<commit_message>
Added 4.4, 4.5, 4.7 and test
</commit_message>
<xml_diff>
--- a/images/Images.pptx
+++ b/images/Images.pptx
@@ -6,12 +6,17 @@
   </p:sldMasterIdLst>
   <p:sldIdLst>
     <p:sldId id="256" r:id="rId2"/>
-    <p:sldId id="258" r:id="rId3"/>
-    <p:sldId id="257" r:id="rId4"/>
-    <p:sldId id="259" r:id="rId5"/>
-    <p:sldId id="260" r:id="rId6"/>
-    <p:sldId id="262" r:id="rId7"/>
-    <p:sldId id="261" r:id="rId8"/>
+    <p:sldId id="267" r:id="rId3"/>
+    <p:sldId id="258" r:id="rId4"/>
+    <p:sldId id="257" r:id="rId5"/>
+    <p:sldId id="259" r:id="rId6"/>
+    <p:sldId id="260" r:id="rId7"/>
+    <p:sldId id="262" r:id="rId8"/>
+    <p:sldId id="261" r:id="rId9"/>
+    <p:sldId id="263" r:id="rId10"/>
+    <p:sldId id="264" r:id="rId11"/>
+    <p:sldId id="265" r:id="rId12"/>
+    <p:sldId id="266" r:id="rId13"/>
   </p:sldIdLst>
   <p:sldSz cx="12192000" cy="6858000"/>
   <p:notesSz cx="6858000" cy="9144000"/>
@@ -267,7 +272,7 @@
           <a:p>
             <a:fld id="{BA48513D-C823-C342-87AA-C2EB607FA67A}" type="datetimeFigureOut">
               <a:rPr lang="en-ES" smtClean="0"/>
-              <a:t>2/12/24</a:t>
+              <a:t>9/12/24</a:t>
             </a:fld>
             <a:endParaRPr lang="en-ES"/>
           </a:p>
@@ -467,7 +472,7 @@
           <a:p>
             <a:fld id="{BA48513D-C823-C342-87AA-C2EB607FA67A}" type="datetimeFigureOut">
               <a:rPr lang="en-ES" smtClean="0"/>
-              <a:t>2/12/24</a:t>
+              <a:t>9/12/24</a:t>
             </a:fld>
             <a:endParaRPr lang="en-ES"/>
           </a:p>
@@ -677,7 +682,7 @@
           <a:p>
             <a:fld id="{BA48513D-C823-C342-87AA-C2EB607FA67A}" type="datetimeFigureOut">
               <a:rPr lang="en-ES" smtClean="0"/>
-              <a:t>2/12/24</a:t>
+              <a:t>9/12/24</a:t>
             </a:fld>
             <a:endParaRPr lang="en-ES"/>
           </a:p>
@@ -877,7 +882,7 @@
           <a:p>
             <a:fld id="{BA48513D-C823-C342-87AA-C2EB607FA67A}" type="datetimeFigureOut">
               <a:rPr lang="en-ES" smtClean="0"/>
-              <a:t>2/12/24</a:t>
+              <a:t>9/12/24</a:t>
             </a:fld>
             <a:endParaRPr lang="en-ES"/>
           </a:p>
@@ -1153,7 +1158,7 @@
           <a:p>
             <a:fld id="{BA48513D-C823-C342-87AA-C2EB607FA67A}" type="datetimeFigureOut">
               <a:rPr lang="en-ES" smtClean="0"/>
-              <a:t>2/12/24</a:t>
+              <a:t>9/12/24</a:t>
             </a:fld>
             <a:endParaRPr lang="en-ES"/>
           </a:p>
@@ -1421,7 +1426,7 @@
           <a:p>
             <a:fld id="{BA48513D-C823-C342-87AA-C2EB607FA67A}" type="datetimeFigureOut">
               <a:rPr lang="en-ES" smtClean="0"/>
-              <a:t>2/12/24</a:t>
+              <a:t>9/12/24</a:t>
             </a:fld>
             <a:endParaRPr lang="en-ES"/>
           </a:p>
@@ -1836,7 +1841,7 @@
           <a:p>
             <a:fld id="{BA48513D-C823-C342-87AA-C2EB607FA67A}" type="datetimeFigureOut">
               <a:rPr lang="en-ES" smtClean="0"/>
-              <a:t>2/12/24</a:t>
+              <a:t>9/12/24</a:t>
             </a:fld>
             <a:endParaRPr lang="en-ES"/>
           </a:p>
@@ -1978,7 +1983,7 @@
           <a:p>
             <a:fld id="{BA48513D-C823-C342-87AA-C2EB607FA67A}" type="datetimeFigureOut">
               <a:rPr lang="en-ES" smtClean="0"/>
-              <a:t>2/12/24</a:t>
+              <a:t>9/12/24</a:t>
             </a:fld>
             <a:endParaRPr lang="en-ES"/>
           </a:p>
@@ -2091,7 +2096,7 @@
           <a:p>
             <a:fld id="{BA48513D-C823-C342-87AA-C2EB607FA67A}" type="datetimeFigureOut">
               <a:rPr lang="en-ES" smtClean="0"/>
-              <a:t>2/12/24</a:t>
+              <a:t>9/12/24</a:t>
             </a:fld>
             <a:endParaRPr lang="en-ES"/>
           </a:p>
@@ -2404,7 +2409,7 @@
           <a:p>
             <a:fld id="{BA48513D-C823-C342-87AA-C2EB607FA67A}" type="datetimeFigureOut">
               <a:rPr lang="en-ES" smtClean="0"/>
-              <a:t>2/12/24</a:t>
+              <a:t>9/12/24</a:t>
             </a:fld>
             <a:endParaRPr lang="en-ES"/>
           </a:p>
@@ -2693,7 +2698,7 @@
           <a:p>
             <a:fld id="{BA48513D-C823-C342-87AA-C2EB607FA67A}" type="datetimeFigureOut">
               <a:rPr lang="en-ES" smtClean="0"/>
-              <a:t>2/12/24</a:t>
+              <a:t>9/12/24</a:t>
             </a:fld>
             <a:endParaRPr lang="en-ES"/>
           </a:p>
@@ -2936,7 +2941,7 @@
           <a:p>
             <a:fld id="{BA48513D-C823-C342-87AA-C2EB607FA67A}" type="datetimeFigureOut">
               <a:rPr lang="en-ES" smtClean="0"/>
-              <a:t>2/12/24</a:t>
+              <a:t>9/12/24</a:t>
             </a:fld>
             <a:endParaRPr lang="en-ES"/>
           </a:p>
@@ -4194,7 +4199,7 @@
 </p:sld>
 </file>
 
-<file path=ppt/slides/slide2.xml><?xml version="1.0" encoding="utf-8"?>
+<file path=ppt/slides/slide10.xml><?xml version="1.0" encoding="utf-8"?>
 <p:sld xmlns:a="http://schemas.openxmlformats.org/drawingml/2006/main" xmlns:r="http://schemas.openxmlformats.org/officeDocument/2006/relationships" xmlns:p="http://schemas.openxmlformats.org/presentationml/2006/main">
   <p:cSld>
     <p:spTree>
@@ -4211,6 +4216,2964 @@
           <a:chExt cx="0" cy="0"/>
         </a:xfrm>
       </p:grpSpPr>
+      <p:grpSp>
+        <p:nvGrpSpPr>
+          <p:cNvPr id="21" name="Group 20">
+            <a:extLst>
+              <a:ext uri="{FF2B5EF4-FFF2-40B4-BE49-F238E27FC236}">
+                <a16:creationId xmlns:a16="http://schemas.microsoft.com/office/drawing/2014/main" id="{398CF618-67E6-E88E-6E5D-D7F37B7417AD}"/>
+              </a:ext>
+            </a:extLst>
+          </p:cNvPr>
+          <p:cNvGrpSpPr/>
+          <p:nvPr/>
+        </p:nvGrpSpPr>
+        <p:grpSpPr>
+          <a:xfrm>
+            <a:off x="2499707" y="2673194"/>
+            <a:ext cx="878983" cy="677794"/>
+            <a:chOff x="2499707" y="2673194"/>
+            <a:chExt cx="878983" cy="677794"/>
+          </a:xfrm>
+        </p:grpSpPr>
+        <p:sp>
+          <p:nvSpPr>
+            <p:cNvPr id="4" name="TextBox 3">
+              <a:extLst>
+                <a:ext uri="{FF2B5EF4-FFF2-40B4-BE49-F238E27FC236}">
+                  <a16:creationId xmlns:a16="http://schemas.microsoft.com/office/drawing/2014/main" id="{E819D1E0-E637-FD68-D259-5330D1C7C53B}"/>
+                </a:ext>
+              </a:extLst>
+            </p:cNvPr>
+            <p:cNvSpPr txBox="1"/>
+            <p:nvPr/>
+          </p:nvSpPr>
+          <p:spPr>
+            <a:xfrm>
+              <a:off x="2504784" y="2766213"/>
+              <a:ext cx="873906" cy="584775"/>
+            </a:xfrm>
+            <a:prstGeom prst="rect">
+              <a:avLst/>
+            </a:prstGeom>
+            <a:noFill/>
+          </p:spPr>
+          <p:txBody>
+            <a:bodyPr wrap="square" rtlCol="0">
+              <a:spAutoFit/>
+            </a:bodyPr>
+            <a:lstStyle/>
+            <a:p>
+              <a:r>
+                <a:rPr lang="en-ES" sz="3200" dirty="0"/>
+                <a:t>m</a:t>
+              </a:r>
+              <a:r>
+                <a:rPr lang="en-ES" sz="3200" baseline="-25000" dirty="0"/>
+                <a:t>1</a:t>
+              </a:r>
+              <a:endParaRPr lang="en-ES" baseline="-25000" dirty="0"/>
+            </a:p>
+          </p:txBody>
+        </p:sp>
+        <p:sp>
+          <p:nvSpPr>
+            <p:cNvPr id="5" name="TextBox 4">
+              <a:extLst>
+                <a:ext uri="{FF2B5EF4-FFF2-40B4-BE49-F238E27FC236}">
+                  <a16:creationId xmlns:a16="http://schemas.microsoft.com/office/drawing/2014/main" id="{385EE595-C4CF-9E3A-E5EC-CCAA42C55236}"/>
+                </a:ext>
+              </a:extLst>
+            </p:cNvPr>
+            <p:cNvSpPr txBox="1"/>
+            <p:nvPr/>
+          </p:nvSpPr>
+          <p:spPr>
+            <a:xfrm>
+              <a:off x="2499707" y="2673194"/>
+              <a:ext cx="492443" cy="461665"/>
+            </a:xfrm>
+            <a:prstGeom prst="rect">
+              <a:avLst/>
+            </a:prstGeom>
+            <a:noFill/>
+          </p:spPr>
+          <p:txBody>
+            <a:bodyPr wrap="square" rtlCol="0">
+              <a:spAutoFit/>
+            </a:bodyPr>
+            <a:lstStyle/>
+            <a:p>
+              <a:r>
+                <a:rPr lang="en-ES" sz="2400" dirty="0"/>
+                <a:t>➝</a:t>
+              </a:r>
+            </a:p>
+          </p:txBody>
+        </p:sp>
+      </p:grpSp>
+      <p:grpSp>
+        <p:nvGrpSpPr>
+          <p:cNvPr id="15" name="Group 14">
+            <a:extLst>
+              <a:ext uri="{FF2B5EF4-FFF2-40B4-BE49-F238E27FC236}">
+                <a16:creationId xmlns:a16="http://schemas.microsoft.com/office/drawing/2014/main" id="{04F9FA61-65B6-A9BE-64FF-38506F2F73BA}"/>
+              </a:ext>
+            </a:extLst>
+          </p:cNvPr>
+          <p:cNvGrpSpPr/>
+          <p:nvPr/>
+        </p:nvGrpSpPr>
+        <p:grpSpPr>
+          <a:xfrm>
+            <a:off x="4544645" y="2543235"/>
+            <a:ext cx="878985" cy="677796"/>
+            <a:chOff x="4982047" y="1023353"/>
+            <a:chExt cx="878985" cy="677796"/>
+          </a:xfrm>
+        </p:grpSpPr>
+        <p:sp>
+          <p:nvSpPr>
+            <p:cNvPr id="11" name="TextBox 10">
+              <a:extLst>
+                <a:ext uri="{FF2B5EF4-FFF2-40B4-BE49-F238E27FC236}">
+                  <a16:creationId xmlns:a16="http://schemas.microsoft.com/office/drawing/2014/main" id="{49AF5C57-429F-361C-E714-C26CDEEAF869}"/>
+                </a:ext>
+              </a:extLst>
+            </p:cNvPr>
+            <p:cNvSpPr txBox="1"/>
+            <p:nvPr/>
+          </p:nvSpPr>
+          <p:spPr>
+            <a:xfrm>
+              <a:off x="4987126" y="1116374"/>
+              <a:ext cx="873906" cy="584775"/>
+            </a:xfrm>
+            <a:prstGeom prst="rect">
+              <a:avLst/>
+            </a:prstGeom>
+            <a:noFill/>
+          </p:spPr>
+          <p:txBody>
+            <a:bodyPr wrap="square" rtlCol="0">
+              <a:spAutoFit/>
+            </a:bodyPr>
+            <a:lstStyle/>
+            <a:p>
+              <a:r>
+                <a:rPr lang="en-ES" sz="3200" dirty="0"/>
+                <a:t>m</a:t>
+              </a:r>
+              <a:r>
+                <a:rPr lang="en-ES" sz="3200" baseline="-25000" dirty="0"/>
+                <a:t>2</a:t>
+              </a:r>
+              <a:endParaRPr lang="en-ES" baseline="-25000" dirty="0"/>
+            </a:p>
+          </p:txBody>
+        </p:sp>
+        <p:sp>
+          <p:nvSpPr>
+            <p:cNvPr id="12" name="TextBox 11">
+              <a:extLst>
+                <a:ext uri="{FF2B5EF4-FFF2-40B4-BE49-F238E27FC236}">
+                  <a16:creationId xmlns:a16="http://schemas.microsoft.com/office/drawing/2014/main" id="{004D5674-AF1B-A1C9-ECF9-CEEE7DCFAABE}"/>
+                </a:ext>
+              </a:extLst>
+            </p:cNvPr>
+            <p:cNvSpPr txBox="1"/>
+            <p:nvPr/>
+          </p:nvSpPr>
+          <p:spPr>
+            <a:xfrm>
+              <a:off x="4982047" y="1023353"/>
+              <a:ext cx="492443" cy="461665"/>
+            </a:xfrm>
+            <a:prstGeom prst="rect">
+              <a:avLst/>
+            </a:prstGeom>
+            <a:noFill/>
+          </p:spPr>
+          <p:txBody>
+            <a:bodyPr wrap="square" rtlCol="0">
+              <a:spAutoFit/>
+            </a:bodyPr>
+            <a:lstStyle/>
+            <a:p>
+              <a:r>
+                <a:rPr lang="en-ES" sz="2400" dirty="0"/>
+                <a:t>➝</a:t>
+              </a:r>
+            </a:p>
+          </p:txBody>
+        </p:sp>
+      </p:grpSp>
+      <p:cxnSp>
+        <p:nvCxnSpPr>
+          <p:cNvPr id="16" name="Straight Arrow Connector 15">
+            <a:extLst>
+              <a:ext uri="{FF2B5EF4-FFF2-40B4-BE49-F238E27FC236}">
+                <a16:creationId xmlns:a16="http://schemas.microsoft.com/office/drawing/2014/main" id="{F01BE37D-5A70-798F-4C8D-ECDEDDC55F69}"/>
+              </a:ext>
+            </a:extLst>
+          </p:cNvPr>
+          <p:cNvCxnSpPr>
+            <a:cxnSpLocks/>
+          </p:cNvCxnSpPr>
+          <p:nvPr/>
+        </p:nvCxnSpPr>
+        <p:spPr>
+          <a:xfrm flipV="1">
+            <a:off x="2498318" y="1187744"/>
+            <a:ext cx="0" cy="2214218"/>
+          </a:xfrm>
+          <a:prstGeom prst="straightConnector1">
+            <a:avLst/>
+          </a:prstGeom>
+          <a:ln w="38100">
+            <a:tailEnd type="triangle"/>
+          </a:ln>
+        </p:spPr>
+        <p:style>
+          <a:lnRef idx="2">
+            <a:schemeClr val="accent1"/>
+          </a:lnRef>
+          <a:fillRef idx="0">
+            <a:schemeClr val="accent1"/>
+          </a:fillRef>
+          <a:effectRef idx="1">
+            <a:schemeClr val="accent1"/>
+          </a:effectRef>
+          <a:fontRef idx="minor">
+            <a:schemeClr val="tx1"/>
+          </a:fontRef>
+        </p:style>
+      </p:cxnSp>
+      <p:sp>
+        <p:nvSpPr>
+          <p:cNvPr id="19" name="TextBox 18">
+            <a:extLst>
+              <a:ext uri="{FF2B5EF4-FFF2-40B4-BE49-F238E27FC236}">
+                <a16:creationId xmlns:a16="http://schemas.microsoft.com/office/drawing/2014/main" id="{A90183F7-92BD-7F6D-D549-A220E9341283}"/>
+              </a:ext>
+            </a:extLst>
+          </p:cNvPr>
+          <p:cNvSpPr txBox="1"/>
+          <p:nvPr/>
+        </p:nvSpPr>
+        <p:spPr>
+          <a:xfrm>
+            <a:off x="2130463" y="970268"/>
+            <a:ext cx="370614" cy="584775"/>
+          </a:xfrm>
+          <a:prstGeom prst="rect">
+            <a:avLst/>
+          </a:prstGeom>
+          <a:noFill/>
+        </p:spPr>
+        <p:txBody>
+          <a:bodyPr wrap="none" rtlCol="0">
+            <a:spAutoFit/>
+          </a:bodyPr>
+          <a:lstStyle/>
+          <a:p>
+            <a:r>
+              <a:rPr lang="en-ES" sz="3200" dirty="0"/>
+              <a:t>y</a:t>
+            </a:r>
+            <a:endParaRPr lang="en-ES" dirty="0"/>
+          </a:p>
+        </p:txBody>
+      </p:sp>
+      <p:grpSp>
+        <p:nvGrpSpPr>
+          <p:cNvPr id="23" name="Group 22">
+            <a:extLst>
+              <a:ext uri="{FF2B5EF4-FFF2-40B4-BE49-F238E27FC236}">
+                <a16:creationId xmlns:a16="http://schemas.microsoft.com/office/drawing/2014/main" id="{233FD450-5138-3ED8-7308-0A2AF61D4533}"/>
+              </a:ext>
+            </a:extLst>
+          </p:cNvPr>
+          <p:cNvGrpSpPr/>
+          <p:nvPr/>
+        </p:nvGrpSpPr>
+        <p:grpSpPr>
+          <a:xfrm>
+            <a:off x="2222659" y="2849239"/>
+            <a:ext cx="549966" cy="660737"/>
+            <a:chOff x="4690772" y="1211142"/>
+            <a:chExt cx="549966" cy="660737"/>
+          </a:xfrm>
+        </p:grpSpPr>
+        <p:sp>
+          <p:nvSpPr>
+            <p:cNvPr id="24" name="Arc 23">
+              <a:extLst>
+                <a:ext uri="{FF2B5EF4-FFF2-40B4-BE49-F238E27FC236}">
+                  <a16:creationId xmlns:a16="http://schemas.microsoft.com/office/drawing/2014/main" id="{88125F11-F569-6A59-2C41-49515248CB38}"/>
+                </a:ext>
+              </a:extLst>
+            </p:cNvPr>
+            <p:cNvSpPr/>
+            <p:nvPr/>
+          </p:nvSpPr>
+          <p:spPr>
+            <a:xfrm>
+              <a:off x="4690772" y="1620088"/>
+              <a:ext cx="549966" cy="251791"/>
+            </a:xfrm>
+            <a:prstGeom prst="arc">
+              <a:avLst>
+                <a:gd name="adj1" fmla="val 2758053"/>
+                <a:gd name="adj2" fmla="val 2720473"/>
+              </a:avLst>
+            </a:prstGeom>
+            <a:ln w="38100">
+              <a:solidFill>
+                <a:schemeClr val="tx1"/>
+              </a:solidFill>
+              <a:prstDash val="solid"/>
+              <a:headEnd type="arrow" w="med" len="med"/>
+              <a:tailEnd type="none" w="med" len="med"/>
+            </a:ln>
+          </p:spPr>
+          <p:style>
+            <a:lnRef idx="2">
+              <a:schemeClr val="accent1"/>
+            </a:lnRef>
+            <a:fillRef idx="0">
+              <a:schemeClr val="accent1"/>
+            </a:fillRef>
+            <a:effectRef idx="1">
+              <a:schemeClr val="accent1"/>
+            </a:effectRef>
+            <a:fontRef idx="minor">
+              <a:schemeClr val="tx1"/>
+            </a:fontRef>
+          </p:style>
+          <p:txBody>
+            <a:bodyPr rtlCol="0" anchor="ctr"/>
+            <a:lstStyle/>
+            <a:p>
+              <a:pPr algn="ctr"/>
+              <a:endParaRPr lang="en-ES" dirty="0"/>
+            </a:p>
+          </p:txBody>
+        </p:sp>
+        <p:cxnSp>
+          <p:nvCxnSpPr>
+            <p:cNvPr id="25" name="Straight Arrow Connector 24">
+              <a:extLst>
+                <a:ext uri="{FF2B5EF4-FFF2-40B4-BE49-F238E27FC236}">
+                  <a16:creationId xmlns:a16="http://schemas.microsoft.com/office/drawing/2014/main" id="{9E48CE07-B300-1B61-EB27-CACA9BD82D5D}"/>
+                </a:ext>
+              </a:extLst>
+            </p:cNvPr>
+            <p:cNvCxnSpPr>
+              <a:cxnSpLocks/>
+            </p:cNvCxnSpPr>
+            <p:nvPr/>
+          </p:nvCxnSpPr>
+          <p:spPr>
+            <a:xfrm flipV="1">
+              <a:off x="4963661" y="1211142"/>
+              <a:ext cx="0" cy="538612"/>
+            </a:xfrm>
+            <a:prstGeom prst="straightConnector1">
+              <a:avLst/>
+            </a:prstGeom>
+            <a:ln w="53975">
+              <a:solidFill>
+                <a:srgbClr val="C00000"/>
+              </a:solidFill>
+              <a:tailEnd type="triangle"/>
+            </a:ln>
+          </p:spPr>
+          <p:style>
+            <a:lnRef idx="2">
+              <a:schemeClr val="accent1"/>
+            </a:lnRef>
+            <a:fillRef idx="0">
+              <a:schemeClr val="accent1"/>
+            </a:fillRef>
+            <a:effectRef idx="1">
+              <a:schemeClr val="accent1"/>
+            </a:effectRef>
+            <a:fontRef idx="minor">
+              <a:schemeClr val="tx1"/>
+            </a:fontRef>
+          </p:style>
+        </p:cxnSp>
+      </p:grpSp>
+      <p:sp>
+        <p:nvSpPr>
+          <p:cNvPr id="26" name="Arc 25">
+            <a:extLst>
+              <a:ext uri="{FF2B5EF4-FFF2-40B4-BE49-F238E27FC236}">
+                <a16:creationId xmlns:a16="http://schemas.microsoft.com/office/drawing/2014/main" id="{B50EB88E-7859-E45F-E149-21CC3FB3F9E2}"/>
+              </a:ext>
+            </a:extLst>
+          </p:cNvPr>
+          <p:cNvSpPr/>
+          <p:nvPr/>
+        </p:nvSpPr>
+        <p:spPr>
+          <a:xfrm>
+            <a:off x="4168878" y="2910348"/>
+            <a:ext cx="884903" cy="943897"/>
+          </a:xfrm>
+          <a:prstGeom prst="arc">
+            <a:avLst>
+              <a:gd name="adj1" fmla="val 5982391"/>
+              <a:gd name="adj2" fmla="val 10937819"/>
+            </a:avLst>
+          </a:prstGeom>
+          <a:ln w="38100">
+            <a:solidFill>
+              <a:schemeClr val="tx1"/>
+            </a:solidFill>
+            <a:prstDash val="sysDot"/>
+            <a:headEnd type="triangle"/>
+            <a:tailEnd type="none"/>
+          </a:ln>
+        </p:spPr>
+        <p:style>
+          <a:lnRef idx="2">
+            <a:schemeClr val="accent1"/>
+          </a:lnRef>
+          <a:fillRef idx="0">
+            <a:schemeClr val="accent1"/>
+          </a:fillRef>
+          <a:effectRef idx="1">
+            <a:schemeClr val="accent1"/>
+          </a:effectRef>
+          <a:fontRef idx="minor">
+            <a:schemeClr val="tx1"/>
+          </a:fontRef>
+        </p:style>
+        <p:txBody>
+          <a:bodyPr rtlCol="0" anchor="ctr"/>
+          <a:lstStyle/>
+          <a:p>
+            <a:pPr algn="ctr"/>
+            <a:endParaRPr lang="en-ES"/>
+          </a:p>
+        </p:txBody>
+      </p:sp>
+      <p:grpSp>
+        <p:nvGrpSpPr>
+          <p:cNvPr id="27" name="Group 26">
+            <a:extLst>
+              <a:ext uri="{FF2B5EF4-FFF2-40B4-BE49-F238E27FC236}">
+                <a16:creationId xmlns:a16="http://schemas.microsoft.com/office/drawing/2014/main" id="{365E1266-C062-86C0-1629-B54C020D5F3B}"/>
+              </a:ext>
+            </a:extLst>
+          </p:cNvPr>
+          <p:cNvGrpSpPr/>
+          <p:nvPr/>
+        </p:nvGrpSpPr>
+        <p:grpSpPr>
+          <a:xfrm>
+            <a:off x="3881141" y="3557710"/>
+            <a:ext cx="918312" cy="543739"/>
+            <a:chOff x="2499707" y="2648226"/>
+            <a:chExt cx="918312" cy="543739"/>
+          </a:xfrm>
+        </p:grpSpPr>
+        <p:sp>
+          <p:nvSpPr>
+            <p:cNvPr id="28" name="TextBox 27">
+              <a:extLst>
+                <a:ext uri="{FF2B5EF4-FFF2-40B4-BE49-F238E27FC236}">
+                  <a16:creationId xmlns:a16="http://schemas.microsoft.com/office/drawing/2014/main" id="{7448322A-55D3-5F3D-1BE9-269CE4BDE6B4}"/>
+                </a:ext>
+              </a:extLst>
+            </p:cNvPr>
+            <p:cNvSpPr txBox="1"/>
+            <p:nvPr/>
+          </p:nvSpPr>
+          <p:spPr>
+            <a:xfrm>
+              <a:off x="2544113" y="2648226"/>
+              <a:ext cx="873906" cy="543739"/>
+            </a:xfrm>
+            <a:prstGeom prst="rect">
+              <a:avLst/>
+            </a:prstGeom>
+            <a:noFill/>
+          </p:spPr>
+          <p:txBody>
+            <a:bodyPr wrap="square" rtlCol="0">
+              <a:spAutoFit/>
+            </a:bodyPr>
+            <a:lstStyle/>
+            <a:p>
+              <a:r>
+                <a:rPr lang="en-ES" sz="4400" baseline="-25000" dirty="0"/>
+                <a:t>𝝉</a:t>
+              </a:r>
+              <a:endParaRPr lang="en-ES" sz="2800" baseline="-25000" dirty="0"/>
+            </a:p>
+          </p:txBody>
+        </p:sp>
+        <p:sp>
+          <p:nvSpPr>
+            <p:cNvPr id="29" name="TextBox 28">
+              <a:extLst>
+                <a:ext uri="{FF2B5EF4-FFF2-40B4-BE49-F238E27FC236}">
+                  <a16:creationId xmlns:a16="http://schemas.microsoft.com/office/drawing/2014/main" id="{77A4CDA7-4619-99EA-BE9F-FD86E4E15DAD}"/>
+                </a:ext>
+              </a:extLst>
+            </p:cNvPr>
+            <p:cNvSpPr txBox="1"/>
+            <p:nvPr/>
+          </p:nvSpPr>
+          <p:spPr>
+            <a:xfrm>
+              <a:off x="2499707" y="2673194"/>
+              <a:ext cx="492443" cy="461665"/>
+            </a:xfrm>
+            <a:prstGeom prst="rect">
+              <a:avLst/>
+            </a:prstGeom>
+            <a:noFill/>
+          </p:spPr>
+          <p:txBody>
+            <a:bodyPr wrap="square" rtlCol="0">
+              <a:spAutoFit/>
+            </a:bodyPr>
+            <a:lstStyle/>
+            <a:p>
+              <a:r>
+                <a:rPr lang="en-ES" sz="2400" dirty="0"/>
+                <a:t>➝</a:t>
+              </a:r>
+            </a:p>
+          </p:txBody>
+        </p:sp>
+      </p:grpSp>
+      <p:cxnSp>
+        <p:nvCxnSpPr>
+          <p:cNvPr id="30" name="Straight Arrow Connector 29">
+            <a:extLst>
+              <a:ext uri="{FF2B5EF4-FFF2-40B4-BE49-F238E27FC236}">
+                <a16:creationId xmlns:a16="http://schemas.microsoft.com/office/drawing/2014/main" id="{1A08ECB2-1E41-81C7-231B-6367295A4775}"/>
+              </a:ext>
+            </a:extLst>
+          </p:cNvPr>
+          <p:cNvCxnSpPr>
+            <a:cxnSpLocks/>
+          </p:cNvCxnSpPr>
+          <p:nvPr/>
+        </p:nvCxnSpPr>
+        <p:spPr>
+          <a:xfrm>
+            <a:off x="2487510" y="3393188"/>
+            <a:ext cx="3166038" cy="0"/>
+          </a:xfrm>
+          <a:prstGeom prst="straightConnector1">
+            <a:avLst/>
+          </a:prstGeom>
+          <a:ln w="38100">
+            <a:tailEnd type="triangle"/>
+          </a:ln>
+        </p:spPr>
+        <p:style>
+          <a:lnRef idx="2">
+            <a:schemeClr val="accent1"/>
+          </a:lnRef>
+          <a:fillRef idx="0">
+            <a:schemeClr val="accent1"/>
+          </a:fillRef>
+          <a:effectRef idx="1">
+            <a:schemeClr val="accent1"/>
+          </a:effectRef>
+          <a:fontRef idx="minor">
+            <a:schemeClr val="tx1"/>
+          </a:fontRef>
+        </p:style>
+      </p:cxnSp>
+      <p:sp>
+        <p:nvSpPr>
+          <p:cNvPr id="31" name="TextBox 30">
+            <a:extLst>
+              <a:ext uri="{FF2B5EF4-FFF2-40B4-BE49-F238E27FC236}">
+                <a16:creationId xmlns:a16="http://schemas.microsoft.com/office/drawing/2014/main" id="{73E569A2-B9A6-590E-F81F-0EA0CC5E9E09}"/>
+              </a:ext>
+            </a:extLst>
+          </p:cNvPr>
+          <p:cNvSpPr txBox="1"/>
+          <p:nvPr/>
+        </p:nvSpPr>
+        <p:spPr>
+          <a:xfrm>
+            <a:off x="5403064" y="3312625"/>
+            <a:ext cx="365806" cy="584775"/>
+          </a:xfrm>
+          <a:prstGeom prst="rect">
+            <a:avLst/>
+          </a:prstGeom>
+          <a:noFill/>
+        </p:spPr>
+        <p:txBody>
+          <a:bodyPr wrap="none" rtlCol="0">
+            <a:spAutoFit/>
+          </a:bodyPr>
+          <a:lstStyle/>
+          <a:p>
+            <a:r>
+              <a:rPr lang="en-ES" sz="3200" dirty="0"/>
+              <a:t>x</a:t>
+            </a:r>
+            <a:endParaRPr lang="en-ES" dirty="0"/>
+          </a:p>
+        </p:txBody>
+      </p:sp>
+      <p:grpSp>
+        <p:nvGrpSpPr>
+          <p:cNvPr id="14" name="Group 13">
+            <a:extLst>
+              <a:ext uri="{FF2B5EF4-FFF2-40B4-BE49-F238E27FC236}">
+                <a16:creationId xmlns:a16="http://schemas.microsoft.com/office/drawing/2014/main" id="{9A3F45C7-5C79-62C5-6080-958836591EA5}"/>
+              </a:ext>
+            </a:extLst>
+          </p:cNvPr>
+          <p:cNvGrpSpPr/>
+          <p:nvPr/>
+        </p:nvGrpSpPr>
+        <p:grpSpPr>
+          <a:xfrm rot="16200000">
+            <a:off x="4105538" y="3060632"/>
+            <a:ext cx="549966" cy="660737"/>
+            <a:chOff x="4690772" y="1211142"/>
+            <a:chExt cx="549966" cy="660737"/>
+          </a:xfrm>
+        </p:grpSpPr>
+        <p:sp>
+          <p:nvSpPr>
+            <p:cNvPr id="13" name="Arc 12">
+              <a:extLst>
+                <a:ext uri="{FF2B5EF4-FFF2-40B4-BE49-F238E27FC236}">
+                  <a16:creationId xmlns:a16="http://schemas.microsoft.com/office/drawing/2014/main" id="{2DF7FD51-7DC9-0A24-568F-BA86D2084702}"/>
+                </a:ext>
+              </a:extLst>
+            </p:cNvPr>
+            <p:cNvSpPr/>
+            <p:nvPr/>
+          </p:nvSpPr>
+          <p:spPr>
+            <a:xfrm>
+              <a:off x="4690772" y="1620088"/>
+              <a:ext cx="549966" cy="251791"/>
+            </a:xfrm>
+            <a:prstGeom prst="arc">
+              <a:avLst>
+                <a:gd name="adj1" fmla="val 2758053"/>
+                <a:gd name="adj2" fmla="val 2720473"/>
+              </a:avLst>
+            </a:prstGeom>
+            <a:ln w="38100">
+              <a:solidFill>
+                <a:schemeClr val="tx1"/>
+              </a:solidFill>
+              <a:prstDash val="solid"/>
+              <a:headEnd type="arrow" w="med" len="med"/>
+              <a:tailEnd type="none" w="med" len="med"/>
+            </a:ln>
+          </p:spPr>
+          <p:style>
+            <a:lnRef idx="2">
+              <a:schemeClr val="accent1"/>
+            </a:lnRef>
+            <a:fillRef idx="0">
+              <a:schemeClr val="accent1"/>
+            </a:fillRef>
+            <a:effectRef idx="1">
+              <a:schemeClr val="accent1"/>
+            </a:effectRef>
+            <a:fontRef idx="minor">
+              <a:schemeClr val="tx1"/>
+            </a:fontRef>
+          </p:style>
+          <p:txBody>
+            <a:bodyPr rtlCol="0" anchor="ctr"/>
+            <a:lstStyle/>
+            <a:p>
+              <a:pPr algn="ctr"/>
+              <a:endParaRPr lang="en-ES" dirty="0"/>
+            </a:p>
+          </p:txBody>
+        </p:sp>
+        <p:cxnSp>
+          <p:nvCxnSpPr>
+            <p:cNvPr id="10" name="Straight Arrow Connector 9">
+              <a:extLst>
+                <a:ext uri="{FF2B5EF4-FFF2-40B4-BE49-F238E27FC236}">
+                  <a16:creationId xmlns:a16="http://schemas.microsoft.com/office/drawing/2014/main" id="{851C1FF3-8EED-27CC-2943-B6A22BE0F1E3}"/>
+                </a:ext>
+              </a:extLst>
+            </p:cNvPr>
+            <p:cNvCxnSpPr>
+              <a:cxnSpLocks/>
+            </p:cNvCxnSpPr>
+            <p:nvPr/>
+          </p:nvCxnSpPr>
+          <p:spPr>
+            <a:xfrm flipV="1">
+              <a:off x="4963661" y="1211142"/>
+              <a:ext cx="0" cy="538612"/>
+            </a:xfrm>
+            <a:prstGeom prst="straightConnector1">
+              <a:avLst/>
+            </a:prstGeom>
+            <a:ln w="53975">
+              <a:solidFill>
+                <a:srgbClr val="C00000"/>
+              </a:solidFill>
+              <a:tailEnd type="triangle"/>
+            </a:ln>
+          </p:spPr>
+          <p:style>
+            <a:lnRef idx="2">
+              <a:schemeClr val="accent1"/>
+            </a:lnRef>
+            <a:fillRef idx="0">
+              <a:schemeClr val="accent1"/>
+            </a:fillRef>
+            <a:effectRef idx="1">
+              <a:schemeClr val="accent1"/>
+            </a:effectRef>
+            <a:fontRef idx="minor">
+              <a:schemeClr val="tx1"/>
+            </a:fontRef>
+          </p:style>
+        </p:cxnSp>
+      </p:grpSp>
+    </p:spTree>
+    <p:extLst>
+      <p:ext uri="{BB962C8B-B14F-4D97-AF65-F5344CB8AC3E}">
+        <p14:creationId xmlns:p14="http://schemas.microsoft.com/office/powerpoint/2010/main" val="975232296"/>
+      </p:ext>
+    </p:extLst>
+  </p:cSld>
+  <p:clrMapOvr>
+    <a:masterClrMapping/>
+  </p:clrMapOvr>
+</p:sld>
+</file>
+
+<file path=ppt/slides/slide11.xml><?xml version="1.0" encoding="utf-8"?>
+<p:sld xmlns:a="http://schemas.openxmlformats.org/drawingml/2006/main" xmlns:r="http://schemas.openxmlformats.org/officeDocument/2006/relationships" xmlns:p="http://schemas.openxmlformats.org/presentationml/2006/main">
+  <p:cSld>
+    <p:spTree>
+      <p:nvGrpSpPr>
+        <p:cNvPr id="1" name="">
+          <a:extLst>
+            <a:ext uri="{FF2B5EF4-FFF2-40B4-BE49-F238E27FC236}">
+              <a16:creationId xmlns:a16="http://schemas.microsoft.com/office/drawing/2014/main" id="{681BFA17-D7DE-197B-A98A-02D16D7A097B}"/>
+            </a:ext>
+          </a:extLst>
+        </p:cNvPr>
+        <p:cNvGrpSpPr/>
+        <p:nvPr/>
+      </p:nvGrpSpPr>
+      <p:grpSpPr>
+        <a:xfrm>
+          <a:off x="0" y="0"/>
+          <a:ext cx="0" cy="0"/>
+          <a:chOff x="0" y="0"/>
+          <a:chExt cx="0" cy="0"/>
+        </a:xfrm>
+      </p:grpSpPr>
+      <p:grpSp>
+        <p:nvGrpSpPr>
+          <p:cNvPr id="21" name="Group 20">
+            <a:extLst>
+              <a:ext uri="{FF2B5EF4-FFF2-40B4-BE49-F238E27FC236}">
+                <a16:creationId xmlns:a16="http://schemas.microsoft.com/office/drawing/2014/main" id="{54F5996E-A09A-9140-A28E-CC5CE126D062}"/>
+              </a:ext>
+            </a:extLst>
+          </p:cNvPr>
+          <p:cNvGrpSpPr/>
+          <p:nvPr/>
+        </p:nvGrpSpPr>
+        <p:grpSpPr>
+          <a:xfrm>
+            <a:off x="2499707" y="2673194"/>
+            <a:ext cx="878983" cy="677794"/>
+            <a:chOff x="2499707" y="2673194"/>
+            <a:chExt cx="878983" cy="677794"/>
+          </a:xfrm>
+        </p:grpSpPr>
+        <p:sp>
+          <p:nvSpPr>
+            <p:cNvPr id="4" name="TextBox 3">
+              <a:extLst>
+                <a:ext uri="{FF2B5EF4-FFF2-40B4-BE49-F238E27FC236}">
+                  <a16:creationId xmlns:a16="http://schemas.microsoft.com/office/drawing/2014/main" id="{9C017A06-858A-2D40-E6B0-5906B185DF60}"/>
+                </a:ext>
+              </a:extLst>
+            </p:cNvPr>
+            <p:cNvSpPr txBox="1"/>
+            <p:nvPr/>
+          </p:nvSpPr>
+          <p:spPr>
+            <a:xfrm>
+              <a:off x="2504784" y="2766213"/>
+              <a:ext cx="873906" cy="584775"/>
+            </a:xfrm>
+            <a:prstGeom prst="rect">
+              <a:avLst/>
+            </a:prstGeom>
+            <a:noFill/>
+          </p:spPr>
+          <p:txBody>
+            <a:bodyPr wrap="square" rtlCol="0">
+              <a:spAutoFit/>
+            </a:bodyPr>
+            <a:lstStyle/>
+            <a:p>
+              <a:r>
+                <a:rPr lang="en-ES" sz="3200" dirty="0"/>
+                <a:t>m</a:t>
+              </a:r>
+              <a:r>
+                <a:rPr lang="en-ES" sz="3200" baseline="-25000" dirty="0"/>
+                <a:t>1</a:t>
+              </a:r>
+              <a:endParaRPr lang="en-ES" baseline="-25000" dirty="0"/>
+            </a:p>
+          </p:txBody>
+        </p:sp>
+        <p:sp>
+          <p:nvSpPr>
+            <p:cNvPr id="5" name="TextBox 4">
+              <a:extLst>
+                <a:ext uri="{FF2B5EF4-FFF2-40B4-BE49-F238E27FC236}">
+                  <a16:creationId xmlns:a16="http://schemas.microsoft.com/office/drawing/2014/main" id="{D5C208B3-1944-38E3-30E6-699659D69A83}"/>
+                </a:ext>
+              </a:extLst>
+            </p:cNvPr>
+            <p:cNvSpPr txBox="1"/>
+            <p:nvPr/>
+          </p:nvSpPr>
+          <p:spPr>
+            <a:xfrm>
+              <a:off x="2499707" y="2673194"/>
+              <a:ext cx="492443" cy="461665"/>
+            </a:xfrm>
+            <a:prstGeom prst="rect">
+              <a:avLst/>
+            </a:prstGeom>
+            <a:noFill/>
+          </p:spPr>
+          <p:txBody>
+            <a:bodyPr wrap="square" rtlCol="0">
+              <a:spAutoFit/>
+            </a:bodyPr>
+            <a:lstStyle/>
+            <a:p>
+              <a:r>
+                <a:rPr lang="en-ES" sz="2400" dirty="0"/>
+                <a:t>➝</a:t>
+              </a:r>
+            </a:p>
+          </p:txBody>
+        </p:sp>
+      </p:grpSp>
+      <p:grpSp>
+        <p:nvGrpSpPr>
+          <p:cNvPr id="15" name="Group 14">
+            <a:extLst>
+              <a:ext uri="{FF2B5EF4-FFF2-40B4-BE49-F238E27FC236}">
+                <a16:creationId xmlns:a16="http://schemas.microsoft.com/office/drawing/2014/main" id="{98467976-F3FB-D97E-E50A-5341E3C12A30}"/>
+              </a:ext>
+            </a:extLst>
+          </p:cNvPr>
+          <p:cNvGrpSpPr/>
+          <p:nvPr/>
+        </p:nvGrpSpPr>
+        <p:grpSpPr>
+          <a:xfrm>
+            <a:off x="3305781" y="2267931"/>
+            <a:ext cx="878985" cy="677796"/>
+            <a:chOff x="4982047" y="1023353"/>
+            <a:chExt cx="878985" cy="677796"/>
+          </a:xfrm>
+        </p:grpSpPr>
+        <p:sp>
+          <p:nvSpPr>
+            <p:cNvPr id="11" name="TextBox 10">
+              <a:extLst>
+                <a:ext uri="{FF2B5EF4-FFF2-40B4-BE49-F238E27FC236}">
+                  <a16:creationId xmlns:a16="http://schemas.microsoft.com/office/drawing/2014/main" id="{ED8579E6-8D48-141F-9693-1D163D20911F}"/>
+                </a:ext>
+              </a:extLst>
+            </p:cNvPr>
+            <p:cNvSpPr txBox="1"/>
+            <p:nvPr/>
+          </p:nvSpPr>
+          <p:spPr>
+            <a:xfrm>
+              <a:off x="4987126" y="1116374"/>
+              <a:ext cx="873906" cy="584775"/>
+            </a:xfrm>
+            <a:prstGeom prst="rect">
+              <a:avLst/>
+            </a:prstGeom>
+            <a:noFill/>
+          </p:spPr>
+          <p:txBody>
+            <a:bodyPr wrap="square" rtlCol="0">
+              <a:spAutoFit/>
+            </a:bodyPr>
+            <a:lstStyle/>
+            <a:p>
+              <a:r>
+                <a:rPr lang="en-ES" sz="3200" dirty="0"/>
+                <a:t>m</a:t>
+              </a:r>
+              <a:r>
+                <a:rPr lang="en-ES" sz="3200" baseline="-25000" dirty="0"/>
+                <a:t>2</a:t>
+              </a:r>
+              <a:endParaRPr lang="en-ES" baseline="-25000" dirty="0"/>
+            </a:p>
+          </p:txBody>
+        </p:sp>
+        <p:sp>
+          <p:nvSpPr>
+            <p:cNvPr id="12" name="TextBox 11">
+              <a:extLst>
+                <a:ext uri="{FF2B5EF4-FFF2-40B4-BE49-F238E27FC236}">
+                  <a16:creationId xmlns:a16="http://schemas.microsoft.com/office/drawing/2014/main" id="{B746F4B1-16F3-3EEE-305B-0F9C76CA9C8C}"/>
+                </a:ext>
+              </a:extLst>
+            </p:cNvPr>
+            <p:cNvSpPr txBox="1"/>
+            <p:nvPr/>
+          </p:nvSpPr>
+          <p:spPr>
+            <a:xfrm>
+              <a:off x="4982047" y="1023353"/>
+              <a:ext cx="492443" cy="461665"/>
+            </a:xfrm>
+            <a:prstGeom prst="rect">
+              <a:avLst/>
+            </a:prstGeom>
+            <a:noFill/>
+          </p:spPr>
+          <p:txBody>
+            <a:bodyPr wrap="square" rtlCol="0">
+              <a:spAutoFit/>
+            </a:bodyPr>
+            <a:lstStyle/>
+            <a:p>
+              <a:r>
+                <a:rPr lang="en-ES" sz="2400" dirty="0"/>
+                <a:t>➝</a:t>
+              </a:r>
+            </a:p>
+          </p:txBody>
+        </p:sp>
+      </p:grpSp>
+      <p:cxnSp>
+        <p:nvCxnSpPr>
+          <p:cNvPr id="16" name="Straight Arrow Connector 15">
+            <a:extLst>
+              <a:ext uri="{FF2B5EF4-FFF2-40B4-BE49-F238E27FC236}">
+                <a16:creationId xmlns:a16="http://schemas.microsoft.com/office/drawing/2014/main" id="{48421AFD-FBA9-DD81-5210-A708092C3176}"/>
+              </a:ext>
+            </a:extLst>
+          </p:cNvPr>
+          <p:cNvCxnSpPr>
+            <a:cxnSpLocks/>
+          </p:cNvCxnSpPr>
+          <p:nvPr/>
+        </p:nvCxnSpPr>
+        <p:spPr>
+          <a:xfrm flipV="1">
+            <a:off x="2498318" y="1187744"/>
+            <a:ext cx="0" cy="2214218"/>
+          </a:xfrm>
+          <a:prstGeom prst="straightConnector1">
+            <a:avLst/>
+          </a:prstGeom>
+          <a:ln w="38100">
+            <a:tailEnd type="triangle"/>
+          </a:ln>
+        </p:spPr>
+        <p:style>
+          <a:lnRef idx="2">
+            <a:schemeClr val="accent1"/>
+          </a:lnRef>
+          <a:fillRef idx="0">
+            <a:schemeClr val="accent1"/>
+          </a:fillRef>
+          <a:effectRef idx="1">
+            <a:schemeClr val="accent1"/>
+          </a:effectRef>
+          <a:fontRef idx="minor">
+            <a:schemeClr val="tx1"/>
+          </a:fontRef>
+        </p:style>
+      </p:cxnSp>
+      <p:sp>
+        <p:nvSpPr>
+          <p:cNvPr id="19" name="TextBox 18">
+            <a:extLst>
+              <a:ext uri="{FF2B5EF4-FFF2-40B4-BE49-F238E27FC236}">
+                <a16:creationId xmlns:a16="http://schemas.microsoft.com/office/drawing/2014/main" id="{E68F4A96-7FEC-0AD3-980B-1D72816A1A30}"/>
+              </a:ext>
+            </a:extLst>
+          </p:cNvPr>
+          <p:cNvSpPr txBox="1"/>
+          <p:nvPr/>
+        </p:nvSpPr>
+        <p:spPr>
+          <a:xfrm>
+            <a:off x="2130463" y="970268"/>
+            <a:ext cx="370614" cy="584775"/>
+          </a:xfrm>
+          <a:prstGeom prst="rect">
+            <a:avLst/>
+          </a:prstGeom>
+          <a:noFill/>
+        </p:spPr>
+        <p:txBody>
+          <a:bodyPr wrap="none" rtlCol="0">
+            <a:spAutoFit/>
+          </a:bodyPr>
+          <a:lstStyle/>
+          <a:p>
+            <a:r>
+              <a:rPr lang="en-ES" sz="3200" dirty="0"/>
+              <a:t>z</a:t>
+            </a:r>
+            <a:endParaRPr lang="en-ES" dirty="0"/>
+          </a:p>
+        </p:txBody>
+      </p:sp>
+      <p:grpSp>
+        <p:nvGrpSpPr>
+          <p:cNvPr id="14" name="Group 13">
+            <a:extLst>
+              <a:ext uri="{FF2B5EF4-FFF2-40B4-BE49-F238E27FC236}">
+                <a16:creationId xmlns:a16="http://schemas.microsoft.com/office/drawing/2014/main" id="{9B6FFAA6-D219-43DC-FCE2-7740046D2A14}"/>
+              </a:ext>
+            </a:extLst>
+          </p:cNvPr>
+          <p:cNvGrpSpPr/>
+          <p:nvPr/>
+        </p:nvGrpSpPr>
+        <p:grpSpPr>
+          <a:xfrm rot="10800000">
+            <a:off x="3899063" y="2411702"/>
+            <a:ext cx="549966" cy="660737"/>
+            <a:chOff x="4690772" y="1211142"/>
+            <a:chExt cx="549966" cy="660737"/>
+          </a:xfrm>
+        </p:grpSpPr>
+        <p:sp>
+          <p:nvSpPr>
+            <p:cNvPr id="13" name="Arc 12">
+              <a:extLst>
+                <a:ext uri="{FF2B5EF4-FFF2-40B4-BE49-F238E27FC236}">
+                  <a16:creationId xmlns:a16="http://schemas.microsoft.com/office/drawing/2014/main" id="{7CCF7401-39EA-B490-F5C2-56459319C94C}"/>
+                </a:ext>
+              </a:extLst>
+            </p:cNvPr>
+            <p:cNvSpPr/>
+            <p:nvPr/>
+          </p:nvSpPr>
+          <p:spPr>
+            <a:xfrm>
+              <a:off x="4690772" y="1620088"/>
+              <a:ext cx="549966" cy="251791"/>
+            </a:xfrm>
+            <a:prstGeom prst="arc">
+              <a:avLst>
+                <a:gd name="adj1" fmla="val 2758053"/>
+                <a:gd name="adj2" fmla="val 2720473"/>
+              </a:avLst>
+            </a:prstGeom>
+            <a:ln w="38100">
+              <a:solidFill>
+                <a:schemeClr val="tx1"/>
+              </a:solidFill>
+              <a:prstDash val="solid"/>
+              <a:headEnd type="arrow" w="med" len="med"/>
+              <a:tailEnd type="none" w="med" len="med"/>
+            </a:ln>
+          </p:spPr>
+          <p:style>
+            <a:lnRef idx="2">
+              <a:schemeClr val="accent1"/>
+            </a:lnRef>
+            <a:fillRef idx="0">
+              <a:schemeClr val="accent1"/>
+            </a:fillRef>
+            <a:effectRef idx="1">
+              <a:schemeClr val="accent1"/>
+            </a:effectRef>
+            <a:fontRef idx="minor">
+              <a:schemeClr val="tx1"/>
+            </a:fontRef>
+          </p:style>
+          <p:txBody>
+            <a:bodyPr rtlCol="0" anchor="ctr"/>
+            <a:lstStyle/>
+            <a:p>
+              <a:pPr algn="ctr"/>
+              <a:endParaRPr lang="en-ES" dirty="0"/>
+            </a:p>
+          </p:txBody>
+        </p:sp>
+        <p:cxnSp>
+          <p:nvCxnSpPr>
+            <p:cNvPr id="10" name="Straight Arrow Connector 9">
+              <a:extLst>
+                <a:ext uri="{FF2B5EF4-FFF2-40B4-BE49-F238E27FC236}">
+                  <a16:creationId xmlns:a16="http://schemas.microsoft.com/office/drawing/2014/main" id="{DAEF500A-C44D-8613-311F-A9107E37CCF7}"/>
+                </a:ext>
+              </a:extLst>
+            </p:cNvPr>
+            <p:cNvCxnSpPr>
+              <a:cxnSpLocks/>
+            </p:cNvCxnSpPr>
+            <p:nvPr/>
+          </p:nvCxnSpPr>
+          <p:spPr>
+            <a:xfrm flipV="1">
+              <a:off x="4963661" y="1211142"/>
+              <a:ext cx="0" cy="538612"/>
+            </a:xfrm>
+            <a:prstGeom prst="straightConnector1">
+              <a:avLst/>
+            </a:prstGeom>
+            <a:ln w="53975">
+              <a:solidFill>
+                <a:srgbClr val="C00000"/>
+              </a:solidFill>
+              <a:tailEnd type="triangle"/>
+            </a:ln>
+          </p:spPr>
+          <p:style>
+            <a:lnRef idx="2">
+              <a:schemeClr val="accent1"/>
+            </a:lnRef>
+            <a:fillRef idx="0">
+              <a:schemeClr val="accent1"/>
+            </a:fillRef>
+            <a:effectRef idx="1">
+              <a:schemeClr val="accent1"/>
+            </a:effectRef>
+            <a:fontRef idx="minor">
+              <a:schemeClr val="tx1"/>
+            </a:fontRef>
+          </p:style>
+        </p:cxnSp>
+      </p:grpSp>
+      <p:grpSp>
+        <p:nvGrpSpPr>
+          <p:cNvPr id="23" name="Group 22">
+            <a:extLst>
+              <a:ext uri="{FF2B5EF4-FFF2-40B4-BE49-F238E27FC236}">
+                <a16:creationId xmlns:a16="http://schemas.microsoft.com/office/drawing/2014/main" id="{D8296227-0D6D-5AB0-1A79-C6538BBEAA0D}"/>
+              </a:ext>
+            </a:extLst>
+          </p:cNvPr>
+          <p:cNvGrpSpPr/>
+          <p:nvPr/>
+        </p:nvGrpSpPr>
+        <p:grpSpPr>
+          <a:xfrm>
+            <a:off x="2222659" y="2849239"/>
+            <a:ext cx="549966" cy="660737"/>
+            <a:chOff x="4690772" y="1211142"/>
+            <a:chExt cx="549966" cy="660737"/>
+          </a:xfrm>
+        </p:grpSpPr>
+        <p:sp>
+          <p:nvSpPr>
+            <p:cNvPr id="24" name="Arc 23">
+              <a:extLst>
+                <a:ext uri="{FF2B5EF4-FFF2-40B4-BE49-F238E27FC236}">
+                  <a16:creationId xmlns:a16="http://schemas.microsoft.com/office/drawing/2014/main" id="{6995C07F-43C3-9716-72AA-62DACF828111}"/>
+                </a:ext>
+              </a:extLst>
+            </p:cNvPr>
+            <p:cNvSpPr/>
+            <p:nvPr/>
+          </p:nvSpPr>
+          <p:spPr>
+            <a:xfrm>
+              <a:off x="4690772" y="1620088"/>
+              <a:ext cx="549966" cy="251791"/>
+            </a:xfrm>
+            <a:prstGeom prst="arc">
+              <a:avLst>
+                <a:gd name="adj1" fmla="val 2758053"/>
+                <a:gd name="adj2" fmla="val 2720473"/>
+              </a:avLst>
+            </a:prstGeom>
+            <a:ln w="38100">
+              <a:solidFill>
+                <a:schemeClr val="tx1"/>
+              </a:solidFill>
+              <a:prstDash val="solid"/>
+              <a:headEnd type="arrow" w="med" len="med"/>
+              <a:tailEnd type="none" w="med" len="med"/>
+            </a:ln>
+          </p:spPr>
+          <p:style>
+            <a:lnRef idx="2">
+              <a:schemeClr val="accent1"/>
+            </a:lnRef>
+            <a:fillRef idx="0">
+              <a:schemeClr val="accent1"/>
+            </a:fillRef>
+            <a:effectRef idx="1">
+              <a:schemeClr val="accent1"/>
+            </a:effectRef>
+            <a:fontRef idx="minor">
+              <a:schemeClr val="tx1"/>
+            </a:fontRef>
+          </p:style>
+          <p:txBody>
+            <a:bodyPr rtlCol="0" anchor="ctr"/>
+            <a:lstStyle/>
+            <a:p>
+              <a:pPr algn="ctr"/>
+              <a:endParaRPr lang="en-ES" dirty="0"/>
+            </a:p>
+          </p:txBody>
+        </p:sp>
+        <p:cxnSp>
+          <p:nvCxnSpPr>
+            <p:cNvPr id="25" name="Straight Arrow Connector 24">
+              <a:extLst>
+                <a:ext uri="{FF2B5EF4-FFF2-40B4-BE49-F238E27FC236}">
+                  <a16:creationId xmlns:a16="http://schemas.microsoft.com/office/drawing/2014/main" id="{9B28B97E-7A29-03EE-D45C-70B19238A5D3}"/>
+                </a:ext>
+              </a:extLst>
+            </p:cNvPr>
+            <p:cNvCxnSpPr>
+              <a:cxnSpLocks/>
+            </p:cNvCxnSpPr>
+            <p:nvPr/>
+          </p:nvCxnSpPr>
+          <p:spPr>
+            <a:xfrm flipV="1">
+              <a:off x="4963661" y="1211142"/>
+              <a:ext cx="0" cy="538612"/>
+            </a:xfrm>
+            <a:prstGeom prst="straightConnector1">
+              <a:avLst/>
+            </a:prstGeom>
+            <a:ln w="53975">
+              <a:solidFill>
+                <a:srgbClr val="C00000"/>
+              </a:solidFill>
+              <a:tailEnd type="triangle"/>
+            </a:ln>
+          </p:spPr>
+          <p:style>
+            <a:lnRef idx="2">
+              <a:schemeClr val="accent1"/>
+            </a:lnRef>
+            <a:fillRef idx="0">
+              <a:schemeClr val="accent1"/>
+            </a:fillRef>
+            <a:effectRef idx="1">
+              <a:schemeClr val="accent1"/>
+            </a:effectRef>
+            <a:fontRef idx="minor">
+              <a:schemeClr val="tx1"/>
+            </a:fontRef>
+          </p:style>
+        </p:cxnSp>
+      </p:grpSp>
+      <p:sp>
+        <p:nvSpPr>
+          <p:cNvPr id="26" name="Arc 25">
+            <a:extLst>
+              <a:ext uri="{FF2B5EF4-FFF2-40B4-BE49-F238E27FC236}">
+                <a16:creationId xmlns:a16="http://schemas.microsoft.com/office/drawing/2014/main" id="{04FF0BFB-C398-6CD4-5CF5-0C515D8C4DCA}"/>
+              </a:ext>
+            </a:extLst>
+          </p:cNvPr>
+          <p:cNvSpPr/>
+          <p:nvPr/>
+        </p:nvSpPr>
+        <p:spPr>
+          <a:xfrm rot="16200000">
+            <a:off x="3746091" y="2153263"/>
+            <a:ext cx="884903" cy="943897"/>
+          </a:xfrm>
+          <a:prstGeom prst="arc">
+            <a:avLst>
+              <a:gd name="adj1" fmla="val 7216346"/>
+              <a:gd name="adj2" fmla="val 10937819"/>
+            </a:avLst>
+          </a:prstGeom>
+          <a:ln w="38100">
+            <a:solidFill>
+              <a:schemeClr val="tx1"/>
+            </a:solidFill>
+            <a:prstDash val="sysDot"/>
+            <a:headEnd type="triangle"/>
+            <a:tailEnd type="none"/>
+          </a:ln>
+        </p:spPr>
+        <p:style>
+          <a:lnRef idx="2">
+            <a:schemeClr val="accent1"/>
+          </a:lnRef>
+          <a:fillRef idx="0">
+            <a:schemeClr val="accent1"/>
+          </a:fillRef>
+          <a:effectRef idx="1">
+            <a:schemeClr val="accent1"/>
+          </a:effectRef>
+          <a:fontRef idx="minor">
+            <a:schemeClr val="tx1"/>
+          </a:fontRef>
+        </p:style>
+        <p:txBody>
+          <a:bodyPr rtlCol="0" anchor="ctr"/>
+          <a:lstStyle/>
+          <a:p>
+            <a:pPr algn="ctr"/>
+            <a:endParaRPr lang="en-ES"/>
+          </a:p>
+        </p:txBody>
+      </p:sp>
+      <p:grpSp>
+        <p:nvGrpSpPr>
+          <p:cNvPr id="27" name="Group 26">
+            <a:extLst>
+              <a:ext uri="{FF2B5EF4-FFF2-40B4-BE49-F238E27FC236}">
+                <a16:creationId xmlns:a16="http://schemas.microsoft.com/office/drawing/2014/main" id="{75E5E8A9-6A7D-CA6A-634C-91FC4C1A39C6}"/>
+              </a:ext>
+            </a:extLst>
+          </p:cNvPr>
+          <p:cNvGrpSpPr/>
+          <p:nvPr/>
+        </p:nvGrpSpPr>
+        <p:grpSpPr>
+          <a:xfrm>
+            <a:off x="4313763" y="2830123"/>
+            <a:ext cx="918312" cy="543739"/>
+            <a:chOff x="2499707" y="2648226"/>
+            <a:chExt cx="918312" cy="543739"/>
+          </a:xfrm>
+        </p:grpSpPr>
+        <p:sp>
+          <p:nvSpPr>
+            <p:cNvPr id="28" name="TextBox 27">
+              <a:extLst>
+                <a:ext uri="{FF2B5EF4-FFF2-40B4-BE49-F238E27FC236}">
+                  <a16:creationId xmlns:a16="http://schemas.microsoft.com/office/drawing/2014/main" id="{DCE81C5E-8383-9A97-1406-8D3C3359E315}"/>
+                </a:ext>
+              </a:extLst>
+            </p:cNvPr>
+            <p:cNvSpPr txBox="1"/>
+            <p:nvPr/>
+          </p:nvSpPr>
+          <p:spPr>
+            <a:xfrm>
+              <a:off x="2544113" y="2648226"/>
+              <a:ext cx="873906" cy="543739"/>
+            </a:xfrm>
+            <a:prstGeom prst="rect">
+              <a:avLst/>
+            </a:prstGeom>
+            <a:noFill/>
+          </p:spPr>
+          <p:txBody>
+            <a:bodyPr wrap="square" rtlCol="0">
+              <a:spAutoFit/>
+            </a:bodyPr>
+            <a:lstStyle/>
+            <a:p>
+              <a:r>
+                <a:rPr lang="en-ES" sz="4400" baseline="-25000" dirty="0"/>
+                <a:t>𝝉</a:t>
+              </a:r>
+              <a:endParaRPr lang="en-ES" sz="2800" baseline="-25000" dirty="0"/>
+            </a:p>
+          </p:txBody>
+        </p:sp>
+        <p:sp>
+          <p:nvSpPr>
+            <p:cNvPr id="29" name="TextBox 28">
+              <a:extLst>
+                <a:ext uri="{FF2B5EF4-FFF2-40B4-BE49-F238E27FC236}">
+                  <a16:creationId xmlns:a16="http://schemas.microsoft.com/office/drawing/2014/main" id="{5B7278A0-1CF2-8117-039F-332086CA18F0}"/>
+                </a:ext>
+              </a:extLst>
+            </p:cNvPr>
+            <p:cNvSpPr txBox="1"/>
+            <p:nvPr/>
+          </p:nvSpPr>
+          <p:spPr>
+            <a:xfrm>
+              <a:off x="2499707" y="2673194"/>
+              <a:ext cx="492443" cy="461665"/>
+            </a:xfrm>
+            <a:prstGeom prst="rect">
+              <a:avLst/>
+            </a:prstGeom>
+            <a:noFill/>
+          </p:spPr>
+          <p:txBody>
+            <a:bodyPr wrap="square" rtlCol="0">
+              <a:spAutoFit/>
+            </a:bodyPr>
+            <a:lstStyle/>
+            <a:p>
+              <a:r>
+                <a:rPr lang="en-ES" sz="2400" dirty="0"/>
+                <a:t>➝</a:t>
+              </a:r>
+            </a:p>
+          </p:txBody>
+        </p:sp>
+      </p:grpSp>
+      <p:cxnSp>
+        <p:nvCxnSpPr>
+          <p:cNvPr id="8" name="Straight Arrow Connector 7">
+            <a:extLst>
+              <a:ext uri="{FF2B5EF4-FFF2-40B4-BE49-F238E27FC236}">
+                <a16:creationId xmlns:a16="http://schemas.microsoft.com/office/drawing/2014/main" id="{ACAF3B6A-3082-5DE1-5786-0CF7784292FE}"/>
+              </a:ext>
+            </a:extLst>
+          </p:cNvPr>
+          <p:cNvCxnSpPr>
+            <a:cxnSpLocks/>
+          </p:cNvCxnSpPr>
+          <p:nvPr/>
+        </p:nvCxnSpPr>
+        <p:spPr>
+          <a:xfrm>
+            <a:off x="2487510" y="3393188"/>
+            <a:ext cx="3166038" cy="0"/>
+          </a:xfrm>
+          <a:prstGeom prst="straightConnector1">
+            <a:avLst/>
+          </a:prstGeom>
+          <a:ln w="38100">
+            <a:tailEnd type="triangle"/>
+          </a:ln>
+        </p:spPr>
+        <p:style>
+          <a:lnRef idx="2">
+            <a:schemeClr val="accent1"/>
+          </a:lnRef>
+          <a:fillRef idx="0">
+            <a:schemeClr val="accent1"/>
+          </a:fillRef>
+          <a:effectRef idx="1">
+            <a:schemeClr val="accent1"/>
+          </a:effectRef>
+          <a:fontRef idx="minor">
+            <a:schemeClr val="tx1"/>
+          </a:fontRef>
+        </p:style>
+      </p:cxnSp>
+      <p:sp>
+        <p:nvSpPr>
+          <p:cNvPr id="9" name="TextBox 8">
+            <a:extLst>
+              <a:ext uri="{FF2B5EF4-FFF2-40B4-BE49-F238E27FC236}">
+                <a16:creationId xmlns:a16="http://schemas.microsoft.com/office/drawing/2014/main" id="{0304AAD2-3EEE-1D27-3F97-DD14489F00E3}"/>
+              </a:ext>
+            </a:extLst>
+          </p:cNvPr>
+          <p:cNvSpPr txBox="1"/>
+          <p:nvPr/>
+        </p:nvSpPr>
+        <p:spPr>
+          <a:xfrm>
+            <a:off x="5403064" y="3312625"/>
+            <a:ext cx="370614" cy="584775"/>
+          </a:xfrm>
+          <a:prstGeom prst="rect">
+            <a:avLst/>
+          </a:prstGeom>
+          <a:noFill/>
+        </p:spPr>
+        <p:txBody>
+          <a:bodyPr wrap="none" rtlCol="0">
+            <a:spAutoFit/>
+          </a:bodyPr>
+          <a:lstStyle/>
+          <a:p>
+            <a:r>
+              <a:rPr lang="en-ES" sz="3200" dirty="0"/>
+              <a:t>y</a:t>
+            </a:r>
+            <a:endParaRPr lang="en-ES" dirty="0"/>
+          </a:p>
+        </p:txBody>
+      </p:sp>
+    </p:spTree>
+    <p:extLst>
+      <p:ext uri="{BB962C8B-B14F-4D97-AF65-F5344CB8AC3E}">
+        <p14:creationId xmlns:p14="http://schemas.microsoft.com/office/powerpoint/2010/main" val="3599675025"/>
+      </p:ext>
+    </p:extLst>
+  </p:cSld>
+  <p:clrMapOvr>
+    <a:masterClrMapping/>
+  </p:clrMapOvr>
+</p:sld>
+</file>
+
+<file path=ppt/slides/slide12.xml><?xml version="1.0" encoding="utf-8"?>
+<p:sld xmlns:a="http://schemas.openxmlformats.org/drawingml/2006/main" xmlns:r="http://schemas.openxmlformats.org/officeDocument/2006/relationships" xmlns:p="http://schemas.openxmlformats.org/presentationml/2006/main">
+  <p:cSld>
+    <p:spTree>
+      <p:nvGrpSpPr>
+        <p:cNvPr id="1" name="">
+          <a:extLst>
+            <a:ext uri="{FF2B5EF4-FFF2-40B4-BE49-F238E27FC236}">
+              <a16:creationId xmlns:a16="http://schemas.microsoft.com/office/drawing/2014/main" id="{783C90B4-942F-BC6C-202B-5807F96D0784}"/>
+            </a:ext>
+          </a:extLst>
+        </p:cNvPr>
+        <p:cNvGrpSpPr/>
+        <p:nvPr/>
+      </p:nvGrpSpPr>
+      <p:grpSpPr>
+        <a:xfrm>
+          <a:off x="0" y="0"/>
+          <a:ext cx="0" cy="0"/>
+          <a:chOff x="0" y="0"/>
+          <a:chExt cx="0" cy="0"/>
+        </a:xfrm>
+      </p:grpSpPr>
+      <p:grpSp>
+        <p:nvGrpSpPr>
+          <p:cNvPr id="21" name="Group 20">
+            <a:extLst>
+              <a:ext uri="{FF2B5EF4-FFF2-40B4-BE49-F238E27FC236}">
+                <a16:creationId xmlns:a16="http://schemas.microsoft.com/office/drawing/2014/main" id="{01E9098B-4402-EFA1-A8E4-E0D5206EF738}"/>
+              </a:ext>
+            </a:extLst>
+          </p:cNvPr>
+          <p:cNvGrpSpPr/>
+          <p:nvPr/>
+        </p:nvGrpSpPr>
+        <p:grpSpPr>
+          <a:xfrm>
+            <a:off x="2499707" y="2673194"/>
+            <a:ext cx="878983" cy="677794"/>
+            <a:chOff x="2499707" y="2673194"/>
+            <a:chExt cx="878983" cy="677794"/>
+          </a:xfrm>
+        </p:grpSpPr>
+        <p:sp>
+          <p:nvSpPr>
+            <p:cNvPr id="4" name="TextBox 3">
+              <a:extLst>
+                <a:ext uri="{FF2B5EF4-FFF2-40B4-BE49-F238E27FC236}">
+                  <a16:creationId xmlns:a16="http://schemas.microsoft.com/office/drawing/2014/main" id="{BCAE3A28-0C83-B435-D5D9-8164278D6788}"/>
+                </a:ext>
+              </a:extLst>
+            </p:cNvPr>
+            <p:cNvSpPr txBox="1"/>
+            <p:nvPr/>
+          </p:nvSpPr>
+          <p:spPr>
+            <a:xfrm>
+              <a:off x="2504784" y="2766213"/>
+              <a:ext cx="873906" cy="584775"/>
+            </a:xfrm>
+            <a:prstGeom prst="rect">
+              <a:avLst/>
+            </a:prstGeom>
+            <a:noFill/>
+          </p:spPr>
+          <p:txBody>
+            <a:bodyPr wrap="square" rtlCol="0">
+              <a:spAutoFit/>
+            </a:bodyPr>
+            <a:lstStyle/>
+            <a:p>
+              <a:r>
+                <a:rPr lang="en-ES" sz="3200" dirty="0"/>
+                <a:t>m</a:t>
+              </a:r>
+              <a:r>
+                <a:rPr lang="en-ES" sz="3200" baseline="-25000" dirty="0"/>
+                <a:t>1</a:t>
+              </a:r>
+              <a:endParaRPr lang="en-ES" baseline="-25000" dirty="0"/>
+            </a:p>
+          </p:txBody>
+        </p:sp>
+        <p:sp>
+          <p:nvSpPr>
+            <p:cNvPr id="5" name="TextBox 4">
+              <a:extLst>
+                <a:ext uri="{FF2B5EF4-FFF2-40B4-BE49-F238E27FC236}">
+                  <a16:creationId xmlns:a16="http://schemas.microsoft.com/office/drawing/2014/main" id="{2231DB57-FF2F-EC89-8458-113127576B3C}"/>
+                </a:ext>
+              </a:extLst>
+            </p:cNvPr>
+            <p:cNvSpPr txBox="1"/>
+            <p:nvPr/>
+          </p:nvSpPr>
+          <p:spPr>
+            <a:xfrm>
+              <a:off x="2499707" y="2673194"/>
+              <a:ext cx="492443" cy="461665"/>
+            </a:xfrm>
+            <a:prstGeom prst="rect">
+              <a:avLst/>
+            </a:prstGeom>
+            <a:noFill/>
+          </p:spPr>
+          <p:txBody>
+            <a:bodyPr wrap="square" rtlCol="0">
+              <a:spAutoFit/>
+            </a:bodyPr>
+            <a:lstStyle/>
+            <a:p>
+              <a:r>
+                <a:rPr lang="en-ES" sz="2400" dirty="0"/>
+                <a:t>➝</a:t>
+              </a:r>
+            </a:p>
+          </p:txBody>
+        </p:sp>
+      </p:grpSp>
+      <p:grpSp>
+        <p:nvGrpSpPr>
+          <p:cNvPr id="15" name="Group 14">
+            <a:extLst>
+              <a:ext uri="{FF2B5EF4-FFF2-40B4-BE49-F238E27FC236}">
+                <a16:creationId xmlns:a16="http://schemas.microsoft.com/office/drawing/2014/main" id="{8EA514AE-BF2B-0183-13F6-FCFF8DEE1BFD}"/>
+              </a:ext>
+            </a:extLst>
+          </p:cNvPr>
+          <p:cNvGrpSpPr/>
+          <p:nvPr/>
+        </p:nvGrpSpPr>
+        <p:grpSpPr>
+          <a:xfrm>
+            <a:off x="3217292" y="3398640"/>
+            <a:ext cx="878985" cy="677796"/>
+            <a:chOff x="4982047" y="1023353"/>
+            <a:chExt cx="878985" cy="677796"/>
+          </a:xfrm>
+        </p:grpSpPr>
+        <p:sp>
+          <p:nvSpPr>
+            <p:cNvPr id="11" name="TextBox 10">
+              <a:extLst>
+                <a:ext uri="{FF2B5EF4-FFF2-40B4-BE49-F238E27FC236}">
+                  <a16:creationId xmlns:a16="http://schemas.microsoft.com/office/drawing/2014/main" id="{DAB77C36-811A-0C3E-0265-091A51249BE0}"/>
+                </a:ext>
+              </a:extLst>
+            </p:cNvPr>
+            <p:cNvSpPr txBox="1"/>
+            <p:nvPr/>
+          </p:nvSpPr>
+          <p:spPr>
+            <a:xfrm>
+              <a:off x="4987126" y="1116374"/>
+              <a:ext cx="873906" cy="584775"/>
+            </a:xfrm>
+            <a:prstGeom prst="rect">
+              <a:avLst/>
+            </a:prstGeom>
+            <a:noFill/>
+          </p:spPr>
+          <p:txBody>
+            <a:bodyPr wrap="square" rtlCol="0">
+              <a:spAutoFit/>
+            </a:bodyPr>
+            <a:lstStyle/>
+            <a:p>
+              <a:r>
+                <a:rPr lang="en-ES" sz="3200" dirty="0"/>
+                <a:t>m</a:t>
+              </a:r>
+              <a:r>
+                <a:rPr lang="en-ES" sz="3200" baseline="-25000" dirty="0"/>
+                <a:t>2</a:t>
+              </a:r>
+              <a:endParaRPr lang="en-ES" baseline="-25000" dirty="0"/>
+            </a:p>
+          </p:txBody>
+        </p:sp>
+        <p:sp>
+          <p:nvSpPr>
+            <p:cNvPr id="12" name="TextBox 11">
+              <a:extLst>
+                <a:ext uri="{FF2B5EF4-FFF2-40B4-BE49-F238E27FC236}">
+                  <a16:creationId xmlns:a16="http://schemas.microsoft.com/office/drawing/2014/main" id="{C11EE719-7C87-5EE8-C9FB-47D506BFEF35}"/>
+                </a:ext>
+              </a:extLst>
+            </p:cNvPr>
+            <p:cNvSpPr txBox="1"/>
+            <p:nvPr/>
+          </p:nvSpPr>
+          <p:spPr>
+            <a:xfrm>
+              <a:off x="4982047" y="1023353"/>
+              <a:ext cx="492443" cy="461665"/>
+            </a:xfrm>
+            <a:prstGeom prst="rect">
+              <a:avLst/>
+            </a:prstGeom>
+            <a:noFill/>
+          </p:spPr>
+          <p:txBody>
+            <a:bodyPr wrap="square" rtlCol="0">
+              <a:spAutoFit/>
+            </a:bodyPr>
+            <a:lstStyle/>
+            <a:p>
+              <a:r>
+                <a:rPr lang="en-ES" sz="2400" dirty="0"/>
+                <a:t>➝</a:t>
+              </a:r>
+            </a:p>
+          </p:txBody>
+        </p:sp>
+      </p:grpSp>
+      <p:cxnSp>
+        <p:nvCxnSpPr>
+          <p:cNvPr id="16" name="Straight Arrow Connector 15">
+            <a:extLst>
+              <a:ext uri="{FF2B5EF4-FFF2-40B4-BE49-F238E27FC236}">
+                <a16:creationId xmlns:a16="http://schemas.microsoft.com/office/drawing/2014/main" id="{381B98C3-A253-144B-4478-60BD4E599472}"/>
+              </a:ext>
+            </a:extLst>
+          </p:cNvPr>
+          <p:cNvCxnSpPr>
+            <a:cxnSpLocks/>
+          </p:cNvCxnSpPr>
+          <p:nvPr/>
+        </p:nvCxnSpPr>
+        <p:spPr>
+          <a:xfrm flipV="1">
+            <a:off x="2498318" y="1187744"/>
+            <a:ext cx="0" cy="2214218"/>
+          </a:xfrm>
+          <a:prstGeom prst="straightConnector1">
+            <a:avLst/>
+          </a:prstGeom>
+          <a:ln w="38100">
+            <a:tailEnd type="triangle"/>
+          </a:ln>
+        </p:spPr>
+        <p:style>
+          <a:lnRef idx="2">
+            <a:schemeClr val="accent1"/>
+          </a:lnRef>
+          <a:fillRef idx="0">
+            <a:schemeClr val="accent1"/>
+          </a:fillRef>
+          <a:effectRef idx="1">
+            <a:schemeClr val="accent1"/>
+          </a:effectRef>
+          <a:fontRef idx="minor">
+            <a:schemeClr val="tx1"/>
+          </a:fontRef>
+        </p:style>
+      </p:cxnSp>
+      <p:cxnSp>
+        <p:nvCxnSpPr>
+          <p:cNvPr id="17" name="Straight Arrow Connector 16">
+            <a:extLst>
+              <a:ext uri="{FF2B5EF4-FFF2-40B4-BE49-F238E27FC236}">
+                <a16:creationId xmlns:a16="http://schemas.microsoft.com/office/drawing/2014/main" id="{7AE021A7-41ED-1D59-BB61-425AC757F7DB}"/>
+              </a:ext>
+            </a:extLst>
+          </p:cNvPr>
+          <p:cNvCxnSpPr>
+            <a:cxnSpLocks/>
+          </p:cNvCxnSpPr>
+          <p:nvPr/>
+        </p:nvCxnSpPr>
+        <p:spPr>
+          <a:xfrm>
+            <a:off x="2487510" y="3393188"/>
+            <a:ext cx="3166038" cy="0"/>
+          </a:xfrm>
+          <a:prstGeom prst="straightConnector1">
+            <a:avLst/>
+          </a:prstGeom>
+          <a:ln w="38100">
+            <a:tailEnd type="triangle"/>
+          </a:ln>
+        </p:spPr>
+        <p:style>
+          <a:lnRef idx="2">
+            <a:schemeClr val="accent1"/>
+          </a:lnRef>
+          <a:fillRef idx="0">
+            <a:schemeClr val="accent1"/>
+          </a:fillRef>
+          <a:effectRef idx="1">
+            <a:schemeClr val="accent1"/>
+          </a:effectRef>
+          <a:fontRef idx="minor">
+            <a:schemeClr val="tx1"/>
+          </a:fontRef>
+        </p:style>
+      </p:cxnSp>
+      <p:sp>
+        <p:nvSpPr>
+          <p:cNvPr id="18" name="TextBox 17">
+            <a:extLst>
+              <a:ext uri="{FF2B5EF4-FFF2-40B4-BE49-F238E27FC236}">
+                <a16:creationId xmlns:a16="http://schemas.microsoft.com/office/drawing/2014/main" id="{A07B4E88-9B5B-B627-9215-67CD0A70FD89}"/>
+              </a:ext>
+            </a:extLst>
+          </p:cNvPr>
+          <p:cNvSpPr txBox="1"/>
+          <p:nvPr/>
+        </p:nvSpPr>
+        <p:spPr>
+          <a:xfrm>
+            <a:off x="5403064" y="3312625"/>
+            <a:ext cx="370614" cy="584775"/>
+          </a:xfrm>
+          <a:prstGeom prst="rect">
+            <a:avLst/>
+          </a:prstGeom>
+          <a:noFill/>
+        </p:spPr>
+        <p:txBody>
+          <a:bodyPr wrap="none" rtlCol="0">
+            <a:spAutoFit/>
+          </a:bodyPr>
+          <a:lstStyle/>
+          <a:p>
+            <a:r>
+              <a:rPr lang="en-ES" sz="3200" dirty="0"/>
+              <a:t>y</a:t>
+            </a:r>
+            <a:endParaRPr lang="en-ES" dirty="0"/>
+          </a:p>
+        </p:txBody>
+      </p:sp>
+      <p:sp>
+        <p:nvSpPr>
+          <p:cNvPr id="19" name="TextBox 18">
+            <a:extLst>
+              <a:ext uri="{FF2B5EF4-FFF2-40B4-BE49-F238E27FC236}">
+                <a16:creationId xmlns:a16="http://schemas.microsoft.com/office/drawing/2014/main" id="{B6E6751F-48A5-59D9-97A1-28596F817E9A}"/>
+              </a:ext>
+            </a:extLst>
+          </p:cNvPr>
+          <p:cNvSpPr txBox="1"/>
+          <p:nvPr/>
+        </p:nvSpPr>
+        <p:spPr>
+          <a:xfrm>
+            <a:off x="2130463" y="970268"/>
+            <a:ext cx="370614" cy="584775"/>
+          </a:xfrm>
+          <a:prstGeom prst="rect">
+            <a:avLst/>
+          </a:prstGeom>
+          <a:noFill/>
+        </p:spPr>
+        <p:txBody>
+          <a:bodyPr wrap="none" rtlCol="0">
+            <a:spAutoFit/>
+          </a:bodyPr>
+          <a:lstStyle/>
+          <a:p>
+            <a:r>
+              <a:rPr lang="en-ES" sz="3200" dirty="0"/>
+              <a:t>z</a:t>
+            </a:r>
+            <a:endParaRPr lang="en-ES" dirty="0"/>
+          </a:p>
+        </p:txBody>
+      </p:sp>
+      <p:grpSp>
+        <p:nvGrpSpPr>
+          <p:cNvPr id="14" name="Group 13">
+            <a:extLst>
+              <a:ext uri="{FF2B5EF4-FFF2-40B4-BE49-F238E27FC236}">
+                <a16:creationId xmlns:a16="http://schemas.microsoft.com/office/drawing/2014/main" id="{4FE66DF8-9B3F-AAD9-C90D-0C78474702F9}"/>
+              </a:ext>
+            </a:extLst>
+          </p:cNvPr>
+          <p:cNvGrpSpPr/>
+          <p:nvPr/>
+        </p:nvGrpSpPr>
+        <p:grpSpPr>
+          <a:xfrm rot="10800000">
+            <a:off x="3889232" y="3758721"/>
+            <a:ext cx="549966" cy="660737"/>
+            <a:chOff x="4690772" y="1211142"/>
+            <a:chExt cx="549966" cy="660737"/>
+          </a:xfrm>
+        </p:grpSpPr>
+        <p:sp>
+          <p:nvSpPr>
+            <p:cNvPr id="13" name="Arc 12">
+              <a:extLst>
+                <a:ext uri="{FF2B5EF4-FFF2-40B4-BE49-F238E27FC236}">
+                  <a16:creationId xmlns:a16="http://schemas.microsoft.com/office/drawing/2014/main" id="{B6DA7E1C-9804-ECD3-46A8-68886C8AF348}"/>
+                </a:ext>
+              </a:extLst>
+            </p:cNvPr>
+            <p:cNvSpPr/>
+            <p:nvPr/>
+          </p:nvSpPr>
+          <p:spPr>
+            <a:xfrm>
+              <a:off x="4690772" y="1620088"/>
+              <a:ext cx="549966" cy="251791"/>
+            </a:xfrm>
+            <a:prstGeom prst="arc">
+              <a:avLst>
+                <a:gd name="adj1" fmla="val 2758053"/>
+                <a:gd name="adj2" fmla="val 2720473"/>
+              </a:avLst>
+            </a:prstGeom>
+            <a:ln w="38100">
+              <a:solidFill>
+                <a:schemeClr val="tx1"/>
+              </a:solidFill>
+              <a:prstDash val="solid"/>
+              <a:headEnd type="arrow" w="med" len="med"/>
+              <a:tailEnd type="none" w="med" len="med"/>
+            </a:ln>
+          </p:spPr>
+          <p:style>
+            <a:lnRef idx="2">
+              <a:schemeClr val="accent1"/>
+            </a:lnRef>
+            <a:fillRef idx="0">
+              <a:schemeClr val="accent1"/>
+            </a:fillRef>
+            <a:effectRef idx="1">
+              <a:schemeClr val="accent1"/>
+            </a:effectRef>
+            <a:fontRef idx="minor">
+              <a:schemeClr val="tx1"/>
+            </a:fontRef>
+          </p:style>
+          <p:txBody>
+            <a:bodyPr rtlCol="0" anchor="ctr"/>
+            <a:lstStyle/>
+            <a:p>
+              <a:pPr algn="ctr"/>
+              <a:endParaRPr lang="en-ES" dirty="0"/>
+            </a:p>
+          </p:txBody>
+        </p:sp>
+        <p:cxnSp>
+          <p:nvCxnSpPr>
+            <p:cNvPr id="10" name="Straight Arrow Connector 9">
+              <a:extLst>
+                <a:ext uri="{FF2B5EF4-FFF2-40B4-BE49-F238E27FC236}">
+                  <a16:creationId xmlns:a16="http://schemas.microsoft.com/office/drawing/2014/main" id="{A1FCB5B3-41D6-E7C0-2449-9DAFE1A85005}"/>
+                </a:ext>
+              </a:extLst>
+            </p:cNvPr>
+            <p:cNvCxnSpPr>
+              <a:cxnSpLocks/>
+            </p:cNvCxnSpPr>
+            <p:nvPr/>
+          </p:nvCxnSpPr>
+          <p:spPr>
+            <a:xfrm flipV="1">
+              <a:off x="4963661" y="1211142"/>
+              <a:ext cx="0" cy="538612"/>
+            </a:xfrm>
+            <a:prstGeom prst="straightConnector1">
+              <a:avLst/>
+            </a:prstGeom>
+            <a:ln w="53975">
+              <a:solidFill>
+                <a:srgbClr val="C00000"/>
+              </a:solidFill>
+              <a:tailEnd type="triangle"/>
+            </a:ln>
+          </p:spPr>
+          <p:style>
+            <a:lnRef idx="2">
+              <a:schemeClr val="accent1"/>
+            </a:lnRef>
+            <a:fillRef idx="0">
+              <a:schemeClr val="accent1"/>
+            </a:fillRef>
+            <a:effectRef idx="1">
+              <a:schemeClr val="accent1"/>
+            </a:effectRef>
+            <a:fontRef idx="minor">
+              <a:schemeClr val="tx1"/>
+            </a:fontRef>
+          </p:style>
+        </p:cxnSp>
+      </p:grpSp>
+      <p:grpSp>
+        <p:nvGrpSpPr>
+          <p:cNvPr id="23" name="Group 22">
+            <a:extLst>
+              <a:ext uri="{FF2B5EF4-FFF2-40B4-BE49-F238E27FC236}">
+                <a16:creationId xmlns:a16="http://schemas.microsoft.com/office/drawing/2014/main" id="{A3845AE0-8DB7-C2DD-7E08-93DA231B27F5}"/>
+              </a:ext>
+            </a:extLst>
+          </p:cNvPr>
+          <p:cNvGrpSpPr/>
+          <p:nvPr/>
+        </p:nvGrpSpPr>
+        <p:grpSpPr>
+          <a:xfrm>
+            <a:off x="2222659" y="2849239"/>
+            <a:ext cx="549966" cy="660737"/>
+            <a:chOff x="4690772" y="1211142"/>
+            <a:chExt cx="549966" cy="660737"/>
+          </a:xfrm>
+        </p:grpSpPr>
+        <p:sp>
+          <p:nvSpPr>
+            <p:cNvPr id="24" name="Arc 23">
+              <a:extLst>
+                <a:ext uri="{FF2B5EF4-FFF2-40B4-BE49-F238E27FC236}">
+                  <a16:creationId xmlns:a16="http://schemas.microsoft.com/office/drawing/2014/main" id="{CAFA6C45-0C29-0CCE-2FE3-2D5C03B11D05}"/>
+                </a:ext>
+              </a:extLst>
+            </p:cNvPr>
+            <p:cNvSpPr/>
+            <p:nvPr/>
+          </p:nvSpPr>
+          <p:spPr>
+            <a:xfrm>
+              <a:off x="4690772" y="1620088"/>
+              <a:ext cx="549966" cy="251791"/>
+            </a:xfrm>
+            <a:prstGeom prst="arc">
+              <a:avLst>
+                <a:gd name="adj1" fmla="val 2758053"/>
+                <a:gd name="adj2" fmla="val 2720473"/>
+              </a:avLst>
+            </a:prstGeom>
+            <a:ln w="38100">
+              <a:solidFill>
+                <a:schemeClr val="tx1"/>
+              </a:solidFill>
+              <a:prstDash val="solid"/>
+              <a:headEnd type="arrow" w="med" len="med"/>
+              <a:tailEnd type="none" w="med" len="med"/>
+            </a:ln>
+          </p:spPr>
+          <p:style>
+            <a:lnRef idx="2">
+              <a:schemeClr val="accent1"/>
+            </a:lnRef>
+            <a:fillRef idx="0">
+              <a:schemeClr val="accent1"/>
+            </a:fillRef>
+            <a:effectRef idx="1">
+              <a:schemeClr val="accent1"/>
+            </a:effectRef>
+            <a:fontRef idx="minor">
+              <a:schemeClr val="tx1"/>
+            </a:fontRef>
+          </p:style>
+          <p:txBody>
+            <a:bodyPr rtlCol="0" anchor="ctr"/>
+            <a:lstStyle/>
+            <a:p>
+              <a:pPr algn="ctr"/>
+              <a:endParaRPr lang="en-ES" dirty="0"/>
+            </a:p>
+          </p:txBody>
+        </p:sp>
+        <p:cxnSp>
+          <p:nvCxnSpPr>
+            <p:cNvPr id="25" name="Straight Arrow Connector 24">
+              <a:extLst>
+                <a:ext uri="{FF2B5EF4-FFF2-40B4-BE49-F238E27FC236}">
+                  <a16:creationId xmlns:a16="http://schemas.microsoft.com/office/drawing/2014/main" id="{7767FADB-4121-F438-8478-A2998DE46EE3}"/>
+                </a:ext>
+              </a:extLst>
+            </p:cNvPr>
+            <p:cNvCxnSpPr>
+              <a:cxnSpLocks/>
+            </p:cNvCxnSpPr>
+            <p:nvPr/>
+          </p:nvCxnSpPr>
+          <p:spPr>
+            <a:xfrm flipV="1">
+              <a:off x="4963661" y="1211142"/>
+              <a:ext cx="0" cy="538612"/>
+            </a:xfrm>
+            <a:prstGeom prst="straightConnector1">
+              <a:avLst/>
+            </a:prstGeom>
+            <a:ln w="53975">
+              <a:solidFill>
+                <a:srgbClr val="C00000"/>
+              </a:solidFill>
+              <a:tailEnd type="triangle"/>
+            </a:ln>
+          </p:spPr>
+          <p:style>
+            <a:lnRef idx="2">
+              <a:schemeClr val="accent1"/>
+            </a:lnRef>
+            <a:fillRef idx="0">
+              <a:schemeClr val="accent1"/>
+            </a:fillRef>
+            <a:effectRef idx="1">
+              <a:schemeClr val="accent1"/>
+            </a:effectRef>
+            <a:fontRef idx="minor">
+              <a:schemeClr val="tx1"/>
+            </a:fontRef>
+          </p:style>
+        </p:cxnSp>
+      </p:grpSp>
+      <p:sp>
+        <p:nvSpPr>
+          <p:cNvPr id="26" name="Arc 25">
+            <a:extLst>
+              <a:ext uri="{FF2B5EF4-FFF2-40B4-BE49-F238E27FC236}">
+                <a16:creationId xmlns:a16="http://schemas.microsoft.com/office/drawing/2014/main" id="{3AF417C1-3332-DB48-0A0D-5787D156854E}"/>
+              </a:ext>
+            </a:extLst>
+          </p:cNvPr>
+          <p:cNvSpPr/>
+          <p:nvPr/>
+        </p:nvSpPr>
+        <p:spPr>
+          <a:xfrm rot="16200000" flipV="1">
+            <a:off x="3741175" y="3515030"/>
+            <a:ext cx="884903" cy="875070"/>
+          </a:xfrm>
+          <a:prstGeom prst="arc">
+            <a:avLst>
+              <a:gd name="adj1" fmla="val 7216346"/>
+              <a:gd name="adj2" fmla="val 10937819"/>
+            </a:avLst>
+          </a:prstGeom>
+          <a:ln w="38100">
+            <a:solidFill>
+              <a:schemeClr val="tx1"/>
+            </a:solidFill>
+            <a:prstDash val="sysDot"/>
+            <a:headEnd type="triangle"/>
+            <a:tailEnd type="none"/>
+          </a:ln>
+        </p:spPr>
+        <p:style>
+          <a:lnRef idx="2">
+            <a:schemeClr val="accent1"/>
+          </a:lnRef>
+          <a:fillRef idx="0">
+            <a:schemeClr val="accent1"/>
+          </a:fillRef>
+          <a:effectRef idx="1">
+            <a:schemeClr val="accent1"/>
+          </a:effectRef>
+          <a:fontRef idx="minor">
+            <a:schemeClr val="tx1"/>
+          </a:fontRef>
+        </p:style>
+        <p:txBody>
+          <a:bodyPr rtlCol="0" anchor="ctr"/>
+          <a:lstStyle/>
+          <a:p>
+            <a:pPr algn="ctr"/>
+            <a:endParaRPr lang="en-ES"/>
+          </a:p>
+        </p:txBody>
+      </p:sp>
+      <p:grpSp>
+        <p:nvGrpSpPr>
+          <p:cNvPr id="27" name="Group 26">
+            <a:extLst>
+              <a:ext uri="{FF2B5EF4-FFF2-40B4-BE49-F238E27FC236}">
+                <a16:creationId xmlns:a16="http://schemas.microsoft.com/office/drawing/2014/main" id="{BD074534-2B2A-7B9C-BADD-0E48ED560949}"/>
+              </a:ext>
+            </a:extLst>
+          </p:cNvPr>
+          <p:cNvGrpSpPr/>
+          <p:nvPr/>
+        </p:nvGrpSpPr>
+        <p:grpSpPr>
+          <a:xfrm>
+            <a:off x="3605842" y="4245968"/>
+            <a:ext cx="918312" cy="543739"/>
+            <a:chOff x="2499707" y="2648226"/>
+            <a:chExt cx="918312" cy="543739"/>
+          </a:xfrm>
+        </p:grpSpPr>
+        <p:sp>
+          <p:nvSpPr>
+            <p:cNvPr id="28" name="TextBox 27">
+              <a:extLst>
+                <a:ext uri="{FF2B5EF4-FFF2-40B4-BE49-F238E27FC236}">
+                  <a16:creationId xmlns:a16="http://schemas.microsoft.com/office/drawing/2014/main" id="{B7FA2F43-A54B-C9C0-6A75-238E7D5BA0F1}"/>
+                </a:ext>
+              </a:extLst>
+            </p:cNvPr>
+            <p:cNvSpPr txBox="1"/>
+            <p:nvPr/>
+          </p:nvSpPr>
+          <p:spPr>
+            <a:xfrm>
+              <a:off x="2544113" y="2648226"/>
+              <a:ext cx="873906" cy="543739"/>
+            </a:xfrm>
+            <a:prstGeom prst="rect">
+              <a:avLst/>
+            </a:prstGeom>
+            <a:noFill/>
+          </p:spPr>
+          <p:txBody>
+            <a:bodyPr wrap="square" rtlCol="0">
+              <a:spAutoFit/>
+            </a:bodyPr>
+            <a:lstStyle/>
+            <a:p>
+              <a:r>
+                <a:rPr lang="en-ES" sz="4400" baseline="-25000" dirty="0"/>
+                <a:t>𝝉</a:t>
+              </a:r>
+              <a:endParaRPr lang="en-ES" sz="2800" baseline="-25000" dirty="0"/>
+            </a:p>
+          </p:txBody>
+        </p:sp>
+        <p:sp>
+          <p:nvSpPr>
+            <p:cNvPr id="29" name="TextBox 28">
+              <a:extLst>
+                <a:ext uri="{FF2B5EF4-FFF2-40B4-BE49-F238E27FC236}">
+                  <a16:creationId xmlns:a16="http://schemas.microsoft.com/office/drawing/2014/main" id="{CF1F81F6-36FC-B9D5-E79F-4D71E3963A3A}"/>
+                </a:ext>
+              </a:extLst>
+            </p:cNvPr>
+            <p:cNvSpPr txBox="1"/>
+            <p:nvPr/>
+          </p:nvSpPr>
+          <p:spPr>
+            <a:xfrm>
+              <a:off x="2499707" y="2673194"/>
+              <a:ext cx="492443" cy="461665"/>
+            </a:xfrm>
+            <a:prstGeom prst="rect">
+              <a:avLst/>
+            </a:prstGeom>
+            <a:noFill/>
+          </p:spPr>
+          <p:txBody>
+            <a:bodyPr wrap="square" rtlCol="0">
+              <a:spAutoFit/>
+            </a:bodyPr>
+            <a:lstStyle/>
+            <a:p>
+              <a:r>
+                <a:rPr lang="en-ES" sz="2400" dirty="0"/>
+                <a:t>➝</a:t>
+              </a:r>
+            </a:p>
+          </p:txBody>
+        </p:sp>
+      </p:grpSp>
+    </p:spTree>
+    <p:extLst>
+      <p:ext uri="{BB962C8B-B14F-4D97-AF65-F5344CB8AC3E}">
+        <p14:creationId xmlns:p14="http://schemas.microsoft.com/office/powerpoint/2010/main" val="963963032"/>
+      </p:ext>
+    </p:extLst>
+  </p:cSld>
+  <p:clrMapOvr>
+    <a:masterClrMapping/>
+  </p:clrMapOvr>
+</p:sld>
+</file>
+
+<file path=ppt/slides/slide2.xml><?xml version="1.0" encoding="utf-8"?>
+<p:sld xmlns:a="http://schemas.openxmlformats.org/drawingml/2006/main" xmlns:r="http://schemas.openxmlformats.org/officeDocument/2006/relationships" xmlns:p="http://schemas.openxmlformats.org/presentationml/2006/main">
+  <p:cSld>
+    <p:spTree>
+      <p:nvGrpSpPr>
+        <p:cNvPr id="1" name="">
+          <a:extLst>
+            <a:ext uri="{FF2B5EF4-FFF2-40B4-BE49-F238E27FC236}">
+              <a16:creationId xmlns:a16="http://schemas.microsoft.com/office/drawing/2014/main" id="{69889FA4-94A3-0B27-13B3-33BBDF7E2BCC}"/>
+            </a:ext>
+          </a:extLst>
+        </p:cNvPr>
+        <p:cNvGrpSpPr/>
+        <p:nvPr/>
+      </p:nvGrpSpPr>
+      <p:grpSpPr>
+        <a:xfrm>
+          <a:off x="0" y="0"/>
+          <a:ext cx="0" cy="0"/>
+          <a:chOff x="0" y="0"/>
+          <a:chExt cx="0" cy="0"/>
+        </a:xfrm>
+      </p:grpSpPr>
+      <p:cxnSp>
+        <p:nvCxnSpPr>
+          <p:cNvPr id="5" name="Straight Arrow Connector 4">
+            <a:extLst>
+              <a:ext uri="{FF2B5EF4-FFF2-40B4-BE49-F238E27FC236}">
+                <a16:creationId xmlns:a16="http://schemas.microsoft.com/office/drawing/2014/main" id="{7E0536D3-1CA6-04A9-A9F7-3EDD86528ECA}"/>
+              </a:ext>
+            </a:extLst>
+          </p:cNvPr>
+          <p:cNvCxnSpPr/>
+          <p:nvPr/>
+        </p:nvCxnSpPr>
+        <p:spPr>
+          <a:xfrm>
+            <a:off x="1728788" y="3371850"/>
+            <a:ext cx="8186737" cy="0"/>
+          </a:xfrm>
+          <a:prstGeom prst="straightConnector1">
+            <a:avLst/>
+          </a:prstGeom>
+          <a:ln w="38100">
+            <a:tailEnd type="triangle"/>
+          </a:ln>
+        </p:spPr>
+        <p:style>
+          <a:lnRef idx="2">
+            <a:schemeClr val="accent1"/>
+          </a:lnRef>
+          <a:fillRef idx="0">
+            <a:schemeClr val="accent1"/>
+          </a:fillRef>
+          <a:effectRef idx="1">
+            <a:schemeClr val="accent1"/>
+          </a:effectRef>
+          <a:fontRef idx="minor">
+            <a:schemeClr val="tx1"/>
+          </a:fontRef>
+        </p:style>
+      </p:cxnSp>
+      <p:sp>
+        <p:nvSpPr>
+          <p:cNvPr id="6" name="Oval 5">
+            <a:extLst>
+              <a:ext uri="{FF2B5EF4-FFF2-40B4-BE49-F238E27FC236}">
+                <a16:creationId xmlns:a16="http://schemas.microsoft.com/office/drawing/2014/main" id="{416352B9-0278-A5DB-7E2B-73367F043221}"/>
+              </a:ext>
+            </a:extLst>
+          </p:cNvPr>
+          <p:cNvSpPr/>
+          <p:nvPr/>
+        </p:nvSpPr>
+        <p:spPr>
+          <a:xfrm>
+            <a:off x="3598223" y="3277590"/>
+            <a:ext cx="166255" cy="178129"/>
+          </a:xfrm>
+          <a:prstGeom prst="ellipse">
+            <a:avLst/>
+          </a:prstGeom>
+        </p:spPr>
+        <p:style>
+          <a:lnRef idx="2">
+            <a:schemeClr val="accent1">
+              <a:shade val="15000"/>
+            </a:schemeClr>
+          </a:lnRef>
+          <a:fillRef idx="1">
+            <a:schemeClr val="accent1"/>
+          </a:fillRef>
+          <a:effectRef idx="0">
+            <a:schemeClr val="accent1"/>
+          </a:effectRef>
+          <a:fontRef idx="minor">
+            <a:schemeClr val="lt1"/>
+          </a:fontRef>
+        </p:style>
+        <p:txBody>
+          <a:bodyPr rtlCol="0" anchor="ctr"/>
+          <a:lstStyle/>
+          <a:p>
+            <a:pPr algn="ctr"/>
+            <a:endParaRPr lang="en-ES"/>
+          </a:p>
+        </p:txBody>
+      </p:sp>
+      <p:sp>
+        <p:nvSpPr>
+          <p:cNvPr id="7" name="TextBox 6">
+            <a:extLst>
+              <a:ext uri="{FF2B5EF4-FFF2-40B4-BE49-F238E27FC236}">
+                <a16:creationId xmlns:a16="http://schemas.microsoft.com/office/drawing/2014/main" id="{5AF0CA74-BFEF-38AC-32B2-CC690677145D}"/>
+              </a:ext>
+            </a:extLst>
+          </p:cNvPr>
+          <p:cNvSpPr txBox="1"/>
+          <p:nvPr/>
+        </p:nvSpPr>
+        <p:spPr>
+          <a:xfrm>
+            <a:off x="3313216" y="2766954"/>
+            <a:ext cx="486030" cy="584775"/>
+          </a:xfrm>
+          <a:prstGeom prst="rect">
+            <a:avLst/>
+          </a:prstGeom>
+          <a:noFill/>
+        </p:spPr>
+        <p:txBody>
+          <a:bodyPr wrap="none" rtlCol="0">
+            <a:spAutoFit/>
+          </a:bodyPr>
+          <a:lstStyle/>
+          <a:p>
+            <a:r>
+              <a:rPr lang="en-ES" sz="3200" dirty="0"/>
+              <a:t>Q</a:t>
+            </a:r>
+            <a:endParaRPr lang="en-ES" dirty="0"/>
+          </a:p>
+        </p:txBody>
+      </p:sp>
+      <p:sp>
+        <p:nvSpPr>
+          <p:cNvPr id="8" name="Oval 7">
+            <a:extLst>
+              <a:ext uri="{FF2B5EF4-FFF2-40B4-BE49-F238E27FC236}">
+                <a16:creationId xmlns:a16="http://schemas.microsoft.com/office/drawing/2014/main" id="{A174AE03-9BBD-DE77-305D-830E5C607F80}"/>
+              </a:ext>
+            </a:extLst>
+          </p:cNvPr>
+          <p:cNvSpPr/>
+          <p:nvPr/>
+        </p:nvSpPr>
+        <p:spPr>
+          <a:xfrm>
+            <a:off x="2303811" y="2006930"/>
+            <a:ext cx="2743200" cy="2743200"/>
+          </a:xfrm>
+          <a:prstGeom prst="ellipse">
+            <a:avLst/>
+          </a:prstGeom>
+          <a:noFill/>
+          <a:ln w="38100" cap="flat" cmpd="sng" algn="ctr">
+            <a:solidFill>
+              <a:srgbClr val="FF0000"/>
+            </a:solidFill>
+            <a:prstDash val="dash"/>
+            <a:round/>
+            <a:headEnd type="none" w="med" len="med"/>
+            <a:tailEnd type="none" w="med" len="med"/>
+          </a:ln>
+        </p:spPr>
+        <p:style>
+          <a:lnRef idx="0">
+            <a:scrgbClr r="0" g="0" b="0"/>
+          </a:lnRef>
+          <a:fillRef idx="0">
+            <a:scrgbClr r="0" g="0" b="0"/>
+          </a:fillRef>
+          <a:effectRef idx="0">
+            <a:scrgbClr r="0" g="0" b="0"/>
+          </a:effectRef>
+          <a:fontRef idx="minor">
+            <a:schemeClr val="dk1"/>
+          </a:fontRef>
+        </p:style>
+        <p:txBody>
+          <a:bodyPr rtlCol="0" anchor="ctr"/>
+          <a:lstStyle/>
+          <a:p>
+            <a:pPr algn="ctr"/>
+            <a:endParaRPr lang="en-ES"/>
+          </a:p>
+        </p:txBody>
+      </p:sp>
+      <p:sp>
+        <p:nvSpPr>
+          <p:cNvPr id="9" name="Oval 8">
+            <a:extLst>
+              <a:ext uri="{FF2B5EF4-FFF2-40B4-BE49-F238E27FC236}">
+                <a16:creationId xmlns:a16="http://schemas.microsoft.com/office/drawing/2014/main" id="{879E03BB-97C3-D26E-879C-39903F779F46}"/>
+              </a:ext>
+            </a:extLst>
+          </p:cNvPr>
+          <p:cNvSpPr/>
+          <p:nvPr/>
+        </p:nvSpPr>
+        <p:spPr>
+          <a:xfrm>
+            <a:off x="8393875" y="3275611"/>
+            <a:ext cx="166255" cy="178129"/>
+          </a:xfrm>
+          <a:prstGeom prst="ellipse">
+            <a:avLst/>
+          </a:prstGeom>
+        </p:spPr>
+        <p:style>
+          <a:lnRef idx="2">
+            <a:schemeClr val="accent1">
+              <a:shade val="15000"/>
+            </a:schemeClr>
+          </a:lnRef>
+          <a:fillRef idx="1">
+            <a:schemeClr val="accent1"/>
+          </a:fillRef>
+          <a:effectRef idx="0">
+            <a:schemeClr val="accent1"/>
+          </a:effectRef>
+          <a:fontRef idx="minor">
+            <a:schemeClr val="lt1"/>
+          </a:fontRef>
+        </p:style>
+        <p:txBody>
+          <a:bodyPr rtlCol="0" anchor="ctr"/>
+          <a:lstStyle/>
+          <a:p>
+            <a:pPr algn="ctr"/>
+            <a:endParaRPr lang="en-ES"/>
+          </a:p>
+        </p:txBody>
+      </p:sp>
+      <p:sp>
+        <p:nvSpPr>
+          <p:cNvPr id="10" name="TextBox 9">
+            <a:extLst>
+              <a:ext uri="{FF2B5EF4-FFF2-40B4-BE49-F238E27FC236}">
+                <a16:creationId xmlns:a16="http://schemas.microsoft.com/office/drawing/2014/main" id="{3E74B357-6356-AE37-B2C0-120DD01583F3}"/>
+              </a:ext>
+            </a:extLst>
+          </p:cNvPr>
+          <p:cNvSpPr txBox="1"/>
+          <p:nvPr/>
+        </p:nvSpPr>
+        <p:spPr>
+          <a:xfrm>
+            <a:off x="8455233" y="2731320"/>
+            <a:ext cx="415498" cy="584775"/>
+          </a:xfrm>
+          <a:prstGeom prst="rect">
+            <a:avLst/>
+          </a:prstGeom>
+          <a:noFill/>
+        </p:spPr>
+        <p:txBody>
+          <a:bodyPr wrap="none" rtlCol="0">
+            <a:spAutoFit/>
+          </a:bodyPr>
+          <a:lstStyle/>
+          <a:p>
+            <a:r>
+              <a:rPr lang="en-ES" sz="3200" dirty="0"/>
+              <a:t>q</a:t>
+            </a:r>
+            <a:endParaRPr lang="en-ES" dirty="0"/>
+          </a:p>
+        </p:txBody>
+      </p:sp>
+      <p:sp>
+        <p:nvSpPr>
+          <p:cNvPr id="11" name="Oval 10">
+            <a:extLst>
+              <a:ext uri="{FF2B5EF4-FFF2-40B4-BE49-F238E27FC236}">
+                <a16:creationId xmlns:a16="http://schemas.microsoft.com/office/drawing/2014/main" id="{C76BFBD9-26ED-C71D-2CB5-DB4FCD8EC4C2}"/>
+              </a:ext>
+            </a:extLst>
+          </p:cNvPr>
+          <p:cNvSpPr/>
+          <p:nvPr/>
+        </p:nvSpPr>
+        <p:spPr>
+          <a:xfrm>
+            <a:off x="4342410" y="3273631"/>
+            <a:ext cx="166255" cy="178129"/>
+          </a:xfrm>
+          <a:prstGeom prst="ellipse">
+            <a:avLst/>
+          </a:prstGeom>
+        </p:spPr>
+        <p:style>
+          <a:lnRef idx="2">
+            <a:schemeClr val="accent1">
+              <a:shade val="15000"/>
+            </a:schemeClr>
+          </a:lnRef>
+          <a:fillRef idx="1">
+            <a:schemeClr val="accent1"/>
+          </a:fillRef>
+          <a:effectRef idx="0">
+            <a:schemeClr val="accent1"/>
+          </a:effectRef>
+          <a:fontRef idx="minor">
+            <a:schemeClr val="lt1"/>
+          </a:fontRef>
+        </p:style>
+        <p:txBody>
+          <a:bodyPr rtlCol="0" anchor="ctr"/>
+          <a:lstStyle/>
+          <a:p>
+            <a:pPr algn="ctr"/>
+            <a:endParaRPr lang="en-ES"/>
+          </a:p>
+        </p:txBody>
+      </p:sp>
+      <p:sp>
+        <p:nvSpPr>
+          <p:cNvPr id="12" name="TextBox 11">
+            <a:extLst>
+              <a:ext uri="{FF2B5EF4-FFF2-40B4-BE49-F238E27FC236}">
+                <a16:creationId xmlns:a16="http://schemas.microsoft.com/office/drawing/2014/main" id="{53A5E995-2486-8581-86D1-86DFCE887A52}"/>
+              </a:ext>
+            </a:extLst>
+          </p:cNvPr>
+          <p:cNvSpPr txBox="1"/>
+          <p:nvPr/>
+        </p:nvSpPr>
+        <p:spPr>
+          <a:xfrm>
+            <a:off x="4391893" y="2729340"/>
+            <a:ext cx="502061" cy="584775"/>
+          </a:xfrm>
+          <a:prstGeom prst="rect">
+            <a:avLst/>
+          </a:prstGeom>
+          <a:noFill/>
+        </p:spPr>
+        <p:txBody>
+          <a:bodyPr wrap="none" rtlCol="0">
+            <a:spAutoFit/>
+          </a:bodyPr>
+          <a:lstStyle/>
+          <a:p>
+            <a:r>
+              <a:rPr lang="en-GB" sz="3200" dirty="0"/>
+              <a:t>q</a:t>
+            </a:r>
+            <a:r>
+              <a:rPr lang="en-ES" sz="3200" dirty="0"/>
+              <a:t>'</a:t>
+            </a:r>
+            <a:endParaRPr lang="en-ES" dirty="0"/>
+          </a:p>
+        </p:txBody>
+      </p:sp>
+      <p:sp>
+        <p:nvSpPr>
+          <p:cNvPr id="13" name="Left Bracket 12">
+            <a:extLst>
+              <a:ext uri="{FF2B5EF4-FFF2-40B4-BE49-F238E27FC236}">
+                <a16:creationId xmlns:a16="http://schemas.microsoft.com/office/drawing/2014/main" id="{901B6797-B2C5-8CC6-E87F-12A34EC8C021}"/>
+              </a:ext>
+            </a:extLst>
+          </p:cNvPr>
+          <p:cNvSpPr/>
+          <p:nvPr/>
+        </p:nvSpPr>
+        <p:spPr>
+          <a:xfrm rot="16200000">
+            <a:off x="6026728" y="2998519"/>
+            <a:ext cx="166255" cy="4809509"/>
+          </a:xfrm>
+          <a:prstGeom prst="leftBracket">
+            <a:avLst/>
+          </a:prstGeom>
+          <a:ln w="38100"/>
+        </p:spPr>
+        <p:style>
+          <a:lnRef idx="2">
+            <a:schemeClr val="accent1"/>
+          </a:lnRef>
+          <a:fillRef idx="0">
+            <a:schemeClr val="accent1"/>
+          </a:fillRef>
+          <a:effectRef idx="1">
+            <a:schemeClr val="accent1"/>
+          </a:effectRef>
+          <a:fontRef idx="minor">
+            <a:schemeClr val="tx1"/>
+          </a:fontRef>
+        </p:style>
+        <p:txBody>
+          <a:bodyPr rtlCol="0" anchor="ctr"/>
+          <a:lstStyle/>
+          <a:p>
+            <a:pPr algn="ctr"/>
+            <a:endParaRPr lang="en-ES" dirty="0"/>
+          </a:p>
+        </p:txBody>
+      </p:sp>
+      <p:sp>
+        <p:nvSpPr>
+          <p:cNvPr id="14" name="Left Bracket 13">
+            <a:extLst>
+              <a:ext uri="{FF2B5EF4-FFF2-40B4-BE49-F238E27FC236}">
+                <a16:creationId xmlns:a16="http://schemas.microsoft.com/office/drawing/2014/main" id="{B928EA57-D132-F49F-B3BC-E198CA32CF39}"/>
+              </a:ext>
+            </a:extLst>
+          </p:cNvPr>
+          <p:cNvSpPr/>
+          <p:nvPr/>
+        </p:nvSpPr>
+        <p:spPr>
+          <a:xfrm rot="16200000">
+            <a:off x="4273138" y="4213760"/>
+            <a:ext cx="168235" cy="1332018"/>
+          </a:xfrm>
+          <a:prstGeom prst="leftBracket">
+            <a:avLst/>
+          </a:prstGeom>
+          <a:ln w="38100"/>
+        </p:spPr>
+        <p:style>
+          <a:lnRef idx="2">
+            <a:schemeClr val="accent1"/>
+          </a:lnRef>
+          <a:fillRef idx="0">
+            <a:schemeClr val="accent1"/>
+          </a:fillRef>
+          <a:effectRef idx="1">
+            <a:schemeClr val="accent1"/>
+          </a:effectRef>
+          <a:fontRef idx="minor">
+            <a:schemeClr val="tx1"/>
+          </a:fontRef>
+        </p:style>
+        <p:txBody>
+          <a:bodyPr rtlCol="0" anchor="ctr"/>
+          <a:lstStyle/>
+          <a:p>
+            <a:pPr algn="ctr"/>
+            <a:endParaRPr lang="en-ES" dirty="0"/>
+          </a:p>
+        </p:txBody>
+      </p:sp>
+      <p:sp>
+        <p:nvSpPr>
+          <p:cNvPr id="15" name="Left Bracket 14">
+            <a:extLst>
+              <a:ext uri="{FF2B5EF4-FFF2-40B4-BE49-F238E27FC236}">
+                <a16:creationId xmlns:a16="http://schemas.microsoft.com/office/drawing/2014/main" id="{5FAB0A46-6D9D-CA8F-EFDF-C21BF408A283}"/>
+              </a:ext>
+            </a:extLst>
+          </p:cNvPr>
+          <p:cNvSpPr/>
+          <p:nvPr/>
+        </p:nvSpPr>
+        <p:spPr>
+          <a:xfrm rot="16200000">
+            <a:off x="3980215" y="3422070"/>
+            <a:ext cx="191984" cy="797627"/>
+          </a:xfrm>
+          <a:prstGeom prst="leftBracket">
+            <a:avLst/>
+          </a:prstGeom>
+          <a:ln w="38100"/>
+        </p:spPr>
+        <p:style>
+          <a:lnRef idx="2">
+            <a:schemeClr val="accent1"/>
+          </a:lnRef>
+          <a:fillRef idx="0">
+            <a:schemeClr val="accent1"/>
+          </a:fillRef>
+          <a:effectRef idx="1">
+            <a:schemeClr val="accent1"/>
+          </a:effectRef>
+          <a:fontRef idx="minor">
+            <a:schemeClr val="tx1"/>
+          </a:fontRef>
+        </p:style>
+        <p:txBody>
+          <a:bodyPr rtlCol="0" anchor="ctr"/>
+          <a:lstStyle/>
+          <a:p>
+            <a:pPr algn="ctr"/>
+            <a:endParaRPr lang="en-ES" dirty="0"/>
+          </a:p>
+        </p:txBody>
+      </p:sp>
+      <p:sp>
+        <p:nvSpPr>
+          <p:cNvPr id="16" name="TextBox 15">
+            <a:extLst>
+              <a:ext uri="{FF2B5EF4-FFF2-40B4-BE49-F238E27FC236}">
+                <a16:creationId xmlns:a16="http://schemas.microsoft.com/office/drawing/2014/main" id="{C903BB8F-207F-59E8-D0E1-6FD5922AC969}"/>
+              </a:ext>
+            </a:extLst>
+          </p:cNvPr>
+          <p:cNvSpPr txBox="1"/>
+          <p:nvPr/>
+        </p:nvSpPr>
+        <p:spPr>
+          <a:xfrm>
+            <a:off x="5864433" y="5413165"/>
+            <a:ext cx="415498" cy="584775"/>
+          </a:xfrm>
+          <a:prstGeom prst="rect">
+            <a:avLst/>
+          </a:prstGeom>
+          <a:noFill/>
+        </p:spPr>
+        <p:txBody>
+          <a:bodyPr wrap="none" rtlCol="0">
+            <a:spAutoFit/>
+          </a:bodyPr>
+          <a:lstStyle/>
+          <a:p>
+            <a:r>
+              <a:rPr lang="en-ES" sz="3200" dirty="0"/>
+              <a:t>d</a:t>
+            </a:r>
+            <a:endParaRPr lang="en-ES" dirty="0"/>
+          </a:p>
+        </p:txBody>
+      </p:sp>
+      <p:sp>
+        <p:nvSpPr>
+          <p:cNvPr id="17" name="TextBox 16">
+            <a:extLst>
+              <a:ext uri="{FF2B5EF4-FFF2-40B4-BE49-F238E27FC236}">
+                <a16:creationId xmlns:a16="http://schemas.microsoft.com/office/drawing/2014/main" id="{A229CB29-F312-EFA2-D2C7-F9B5ACD79377}"/>
+              </a:ext>
+            </a:extLst>
+          </p:cNvPr>
+          <p:cNvSpPr txBox="1"/>
+          <p:nvPr/>
+        </p:nvSpPr>
+        <p:spPr>
+          <a:xfrm>
+            <a:off x="3831773" y="3831768"/>
+            <a:ext cx="502061" cy="584775"/>
+          </a:xfrm>
+          <a:prstGeom prst="rect">
+            <a:avLst/>
+          </a:prstGeom>
+          <a:noFill/>
+        </p:spPr>
+        <p:txBody>
+          <a:bodyPr wrap="none" rtlCol="0">
+            <a:spAutoFit/>
+          </a:bodyPr>
+          <a:lstStyle/>
+          <a:p>
+            <a:r>
+              <a:rPr lang="en-ES" sz="3200" dirty="0"/>
+              <a:t>d'</a:t>
+            </a:r>
+          </a:p>
+        </p:txBody>
+      </p:sp>
+      <p:sp>
+        <p:nvSpPr>
+          <p:cNvPr id="18" name="TextBox 17">
+            <a:extLst>
+              <a:ext uri="{FF2B5EF4-FFF2-40B4-BE49-F238E27FC236}">
+                <a16:creationId xmlns:a16="http://schemas.microsoft.com/office/drawing/2014/main" id="{6A737DBC-C0D2-970A-B1F1-C5B5510F22B2}"/>
+              </a:ext>
+            </a:extLst>
+          </p:cNvPr>
+          <p:cNvSpPr txBox="1"/>
+          <p:nvPr/>
+        </p:nvSpPr>
+        <p:spPr>
+          <a:xfrm>
+            <a:off x="4176158" y="4805544"/>
+            <a:ext cx="402674" cy="584775"/>
+          </a:xfrm>
+          <a:prstGeom prst="rect">
+            <a:avLst/>
+          </a:prstGeom>
+          <a:noFill/>
+        </p:spPr>
+        <p:txBody>
+          <a:bodyPr wrap="none" rtlCol="0">
+            <a:spAutoFit/>
+          </a:bodyPr>
+          <a:lstStyle/>
+          <a:p>
+            <a:r>
+              <a:rPr lang="en-ES" sz="3200" dirty="0"/>
+              <a:t>a</a:t>
+            </a:r>
+            <a:endParaRPr lang="en-ES" dirty="0"/>
+          </a:p>
+        </p:txBody>
+      </p:sp>
+      <p:sp>
+        <p:nvSpPr>
+          <p:cNvPr id="2" name="TextBox 1">
+            <a:extLst>
+              <a:ext uri="{FF2B5EF4-FFF2-40B4-BE49-F238E27FC236}">
+                <a16:creationId xmlns:a16="http://schemas.microsoft.com/office/drawing/2014/main" id="{063B39E7-D5F1-0552-DD13-B087F95D5B30}"/>
+              </a:ext>
+            </a:extLst>
+          </p:cNvPr>
+          <p:cNvSpPr txBox="1"/>
+          <p:nvPr/>
+        </p:nvSpPr>
+        <p:spPr>
+          <a:xfrm>
+            <a:off x="2551216" y="1731821"/>
+            <a:ext cx="425116" cy="584775"/>
+          </a:xfrm>
+          <a:prstGeom prst="rect">
+            <a:avLst/>
+          </a:prstGeom>
+          <a:noFill/>
+        </p:spPr>
+        <p:txBody>
+          <a:bodyPr wrap="none" rtlCol="0">
+            <a:spAutoFit/>
+          </a:bodyPr>
+          <a:lstStyle/>
+          <a:p>
+            <a:r>
+              <a:rPr lang="en-ES" sz="3200" dirty="0"/>
+              <a:t>V</a:t>
+            </a:r>
+            <a:endParaRPr lang="en-ES" dirty="0"/>
+          </a:p>
+        </p:txBody>
+      </p:sp>
+    </p:spTree>
+    <p:extLst>
+      <p:ext uri="{BB962C8B-B14F-4D97-AF65-F5344CB8AC3E}">
+        <p14:creationId xmlns:p14="http://schemas.microsoft.com/office/powerpoint/2010/main" val="2209225578"/>
+      </p:ext>
+    </p:extLst>
+  </p:cSld>
+  <p:clrMapOvr>
+    <a:masterClrMapping/>
+  </p:clrMapOvr>
+</p:sld>
+</file>
+
+<file path=ppt/slides/slide3.xml><?xml version="1.0" encoding="utf-8"?>
+<p:sld xmlns:a="http://schemas.openxmlformats.org/drawingml/2006/main" xmlns:r="http://schemas.openxmlformats.org/officeDocument/2006/relationships" xmlns:p="http://schemas.openxmlformats.org/presentationml/2006/main">
+  <p:cSld>
+    <p:spTree>
+      <p:nvGrpSpPr>
+        <p:cNvPr id="1" name=""/>
+        <p:cNvGrpSpPr/>
+        <p:nvPr/>
+      </p:nvGrpSpPr>
+      <p:grpSpPr>
+        <a:xfrm>
+          <a:off x="0" y="0"/>
+          <a:ext cx="0" cy="0"/>
+          <a:chOff x="0" y="0"/>
+          <a:chExt cx="0" cy="0"/>
+        </a:xfrm>
+      </p:grpSpPr>
       <p:sp>
         <p:nvSpPr>
           <p:cNvPr id="2" name="Oval 1">
@@ -4625,7 +7588,7 @@
 </p:sld>
 </file>
 
-<file path=ppt/slides/slide3.xml><?xml version="1.0" encoding="utf-8"?>
+<file path=ppt/slides/slide4.xml><?xml version="1.0" encoding="utf-8"?>
 <p:sld xmlns:a="http://schemas.openxmlformats.org/drawingml/2006/main" xmlns:r="http://schemas.openxmlformats.org/officeDocument/2006/relationships" xmlns:p="http://schemas.openxmlformats.org/presentationml/2006/main">
   <p:cSld>
     <p:spTree>
@@ -5825,7 +8788,7 @@
 </p:sld>
 </file>
 
-<file path=ppt/slides/slide4.xml><?xml version="1.0" encoding="utf-8"?>
+<file path=ppt/slides/slide5.xml><?xml version="1.0" encoding="utf-8"?>
 <p:sld xmlns:a="http://schemas.openxmlformats.org/drawingml/2006/main" xmlns:r="http://schemas.openxmlformats.org/officeDocument/2006/relationships" xmlns:p="http://schemas.openxmlformats.org/presentationml/2006/main">
   <p:cSld>
     <p:spTree>
@@ -6938,7 +9901,7 @@
 </p:sld>
 </file>
 
-<file path=ppt/slides/slide5.xml><?xml version="1.0" encoding="utf-8"?>
+<file path=ppt/slides/slide6.xml><?xml version="1.0" encoding="utf-8"?>
 <p:sld xmlns:a="http://schemas.openxmlformats.org/drawingml/2006/main" xmlns:r="http://schemas.openxmlformats.org/officeDocument/2006/relationships" xmlns:p="http://schemas.openxmlformats.org/presentationml/2006/main">
   <p:cSld>
     <p:spTree>
@@ -7304,7 +10267,7 @@
 </p:sld>
 </file>
 
-<file path=ppt/slides/slide6.xml><?xml version="1.0" encoding="utf-8"?>
+<file path=ppt/slides/slide7.xml><?xml version="1.0" encoding="utf-8"?>
 <p:sld xmlns:a="http://schemas.openxmlformats.org/drawingml/2006/main" xmlns:r="http://schemas.openxmlformats.org/officeDocument/2006/relationships" xmlns:p="http://schemas.openxmlformats.org/presentationml/2006/main">
   <p:cSld>
     <p:spTree>
@@ -7987,7 +10950,7 @@
 </p:sld>
 </file>
 
-<file path=ppt/slides/slide7.xml><?xml version="1.0" encoding="utf-8"?>
+<file path=ppt/slides/slide8.xml><?xml version="1.0" encoding="utf-8"?>
 <p:sld xmlns:a="http://schemas.openxmlformats.org/drawingml/2006/main" xmlns:r="http://schemas.openxmlformats.org/officeDocument/2006/relationships" xmlns:p="http://schemas.openxmlformats.org/presentationml/2006/main">
   <p:cSld>
     <p:spTree>
@@ -9029,6 +11992,1019 @@
     <p:extLst>
       <p:ext uri="{BB962C8B-B14F-4D97-AF65-F5344CB8AC3E}">
         <p14:creationId xmlns:p14="http://schemas.microsoft.com/office/powerpoint/2010/main" val="2737878607"/>
+      </p:ext>
+    </p:extLst>
+  </p:cSld>
+  <p:clrMapOvr>
+    <a:masterClrMapping/>
+  </p:clrMapOvr>
+</p:sld>
+</file>
+
+<file path=ppt/slides/slide9.xml><?xml version="1.0" encoding="utf-8"?>
+<p:sld xmlns:a="http://schemas.openxmlformats.org/drawingml/2006/main" xmlns:r="http://schemas.openxmlformats.org/officeDocument/2006/relationships" xmlns:p="http://schemas.openxmlformats.org/presentationml/2006/main">
+  <p:cSld>
+    <p:spTree>
+      <p:nvGrpSpPr>
+        <p:cNvPr id="1" name=""/>
+        <p:cNvGrpSpPr/>
+        <p:nvPr/>
+      </p:nvGrpSpPr>
+      <p:grpSpPr>
+        <a:xfrm>
+          <a:off x="0" y="0"/>
+          <a:ext cx="0" cy="0"/>
+          <a:chOff x="0" y="0"/>
+          <a:chExt cx="0" cy="0"/>
+        </a:xfrm>
+      </p:grpSpPr>
+      <p:sp>
+        <p:nvSpPr>
+          <p:cNvPr id="22" name="Can 21">
+            <a:extLst>
+              <a:ext uri="{FF2B5EF4-FFF2-40B4-BE49-F238E27FC236}">
+                <a16:creationId xmlns:a16="http://schemas.microsoft.com/office/drawing/2014/main" id="{80B3E943-445B-F936-12D0-D3FAD8707844}"/>
+              </a:ext>
+            </a:extLst>
+          </p:cNvPr>
+          <p:cNvSpPr/>
+          <p:nvPr/>
+        </p:nvSpPr>
+        <p:spPr>
+          <a:xfrm>
+            <a:off x="2630920" y="1732530"/>
+            <a:ext cx="1816924" cy="3666321"/>
+          </a:xfrm>
+          <a:prstGeom prst="can">
+            <a:avLst/>
+          </a:prstGeom>
+          <a:gradFill flip="none" rotWithShape="1">
+            <a:gsLst>
+              <a:gs pos="0">
+                <a:schemeClr val="accent1">
+                  <a:lumMod val="5000"/>
+                  <a:lumOff val="95000"/>
+                </a:schemeClr>
+              </a:gs>
+              <a:gs pos="74000">
+                <a:schemeClr val="accent1">
+                  <a:lumMod val="45000"/>
+                  <a:lumOff val="55000"/>
+                </a:schemeClr>
+              </a:gs>
+              <a:gs pos="83000">
+                <a:schemeClr val="accent1">
+                  <a:lumMod val="45000"/>
+                  <a:lumOff val="55000"/>
+                </a:schemeClr>
+              </a:gs>
+              <a:gs pos="100000">
+                <a:schemeClr val="accent1">
+                  <a:lumMod val="30000"/>
+                  <a:lumOff val="70000"/>
+                </a:schemeClr>
+              </a:gs>
+            </a:gsLst>
+            <a:lin ang="10800000" scaled="1"/>
+            <a:tileRect/>
+          </a:gradFill>
+        </p:spPr>
+        <p:style>
+          <a:lnRef idx="2">
+            <a:schemeClr val="accent1">
+              <a:shade val="15000"/>
+            </a:schemeClr>
+          </a:lnRef>
+          <a:fillRef idx="1">
+            <a:schemeClr val="accent1"/>
+          </a:fillRef>
+          <a:effectRef idx="0">
+            <a:schemeClr val="accent1"/>
+          </a:effectRef>
+          <a:fontRef idx="minor">
+            <a:schemeClr val="lt1"/>
+          </a:fontRef>
+        </p:style>
+        <p:txBody>
+          <a:bodyPr rtlCol="0" anchor="ctr"/>
+          <a:lstStyle/>
+          <a:p>
+            <a:pPr algn="ctr"/>
+            <a:endParaRPr lang="en-ES"/>
+          </a:p>
+        </p:txBody>
+      </p:sp>
+      <p:cxnSp>
+        <p:nvCxnSpPr>
+          <p:cNvPr id="8" name="Straight Arrow Connector 7">
+            <a:extLst>
+              <a:ext uri="{FF2B5EF4-FFF2-40B4-BE49-F238E27FC236}">
+                <a16:creationId xmlns:a16="http://schemas.microsoft.com/office/drawing/2014/main" id="{07F70B38-E8A3-D7DF-F363-93F9932086BE}"/>
+              </a:ext>
+            </a:extLst>
+          </p:cNvPr>
+          <p:cNvCxnSpPr>
+            <a:cxnSpLocks/>
+          </p:cNvCxnSpPr>
+          <p:nvPr/>
+        </p:nvCxnSpPr>
+        <p:spPr>
+          <a:xfrm flipV="1">
+            <a:off x="3531502" y="477430"/>
+            <a:ext cx="0" cy="3192045"/>
+          </a:xfrm>
+          <a:prstGeom prst="straightConnector1">
+            <a:avLst/>
+          </a:prstGeom>
+          <a:ln w="38100">
+            <a:tailEnd type="triangle"/>
+          </a:ln>
+        </p:spPr>
+        <p:style>
+          <a:lnRef idx="2">
+            <a:schemeClr val="accent1"/>
+          </a:lnRef>
+          <a:fillRef idx="0">
+            <a:schemeClr val="accent1"/>
+          </a:fillRef>
+          <a:effectRef idx="1">
+            <a:schemeClr val="accent1"/>
+          </a:effectRef>
+          <a:fontRef idx="minor">
+            <a:schemeClr val="tx1"/>
+          </a:fontRef>
+        </p:style>
+      </p:cxnSp>
+      <p:cxnSp>
+        <p:nvCxnSpPr>
+          <p:cNvPr id="9" name="Straight Arrow Connector 8">
+            <a:extLst>
+              <a:ext uri="{FF2B5EF4-FFF2-40B4-BE49-F238E27FC236}">
+                <a16:creationId xmlns:a16="http://schemas.microsoft.com/office/drawing/2014/main" id="{B3CC1E23-28A9-6BCC-BE20-5C1B057C7AF4}"/>
+              </a:ext>
+            </a:extLst>
+          </p:cNvPr>
+          <p:cNvCxnSpPr>
+            <a:cxnSpLocks/>
+          </p:cNvCxnSpPr>
+          <p:nvPr/>
+        </p:nvCxnSpPr>
+        <p:spPr>
+          <a:xfrm flipH="1">
+            <a:off x="1935679" y="3655621"/>
+            <a:ext cx="1605720" cy="1260762"/>
+          </a:xfrm>
+          <a:prstGeom prst="straightConnector1">
+            <a:avLst/>
+          </a:prstGeom>
+          <a:ln w="38100">
+            <a:tailEnd type="triangle"/>
+          </a:ln>
+        </p:spPr>
+        <p:style>
+          <a:lnRef idx="2">
+            <a:schemeClr val="accent1"/>
+          </a:lnRef>
+          <a:fillRef idx="0">
+            <a:schemeClr val="accent1"/>
+          </a:fillRef>
+          <a:effectRef idx="1">
+            <a:schemeClr val="accent1"/>
+          </a:effectRef>
+          <a:fontRef idx="minor">
+            <a:schemeClr val="tx1"/>
+          </a:fontRef>
+        </p:style>
+      </p:cxnSp>
+      <p:cxnSp>
+        <p:nvCxnSpPr>
+          <p:cNvPr id="10" name="Straight Arrow Connector 9">
+            <a:extLst>
+              <a:ext uri="{FF2B5EF4-FFF2-40B4-BE49-F238E27FC236}">
+                <a16:creationId xmlns:a16="http://schemas.microsoft.com/office/drawing/2014/main" id="{7A76A70B-A609-E30A-E1B0-FA83F69C856B}"/>
+              </a:ext>
+            </a:extLst>
+          </p:cNvPr>
+          <p:cNvCxnSpPr>
+            <a:cxnSpLocks/>
+          </p:cNvCxnSpPr>
+          <p:nvPr/>
+        </p:nvCxnSpPr>
+        <p:spPr>
+          <a:xfrm>
+            <a:off x="3513120" y="3677394"/>
+            <a:ext cx="1783276" cy="0"/>
+          </a:xfrm>
+          <a:prstGeom prst="straightConnector1">
+            <a:avLst/>
+          </a:prstGeom>
+          <a:ln w="38100">
+            <a:tailEnd type="triangle"/>
+          </a:ln>
+        </p:spPr>
+        <p:style>
+          <a:lnRef idx="2">
+            <a:schemeClr val="accent1"/>
+          </a:lnRef>
+          <a:fillRef idx="0">
+            <a:schemeClr val="accent1"/>
+          </a:fillRef>
+          <a:effectRef idx="1">
+            <a:schemeClr val="accent1"/>
+          </a:effectRef>
+          <a:fontRef idx="minor">
+            <a:schemeClr val="tx1"/>
+          </a:fontRef>
+        </p:style>
+      </p:cxnSp>
+      <p:sp>
+        <p:nvSpPr>
+          <p:cNvPr id="13" name="TextBox 12">
+            <a:extLst>
+              <a:ext uri="{FF2B5EF4-FFF2-40B4-BE49-F238E27FC236}">
+                <a16:creationId xmlns:a16="http://schemas.microsoft.com/office/drawing/2014/main" id="{FACD9C23-894B-1D30-C745-03602F4000CA}"/>
+              </a:ext>
+            </a:extLst>
+          </p:cNvPr>
+          <p:cNvSpPr txBox="1"/>
+          <p:nvPr/>
+        </p:nvSpPr>
+        <p:spPr>
+          <a:xfrm>
+            <a:off x="1812336" y="4233110"/>
+            <a:ext cx="365806" cy="584775"/>
+          </a:xfrm>
+          <a:prstGeom prst="rect">
+            <a:avLst/>
+          </a:prstGeom>
+          <a:noFill/>
+        </p:spPr>
+        <p:txBody>
+          <a:bodyPr wrap="none" rtlCol="0">
+            <a:spAutoFit/>
+          </a:bodyPr>
+          <a:lstStyle/>
+          <a:p>
+            <a:r>
+              <a:rPr lang="en-ES" sz="3200" dirty="0"/>
+              <a:t>x</a:t>
+            </a:r>
+            <a:endParaRPr lang="en-ES" dirty="0"/>
+          </a:p>
+        </p:txBody>
+      </p:sp>
+      <p:sp>
+        <p:nvSpPr>
+          <p:cNvPr id="14" name="TextBox 13">
+            <a:extLst>
+              <a:ext uri="{FF2B5EF4-FFF2-40B4-BE49-F238E27FC236}">
+                <a16:creationId xmlns:a16="http://schemas.microsoft.com/office/drawing/2014/main" id="{3694A896-740D-849F-C810-84BB5A636B43}"/>
+              </a:ext>
+            </a:extLst>
+          </p:cNvPr>
+          <p:cNvSpPr txBox="1"/>
+          <p:nvPr/>
+        </p:nvSpPr>
+        <p:spPr>
+          <a:xfrm>
+            <a:off x="5246545" y="3103756"/>
+            <a:ext cx="370614" cy="584775"/>
+          </a:xfrm>
+          <a:prstGeom prst="rect">
+            <a:avLst/>
+          </a:prstGeom>
+          <a:noFill/>
+        </p:spPr>
+        <p:txBody>
+          <a:bodyPr wrap="none" rtlCol="0">
+            <a:spAutoFit/>
+          </a:bodyPr>
+          <a:lstStyle/>
+          <a:p>
+            <a:r>
+              <a:rPr lang="en-ES" sz="3200" dirty="0"/>
+              <a:t>y</a:t>
+            </a:r>
+            <a:endParaRPr lang="en-ES" dirty="0"/>
+          </a:p>
+        </p:txBody>
+      </p:sp>
+      <p:sp>
+        <p:nvSpPr>
+          <p:cNvPr id="15" name="TextBox 14">
+            <a:extLst>
+              <a:ext uri="{FF2B5EF4-FFF2-40B4-BE49-F238E27FC236}">
+                <a16:creationId xmlns:a16="http://schemas.microsoft.com/office/drawing/2014/main" id="{16C5A542-8C42-9ED6-850A-AD050661EC70}"/>
+              </a:ext>
+            </a:extLst>
+          </p:cNvPr>
+          <p:cNvSpPr txBox="1"/>
+          <p:nvPr/>
+        </p:nvSpPr>
+        <p:spPr>
+          <a:xfrm>
+            <a:off x="3153815" y="102637"/>
+            <a:ext cx="364202" cy="584775"/>
+          </a:xfrm>
+          <a:prstGeom prst="rect">
+            <a:avLst/>
+          </a:prstGeom>
+          <a:noFill/>
+        </p:spPr>
+        <p:txBody>
+          <a:bodyPr wrap="none" rtlCol="0">
+            <a:spAutoFit/>
+          </a:bodyPr>
+          <a:lstStyle/>
+          <a:p>
+            <a:r>
+              <a:rPr lang="en-ES" sz="3200" dirty="0"/>
+              <a:t>z</a:t>
+            </a:r>
+            <a:endParaRPr lang="en-ES" dirty="0"/>
+          </a:p>
+        </p:txBody>
+      </p:sp>
+      <p:grpSp>
+        <p:nvGrpSpPr>
+          <p:cNvPr id="21" name="Group 20">
+            <a:extLst>
+              <a:ext uri="{FF2B5EF4-FFF2-40B4-BE49-F238E27FC236}">
+                <a16:creationId xmlns:a16="http://schemas.microsoft.com/office/drawing/2014/main" id="{7F8B98D3-AD84-CECA-7DC4-157E2B25BA30}"/>
+              </a:ext>
+            </a:extLst>
+          </p:cNvPr>
+          <p:cNvGrpSpPr/>
+          <p:nvPr/>
+        </p:nvGrpSpPr>
+        <p:grpSpPr>
+          <a:xfrm>
+            <a:off x="3271113" y="844394"/>
+            <a:ext cx="783718" cy="1126822"/>
+            <a:chOff x="3081130" y="1722395"/>
+            <a:chExt cx="783718" cy="1126822"/>
+          </a:xfrm>
+        </p:grpSpPr>
+        <p:cxnSp>
+          <p:nvCxnSpPr>
+            <p:cNvPr id="17" name="Straight Arrow Connector 16">
+              <a:extLst>
+                <a:ext uri="{FF2B5EF4-FFF2-40B4-BE49-F238E27FC236}">
+                  <a16:creationId xmlns:a16="http://schemas.microsoft.com/office/drawing/2014/main" id="{A57B4F9A-8E31-FC46-AFDC-809784F81A04}"/>
+                </a:ext>
+              </a:extLst>
+            </p:cNvPr>
+            <p:cNvCxnSpPr>
+              <a:cxnSpLocks/>
+            </p:cNvCxnSpPr>
+            <p:nvPr/>
+          </p:nvCxnSpPr>
+          <p:spPr>
+            <a:xfrm flipV="1">
+              <a:off x="3341605" y="1910184"/>
+              <a:ext cx="0" cy="939033"/>
+            </a:xfrm>
+            <a:prstGeom prst="straightConnector1">
+              <a:avLst/>
+            </a:prstGeom>
+            <a:ln w="38100">
+              <a:tailEnd type="triangle"/>
+            </a:ln>
+          </p:spPr>
+          <p:style>
+            <a:lnRef idx="2">
+              <a:schemeClr val="accent1"/>
+            </a:lnRef>
+            <a:fillRef idx="0">
+              <a:schemeClr val="accent1"/>
+            </a:fillRef>
+            <a:effectRef idx="1">
+              <a:schemeClr val="accent1"/>
+            </a:effectRef>
+            <a:fontRef idx="minor">
+              <a:schemeClr val="tx1"/>
+            </a:fontRef>
+          </p:style>
+        </p:cxnSp>
+        <p:sp>
+          <p:nvSpPr>
+            <p:cNvPr id="18" name="TextBox 17">
+              <a:extLst>
+                <a:ext uri="{FF2B5EF4-FFF2-40B4-BE49-F238E27FC236}">
+                  <a16:creationId xmlns:a16="http://schemas.microsoft.com/office/drawing/2014/main" id="{E71F0E75-F2E4-CD96-7998-69239FE2D431}"/>
+                </a:ext>
+              </a:extLst>
+            </p:cNvPr>
+            <p:cNvSpPr txBox="1"/>
+            <p:nvPr/>
+          </p:nvSpPr>
+          <p:spPr>
+            <a:xfrm>
+              <a:off x="3377482" y="1815414"/>
+              <a:ext cx="481222" cy="584775"/>
+            </a:xfrm>
+            <a:prstGeom prst="rect">
+              <a:avLst/>
+            </a:prstGeom>
+            <a:noFill/>
+          </p:spPr>
+          <p:txBody>
+            <a:bodyPr wrap="square" rtlCol="0">
+              <a:spAutoFit/>
+            </a:bodyPr>
+            <a:lstStyle/>
+            <a:p>
+              <a:r>
+                <a:rPr lang="en-ES" sz="3200" dirty="0"/>
+                <a:t>w</a:t>
+              </a:r>
+              <a:endParaRPr lang="en-ES" dirty="0"/>
+            </a:p>
+          </p:txBody>
+        </p:sp>
+        <p:sp>
+          <p:nvSpPr>
+            <p:cNvPr id="19" name="TextBox 18">
+              <a:extLst>
+                <a:ext uri="{FF2B5EF4-FFF2-40B4-BE49-F238E27FC236}">
+                  <a16:creationId xmlns:a16="http://schemas.microsoft.com/office/drawing/2014/main" id="{1BD9E95E-A0A7-844C-47F9-8779FC495CC1}"/>
+                </a:ext>
+              </a:extLst>
+            </p:cNvPr>
+            <p:cNvSpPr txBox="1"/>
+            <p:nvPr/>
+          </p:nvSpPr>
+          <p:spPr>
+            <a:xfrm>
+              <a:off x="3372405" y="1722395"/>
+              <a:ext cx="492443" cy="461665"/>
+            </a:xfrm>
+            <a:prstGeom prst="rect">
+              <a:avLst/>
+            </a:prstGeom>
+            <a:noFill/>
+          </p:spPr>
+          <p:txBody>
+            <a:bodyPr wrap="square" rtlCol="0">
+              <a:spAutoFit/>
+            </a:bodyPr>
+            <a:lstStyle/>
+            <a:p>
+              <a:r>
+                <a:rPr lang="en-ES" sz="2400" dirty="0"/>
+                <a:t>➝</a:t>
+              </a:r>
+            </a:p>
+          </p:txBody>
+        </p:sp>
+        <p:sp>
+          <p:nvSpPr>
+            <p:cNvPr id="20" name="Arc 19">
+              <a:extLst>
+                <a:ext uri="{FF2B5EF4-FFF2-40B4-BE49-F238E27FC236}">
+                  <a16:creationId xmlns:a16="http://schemas.microsoft.com/office/drawing/2014/main" id="{1A79B766-DE35-1485-6F18-3C56E4D5E489}"/>
+                </a:ext>
+              </a:extLst>
+            </p:cNvPr>
+            <p:cNvSpPr/>
+            <p:nvPr/>
+          </p:nvSpPr>
+          <p:spPr>
+            <a:xfrm>
+              <a:off x="3081130" y="2319130"/>
+              <a:ext cx="549966" cy="251791"/>
+            </a:xfrm>
+            <a:prstGeom prst="arc">
+              <a:avLst>
+                <a:gd name="adj1" fmla="val 1510068"/>
+                <a:gd name="adj2" fmla="val 20964950"/>
+              </a:avLst>
+            </a:prstGeom>
+            <a:ln w="38100">
+              <a:solidFill>
+                <a:schemeClr val="tx1"/>
+              </a:solidFill>
+              <a:prstDash val="solid"/>
+              <a:headEnd type="arrow" w="med" len="med"/>
+              <a:tailEnd type="none" w="med" len="med"/>
+            </a:ln>
+          </p:spPr>
+          <p:style>
+            <a:lnRef idx="2">
+              <a:schemeClr val="accent1"/>
+            </a:lnRef>
+            <a:fillRef idx="0">
+              <a:schemeClr val="accent1"/>
+            </a:fillRef>
+            <a:effectRef idx="1">
+              <a:schemeClr val="accent1"/>
+            </a:effectRef>
+            <a:fontRef idx="minor">
+              <a:schemeClr val="tx1"/>
+            </a:fontRef>
+          </p:style>
+          <p:txBody>
+            <a:bodyPr rtlCol="0" anchor="ctr"/>
+            <a:lstStyle/>
+            <a:p>
+              <a:pPr algn="ctr"/>
+              <a:endParaRPr lang="en-ES"/>
+            </a:p>
+          </p:txBody>
+        </p:sp>
+      </p:grpSp>
+      <p:sp>
+        <p:nvSpPr>
+          <p:cNvPr id="24" name="TextBox 23">
+            <a:extLst>
+              <a:ext uri="{FF2B5EF4-FFF2-40B4-BE49-F238E27FC236}">
+                <a16:creationId xmlns:a16="http://schemas.microsoft.com/office/drawing/2014/main" id="{CD505208-224C-A5CD-CDDE-9D9E3F377094}"/>
+              </a:ext>
+            </a:extLst>
+          </p:cNvPr>
+          <p:cNvSpPr txBox="1"/>
+          <p:nvPr/>
+        </p:nvSpPr>
+        <p:spPr>
+          <a:xfrm>
+            <a:off x="3927469" y="3762196"/>
+            <a:ext cx="421910" cy="584775"/>
+          </a:xfrm>
+          <a:prstGeom prst="rect">
+            <a:avLst/>
+          </a:prstGeom>
+          <a:noFill/>
+        </p:spPr>
+        <p:txBody>
+          <a:bodyPr wrap="none" rtlCol="0">
+            <a:spAutoFit/>
+          </a:bodyPr>
+          <a:lstStyle/>
+          <a:p>
+            <a:r>
+              <a:rPr lang="en-ES" sz="3200" dirty="0"/>
+              <a:t>σ</a:t>
+            </a:r>
+            <a:endParaRPr lang="en-ES" dirty="0"/>
+          </a:p>
+        </p:txBody>
+      </p:sp>
+      <p:cxnSp>
+        <p:nvCxnSpPr>
+          <p:cNvPr id="26" name="Straight Arrow Connector 25">
+            <a:extLst>
+              <a:ext uri="{FF2B5EF4-FFF2-40B4-BE49-F238E27FC236}">
+                <a16:creationId xmlns:a16="http://schemas.microsoft.com/office/drawing/2014/main" id="{E559CAB3-AA63-1E87-3C34-E37F3C69FD9C}"/>
+              </a:ext>
+            </a:extLst>
+          </p:cNvPr>
+          <p:cNvCxnSpPr>
+            <a:cxnSpLocks/>
+          </p:cNvCxnSpPr>
+          <p:nvPr/>
+        </p:nvCxnSpPr>
+        <p:spPr>
+          <a:xfrm flipV="1">
+            <a:off x="3535386" y="2664373"/>
+            <a:ext cx="0" cy="1031378"/>
+          </a:xfrm>
+          <a:prstGeom prst="straightConnector1">
+            <a:avLst/>
+          </a:prstGeom>
+          <a:ln w="57150">
+            <a:solidFill>
+              <a:schemeClr val="tx1"/>
+            </a:solidFill>
+            <a:tailEnd type="triangle"/>
+          </a:ln>
+        </p:spPr>
+        <p:style>
+          <a:lnRef idx="2">
+            <a:schemeClr val="accent1"/>
+          </a:lnRef>
+          <a:fillRef idx="0">
+            <a:schemeClr val="accent1"/>
+          </a:fillRef>
+          <a:effectRef idx="1">
+            <a:schemeClr val="accent1"/>
+          </a:effectRef>
+          <a:fontRef idx="minor">
+            <a:schemeClr val="tx1"/>
+          </a:fontRef>
+        </p:style>
+      </p:cxnSp>
+      <p:sp>
+        <p:nvSpPr>
+          <p:cNvPr id="28" name="TextBox 27">
+            <a:extLst>
+              <a:ext uri="{FF2B5EF4-FFF2-40B4-BE49-F238E27FC236}">
+                <a16:creationId xmlns:a16="http://schemas.microsoft.com/office/drawing/2014/main" id="{B7BB9EBD-1C30-B6ED-F8D9-6C31D8FA9125}"/>
+              </a:ext>
+            </a:extLst>
+          </p:cNvPr>
+          <p:cNvSpPr txBox="1"/>
+          <p:nvPr/>
+        </p:nvSpPr>
+        <p:spPr>
+          <a:xfrm>
+            <a:off x="3570375" y="2398797"/>
+            <a:ext cx="450764" cy="584775"/>
+          </a:xfrm>
+          <a:prstGeom prst="rect">
+            <a:avLst/>
+          </a:prstGeom>
+          <a:noFill/>
+        </p:spPr>
+        <p:txBody>
+          <a:bodyPr wrap="none" rtlCol="0">
+            <a:spAutoFit/>
+          </a:bodyPr>
+          <a:lstStyle/>
+          <a:p>
+            <a:r>
+              <a:rPr lang="en-GB" sz="3200" dirty="0"/>
+              <a:t>z</a:t>
+            </a:r>
+            <a:r>
+              <a:rPr lang="en-ES" sz="3200" dirty="0"/>
+              <a:t>'</a:t>
+            </a:r>
+            <a:endParaRPr lang="en-ES" dirty="0"/>
+          </a:p>
+        </p:txBody>
+      </p:sp>
+      <p:grpSp>
+        <p:nvGrpSpPr>
+          <p:cNvPr id="33" name="Group 32">
+            <a:extLst>
+              <a:ext uri="{FF2B5EF4-FFF2-40B4-BE49-F238E27FC236}">
+                <a16:creationId xmlns:a16="http://schemas.microsoft.com/office/drawing/2014/main" id="{A0080567-B3E8-6AD8-128A-10D3F4DE0ADA}"/>
+              </a:ext>
+            </a:extLst>
+          </p:cNvPr>
+          <p:cNvGrpSpPr/>
+          <p:nvPr/>
+        </p:nvGrpSpPr>
+        <p:grpSpPr>
+          <a:xfrm>
+            <a:off x="2616740" y="2422186"/>
+            <a:ext cx="1835285" cy="609600"/>
+            <a:chOff x="5107021" y="1342417"/>
+            <a:chExt cx="1835285" cy="609600"/>
+          </a:xfrm>
+        </p:grpSpPr>
+        <p:sp>
+          <p:nvSpPr>
+            <p:cNvPr id="31" name="Oval 30">
+              <a:extLst>
+                <a:ext uri="{FF2B5EF4-FFF2-40B4-BE49-F238E27FC236}">
+                  <a16:creationId xmlns:a16="http://schemas.microsoft.com/office/drawing/2014/main" id="{083778A3-7DE1-75AD-E146-1946A438CD3D}"/>
+                </a:ext>
+              </a:extLst>
+            </p:cNvPr>
+            <p:cNvSpPr/>
+            <p:nvPr/>
+          </p:nvSpPr>
+          <p:spPr>
+            <a:xfrm>
+              <a:off x="5107021" y="1342417"/>
+              <a:ext cx="1828800" cy="476655"/>
+            </a:xfrm>
+            <a:prstGeom prst="ellipse">
+              <a:avLst/>
+            </a:prstGeom>
+            <a:noFill/>
+            <a:ln>
+              <a:prstDash val="sysDash"/>
+            </a:ln>
+          </p:spPr>
+          <p:style>
+            <a:lnRef idx="2">
+              <a:schemeClr val="accent1">
+                <a:shade val="15000"/>
+              </a:schemeClr>
+            </a:lnRef>
+            <a:fillRef idx="1">
+              <a:schemeClr val="accent1"/>
+            </a:fillRef>
+            <a:effectRef idx="0">
+              <a:schemeClr val="accent1"/>
+            </a:effectRef>
+            <a:fontRef idx="minor">
+              <a:schemeClr val="lt1"/>
+            </a:fontRef>
+          </p:style>
+          <p:txBody>
+            <a:bodyPr rtlCol="0" anchor="ctr"/>
+            <a:lstStyle/>
+            <a:p>
+              <a:pPr algn="ctr"/>
+              <a:endParaRPr lang="en-ES"/>
+            </a:p>
+          </p:txBody>
+        </p:sp>
+        <p:sp>
+          <p:nvSpPr>
+            <p:cNvPr id="32" name="Oval 31">
+              <a:extLst>
+                <a:ext uri="{FF2B5EF4-FFF2-40B4-BE49-F238E27FC236}">
+                  <a16:creationId xmlns:a16="http://schemas.microsoft.com/office/drawing/2014/main" id="{69005D1F-BDA2-DFED-FBFA-4F9B913C5C70}"/>
+                </a:ext>
+              </a:extLst>
+            </p:cNvPr>
+            <p:cNvSpPr/>
+            <p:nvPr/>
+          </p:nvSpPr>
+          <p:spPr>
+            <a:xfrm>
+              <a:off x="5113506" y="1475362"/>
+              <a:ext cx="1828800" cy="476655"/>
+            </a:xfrm>
+            <a:prstGeom prst="ellipse">
+              <a:avLst/>
+            </a:prstGeom>
+            <a:noFill/>
+            <a:ln>
+              <a:prstDash val="sysDash"/>
+            </a:ln>
+          </p:spPr>
+          <p:style>
+            <a:lnRef idx="2">
+              <a:schemeClr val="accent1">
+                <a:shade val="15000"/>
+              </a:schemeClr>
+            </a:lnRef>
+            <a:fillRef idx="1">
+              <a:schemeClr val="accent1"/>
+            </a:fillRef>
+            <a:effectRef idx="0">
+              <a:schemeClr val="accent1"/>
+            </a:effectRef>
+            <a:fontRef idx="minor">
+              <a:schemeClr val="lt1"/>
+            </a:fontRef>
+          </p:style>
+          <p:txBody>
+            <a:bodyPr rtlCol="0" anchor="ctr"/>
+            <a:lstStyle/>
+            <a:p>
+              <a:pPr algn="ctr"/>
+              <a:endParaRPr lang="en-ES"/>
+            </a:p>
+          </p:txBody>
+        </p:sp>
+      </p:grpSp>
+      <p:sp>
+        <p:nvSpPr>
+          <p:cNvPr id="34" name="Left Bracket 33">
+            <a:extLst>
+              <a:ext uri="{FF2B5EF4-FFF2-40B4-BE49-F238E27FC236}">
+                <a16:creationId xmlns:a16="http://schemas.microsoft.com/office/drawing/2014/main" id="{1E7C2054-8342-EEDF-D251-E19FBF0C1E6B}"/>
+              </a:ext>
+            </a:extLst>
+          </p:cNvPr>
+          <p:cNvSpPr/>
+          <p:nvPr/>
+        </p:nvSpPr>
+        <p:spPr>
+          <a:xfrm>
+            <a:off x="2411704" y="2641376"/>
+            <a:ext cx="156398" cy="199101"/>
+          </a:xfrm>
+          <a:prstGeom prst="leftBracket">
+            <a:avLst/>
+          </a:prstGeom>
+          <a:ln w="38100"/>
+        </p:spPr>
+        <p:style>
+          <a:lnRef idx="2">
+            <a:schemeClr val="accent1"/>
+          </a:lnRef>
+          <a:fillRef idx="0">
+            <a:schemeClr val="accent1"/>
+          </a:fillRef>
+          <a:effectRef idx="1">
+            <a:schemeClr val="accent1"/>
+          </a:effectRef>
+          <a:fontRef idx="minor">
+            <a:schemeClr val="tx1"/>
+          </a:fontRef>
+        </p:style>
+        <p:txBody>
+          <a:bodyPr rtlCol="0" anchor="ctr"/>
+          <a:lstStyle/>
+          <a:p>
+            <a:pPr algn="ctr"/>
+            <a:endParaRPr lang="en-ES" dirty="0"/>
+          </a:p>
+        </p:txBody>
+      </p:sp>
+      <p:sp>
+        <p:nvSpPr>
+          <p:cNvPr id="35" name="TextBox 34">
+            <a:extLst>
+              <a:ext uri="{FF2B5EF4-FFF2-40B4-BE49-F238E27FC236}">
+                <a16:creationId xmlns:a16="http://schemas.microsoft.com/office/drawing/2014/main" id="{EFAF11EC-7A15-21FD-1B99-37FC0C43EDE3}"/>
+              </a:ext>
+            </a:extLst>
+          </p:cNvPr>
+          <p:cNvSpPr txBox="1"/>
+          <p:nvPr/>
+        </p:nvSpPr>
+        <p:spPr>
+          <a:xfrm>
+            <a:off x="1780163" y="2344994"/>
+            <a:ext cx="988178" cy="584775"/>
+          </a:xfrm>
+          <a:prstGeom prst="rect">
+            <a:avLst/>
+          </a:prstGeom>
+          <a:noFill/>
+        </p:spPr>
+        <p:txBody>
+          <a:bodyPr wrap="square" rtlCol="0">
+            <a:spAutoFit/>
+          </a:bodyPr>
+          <a:lstStyle/>
+          <a:p>
+            <a:r>
+              <a:rPr lang="en-GB" sz="3200" dirty="0"/>
+              <a:t>d</a:t>
+            </a:r>
+            <a:r>
+              <a:rPr lang="en-ES" sz="3200" dirty="0"/>
+              <a:t>z'</a:t>
+            </a:r>
+            <a:endParaRPr lang="en-ES" sz="3200" baseline="-25000" dirty="0"/>
+          </a:p>
+        </p:txBody>
+      </p:sp>
+      <p:sp>
+        <p:nvSpPr>
+          <p:cNvPr id="36" name="Left Bracket 35">
+            <a:extLst>
+              <a:ext uri="{FF2B5EF4-FFF2-40B4-BE49-F238E27FC236}">
+                <a16:creationId xmlns:a16="http://schemas.microsoft.com/office/drawing/2014/main" id="{BCDF7685-657D-B3F2-1554-4AF4E72D2770}"/>
+              </a:ext>
+            </a:extLst>
+          </p:cNvPr>
+          <p:cNvSpPr/>
+          <p:nvPr/>
+        </p:nvSpPr>
+        <p:spPr>
+          <a:xfrm rot="10800000">
+            <a:off x="4511841" y="1985210"/>
+            <a:ext cx="213288" cy="3199933"/>
+          </a:xfrm>
+          <a:prstGeom prst="leftBracket">
+            <a:avLst/>
+          </a:prstGeom>
+          <a:ln w="38100"/>
+        </p:spPr>
+        <p:style>
+          <a:lnRef idx="2">
+            <a:schemeClr val="accent1"/>
+          </a:lnRef>
+          <a:fillRef idx="0">
+            <a:schemeClr val="accent1"/>
+          </a:fillRef>
+          <a:effectRef idx="1">
+            <a:schemeClr val="accent1"/>
+          </a:effectRef>
+          <a:fontRef idx="minor">
+            <a:schemeClr val="tx1"/>
+          </a:fontRef>
+        </p:style>
+        <p:txBody>
+          <a:bodyPr rtlCol="0" anchor="ctr"/>
+          <a:lstStyle/>
+          <a:p>
+            <a:pPr algn="ctr"/>
+            <a:endParaRPr lang="en-ES" dirty="0"/>
+          </a:p>
+        </p:txBody>
+      </p:sp>
+      <p:sp>
+        <p:nvSpPr>
+          <p:cNvPr id="37" name="Left Bracket 36">
+            <a:extLst>
+              <a:ext uri="{FF2B5EF4-FFF2-40B4-BE49-F238E27FC236}">
+                <a16:creationId xmlns:a16="http://schemas.microsoft.com/office/drawing/2014/main" id="{560C2E30-ECF5-996E-02BB-5FB0103131E6}"/>
+              </a:ext>
+            </a:extLst>
+          </p:cNvPr>
+          <p:cNvSpPr/>
+          <p:nvPr/>
+        </p:nvSpPr>
+        <p:spPr>
+          <a:xfrm rot="16200000">
+            <a:off x="3899587" y="5073524"/>
+            <a:ext cx="199382" cy="904818"/>
+          </a:xfrm>
+          <a:prstGeom prst="leftBracket">
+            <a:avLst/>
+          </a:prstGeom>
+          <a:ln w="38100"/>
+        </p:spPr>
+        <p:style>
+          <a:lnRef idx="2">
+            <a:schemeClr val="accent1"/>
+          </a:lnRef>
+          <a:fillRef idx="0">
+            <a:schemeClr val="accent1"/>
+          </a:fillRef>
+          <a:effectRef idx="1">
+            <a:schemeClr val="accent1"/>
+          </a:effectRef>
+          <a:fontRef idx="minor">
+            <a:schemeClr val="tx1"/>
+          </a:fontRef>
+        </p:style>
+        <p:txBody>
+          <a:bodyPr rtlCol="0" anchor="ctr"/>
+          <a:lstStyle/>
+          <a:p>
+            <a:pPr algn="ctr"/>
+            <a:endParaRPr lang="en-ES" dirty="0"/>
+          </a:p>
+        </p:txBody>
+      </p:sp>
+      <p:sp>
+        <p:nvSpPr>
+          <p:cNvPr id="38" name="TextBox 37">
+            <a:extLst>
+              <a:ext uri="{FF2B5EF4-FFF2-40B4-BE49-F238E27FC236}">
+                <a16:creationId xmlns:a16="http://schemas.microsoft.com/office/drawing/2014/main" id="{80F73788-7C4F-FABF-CCFD-A7971642894D}"/>
+              </a:ext>
+            </a:extLst>
+          </p:cNvPr>
+          <p:cNvSpPr txBox="1"/>
+          <p:nvPr/>
+        </p:nvSpPr>
+        <p:spPr>
+          <a:xfrm>
+            <a:off x="4685340" y="3175291"/>
+            <a:ext cx="389850" cy="584775"/>
+          </a:xfrm>
+          <a:prstGeom prst="rect">
+            <a:avLst/>
+          </a:prstGeom>
+          <a:noFill/>
+        </p:spPr>
+        <p:txBody>
+          <a:bodyPr wrap="none" rtlCol="0">
+            <a:spAutoFit/>
+          </a:bodyPr>
+          <a:lstStyle/>
+          <a:p>
+            <a:r>
+              <a:rPr lang="en-ES" sz="3200" dirty="0"/>
+              <a:t>L</a:t>
+            </a:r>
+            <a:endParaRPr lang="en-ES" dirty="0"/>
+          </a:p>
+        </p:txBody>
+      </p:sp>
+      <p:sp>
+        <p:nvSpPr>
+          <p:cNvPr id="39" name="TextBox 38">
+            <a:extLst>
+              <a:ext uri="{FF2B5EF4-FFF2-40B4-BE49-F238E27FC236}">
+                <a16:creationId xmlns:a16="http://schemas.microsoft.com/office/drawing/2014/main" id="{7B0363E2-9756-6738-8E3D-C98B634D53E8}"/>
+              </a:ext>
+            </a:extLst>
+          </p:cNvPr>
+          <p:cNvSpPr txBox="1"/>
+          <p:nvPr/>
+        </p:nvSpPr>
+        <p:spPr>
+          <a:xfrm>
+            <a:off x="3791149" y="5477018"/>
+            <a:ext cx="492094" cy="584775"/>
+          </a:xfrm>
+          <a:prstGeom prst="rect">
+            <a:avLst/>
+          </a:prstGeom>
+          <a:noFill/>
+        </p:spPr>
+        <p:txBody>
+          <a:bodyPr wrap="square" rtlCol="0">
+            <a:spAutoFit/>
+          </a:bodyPr>
+          <a:lstStyle/>
+          <a:p>
+            <a:r>
+              <a:rPr lang="en-ES" sz="3200" dirty="0"/>
+              <a:t>a</a:t>
+            </a:r>
+            <a:endParaRPr lang="en-ES" dirty="0"/>
+          </a:p>
+        </p:txBody>
+      </p:sp>
+    </p:spTree>
+    <p:extLst>
+      <p:ext uri="{BB962C8B-B14F-4D97-AF65-F5344CB8AC3E}">
+        <p14:creationId xmlns:p14="http://schemas.microsoft.com/office/powerpoint/2010/main" val="2923227112"/>
       </p:ext>
     </p:extLst>
   </p:cSld>

</xml_diff>

<commit_message>
Added 5.4 and 5.5
</commit_message>
<xml_diff>
--- a/images/Images.pptx
+++ b/images/Images.pptx
@@ -17,6 +17,9 @@
     <p:sldId id="264" r:id="rId11"/>
     <p:sldId id="265" r:id="rId12"/>
     <p:sldId id="266" r:id="rId13"/>
+    <p:sldId id="268" r:id="rId14"/>
+    <p:sldId id="269" r:id="rId15"/>
+    <p:sldId id="270" r:id="rId16"/>
   </p:sldIdLst>
   <p:sldSz cx="12192000" cy="6858000"/>
   <p:notesSz cx="6858000" cy="9144000"/>
@@ -272,7 +275,7 @@
           <a:p>
             <a:fld id="{BA48513D-C823-C342-87AA-C2EB607FA67A}" type="datetimeFigureOut">
               <a:rPr lang="en-ES" smtClean="0"/>
-              <a:t>9/12/24</a:t>
+              <a:t>13/12/24</a:t>
             </a:fld>
             <a:endParaRPr lang="en-ES"/>
           </a:p>
@@ -472,7 +475,7 @@
           <a:p>
             <a:fld id="{BA48513D-C823-C342-87AA-C2EB607FA67A}" type="datetimeFigureOut">
               <a:rPr lang="en-ES" smtClean="0"/>
-              <a:t>9/12/24</a:t>
+              <a:t>13/12/24</a:t>
             </a:fld>
             <a:endParaRPr lang="en-ES"/>
           </a:p>
@@ -682,7 +685,7 @@
           <a:p>
             <a:fld id="{BA48513D-C823-C342-87AA-C2EB607FA67A}" type="datetimeFigureOut">
               <a:rPr lang="en-ES" smtClean="0"/>
-              <a:t>9/12/24</a:t>
+              <a:t>13/12/24</a:t>
             </a:fld>
             <a:endParaRPr lang="en-ES"/>
           </a:p>
@@ -882,7 +885,7 @@
           <a:p>
             <a:fld id="{BA48513D-C823-C342-87AA-C2EB607FA67A}" type="datetimeFigureOut">
               <a:rPr lang="en-ES" smtClean="0"/>
-              <a:t>9/12/24</a:t>
+              <a:t>13/12/24</a:t>
             </a:fld>
             <a:endParaRPr lang="en-ES"/>
           </a:p>
@@ -1158,7 +1161,7 @@
           <a:p>
             <a:fld id="{BA48513D-C823-C342-87AA-C2EB607FA67A}" type="datetimeFigureOut">
               <a:rPr lang="en-ES" smtClean="0"/>
-              <a:t>9/12/24</a:t>
+              <a:t>13/12/24</a:t>
             </a:fld>
             <a:endParaRPr lang="en-ES"/>
           </a:p>
@@ -1426,7 +1429,7 @@
           <a:p>
             <a:fld id="{BA48513D-C823-C342-87AA-C2EB607FA67A}" type="datetimeFigureOut">
               <a:rPr lang="en-ES" smtClean="0"/>
-              <a:t>9/12/24</a:t>
+              <a:t>13/12/24</a:t>
             </a:fld>
             <a:endParaRPr lang="en-ES"/>
           </a:p>
@@ -1841,7 +1844,7 @@
           <a:p>
             <a:fld id="{BA48513D-C823-C342-87AA-C2EB607FA67A}" type="datetimeFigureOut">
               <a:rPr lang="en-ES" smtClean="0"/>
-              <a:t>9/12/24</a:t>
+              <a:t>13/12/24</a:t>
             </a:fld>
             <a:endParaRPr lang="en-ES"/>
           </a:p>
@@ -1983,7 +1986,7 @@
           <a:p>
             <a:fld id="{BA48513D-C823-C342-87AA-C2EB607FA67A}" type="datetimeFigureOut">
               <a:rPr lang="en-ES" smtClean="0"/>
-              <a:t>9/12/24</a:t>
+              <a:t>13/12/24</a:t>
             </a:fld>
             <a:endParaRPr lang="en-ES"/>
           </a:p>
@@ -2096,7 +2099,7 @@
           <a:p>
             <a:fld id="{BA48513D-C823-C342-87AA-C2EB607FA67A}" type="datetimeFigureOut">
               <a:rPr lang="en-ES" smtClean="0"/>
-              <a:t>9/12/24</a:t>
+              <a:t>13/12/24</a:t>
             </a:fld>
             <a:endParaRPr lang="en-ES"/>
           </a:p>
@@ -2409,7 +2412,7 @@
           <a:p>
             <a:fld id="{BA48513D-C823-C342-87AA-C2EB607FA67A}" type="datetimeFigureOut">
               <a:rPr lang="en-ES" smtClean="0"/>
-              <a:t>9/12/24</a:t>
+              <a:t>13/12/24</a:t>
             </a:fld>
             <a:endParaRPr lang="en-ES"/>
           </a:p>
@@ -2698,7 +2701,7 @@
           <a:p>
             <a:fld id="{BA48513D-C823-C342-87AA-C2EB607FA67A}" type="datetimeFigureOut">
               <a:rPr lang="en-ES" smtClean="0"/>
-              <a:t>9/12/24</a:t>
+              <a:t>13/12/24</a:t>
             </a:fld>
             <a:endParaRPr lang="en-ES"/>
           </a:p>
@@ -2941,7 +2944,7 @@
           <a:p>
             <a:fld id="{BA48513D-C823-C342-87AA-C2EB607FA67A}" type="datetimeFigureOut">
               <a:rPr lang="en-ES" smtClean="0"/>
-              <a:t>9/12/24</a:t>
+              <a:t>13/12/24</a:t>
             </a:fld>
             <a:endParaRPr lang="en-ES"/>
           </a:p>
@@ -6491,6 +6494,1879 @@
     <p:extLst>
       <p:ext uri="{BB962C8B-B14F-4D97-AF65-F5344CB8AC3E}">
         <p14:creationId xmlns:p14="http://schemas.microsoft.com/office/powerpoint/2010/main" val="963963032"/>
+      </p:ext>
+    </p:extLst>
+  </p:cSld>
+  <p:clrMapOvr>
+    <a:masterClrMapping/>
+  </p:clrMapOvr>
+</p:sld>
+</file>
+
+<file path=ppt/slides/slide13.xml><?xml version="1.0" encoding="utf-8"?>
+<p:sld xmlns:a="http://schemas.openxmlformats.org/drawingml/2006/main" xmlns:r="http://schemas.openxmlformats.org/officeDocument/2006/relationships" xmlns:p="http://schemas.openxmlformats.org/presentationml/2006/main">
+  <p:cSld>
+    <p:spTree>
+      <p:nvGrpSpPr>
+        <p:cNvPr id="1" name=""/>
+        <p:cNvGrpSpPr/>
+        <p:nvPr/>
+      </p:nvGrpSpPr>
+      <p:grpSpPr>
+        <a:xfrm>
+          <a:off x="0" y="0"/>
+          <a:ext cx="0" cy="0"/>
+          <a:chOff x="0" y="0"/>
+          <a:chExt cx="0" cy="0"/>
+        </a:xfrm>
+      </p:grpSpPr>
+      <p:grpSp>
+        <p:nvGrpSpPr>
+          <p:cNvPr id="5" name="Group 4">
+            <a:extLst>
+              <a:ext uri="{FF2B5EF4-FFF2-40B4-BE49-F238E27FC236}">
+                <a16:creationId xmlns:a16="http://schemas.microsoft.com/office/drawing/2014/main" id="{6D68F618-2B2C-6981-20FA-6D8D580FB234}"/>
+              </a:ext>
+            </a:extLst>
+          </p:cNvPr>
+          <p:cNvGrpSpPr/>
+          <p:nvPr/>
+        </p:nvGrpSpPr>
+        <p:grpSpPr>
+          <a:xfrm>
+            <a:off x="1285874" y="1828796"/>
+            <a:ext cx="771526" cy="857254"/>
+            <a:chOff x="1228724" y="1857371"/>
+            <a:chExt cx="771526" cy="857254"/>
+          </a:xfrm>
+        </p:grpSpPr>
+        <p:sp>
+          <p:nvSpPr>
+            <p:cNvPr id="3" name="Oval 2">
+              <a:extLst>
+                <a:ext uri="{FF2B5EF4-FFF2-40B4-BE49-F238E27FC236}">
+                  <a16:creationId xmlns:a16="http://schemas.microsoft.com/office/drawing/2014/main" id="{0D4E23A1-9713-313A-34BA-D145534CF0D5}"/>
+                </a:ext>
+              </a:extLst>
+            </p:cNvPr>
+            <p:cNvSpPr/>
+            <p:nvPr/>
+          </p:nvSpPr>
+          <p:spPr>
+            <a:xfrm>
+              <a:off x="1514475" y="2214563"/>
+              <a:ext cx="485775" cy="500062"/>
+            </a:xfrm>
+            <a:prstGeom prst="ellipse">
+              <a:avLst/>
+            </a:prstGeom>
+            <a:noFill/>
+            <a:ln w="38100"/>
+          </p:spPr>
+          <p:style>
+            <a:lnRef idx="2">
+              <a:schemeClr val="accent1">
+                <a:shade val="15000"/>
+              </a:schemeClr>
+            </a:lnRef>
+            <a:fillRef idx="1">
+              <a:schemeClr val="accent1"/>
+            </a:fillRef>
+            <a:effectRef idx="0">
+              <a:schemeClr val="accent1"/>
+            </a:effectRef>
+            <a:fontRef idx="minor">
+              <a:schemeClr val="lt1"/>
+            </a:fontRef>
+          </p:style>
+          <p:txBody>
+            <a:bodyPr rtlCol="0" anchor="ctr"/>
+            <a:lstStyle/>
+            <a:p>
+              <a:pPr algn="ctr"/>
+              <a:endParaRPr lang="en-ES"/>
+            </a:p>
+          </p:txBody>
+        </p:sp>
+        <p:sp>
+          <p:nvSpPr>
+            <p:cNvPr id="4" name="TextBox 3">
+              <a:extLst>
+                <a:ext uri="{FF2B5EF4-FFF2-40B4-BE49-F238E27FC236}">
+                  <a16:creationId xmlns:a16="http://schemas.microsoft.com/office/drawing/2014/main" id="{5740B773-6C32-B3B7-6981-63592BBC4F42}"/>
+                </a:ext>
+              </a:extLst>
+            </p:cNvPr>
+            <p:cNvSpPr txBox="1"/>
+            <p:nvPr/>
+          </p:nvSpPr>
+          <p:spPr>
+            <a:xfrm>
+              <a:off x="1228724" y="1857371"/>
+              <a:ext cx="431528" cy="646331"/>
+            </a:xfrm>
+            <a:prstGeom prst="rect">
+              <a:avLst/>
+            </a:prstGeom>
+            <a:noFill/>
+          </p:spPr>
+          <p:txBody>
+            <a:bodyPr wrap="none" rtlCol="0">
+              <a:spAutoFit/>
+            </a:bodyPr>
+            <a:lstStyle/>
+            <a:p>
+              <a:r>
+                <a:rPr lang="en-ES" sz="3600" dirty="0"/>
+                <a:t>+</a:t>
+              </a:r>
+            </a:p>
+          </p:txBody>
+        </p:sp>
+      </p:grpSp>
+      <p:sp>
+        <p:nvSpPr>
+          <p:cNvPr id="6" name="TextBox 5">
+            <a:extLst>
+              <a:ext uri="{FF2B5EF4-FFF2-40B4-BE49-F238E27FC236}">
+                <a16:creationId xmlns:a16="http://schemas.microsoft.com/office/drawing/2014/main" id="{1CDA2BF8-B349-BB28-2DA2-2BAC14FA4935}"/>
+              </a:ext>
+            </a:extLst>
+          </p:cNvPr>
+          <p:cNvSpPr txBox="1"/>
+          <p:nvPr/>
+        </p:nvSpPr>
+        <p:spPr>
+          <a:xfrm>
+            <a:off x="500062" y="2328863"/>
+            <a:ext cx="1007007" cy="584775"/>
+          </a:xfrm>
+          <a:prstGeom prst="rect">
+            <a:avLst/>
+          </a:prstGeom>
+          <a:noFill/>
+        </p:spPr>
+        <p:txBody>
+          <a:bodyPr wrap="none" rtlCol="0">
+            <a:spAutoFit/>
+          </a:bodyPr>
+          <a:lstStyle/>
+          <a:p>
+            <a:r>
+              <a:rPr lang="en-ES" sz="3200" dirty="0"/>
+              <a:t>fmm</a:t>
+            </a:r>
+            <a:endParaRPr lang="en-ES" dirty="0"/>
+          </a:p>
+        </p:txBody>
+      </p:sp>
+      <p:sp>
+        <p:nvSpPr>
+          <p:cNvPr id="7" name="Rectangle 6">
+            <a:extLst>
+              <a:ext uri="{FF2B5EF4-FFF2-40B4-BE49-F238E27FC236}">
+                <a16:creationId xmlns:a16="http://schemas.microsoft.com/office/drawing/2014/main" id="{9433B74C-2C69-3E24-E8A0-1E527DAFF4EF}"/>
+              </a:ext>
+            </a:extLst>
+          </p:cNvPr>
+          <p:cNvSpPr/>
+          <p:nvPr/>
+        </p:nvSpPr>
+        <p:spPr>
+          <a:xfrm>
+            <a:off x="3457575" y="1428751"/>
+            <a:ext cx="228600" cy="857250"/>
+          </a:xfrm>
+          <a:prstGeom prst="rect">
+            <a:avLst/>
+          </a:prstGeom>
+          <a:noFill/>
+          <a:ln w="38100"/>
+        </p:spPr>
+        <p:style>
+          <a:lnRef idx="2">
+            <a:schemeClr val="accent1">
+              <a:shade val="15000"/>
+            </a:schemeClr>
+          </a:lnRef>
+          <a:fillRef idx="1">
+            <a:schemeClr val="accent1"/>
+          </a:fillRef>
+          <a:effectRef idx="0">
+            <a:schemeClr val="accent1"/>
+          </a:effectRef>
+          <a:fontRef idx="minor">
+            <a:schemeClr val="lt1"/>
+          </a:fontRef>
+        </p:style>
+        <p:txBody>
+          <a:bodyPr rtlCol="0" anchor="ctr"/>
+          <a:lstStyle/>
+          <a:p>
+            <a:pPr algn="ctr"/>
+            <a:endParaRPr lang="en-ES"/>
+          </a:p>
+        </p:txBody>
+      </p:sp>
+      <p:sp>
+        <p:nvSpPr>
+          <p:cNvPr id="8" name="Rectangle 7">
+            <a:extLst>
+              <a:ext uri="{FF2B5EF4-FFF2-40B4-BE49-F238E27FC236}">
+                <a16:creationId xmlns:a16="http://schemas.microsoft.com/office/drawing/2014/main" id="{F27C1F8C-9909-7763-8B44-11F86F7A134F}"/>
+              </a:ext>
+            </a:extLst>
+          </p:cNvPr>
+          <p:cNvSpPr/>
+          <p:nvPr/>
+        </p:nvSpPr>
+        <p:spPr>
+          <a:xfrm>
+            <a:off x="3461279" y="2724151"/>
+            <a:ext cx="228600" cy="857250"/>
+          </a:xfrm>
+          <a:prstGeom prst="rect">
+            <a:avLst/>
+          </a:prstGeom>
+          <a:noFill/>
+          <a:ln w="38100"/>
+        </p:spPr>
+        <p:style>
+          <a:lnRef idx="2">
+            <a:schemeClr val="accent1">
+              <a:shade val="15000"/>
+            </a:schemeClr>
+          </a:lnRef>
+          <a:fillRef idx="1">
+            <a:schemeClr val="accent1"/>
+          </a:fillRef>
+          <a:effectRef idx="0">
+            <a:schemeClr val="accent1"/>
+          </a:effectRef>
+          <a:fontRef idx="minor">
+            <a:schemeClr val="lt1"/>
+          </a:fontRef>
+        </p:style>
+        <p:txBody>
+          <a:bodyPr rtlCol="0" anchor="ctr"/>
+          <a:lstStyle/>
+          <a:p>
+            <a:pPr algn="ctr"/>
+            <a:endParaRPr lang="en-ES"/>
+          </a:p>
+        </p:txBody>
+      </p:sp>
+      <p:cxnSp>
+        <p:nvCxnSpPr>
+          <p:cNvPr id="10" name="Elbow Connector 9">
+            <a:extLst>
+              <a:ext uri="{FF2B5EF4-FFF2-40B4-BE49-F238E27FC236}">
+                <a16:creationId xmlns:a16="http://schemas.microsoft.com/office/drawing/2014/main" id="{B1AFDCE5-CC90-1CAE-7ADF-FC9C9A0C71D9}"/>
+              </a:ext>
+            </a:extLst>
+          </p:cNvPr>
+          <p:cNvCxnSpPr>
+            <a:cxnSpLocks/>
+            <a:stCxn id="3" idx="0"/>
+            <a:endCxn id="7" idx="0"/>
+          </p:cNvCxnSpPr>
+          <p:nvPr/>
+        </p:nvCxnSpPr>
+        <p:spPr>
+          <a:xfrm rot="5400000" flipH="1" flipV="1">
+            <a:off x="2314576" y="928689"/>
+            <a:ext cx="757237" cy="1757362"/>
+          </a:xfrm>
+          <a:prstGeom prst="bentConnector3">
+            <a:avLst>
+              <a:gd name="adj1" fmla="val 130189"/>
+            </a:avLst>
+          </a:prstGeom>
+          <a:ln w="38100">
+            <a:solidFill>
+              <a:schemeClr val="tx1"/>
+            </a:solidFill>
+          </a:ln>
+        </p:spPr>
+        <p:style>
+          <a:lnRef idx="1">
+            <a:schemeClr val="dk1"/>
+          </a:lnRef>
+          <a:fillRef idx="0">
+            <a:schemeClr val="dk1"/>
+          </a:fillRef>
+          <a:effectRef idx="0">
+            <a:schemeClr val="dk1"/>
+          </a:effectRef>
+          <a:fontRef idx="minor">
+            <a:schemeClr val="tx1"/>
+          </a:fontRef>
+        </p:style>
+      </p:cxnSp>
+      <p:cxnSp>
+        <p:nvCxnSpPr>
+          <p:cNvPr id="12" name="Elbow Connector 11">
+            <a:extLst>
+              <a:ext uri="{FF2B5EF4-FFF2-40B4-BE49-F238E27FC236}">
+                <a16:creationId xmlns:a16="http://schemas.microsoft.com/office/drawing/2014/main" id="{142D1CDB-DDB1-241F-BEBE-56457FD24D3B}"/>
+              </a:ext>
+            </a:extLst>
+          </p:cNvPr>
+          <p:cNvCxnSpPr>
+            <a:cxnSpLocks/>
+            <a:stCxn id="7" idx="2"/>
+            <a:endCxn id="8" idx="0"/>
+          </p:cNvCxnSpPr>
+          <p:nvPr/>
+        </p:nvCxnSpPr>
+        <p:spPr>
+          <a:xfrm rot="16200000" flipH="1">
+            <a:off x="3354652" y="2503224"/>
+            <a:ext cx="438150" cy="3704"/>
+          </a:xfrm>
+          <a:prstGeom prst="bentConnector3">
+            <a:avLst>
+              <a:gd name="adj1" fmla="val 50000"/>
+            </a:avLst>
+          </a:prstGeom>
+          <a:ln w="38100">
+            <a:solidFill>
+              <a:schemeClr val="tx1"/>
+            </a:solidFill>
+          </a:ln>
+        </p:spPr>
+        <p:style>
+          <a:lnRef idx="1">
+            <a:schemeClr val="dk1"/>
+          </a:lnRef>
+          <a:fillRef idx="0">
+            <a:schemeClr val="dk1"/>
+          </a:fillRef>
+          <a:effectRef idx="0">
+            <a:schemeClr val="dk1"/>
+          </a:effectRef>
+          <a:fontRef idx="minor">
+            <a:schemeClr val="tx1"/>
+          </a:fontRef>
+        </p:style>
+      </p:cxnSp>
+      <p:cxnSp>
+        <p:nvCxnSpPr>
+          <p:cNvPr id="15" name="Elbow Connector 14">
+            <a:extLst>
+              <a:ext uri="{FF2B5EF4-FFF2-40B4-BE49-F238E27FC236}">
+                <a16:creationId xmlns:a16="http://schemas.microsoft.com/office/drawing/2014/main" id="{E1391524-B8CB-FB4B-2D6E-38066110C156}"/>
+              </a:ext>
+            </a:extLst>
+          </p:cNvPr>
+          <p:cNvCxnSpPr>
+            <a:cxnSpLocks/>
+            <a:stCxn id="3" idx="4"/>
+            <a:endCxn id="8" idx="2"/>
+          </p:cNvCxnSpPr>
+          <p:nvPr/>
+        </p:nvCxnSpPr>
+        <p:spPr>
+          <a:xfrm rot="16200000" flipH="1">
+            <a:off x="2247371" y="2253192"/>
+            <a:ext cx="895351" cy="1761066"/>
+          </a:xfrm>
+          <a:prstGeom prst="bentConnector3">
+            <a:avLst>
+              <a:gd name="adj1" fmla="val 125532"/>
+            </a:avLst>
+          </a:prstGeom>
+          <a:ln w="38100">
+            <a:solidFill>
+              <a:schemeClr val="tx1"/>
+            </a:solidFill>
+          </a:ln>
+        </p:spPr>
+        <p:style>
+          <a:lnRef idx="1">
+            <a:schemeClr val="dk1"/>
+          </a:lnRef>
+          <a:fillRef idx="0">
+            <a:schemeClr val="dk1"/>
+          </a:fillRef>
+          <a:effectRef idx="0">
+            <a:schemeClr val="dk1"/>
+          </a:effectRef>
+          <a:fontRef idx="minor">
+            <a:schemeClr val="tx1"/>
+          </a:fontRef>
+        </p:style>
+      </p:cxnSp>
+      <p:cxnSp>
+        <p:nvCxnSpPr>
+          <p:cNvPr id="19" name="Straight Arrow Connector 18">
+            <a:extLst>
+              <a:ext uri="{FF2B5EF4-FFF2-40B4-BE49-F238E27FC236}">
+                <a16:creationId xmlns:a16="http://schemas.microsoft.com/office/drawing/2014/main" id="{D3E42462-F366-D604-AB1C-48F61F2E48C9}"/>
+              </a:ext>
+            </a:extLst>
+          </p:cNvPr>
+          <p:cNvCxnSpPr>
+            <a:cxnSpLocks/>
+          </p:cNvCxnSpPr>
+          <p:nvPr/>
+        </p:nvCxnSpPr>
+        <p:spPr>
+          <a:xfrm>
+            <a:off x="2753127" y="1199547"/>
+            <a:ext cx="142875" cy="0"/>
+          </a:xfrm>
+          <a:prstGeom prst="straightConnector1">
+            <a:avLst/>
+          </a:prstGeom>
+          <a:ln w="73025">
+            <a:solidFill>
+              <a:schemeClr val="tx1"/>
+            </a:solidFill>
+            <a:tailEnd type="triangle"/>
+          </a:ln>
+        </p:spPr>
+        <p:style>
+          <a:lnRef idx="1">
+            <a:schemeClr val="dk1"/>
+          </a:lnRef>
+          <a:fillRef idx="0">
+            <a:schemeClr val="dk1"/>
+          </a:fillRef>
+          <a:effectRef idx="0">
+            <a:schemeClr val="dk1"/>
+          </a:effectRef>
+          <a:fontRef idx="minor">
+            <a:schemeClr val="tx1"/>
+          </a:fontRef>
+        </p:style>
+      </p:cxnSp>
+      <p:sp>
+        <p:nvSpPr>
+          <p:cNvPr id="21" name="TextBox 20">
+            <a:extLst>
+              <a:ext uri="{FF2B5EF4-FFF2-40B4-BE49-F238E27FC236}">
+                <a16:creationId xmlns:a16="http://schemas.microsoft.com/office/drawing/2014/main" id="{24E7B425-AB1A-BE65-7727-A35EE5AAAE5D}"/>
+              </a:ext>
+            </a:extLst>
+          </p:cNvPr>
+          <p:cNvSpPr txBox="1"/>
+          <p:nvPr/>
+        </p:nvSpPr>
+        <p:spPr>
+          <a:xfrm>
+            <a:off x="2515129" y="516996"/>
+            <a:ext cx="460382" cy="584775"/>
+          </a:xfrm>
+          <a:prstGeom prst="rect">
+            <a:avLst/>
+          </a:prstGeom>
+          <a:noFill/>
+        </p:spPr>
+        <p:txBody>
+          <a:bodyPr wrap="none" rtlCol="0">
+            <a:spAutoFit/>
+          </a:bodyPr>
+          <a:lstStyle/>
+          <a:p>
+            <a:r>
+              <a:rPr lang="en-ES" sz="3200" dirty="0"/>
+              <a:t>φ</a:t>
+            </a:r>
+          </a:p>
+        </p:txBody>
+      </p:sp>
+      <p:sp>
+        <p:nvSpPr>
+          <p:cNvPr id="22" name="TextBox 21">
+            <a:extLst>
+              <a:ext uri="{FF2B5EF4-FFF2-40B4-BE49-F238E27FC236}">
+                <a16:creationId xmlns:a16="http://schemas.microsoft.com/office/drawing/2014/main" id="{2723AFDD-507F-9629-781C-763537465D3D}"/>
+              </a:ext>
+            </a:extLst>
+          </p:cNvPr>
+          <p:cNvSpPr txBox="1"/>
+          <p:nvPr/>
+        </p:nvSpPr>
+        <p:spPr>
+          <a:xfrm>
+            <a:off x="3742796" y="2845329"/>
+            <a:ext cx="577402" cy="584775"/>
+          </a:xfrm>
+          <a:prstGeom prst="rect">
+            <a:avLst/>
+          </a:prstGeom>
+          <a:noFill/>
+        </p:spPr>
+        <p:txBody>
+          <a:bodyPr wrap="none" rtlCol="0">
+            <a:spAutoFit/>
+          </a:bodyPr>
+          <a:lstStyle/>
+          <a:p>
+            <a:r>
+              <a:rPr lang="en-ES" sz="3200" dirty="0"/>
+              <a:t>R</a:t>
+            </a:r>
+            <a:r>
+              <a:rPr lang="en-ES" sz="3200" baseline="-25000" dirty="0"/>
+              <a:t>e</a:t>
+            </a:r>
+          </a:p>
+        </p:txBody>
+      </p:sp>
+      <p:sp>
+        <p:nvSpPr>
+          <p:cNvPr id="23" name="TextBox 22">
+            <a:extLst>
+              <a:ext uri="{FF2B5EF4-FFF2-40B4-BE49-F238E27FC236}">
+                <a16:creationId xmlns:a16="http://schemas.microsoft.com/office/drawing/2014/main" id="{70394010-775A-3372-0B7D-630379F1D856}"/>
+              </a:ext>
+            </a:extLst>
+          </p:cNvPr>
+          <p:cNvSpPr txBox="1"/>
+          <p:nvPr/>
+        </p:nvSpPr>
+        <p:spPr>
+          <a:xfrm>
+            <a:off x="3751263" y="1532996"/>
+            <a:ext cx="1248803" cy="584775"/>
+          </a:xfrm>
+          <a:prstGeom prst="rect">
+            <a:avLst/>
+          </a:prstGeom>
+          <a:noFill/>
+        </p:spPr>
+        <p:txBody>
+          <a:bodyPr wrap="none" rtlCol="0">
+            <a:spAutoFit/>
+          </a:bodyPr>
+          <a:lstStyle/>
+          <a:p>
+            <a:r>
+              <a:rPr lang="en-ES" sz="3200" dirty="0"/>
+              <a:t>H</a:t>
+            </a:r>
+            <a:r>
+              <a:rPr lang="en-GB" sz="3200" baseline="-25000" dirty="0"/>
+              <a:t>F</a:t>
+            </a:r>
+            <a:r>
+              <a:rPr lang="en-ES" sz="3200" baseline="-25000" dirty="0"/>
+              <a:t>e</a:t>
+            </a:r>
+            <a:r>
+              <a:rPr lang="en-ES" sz="3200" dirty="0"/>
+              <a:t>(B)</a:t>
+            </a:r>
+            <a:endParaRPr lang="en-ES" sz="3200" baseline="-25000" dirty="0"/>
+          </a:p>
+        </p:txBody>
+      </p:sp>
+    </p:spTree>
+    <p:extLst>
+      <p:ext uri="{BB962C8B-B14F-4D97-AF65-F5344CB8AC3E}">
+        <p14:creationId xmlns:p14="http://schemas.microsoft.com/office/powerpoint/2010/main" val="2365552285"/>
+      </p:ext>
+    </p:extLst>
+  </p:cSld>
+  <p:clrMapOvr>
+    <a:masterClrMapping/>
+  </p:clrMapOvr>
+</p:sld>
+</file>
+
+<file path=ppt/slides/slide14.xml><?xml version="1.0" encoding="utf-8"?>
+<p:sld xmlns:a="http://schemas.openxmlformats.org/drawingml/2006/main" xmlns:r="http://schemas.openxmlformats.org/officeDocument/2006/relationships" xmlns:p="http://schemas.openxmlformats.org/presentationml/2006/main">
+  <p:cSld>
+    <p:spTree>
+      <p:nvGrpSpPr>
+        <p:cNvPr id="1" name="">
+          <a:extLst>
+            <a:ext uri="{FF2B5EF4-FFF2-40B4-BE49-F238E27FC236}">
+              <a16:creationId xmlns:a16="http://schemas.microsoft.com/office/drawing/2014/main" id="{021D2198-3F92-BF71-7B93-4F668D313911}"/>
+            </a:ext>
+          </a:extLst>
+        </p:cNvPr>
+        <p:cNvGrpSpPr/>
+        <p:nvPr/>
+      </p:nvGrpSpPr>
+      <p:grpSpPr>
+        <a:xfrm>
+          <a:off x="0" y="0"/>
+          <a:ext cx="0" cy="0"/>
+          <a:chOff x="0" y="0"/>
+          <a:chExt cx="0" cy="0"/>
+        </a:xfrm>
+      </p:grpSpPr>
+      <p:grpSp>
+        <p:nvGrpSpPr>
+          <p:cNvPr id="5" name="Group 4">
+            <a:extLst>
+              <a:ext uri="{FF2B5EF4-FFF2-40B4-BE49-F238E27FC236}">
+                <a16:creationId xmlns:a16="http://schemas.microsoft.com/office/drawing/2014/main" id="{AD9FC555-6949-C638-AFC4-EB687F27CE59}"/>
+              </a:ext>
+            </a:extLst>
+          </p:cNvPr>
+          <p:cNvGrpSpPr/>
+          <p:nvPr/>
+        </p:nvGrpSpPr>
+        <p:grpSpPr>
+          <a:xfrm>
+            <a:off x="1285874" y="1828796"/>
+            <a:ext cx="771526" cy="857254"/>
+            <a:chOff x="1228724" y="1857371"/>
+            <a:chExt cx="771526" cy="857254"/>
+          </a:xfrm>
+        </p:grpSpPr>
+        <p:sp>
+          <p:nvSpPr>
+            <p:cNvPr id="3" name="Oval 2">
+              <a:extLst>
+                <a:ext uri="{FF2B5EF4-FFF2-40B4-BE49-F238E27FC236}">
+                  <a16:creationId xmlns:a16="http://schemas.microsoft.com/office/drawing/2014/main" id="{E1DD9253-7AEC-3726-4686-96B5C8A30228}"/>
+                </a:ext>
+              </a:extLst>
+            </p:cNvPr>
+            <p:cNvSpPr/>
+            <p:nvPr/>
+          </p:nvSpPr>
+          <p:spPr>
+            <a:xfrm>
+              <a:off x="1514475" y="2214563"/>
+              <a:ext cx="485775" cy="500062"/>
+            </a:xfrm>
+            <a:prstGeom prst="ellipse">
+              <a:avLst/>
+            </a:prstGeom>
+            <a:noFill/>
+            <a:ln w="38100"/>
+          </p:spPr>
+          <p:style>
+            <a:lnRef idx="2">
+              <a:schemeClr val="accent1">
+                <a:shade val="15000"/>
+              </a:schemeClr>
+            </a:lnRef>
+            <a:fillRef idx="1">
+              <a:schemeClr val="accent1"/>
+            </a:fillRef>
+            <a:effectRef idx="0">
+              <a:schemeClr val="accent1"/>
+            </a:effectRef>
+            <a:fontRef idx="minor">
+              <a:schemeClr val="lt1"/>
+            </a:fontRef>
+          </p:style>
+          <p:txBody>
+            <a:bodyPr rtlCol="0" anchor="ctr"/>
+            <a:lstStyle/>
+            <a:p>
+              <a:pPr algn="ctr"/>
+              <a:endParaRPr lang="en-ES"/>
+            </a:p>
+          </p:txBody>
+        </p:sp>
+        <p:sp>
+          <p:nvSpPr>
+            <p:cNvPr id="4" name="TextBox 3">
+              <a:extLst>
+                <a:ext uri="{FF2B5EF4-FFF2-40B4-BE49-F238E27FC236}">
+                  <a16:creationId xmlns:a16="http://schemas.microsoft.com/office/drawing/2014/main" id="{A1AFB512-8EFC-43A3-90E5-F9C0223D0A0A}"/>
+                </a:ext>
+              </a:extLst>
+            </p:cNvPr>
+            <p:cNvSpPr txBox="1"/>
+            <p:nvPr/>
+          </p:nvSpPr>
+          <p:spPr>
+            <a:xfrm>
+              <a:off x="1228724" y="1857371"/>
+              <a:ext cx="431528" cy="646331"/>
+            </a:xfrm>
+            <a:prstGeom prst="rect">
+              <a:avLst/>
+            </a:prstGeom>
+            <a:noFill/>
+          </p:spPr>
+          <p:txBody>
+            <a:bodyPr wrap="none" rtlCol="0">
+              <a:spAutoFit/>
+            </a:bodyPr>
+            <a:lstStyle/>
+            <a:p>
+              <a:r>
+                <a:rPr lang="en-ES" sz="3600" dirty="0"/>
+                <a:t>+</a:t>
+              </a:r>
+            </a:p>
+          </p:txBody>
+        </p:sp>
+      </p:grpSp>
+      <p:sp>
+        <p:nvSpPr>
+          <p:cNvPr id="6" name="TextBox 5">
+            <a:extLst>
+              <a:ext uri="{FF2B5EF4-FFF2-40B4-BE49-F238E27FC236}">
+                <a16:creationId xmlns:a16="http://schemas.microsoft.com/office/drawing/2014/main" id="{79B6A099-3EB7-2190-7947-DE6CA1A58E05}"/>
+              </a:ext>
+            </a:extLst>
+          </p:cNvPr>
+          <p:cNvSpPr txBox="1"/>
+          <p:nvPr/>
+        </p:nvSpPr>
+        <p:spPr>
+          <a:xfrm>
+            <a:off x="151720" y="2611891"/>
+            <a:ext cx="1446230" cy="584775"/>
+          </a:xfrm>
+          <a:prstGeom prst="rect">
+            <a:avLst/>
+          </a:prstGeom>
+          <a:noFill/>
+        </p:spPr>
+        <p:txBody>
+          <a:bodyPr wrap="none" rtlCol="0">
+            <a:spAutoFit/>
+          </a:bodyPr>
+          <a:lstStyle/>
+          <a:p>
+            <a:r>
+              <a:rPr lang="en-GB" sz="3200" dirty="0"/>
+              <a:t>f</a:t>
+            </a:r>
+            <a:r>
+              <a:rPr lang="en-ES" sz="3200" dirty="0"/>
+              <a:t>mm=0</a:t>
+            </a:r>
+            <a:endParaRPr lang="en-ES" dirty="0"/>
+          </a:p>
+        </p:txBody>
+      </p:sp>
+      <p:sp>
+        <p:nvSpPr>
+          <p:cNvPr id="7" name="Rectangle 6">
+            <a:extLst>
+              <a:ext uri="{FF2B5EF4-FFF2-40B4-BE49-F238E27FC236}">
+                <a16:creationId xmlns:a16="http://schemas.microsoft.com/office/drawing/2014/main" id="{C202A17F-700F-3191-B5FD-5183378F9AAF}"/>
+              </a:ext>
+            </a:extLst>
+          </p:cNvPr>
+          <p:cNvSpPr/>
+          <p:nvPr/>
+        </p:nvSpPr>
+        <p:spPr>
+          <a:xfrm>
+            <a:off x="3457575" y="1428751"/>
+            <a:ext cx="228600" cy="857250"/>
+          </a:xfrm>
+          <a:prstGeom prst="rect">
+            <a:avLst/>
+          </a:prstGeom>
+          <a:noFill/>
+          <a:ln w="38100"/>
+        </p:spPr>
+        <p:style>
+          <a:lnRef idx="2">
+            <a:schemeClr val="accent1">
+              <a:shade val="15000"/>
+            </a:schemeClr>
+          </a:lnRef>
+          <a:fillRef idx="1">
+            <a:schemeClr val="accent1"/>
+          </a:fillRef>
+          <a:effectRef idx="0">
+            <a:schemeClr val="accent1"/>
+          </a:effectRef>
+          <a:fontRef idx="minor">
+            <a:schemeClr val="lt1"/>
+          </a:fontRef>
+        </p:style>
+        <p:txBody>
+          <a:bodyPr rtlCol="0" anchor="ctr"/>
+          <a:lstStyle/>
+          <a:p>
+            <a:pPr algn="ctr"/>
+            <a:endParaRPr lang="en-ES"/>
+          </a:p>
+        </p:txBody>
+      </p:sp>
+      <p:sp>
+        <p:nvSpPr>
+          <p:cNvPr id="8" name="Rectangle 7">
+            <a:extLst>
+              <a:ext uri="{FF2B5EF4-FFF2-40B4-BE49-F238E27FC236}">
+                <a16:creationId xmlns:a16="http://schemas.microsoft.com/office/drawing/2014/main" id="{67BA8FE9-5043-9A54-8AA2-94614F05CBFD}"/>
+              </a:ext>
+            </a:extLst>
+          </p:cNvPr>
+          <p:cNvSpPr/>
+          <p:nvPr/>
+        </p:nvSpPr>
+        <p:spPr>
+          <a:xfrm>
+            <a:off x="3461279" y="2724151"/>
+            <a:ext cx="228600" cy="857250"/>
+          </a:xfrm>
+          <a:prstGeom prst="rect">
+            <a:avLst/>
+          </a:prstGeom>
+          <a:noFill/>
+          <a:ln w="38100"/>
+        </p:spPr>
+        <p:style>
+          <a:lnRef idx="2">
+            <a:schemeClr val="accent1">
+              <a:shade val="15000"/>
+            </a:schemeClr>
+          </a:lnRef>
+          <a:fillRef idx="1">
+            <a:schemeClr val="accent1"/>
+          </a:fillRef>
+          <a:effectRef idx="0">
+            <a:schemeClr val="accent1"/>
+          </a:effectRef>
+          <a:fontRef idx="minor">
+            <a:schemeClr val="lt1"/>
+          </a:fontRef>
+        </p:style>
+        <p:txBody>
+          <a:bodyPr rtlCol="0" anchor="ctr"/>
+          <a:lstStyle/>
+          <a:p>
+            <a:pPr algn="ctr"/>
+            <a:endParaRPr lang="en-ES"/>
+          </a:p>
+        </p:txBody>
+      </p:sp>
+      <p:cxnSp>
+        <p:nvCxnSpPr>
+          <p:cNvPr id="10" name="Elbow Connector 9">
+            <a:extLst>
+              <a:ext uri="{FF2B5EF4-FFF2-40B4-BE49-F238E27FC236}">
+                <a16:creationId xmlns:a16="http://schemas.microsoft.com/office/drawing/2014/main" id="{007F7A44-F27E-F324-940D-B5601D47B535}"/>
+              </a:ext>
+            </a:extLst>
+          </p:cNvPr>
+          <p:cNvCxnSpPr>
+            <a:cxnSpLocks/>
+            <a:stCxn id="3" idx="0"/>
+            <a:endCxn id="7" idx="0"/>
+          </p:cNvCxnSpPr>
+          <p:nvPr/>
+        </p:nvCxnSpPr>
+        <p:spPr>
+          <a:xfrm rot="5400000" flipH="1" flipV="1">
+            <a:off x="2314576" y="928689"/>
+            <a:ext cx="757237" cy="1757362"/>
+          </a:xfrm>
+          <a:prstGeom prst="bentConnector3">
+            <a:avLst>
+              <a:gd name="adj1" fmla="val 130189"/>
+            </a:avLst>
+          </a:prstGeom>
+          <a:ln w="38100">
+            <a:solidFill>
+              <a:schemeClr val="tx1"/>
+            </a:solidFill>
+          </a:ln>
+        </p:spPr>
+        <p:style>
+          <a:lnRef idx="1">
+            <a:schemeClr val="dk1"/>
+          </a:lnRef>
+          <a:fillRef idx="0">
+            <a:schemeClr val="dk1"/>
+          </a:fillRef>
+          <a:effectRef idx="0">
+            <a:schemeClr val="dk1"/>
+          </a:effectRef>
+          <a:fontRef idx="minor">
+            <a:schemeClr val="tx1"/>
+          </a:fontRef>
+        </p:style>
+      </p:cxnSp>
+      <p:cxnSp>
+        <p:nvCxnSpPr>
+          <p:cNvPr id="12" name="Elbow Connector 11">
+            <a:extLst>
+              <a:ext uri="{FF2B5EF4-FFF2-40B4-BE49-F238E27FC236}">
+                <a16:creationId xmlns:a16="http://schemas.microsoft.com/office/drawing/2014/main" id="{F67D3F4A-69C1-BE8F-4EDD-5A10AD22898D}"/>
+              </a:ext>
+            </a:extLst>
+          </p:cNvPr>
+          <p:cNvCxnSpPr>
+            <a:cxnSpLocks/>
+            <a:stCxn id="7" idx="2"/>
+            <a:endCxn id="8" idx="0"/>
+          </p:cNvCxnSpPr>
+          <p:nvPr/>
+        </p:nvCxnSpPr>
+        <p:spPr>
+          <a:xfrm rot="16200000" flipH="1">
+            <a:off x="3354652" y="2503224"/>
+            <a:ext cx="438150" cy="3704"/>
+          </a:xfrm>
+          <a:prstGeom prst="bentConnector3">
+            <a:avLst>
+              <a:gd name="adj1" fmla="val 50000"/>
+            </a:avLst>
+          </a:prstGeom>
+          <a:ln w="38100">
+            <a:solidFill>
+              <a:schemeClr val="tx1"/>
+            </a:solidFill>
+          </a:ln>
+        </p:spPr>
+        <p:style>
+          <a:lnRef idx="1">
+            <a:schemeClr val="dk1"/>
+          </a:lnRef>
+          <a:fillRef idx="0">
+            <a:schemeClr val="dk1"/>
+          </a:fillRef>
+          <a:effectRef idx="0">
+            <a:schemeClr val="dk1"/>
+          </a:effectRef>
+          <a:fontRef idx="minor">
+            <a:schemeClr val="tx1"/>
+          </a:fontRef>
+        </p:style>
+      </p:cxnSp>
+      <p:cxnSp>
+        <p:nvCxnSpPr>
+          <p:cNvPr id="15" name="Elbow Connector 14">
+            <a:extLst>
+              <a:ext uri="{FF2B5EF4-FFF2-40B4-BE49-F238E27FC236}">
+                <a16:creationId xmlns:a16="http://schemas.microsoft.com/office/drawing/2014/main" id="{0D34456C-4793-EA82-391D-FA0BB9C12DB9}"/>
+              </a:ext>
+            </a:extLst>
+          </p:cNvPr>
+          <p:cNvCxnSpPr>
+            <a:cxnSpLocks/>
+            <a:stCxn id="3" idx="4"/>
+            <a:endCxn id="8" idx="2"/>
+          </p:cNvCxnSpPr>
+          <p:nvPr/>
+        </p:nvCxnSpPr>
+        <p:spPr>
+          <a:xfrm rot="16200000" flipH="1">
+            <a:off x="2247371" y="2253192"/>
+            <a:ext cx="895351" cy="1761066"/>
+          </a:xfrm>
+          <a:prstGeom prst="bentConnector3">
+            <a:avLst>
+              <a:gd name="adj1" fmla="val 125532"/>
+            </a:avLst>
+          </a:prstGeom>
+          <a:ln w="38100">
+            <a:solidFill>
+              <a:schemeClr val="tx1"/>
+            </a:solidFill>
+          </a:ln>
+        </p:spPr>
+        <p:style>
+          <a:lnRef idx="1">
+            <a:schemeClr val="dk1"/>
+          </a:lnRef>
+          <a:fillRef idx="0">
+            <a:schemeClr val="dk1"/>
+          </a:fillRef>
+          <a:effectRef idx="0">
+            <a:schemeClr val="dk1"/>
+          </a:effectRef>
+          <a:fontRef idx="minor">
+            <a:schemeClr val="tx1"/>
+          </a:fontRef>
+        </p:style>
+      </p:cxnSp>
+      <p:cxnSp>
+        <p:nvCxnSpPr>
+          <p:cNvPr id="19" name="Straight Arrow Connector 18">
+            <a:extLst>
+              <a:ext uri="{FF2B5EF4-FFF2-40B4-BE49-F238E27FC236}">
+                <a16:creationId xmlns:a16="http://schemas.microsoft.com/office/drawing/2014/main" id="{92D7B5EB-28DE-382A-7ACF-057D7CDB60AE}"/>
+              </a:ext>
+            </a:extLst>
+          </p:cNvPr>
+          <p:cNvCxnSpPr>
+            <a:cxnSpLocks/>
+          </p:cNvCxnSpPr>
+          <p:nvPr/>
+        </p:nvCxnSpPr>
+        <p:spPr>
+          <a:xfrm>
+            <a:off x="2753127" y="1199547"/>
+            <a:ext cx="142875" cy="0"/>
+          </a:xfrm>
+          <a:prstGeom prst="straightConnector1">
+            <a:avLst/>
+          </a:prstGeom>
+          <a:ln w="73025">
+            <a:solidFill>
+              <a:schemeClr val="tx1"/>
+            </a:solidFill>
+            <a:tailEnd type="triangle"/>
+          </a:ln>
+        </p:spPr>
+        <p:style>
+          <a:lnRef idx="1">
+            <a:schemeClr val="dk1"/>
+          </a:lnRef>
+          <a:fillRef idx="0">
+            <a:schemeClr val="dk1"/>
+          </a:fillRef>
+          <a:effectRef idx="0">
+            <a:schemeClr val="dk1"/>
+          </a:effectRef>
+          <a:fontRef idx="minor">
+            <a:schemeClr val="tx1"/>
+          </a:fontRef>
+        </p:style>
+      </p:cxnSp>
+      <p:sp>
+        <p:nvSpPr>
+          <p:cNvPr id="21" name="TextBox 20">
+            <a:extLst>
+              <a:ext uri="{FF2B5EF4-FFF2-40B4-BE49-F238E27FC236}">
+                <a16:creationId xmlns:a16="http://schemas.microsoft.com/office/drawing/2014/main" id="{B4F033C7-45C9-B572-C226-9CE714C00564}"/>
+              </a:ext>
+            </a:extLst>
+          </p:cNvPr>
+          <p:cNvSpPr txBox="1"/>
+          <p:nvPr/>
+        </p:nvSpPr>
+        <p:spPr>
+          <a:xfrm>
+            <a:off x="2515129" y="516996"/>
+            <a:ext cx="460382" cy="584775"/>
+          </a:xfrm>
+          <a:prstGeom prst="rect">
+            <a:avLst/>
+          </a:prstGeom>
+          <a:noFill/>
+        </p:spPr>
+        <p:txBody>
+          <a:bodyPr wrap="none" rtlCol="0">
+            <a:spAutoFit/>
+          </a:bodyPr>
+          <a:lstStyle/>
+          <a:p>
+            <a:r>
+              <a:rPr lang="en-ES" sz="3200" dirty="0"/>
+              <a:t>φ</a:t>
+            </a:r>
+          </a:p>
+        </p:txBody>
+      </p:sp>
+      <p:sp>
+        <p:nvSpPr>
+          <p:cNvPr id="22" name="TextBox 21">
+            <a:extLst>
+              <a:ext uri="{FF2B5EF4-FFF2-40B4-BE49-F238E27FC236}">
+                <a16:creationId xmlns:a16="http://schemas.microsoft.com/office/drawing/2014/main" id="{C8DA1606-C641-420B-AEA8-EFE7FB26D782}"/>
+              </a:ext>
+            </a:extLst>
+          </p:cNvPr>
+          <p:cNvSpPr txBox="1"/>
+          <p:nvPr/>
+        </p:nvSpPr>
+        <p:spPr>
+          <a:xfrm>
+            <a:off x="3742796" y="2845329"/>
+            <a:ext cx="503664" cy="584775"/>
+          </a:xfrm>
+          <a:prstGeom prst="rect">
+            <a:avLst/>
+          </a:prstGeom>
+          <a:noFill/>
+        </p:spPr>
+        <p:txBody>
+          <a:bodyPr wrap="none" rtlCol="0">
+            <a:spAutoFit/>
+          </a:bodyPr>
+          <a:lstStyle/>
+          <a:p>
+            <a:r>
+              <a:rPr lang="en-ES" sz="3200" dirty="0"/>
+              <a:t>R</a:t>
+            </a:r>
+            <a:r>
+              <a:rPr lang="en-ES" sz="3200" baseline="-25000" dirty="0"/>
+              <a:t>l</a:t>
+            </a:r>
+          </a:p>
+        </p:txBody>
+      </p:sp>
+      <p:sp>
+        <p:nvSpPr>
+          <p:cNvPr id="23" name="TextBox 22">
+            <a:extLst>
+              <a:ext uri="{FF2B5EF4-FFF2-40B4-BE49-F238E27FC236}">
+                <a16:creationId xmlns:a16="http://schemas.microsoft.com/office/drawing/2014/main" id="{AF1DC6C7-41ED-BB3A-6195-A95CE20370D2}"/>
+              </a:ext>
+            </a:extLst>
+          </p:cNvPr>
+          <p:cNvSpPr txBox="1"/>
+          <p:nvPr/>
+        </p:nvSpPr>
+        <p:spPr>
+          <a:xfrm>
+            <a:off x="3751263" y="1532996"/>
+            <a:ext cx="1248803" cy="584775"/>
+          </a:xfrm>
+          <a:prstGeom prst="rect">
+            <a:avLst/>
+          </a:prstGeom>
+          <a:noFill/>
+        </p:spPr>
+        <p:txBody>
+          <a:bodyPr wrap="none" rtlCol="0">
+            <a:spAutoFit/>
+          </a:bodyPr>
+          <a:lstStyle/>
+          <a:p>
+            <a:r>
+              <a:rPr lang="en-ES" sz="3200" dirty="0"/>
+              <a:t>H</a:t>
+            </a:r>
+            <a:r>
+              <a:rPr lang="en-GB" sz="3200" baseline="-25000" dirty="0"/>
+              <a:t>F</a:t>
+            </a:r>
+            <a:r>
+              <a:rPr lang="en-ES" sz="3200" baseline="-25000" dirty="0"/>
+              <a:t>e</a:t>
+            </a:r>
+            <a:r>
+              <a:rPr lang="en-ES" sz="3200" dirty="0"/>
+              <a:t>(B)</a:t>
+            </a:r>
+            <a:endParaRPr lang="en-ES" sz="3200" baseline="-25000" dirty="0"/>
+          </a:p>
+        </p:txBody>
+      </p:sp>
+    </p:spTree>
+    <p:extLst>
+      <p:ext uri="{BB962C8B-B14F-4D97-AF65-F5344CB8AC3E}">
+        <p14:creationId xmlns:p14="http://schemas.microsoft.com/office/powerpoint/2010/main" val="3980787269"/>
+      </p:ext>
+    </p:extLst>
+  </p:cSld>
+  <p:clrMapOvr>
+    <a:masterClrMapping/>
+  </p:clrMapOvr>
+</p:sld>
+</file>
+
+<file path=ppt/slides/slide15.xml><?xml version="1.0" encoding="utf-8"?>
+<p:sld xmlns:a="http://schemas.openxmlformats.org/drawingml/2006/main" xmlns:r="http://schemas.openxmlformats.org/officeDocument/2006/relationships" xmlns:p="http://schemas.openxmlformats.org/presentationml/2006/main">
+  <p:cSld>
+    <p:spTree>
+      <p:nvGrpSpPr>
+        <p:cNvPr id="1" name="">
+          <a:extLst>
+            <a:ext uri="{FF2B5EF4-FFF2-40B4-BE49-F238E27FC236}">
+              <a16:creationId xmlns:a16="http://schemas.microsoft.com/office/drawing/2014/main" id="{99FFBEA0-20A1-3DAF-5302-36E9CD803E4B}"/>
+            </a:ext>
+          </a:extLst>
+        </p:cNvPr>
+        <p:cNvGrpSpPr/>
+        <p:nvPr/>
+      </p:nvGrpSpPr>
+      <p:grpSpPr>
+        <a:xfrm>
+          <a:off x="0" y="0"/>
+          <a:ext cx="0" cy="0"/>
+          <a:chOff x="0" y="0"/>
+          <a:chExt cx="0" cy="0"/>
+        </a:xfrm>
+      </p:grpSpPr>
+      <p:grpSp>
+        <p:nvGrpSpPr>
+          <p:cNvPr id="5" name="Group 4">
+            <a:extLst>
+              <a:ext uri="{FF2B5EF4-FFF2-40B4-BE49-F238E27FC236}">
+                <a16:creationId xmlns:a16="http://schemas.microsoft.com/office/drawing/2014/main" id="{D535B6B9-7D5B-A83E-9508-46C6221B982C}"/>
+              </a:ext>
+            </a:extLst>
+          </p:cNvPr>
+          <p:cNvGrpSpPr/>
+          <p:nvPr/>
+        </p:nvGrpSpPr>
+        <p:grpSpPr>
+          <a:xfrm>
+            <a:off x="1285874" y="1828796"/>
+            <a:ext cx="771526" cy="857254"/>
+            <a:chOff x="1228724" y="1857371"/>
+            <a:chExt cx="771526" cy="857254"/>
+          </a:xfrm>
+        </p:grpSpPr>
+        <p:sp>
+          <p:nvSpPr>
+            <p:cNvPr id="3" name="Oval 2">
+              <a:extLst>
+                <a:ext uri="{FF2B5EF4-FFF2-40B4-BE49-F238E27FC236}">
+                  <a16:creationId xmlns:a16="http://schemas.microsoft.com/office/drawing/2014/main" id="{CA4DD5BE-F6F6-66B9-5750-3DDE3A53E4FC}"/>
+                </a:ext>
+              </a:extLst>
+            </p:cNvPr>
+            <p:cNvSpPr/>
+            <p:nvPr/>
+          </p:nvSpPr>
+          <p:spPr>
+            <a:xfrm>
+              <a:off x="1514475" y="2214563"/>
+              <a:ext cx="485775" cy="500062"/>
+            </a:xfrm>
+            <a:prstGeom prst="ellipse">
+              <a:avLst/>
+            </a:prstGeom>
+            <a:noFill/>
+            <a:ln w="38100"/>
+          </p:spPr>
+          <p:style>
+            <a:lnRef idx="2">
+              <a:schemeClr val="accent1">
+                <a:shade val="15000"/>
+              </a:schemeClr>
+            </a:lnRef>
+            <a:fillRef idx="1">
+              <a:schemeClr val="accent1"/>
+            </a:fillRef>
+            <a:effectRef idx="0">
+              <a:schemeClr val="accent1"/>
+            </a:effectRef>
+            <a:fontRef idx="minor">
+              <a:schemeClr val="lt1"/>
+            </a:fontRef>
+          </p:style>
+          <p:txBody>
+            <a:bodyPr rtlCol="0" anchor="ctr"/>
+            <a:lstStyle/>
+            <a:p>
+              <a:pPr algn="ctr"/>
+              <a:endParaRPr lang="en-ES"/>
+            </a:p>
+          </p:txBody>
+        </p:sp>
+        <p:sp>
+          <p:nvSpPr>
+            <p:cNvPr id="4" name="TextBox 3">
+              <a:extLst>
+                <a:ext uri="{FF2B5EF4-FFF2-40B4-BE49-F238E27FC236}">
+                  <a16:creationId xmlns:a16="http://schemas.microsoft.com/office/drawing/2014/main" id="{2B582E26-687D-9766-2582-2D0C0092842E}"/>
+                </a:ext>
+              </a:extLst>
+            </p:cNvPr>
+            <p:cNvSpPr txBox="1"/>
+            <p:nvPr/>
+          </p:nvSpPr>
+          <p:spPr>
+            <a:xfrm>
+              <a:off x="1228724" y="1857371"/>
+              <a:ext cx="431528" cy="646331"/>
+            </a:xfrm>
+            <a:prstGeom prst="rect">
+              <a:avLst/>
+            </a:prstGeom>
+            <a:noFill/>
+          </p:spPr>
+          <p:txBody>
+            <a:bodyPr wrap="none" rtlCol="0">
+              <a:spAutoFit/>
+            </a:bodyPr>
+            <a:lstStyle/>
+            <a:p>
+              <a:r>
+                <a:rPr lang="en-ES" sz="3600" dirty="0"/>
+                <a:t>+</a:t>
+              </a:r>
+            </a:p>
+          </p:txBody>
+        </p:sp>
+      </p:grpSp>
+      <p:sp>
+        <p:nvSpPr>
+          <p:cNvPr id="6" name="TextBox 5">
+            <a:extLst>
+              <a:ext uri="{FF2B5EF4-FFF2-40B4-BE49-F238E27FC236}">
+                <a16:creationId xmlns:a16="http://schemas.microsoft.com/office/drawing/2014/main" id="{D7CA5454-0258-3EAF-A0AC-4B84EA1E37E0}"/>
+              </a:ext>
+            </a:extLst>
+          </p:cNvPr>
+          <p:cNvSpPr txBox="1"/>
+          <p:nvPr/>
+        </p:nvSpPr>
+        <p:spPr>
+          <a:xfrm>
+            <a:off x="151720" y="2611891"/>
+            <a:ext cx="1446230" cy="584775"/>
+          </a:xfrm>
+          <a:prstGeom prst="rect">
+            <a:avLst/>
+          </a:prstGeom>
+          <a:noFill/>
+        </p:spPr>
+        <p:txBody>
+          <a:bodyPr wrap="none" rtlCol="0">
+            <a:spAutoFit/>
+          </a:bodyPr>
+          <a:lstStyle/>
+          <a:p>
+            <a:r>
+              <a:rPr lang="en-GB" sz="3200" dirty="0"/>
+              <a:t>f</a:t>
+            </a:r>
+            <a:r>
+              <a:rPr lang="en-ES" sz="3200" dirty="0"/>
+              <a:t>mm=0</a:t>
+            </a:r>
+            <a:endParaRPr lang="en-ES" dirty="0"/>
+          </a:p>
+        </p:txBody>
+      </p:sp>
+      <p:sp>
+        <p:nvSpPr>
+          <p:cNvPr id="7" name="Rectangle 6">
+            <a:extLst>
+              <a:ext uri="{FF2B5EF4-FFF2-40B4-BE49-F238E27FC236}">
+                <a16:creationId xmlns:a16="http://schemas.microsoft.com/office/drawing/2014/main" id="{8508AC69-4D69-0C62-BE33-6254F1124399}"/>
+              </a:ext>
+            </a:extLst>
+          </p:cNvPr>
+          <p:cNvSpPr/>
+          <p:nvPr/>
+        </p:nvSpPr>
+        <p:spPr>
+          <a:xfrm>
+            <a:off x="3457575" y="1428751"/>
+            <a:ext cx="228600" cy="857250"/>
+          </a:xfrm>
+          <a:prstGeom prst="rect">
+            <a:avLst/>
+          </a:prstGeom>
+          <a:noFill/>
+          <a:ln w="38100"/>
+        </p:spPr>
+        <p:style>
+          <a:lnRef idx="2">
+            <a:schemeClr val="accent1">
+              <a:shade val="15000"/>
+            </a:schemeClr>
+          </a:lnRef>
+          <a:fillRef idx="1">
+            <a:schemeClr val="accent1"/>
+          </a:fillRef>
+          <a:effectRef idx="0">
+            <a:schemeClr val="accent1"/>
+          </a:effectRef>
+          <a:fontRef idx="minor">
+            <a:schemeClr val="lt1"/>
+          </a:fontRef>
+        </p:style>
+        <p:txBody>
+          <a:bodyPr rtlCol="0" anchor="ctr"/>
+          <a:lstStyle/>
+          <a:p>
+            <a:pPr algn="ctr"/>
+            <a:endParaRPr lang="en-ES"/>
+          </a:p>
+        </p:txBody>
+      </p:sp>
+      <p:sp>
+        <p:nvSpPr>
+          <p:cNvPr id="8" name="Rectangle 7">
+            <a:extLst>
+              <a:ext uri="{FF2B5EF4-FFF2-40B4-BE49-F238E27FC236}">
+                <a16:creationId xmlns:a16="http://schemas.microsoft.com/office/drawing/2014/main" id="{02F947B2-8BF8-EA93-F275-AF67024DBF45}"/>
+              </a:ext>
+            </a:extLst>
+          </p:cNvPr>
+          <p:cNvSpPr/>
+          <p:nvPr/>
+        </p:nvSpPr>
+        <p:spPr>
+          <a:xfrm>
+            <a:off x="3461279" y="2724151"/>
+            <a:ext cx="228600" cy="857250"/>
+          </a:xfrm>
+          <a:prstGeom prst="rect">
+            <a:avLst/>
+          </a:prstGeom>
+          <a:noFill/>
+          <a:ln w="38100"/>
+        </p:spPr>
+        <p:style>
+          <a:lnRef idx="2">
+            <a:schemeClr val="accent1">
+              <a:shade val="15000"/>
+            </a:schemeClr>
+          </a:lnRef>
+          <a:fillRef idx="1">
+            <a:schemeClr val="accent1"/>
+          </a:fillRef>
+          <a:effectRef idx="0">
+            <a:schemeClr val="accent1"/>
+          </a:effectRef>
+          <a:fontRef idx="minor">
+            <a:schemeClr val="lt1"/>
+          </a:fontRef>
+        </p:style>
+        <p:txBody>
+          <a:bodyPr rtlCol="0" anchor="ctr"/>
+          <a:lstStyle/>
+          <a:p>
+            <a:pPr algn="ctr"/>
+            <a:endParaRPr lang="en-ES"/>
+          </a:p>
+        </p:txBody>
+      </p:sp>
+      <p:cxnSp>
+        <p:nvCxnSpPr>
+          <p:cNvPr id="10" name="Elbow Connector 9">
+            <a:extLst>
+              <a:ext uri="{FF2B5EF4-FFF2-40B4-BE49-F238E27FC236}">
+                <a16:creationId xmlns:a16="http://schemas.microsoft.com/office/drawing/2014/main" id="{A9DB73C6-1EB7-25BD-49CA-A6795E78E97D}"/>
+              </a:ext>
+            </a:extLst>
+          </p:cNvPr>
+          <p:cNvCxnSpPr>
+            <a:cxnSpLocks/>
+            <a:stCxn id="3" idx="0"/>
+            <a:endCxn id="7" idx="0"/>
+          </p:cNvCxnSpPr>
+          <p:nvPr/>
+        </p:nvCxnSpPr>
+        <p:spPr>
+          <a:xfrm rot="5400000" flipH="1" flipV="1">
+            <a:off x="2314576" y="928689"/>
+            <a:ext cx="757237" cy="1757362"/>
+          </a:xfrm>
+          <a:prstGeom prst="bentConnector3">
+            <a:avLst>
+              <a:gd name="adj1" fmla="val 130189"/>
+            </a:avLst>
+          </a:prstGeom>
+          <a:ln w="38100">
+            <a:solidFill>
+              <a:schemeClr val="tx1"/>
+            </a:solidFill>
+          </a:ln>
+        </p:spPr>
+        <p:style>
+          <a:lnRef idx="1">
+            <a:schemeClr val="dk1"/>
+          </a:lnRef>
+          <a:fillRef idx="0">
+            <a:schemeClr val="dk1"/>
+          </a:fillRef>
+          <a:effectRef idx="0">
+            <a:schemeClr val="dk1"/>
+          </a:effectRef>
+          <a:fontRef idx="minor">
+            <a:schemeClr val="tx1"/>
+          </a:fontRef>
+        </p:style>
+      </p:cxnSp>
+      <p:cxnSp>
+        <p:nvCxnSpPr>
+          <p:cNvPr id="12" name="Elbow Connector 11">
+            <a:extLst>
+              <a:ext uri="{FF2B5EF4-FFF2-40B4-BE49-F238E27FC236}">
+                <a16:creationId xmlns:a16="http://schemas.microsoft.com/office/drawing/2014/main" id="{A3C3340F-0CCB-06C4-3079-FAAAA6F95363}"/>
+              </a:ext>
+            </a:extLst>
+          </p:cNvPr>
+          <p:cNvCxnSpPr>
+            <a:cxnSpLocks/>
+            <a:stCxn id="7" idx="2"/>
+            <a:endCxn id="8" idx="0"/>
+          </p:cNvCxnSpPr>
+          <p:nvPr/>
+        </p:nvCxnSpPr>
+        <p:spPr>
+          <a:xfrm rot="16200000" flipH="1">
+            <a:off x="3354652" y="2503224"/>
+            <a:ext cx="438150" cy="3704"/>
+          </a:xfrm>
+          <a:prstGeom prst="bentConnector3">
+            <a:avLst>
+              <a:gd name="adj1" fmla="val 50000"/>
+            </a:avLst>
+          </a:prstGeom>
+          <a:ln w="38100">
+            <a:solidFill>
+              <a:schemeClr val="tx1"/>
+            </a:solidFill>
+          </a:ln>
+        </p:spPr>
+        <p:style>
+          <a:lnRef idx="1">
+            <a:schemeClr val="dk1"/>
+          </a:lnRef>
+          <a:fillRef idx="0">
+            <a:schemeClr val="dk1"/>
+          </a:fillRef>
+          <a:effectRef idx="0">
+            <a:schemeClr val="dk1"/>
+          </a:effectRef>
+          <a:fontRef idx="minor">
+            <a:schemeClr val="tx1"/>
+          </a:fontRef>
+        </p:style>
+      </p:cxnSp>
+      <p:cxnSp>
+        <p:nvCxnSpPr>
+          <p:cNvPr id="15" name="Elbow Connector 14">
+            <a:extLst>
+              <a:ext uri="{FF2B5EF4-FFF2-40B4-BE49-F238E27FC236}">
+                <a16:creationId xmlns:a16="http://schemas.microsoft.com/office/drawing/2014/main" id="{4A2B6AAC-7158-8E80-E822-332545DBF8AE}"/>
+              </a:ext>
+            </a:extLst>
+          </p:cNvPr>
+          <p:cNvCxnSpPr>
+            <a:cxnSpLocks/>
+            <a:stCxn id="3" idx="4"/>
+            <a:endCxn id="2" idx="2"/>
+          </p:cNvCxnSpPr>
+          <p:nvPr/>
+        </p:nvCxnSpPr>
+        <p:spPr>
+          <a:xfrm rot="16200000" flipH="1">
+            <a:off x="1616000" y="2884563"/>
+            <a:ext cx="2159001" cy="1761974"/>
+          </a:xfrm>
+          <a:prstGeom prst="bentConnector3">
+            <a:avLst>
+              <a:gd name="adj1" fmla="val 110588"/>
+            </a:avLst>
+          </a:prstGeom>
+          <a:ln w="38100">
+            <a:solidFill>
+              <a:schemeClr val="tx1"/>
+            </a:solidFill>
+          </a:ln>
+        </p:spPr>
+        <p:style>
+          <a:lnRef idx="1">
+            <a:schemeClr val="dk1"/>
+          </a:lnRef>
+          <a:fillRef idx="0">
+            <a:schemeClr val="dk1"/>
+          </a:fillRef>
+          <a:effectRef idx="0">
+            <a:schemeClr val="dk1"/>
+          </a:effectRef>
+          <a:fontRef idx="minor">
+            <a:schemeClr val="tx1"/>
+          </a:fontRef>
+        </p:style>
+      </p:cxnSp>
+      <p:cxnSp>
+        <p:nvCxnSpPr>
+          <p:cNvPr id="19" name="Straight Arrow Connector 18">
+            <a:extLst>
+              <a:ext uri="{FF2B5EF4-FFF2-40B4-BE49-F238E27FC236}">
+                <a16:creationId xmlns:a16="http://schemas.microsoft.com/office/drawing/2014/main" id="{15272A8E-5C3D-4415-9703-86C43CBA6007}"/>
+              </a:ext>
+            </a:extLst>
+          </p:cNvPr>
+          <p:cNvCxnSpPr>
+            <a:cxnSpLocks/>
+          </p:cNvCxnSpPr>
+          <p:nvPr/>
+        </p:nvCxnSpPr>
+        <p:spPr>
+          <a:xfrm>
+            <a:off x="2753127" y="1199547"/>
+            <a:ext cx="142875" cy="0"/>
+          </a:xfrm>
+          <a:prstGeom prst="straightConnector1">
+            <a:avLst/>
+          </a:prstGeom>
+          <a:ln w="73025">
+            <a:solidFill>
+              <a:schemeClr val="tx1"/>
+            </a:solidFill>
+            <a:tailEnd type="triangle"/>
+          </a:ln>
+        </p:spPr>
+        <p:style>
+          <a:lnRef idx="1">
+            <a:schemeClr val="dk1"/>
+          </a:lnRef>
+          <a:fillRef idx="0">
+            <a:schemeClr val="dk1"/>
+          </a:fillRef>
+          <a:effectRef idx="0">
+            <a:schemeClr val="dk1"/>
+          </a:effectRef>
+          <a:fontRef idx="minor">
+            <a:schemeClr val="tx1"/>
+          </a:fontRef>
+        </p:style>
+      </p:cxnSp>
+      <p:sp>
+        <p:nvSpPr>
+          <p:cNvPr id="21" name="TextBox 20">
+            <a:extLst>
+              <a:ext uri="{FF2B5EF4-FFF2-40B4-BE49-F238E27FC236}">
+                <a16:creationId xmlns:a16="http://schemas.microsoft.com/office/drawing/2014/main" id="{C9E4E778-C39A-A06B-4BC4-4505E3309CF3}"/>
+              </a:ext>
+            </a:extLst>
+          </p:cNvPr>
+          <p:cNvSpPr txBox="1"/>
+          <p:nvPr/>
+        </p:nvSpPr>
+        <p:spPr>
+          <a:xfrm>
+            <a:off x="2515129" y="516996"/>
+            <a:ext cx="460382" cy="584775"/>
+          </a:xfrm>
+          <a:prstGeom prst="rect">
+            <a:avLst/>
+          </a:prstGeom>
+          <a:noFill/>
+        </p:spPr>
+        <p:txBody>
+          <a:bodyPr wrap="none" rtlCol="0">
+            <a:spAutoFit/>
+          </a:bodyPr>
+          <a:lstStyle/>
+          <a:p>
+            <a:r>
+              <a:rPr lang="en-ES" sz="3200" dirty="0"/>
+              <a:t>φ</a:t>
+            </a:r>
+          </a:p>
+        </p:txBody>
+      </p:sp>
+      <p:sp>
+        <p:nvSpPr>
+          <p:cNvPr id="22" name="TextBox 21">
+            <a:extLst>
+              <a:ext uri="{FF2B5EF4-FFF2-40B4-BE49-F238E27FC236}">
+                <a16:creationId xmlns:a16="http://schemas.microsoft.com/office/drawing/2014/main" id="{0F5FF090-EB57-4BA7-42F5-71EA5965D1E4}"/>
+              </a:ext>
+            </a:extLst>
+          </p:cNvPr>
+          <p:cNvSpPr txBox="1"/>
+          <p:nvPr/>
+        </p:nvSpPr>
+        <p:spPr>
+          <a:xfrm>
+            <a:off x="3742796" y="2845329"/>
+            <a:ext cx="503664" cy="584775"/>
+          </a:xfrm>
+          <a:prstGeom prst="rect">
+            <a:avLst/>
+          </a:prstGeom>
+          <a:noFill/>
+        </p:spPr>
+        <p:txBody>
+          <a:bodyPr wrap="none" rtlCol="0">
+            <a:spAutoFit/>
+          </a:bodyPr>
+          <a:lstStyle/>
+          <a:p>
+            <a:r>
+              <a:rPr lang="en-ES" sz="3200" dirty="0"/>
+              <a:t>R</a:t>
+            </a:r>
+            <a:r>
+              <a:rPr lang="en-ES" sz="3200" baseline="-25000" dirty="0"/>
+              <a:t>l</a:t>
+            </a:r>
+          </a:p>
+        </p:txBody>
+      </p:sp>
+      <p:sp>
+        <p:nvSpPr>
+          <p:cNvPr id="23" name="TextBox 22">
+            <a:extLst>
+              <a:ext uri="{FF2B5EF4-FFF2-40B4-BE49-F238E27FC236}">
+                <a16:creationId xmlns:a16="http://schemas.microsoft.com/office/drawing/2014/main" id="{A39B76A4-52DA-ECEF-34C7-97F1055250F9}"/>
+              </a:ext>
+            </a:extLst>
+          </p:cNvPr>
+          <p:cNvSpPr txBox="1"/>
+          <p:nvPr/>
+        </p:nvSpPr>
+        <p:spPr>
+          <a:xfrm>
+            <a:off x="3751263" y="1532996"/>
+            <a:ext cx="1248803" cy="584775"/>
+          </a:xfrm>
+          <a:prstGeom prst="rect">
+            <a:avLst/>
+          </a:prstGeom>
+          <a:noFill/>
+        </p:spPr>
+        <p:txBody>
+          <a:bodyPr wrap="none" rtlCol="0">
+            <a:spAutoFit/>
+          </a:bodyPr>
+          <a:lstStyle/>
+          <a:p>
+            <a:r>
+              <a:rPr lang="en-ES" sz="3200" dirty="0"/>
+              <a:t>H</a:t>
+            </a:r>
+            <a:r>
+              <a:rPr lang="en-GB" sz="3200" baseline="-25000" dirty="0"/>
+              <a:t>F</a:t>
+            </a:r>
+            <a:r>
+              <a:rPr lang="en-ES" sz="3200" baseline="-25000" dirty="0"/>
+              <a:t>e</a:t>
+            </a:r>
+            <a:r>
+              <a:rPr lang="en-ES" sz="3200" dirty="0"/>
+              <a:t>(B)</a:t>
+            </a:r>
+            <a:endParaRPr lang="en-ES" sz="3200" baseline="-25000" dirty="0"/>
+          </a:p>
+        </p:txBody>
+      </p:sp>
+      <p:sp>
+        <p:nvSpPr>
+          <p:cNvPr id="2" name="Rectangle 1">
+            <a:extLst>
+              <a:ext uri="{FF2B5EF4-FFF2-40B4-BE49-F238E27FC236}">
+                <a16:creationId xmlns:a16="http://schemas.microsoft.com/office/drawing/2014/main" id="{0BE81064-6EA6-DB58-0C8E-CC5689425E82}"/>
+              </a:ext>
+            </a:extLst>
+          </p:cNvPr>
+          <p:cNvSpPr/>
+          <p:nvPr/>
+        </p:nvSpPr>
+        <p:spPr>
+          <a:xfrm>
+            <a:off x="3462187" y="3987801"/>
+            <a:ext cx="228600" cy="857250"/>
+          </a:xfrm>
+          <a:prstGeom prst="rect">
+            <a:avLst/>
+          </a:prstGeom>
+          <a:noFill/>
+          <a:ln w="38100"/>
+        </p:spPr>
+        <p:style>
+          <a:lnRef idx="2">
+            <a:schemeClr val="accent1">
+              <a:shade val="15000"/>
+            </a:schemeClr>
+          </a:lnRef>
+          <a:fillRef idx="1">
+            <a:schemeClr val="accent1"/>
+          </a:fillRef>
+          <a:effectRef idx="0">
+            <a:schemeClr val="accent1"/>
+          </a:effectRef>
+          <a:fontRef idx="minor">
+            <a:schemeClr val="lt1"/>
+          </a:fontRef>
+        </p:style>
+        <p:txBody>
+          <a:bodyPr rtlCol="0" anchor="ctr"/>
+          <a:lstStyle/>
+          <a:p>
+            <a:pPr algn="ctr"/>
+            <a:endParaRPr lang="en-ES"/>
+          </a:p>
+        </p:txBody>
+      </p:sp>
+      <p:sp>
+        <p:nvSpPr>
+          <p:cNvPr id="9" name="TextBox 8">
+            <a:extLst>
+              <a:ext uri="{FF2B5EF4-FFF2-40B4-BE49-F238E27FC236}">
+                <a16:creationId xmlns:a16="http://schemas.microsoft.com/office/drawing/2014/main" id="{3E50DF7D-CEE4-B040-78D8-CE266FFCFE57}"/>
+              </a:ext>
+            </a:extLst>
+          </p:cNvPr>
+          <p:cNvSpPr txBox="1"/>
+          <p:nvPr/>
+        </p:nvSpPr>
+        <p:spPr>
+          <a:xfrm>
+            <a:off x="3743704" y="4108979"/>
+            <a:ext cx="577402" cy="584775"/>
+          </a:xfrm>
+          <a:prstGeom prst="rect">
+            <a:avLst/>
+          </a:prstGeom>
+          <a:noFill/>
+        </p:spPr>
+        <p:txBody>
+          <a:bodyPr wrap="none" rtlCol="0">
+            <a:spAutoFit/>
+          </a:bodyPr>
+          <a:lstStyle/>
+          <a:p>
+            <a:r>
+              <a:rPr lang="en-ES" sz="3200" dirty="0"/>
+              <a:t>R</a:t>
+            </a:r>
+            <a:r>
+              <a:rPr lang="en-ES" sz="3200" baseline="-25000" dirty="0"/>
+              <a:t>e</a:t>
+            </a:r>
+          </a:p>
+        </p:txBody>
+      </p:sp>
+      <p:cxnSp>
+        <p:nvCxnSpPr>
+          <p:cNvPr id="13" name="Elbow Connector 12">
+            <a:extLst>
+              <a:ext uri="{FF2B5EF4-FFF2-40B4-BE49-F238E27FC236}">
+                <a16:creationId xmlns:a16="http://schemas.microsoft.com/office/drawing/2014/main" id="{A39BE957-36A3-94E5-FF2B-C128E8AA134D}"/>
+              </a:ext>
+            </a:extLst>
+          </p:cNvPr>
+          <p:cNvCxnSpPr>
+            <a:cxnSpLocks/>
+            <a:stCxn id="8" idx="2"/>
+            <a:endCxn id="2" idx="0"/>
+          </p:cNvCxnSpPr>
+          <p:nvPr/>
+        </p:nvCxnSpPr>
+        <p:spPr>
+          <a:xfrm rot="16200000" flipH="1">
+            <a:off x="3372833" y="3784147"/>
+            <a:ext cx="406400" cy="908"/>
+          </a:xfrm>
+          <a:prstGeom prst="bentConnector3">
+            <a:avLst>
+              <a:gd name="adj1" fmla="val 50000"/>
+            </a:avLst>
+          </a:prstGeom>
+          <a:ln w="38100">
+            <a:solidFill>
+              <a:schemeClr val="tx1"/>
+            </a:solidFill>
+          </a:ln>
+        </p:spPr>
+        <p:style>
+          <a:lnRef idx="1">
+            <a:schemeClr val="dk1"/>
+          </a:lnRef>
+          <a:fillRef idx="0">
+            <a:schemeClr val="dk1"/>
+          </a:fillRef>
+          <a:effectRef idx="0">
+            <a:schemeClr val="dk1"/>
+          </a:effectRef>
+          <a:fontRef idx="minor">
+            <a:schemeClr val="tx1"/>
+          </a:fontRef>
+        </p:style>
+      </p:cxnSp>
+    </p:spTree>
+    <p:extLst>
+      <p:ext uri="{BB962C8B-B14F-4D97-AF65-F5344CB8AC3E}">
+        <p14:creationId xmlns:p14="http://schemas.microsoft.com/office/powerpoint/2010/main" val="2485803412"/>
       </p:ext>
     </p:extLst>
   </p:cSld>

</xml_diff>

<commit_message>
Added Examen 1a 2425 1er llamamiento
</commit_message>
<xml_diff>
--- a/images/Images.pptx
+++ b/images/Images.pptx
@@ -284,7 +284,7 @@
           <a:p>
             <a:fld id="{BA48513D-C823-C342-87AA-C2EB607FA67A}" type="datetimeFigureOut">
               <a:rPr lang="en-ES" smtClean="0"/>
-              <a:t>19/12/24</a:t>
+              <a:t>7/1/25</a:t>
             </a:fld>
             <a:endParaRPr lang="en-ES"/>
           </a:p>
@@ -484,7 +484,7 @@
           <a:p>
             <a:fld id="{BA48513D-C823-C342-87AA-C2EB607FA67A}" type="datetimeFigureOut">
               <a:rPr lang="en-ES" smtClean="0"/>
-              <a:t>19/12/24</a:t>
+              <a:t>7/1/25</a:t>
             </a:fld>
             <a:endParaRPr lang="en-ES"/>
           </a:p>
@@ -694,7 +694,7 @@
           <a:p>
             <a:fld id="{BA48513D-C823-C342-87AA-C2EB607FA67A}" type="datetimeFigureOut">
               <a:rPr lang="en-ES" smtClean="0"/>
-              <a:t>19/12/24</a:t>
+              <a:t>7/1/25</a:t>
             </a:fld>
             <a:endParaRPr lang="en-ES"/>
           </a:p>
@@ -894,7 +894,7 @@
           <a:p>
             <a:fld id="{BA48513D-C823-C342-87AA-C2EB607FA67A}" type="datetimeFigureOut">
               <a:rPr lang="en-ES" smtClean="0"/>
-              <a:t>19/12/24</a:t>
+              <a:t>7/1/25</a:t>
             </a:fld>
             <a:endParaRPr lang="en-ES"/>
           </a:p>
@@ -1170,7 +1170,7 @@
           <a:p>
             <a:fld id="{BA48513D-C823-C342-87AA-C2EB607FA67A}" type="datetimeFigureOut">
               <a:rPr lang="en-ES" smtClean="0"/>
-              <a:t>19/12/24</a:t>
+              <a:t>7/1/25</a:t>
             </a:fld>
             <a:endParaRPr lang="en-ES"/>
           </a:p>
@@ -1438,7 +1438,7 @@
           <a:p>
             <a:fld id="{BA48513D-C823-C342-87AA-C2EB607FA67A}" type="datetimeFigureOut">
               <a:rPr lang="en-ES" smtClean="0"/>
-              <a:t>19/12/24</a:t>
+              <a:t>7/1/25</a:t>
             </a:fld>
             <a:endParaRPr lang="en-ES"/>
           </a:p>
@@ -1853,7 +1853,7 @@
           <a:p>
             <a:fld id="{BA48513D-C823-C342-87AA-C2EB607FA67A}" type="datetimeFigureOut">
               <a:rPr lang="en-ES" smtClean="0"/>
-              <a:t>19/12/24</a:t>
+              <a:t>7/1/25</a:t>
             </a:fld>
             <a:endParaRPr lang="en-ES"/>
           </a:p>
@@ -1995,7 +1995,7 @@
           <a:p>
             <a:fld id="{BA48513D-C823-C342-87AA-C2EB607FA67A}" type="datetimeFigureOut">
               <a:rPr lang="en-ES" smtClean="0"/>
-              <a:t>19/12/24</a:t>
+              <a:t>7/1/25</a:t>
             </a:fld>
             <a:endParaRPr lang="en-ES"/>
           </a:p>
@@ -2108,7 +2108,7 @@
           <a:p>
             <a:fld id="{BA48513D-C823-C342-87AA-C2EB607FA67A}" type="datetimeFigureOut">
               <a:rPr lang="en-ES" smtClean="0"/>
-              <a:t>19/12/24</a:t>
+              <a:t>7/1/25</a:t>
             </a:fld>
             <a:endParaRPr lang="en-ES"/>
           </a:p>
@@ -2421,7 +2421,7 @@
           <a:p>
             <a:fld id="{BA48513D-C823-C342-87AA-C2EB607FA67A}" type="datetimeFigureOut">
               <a:rPr lang="en-ES" smtClean="0"/>
-              <a:t>19/12/24</a:t>
+              <a:t>7/1/25</a:t>
             </a:fld>
             <a:endParaRPr lang="en-ES"/>
           </a:p>
@@ -2710,7 +2710,7 @@
           <a:p>
             <a:fld id="{BA48513D-C823-C342-87AA-C2EB607FA67A}" type="datetimeFigureOut">
               <a:rPr lang="en-ES" smtClean="0"/>
-              <a:t>19/12/24</a:t>
+              <a:t>7/1/25</a:t>
             </a:fld>
             <a:endParaRPr lang="en-ES"/>
           </a:p>
@@ -2953,7 +2953,7 @@
           <a:p>
             <a:fld id="{BA48513D-C823-C342-87AA-C2EB607FA67A}" type="datetimeFigureOut">
               <a:rPr lang="en-ES" smtClean="0"/>
-              <a:t>19/12/24</a:t>
+              <a:t>7/1/25</a:t>
             </a:fld>
             <a:endParaRPr lang="en-ES"/>
           </a:p>

</xml_diff>

<commit_message>
Fixed typo, added eqs to S1.1, published Seminario 6
</commit_message>
<xml_diff>
--- a/images/Images.pptx
+++ b/images/Images.pptx
@@ -21,26 +21,27 @@
     <p:sldId id="290" r:id="rId15"/>
     <p:sldId id="291" r:id="rId16"/>
     <p:sldId id="292" r:id="rId17"/>
-    <p:sldId id="259" r:id="rId18"/>
-    <p:sldId id="260" r:id="rId19"/>
-    <p:sldId id="262" r:id="rId20"/>
-    <p:sldId id="261" r:id="rId21"/>
-    <p:sldId id="263" r:id="rId22"/>
-    <p:sldId id="264" r:id="rId23"/>
-    <p:sldId id="265" r:id="rId24"/>
-    <p:sldId id="266" r:id="rId25"/>
-    <p:sldId id="268" r:id="rId26"/>
-    <p:sldId id="269" r:id="rId27"/>
-    <p:sldId id="270" r:id="rId28"/>
-    <p:sldId id="271" r:id="rId29"/>
-    <p:sldId id="272" r:id="rId30"/>
-    <p:sldId id="273" r:id="rId31"/>
-    <p:sldId id="274" r:id="rId32"/>
-    <p:sldId id="275" r:id="rId33"/>
-    <p:sldId id="276" r:id="rId34"/>
-    <p:sldId id="277" r:id="rId35"/>
-    <p:sldId id="278" r:id="rId36"/>
-    <p:sldId id="279" r:id="rId37"/>
+    <p:sldId id="293" r:id="rId18"/>
+    <p:sldId id="259" r:id="rId19"/>
+    <p:sldId id="260" r:id="rId20"/>
+    <p:sldId id="262" r:id="rId21"/>
+    <p:sldId id="261" r:id="rId22"/>
+    <p:sldId id="263" r:id="rId23"/>
+    <p:sldId id="264" r:id="rId24"/>
+    <p:sldId id="265" r:id="rId25"/>
+    <p:sldId id="266" r:id="rId26"/>
+    <p:sldId id="268" r:id="rId27"/>
+    <p:sldId id="269" r:id="rId28"/>
+    <p:sldId id="270" r:id="rId29"/>
+    <p:sldId id="271" r:id="rId30"/>
+    <p:sldId id="272" r:id="rId31"/>
+    <p:sldId id="273" r:id="rId32"/>
+    <p:sldId id="274" r:id="rId33"/>
+    <p:sldId id="275" r:id="rId34"/>
+    <p:sldId id="276" r:id="rId35"/>
+    <p:sldId id="277" r:id="rId36"/>
+    <p:sldId id="278" r:id="rId37"/>
+    <p:sldId id="279" r:id="rId38"/>
   </p:sldIdLst>
   <p:sldSz cx="12192000" cy="6858000"/>
   <p:notesSz cx="6858000" cy="9144000"/>
@@ -296,7 +297,7 @@
           <a:p>
             <a:fld id="{BA48513D-C823-C342-87AA-C2EB607FA67A}" type="datetimeFigureOut">
               <a:rPr lang="en-ES" smtClean="0"/>
-              <a:t>7/10/25</a:t>
+              <a:t>25/10/25</a:t>
             </a:fld>
             <a:endParaRPr lang="en-ES"/>
           </a:p>
@@ -496,7 +497,7 @@
           <a:p>
             <a:fld id="{BA48513D-C823-C342-87AA-C2EB607FA67A}" type="datetimeFigureOut">
               <a:rPr lang="en-ES" smtClean="0"/>
-              <a:t>7/10/25</a:t>
+              <a:t>25/10/25</a:t>
             </a:fld>
             <a:endParaRPr lang="en-ES"/>
           </a:p>
@@ -706,7 +707,7 @@
           <a:p>
             <a:fld id="{BA48513D-C823-C342-87AA-C2EB607FA67A}" type="datetimeFigureOut">
               <a:rPr lang="en-ES" smtClean="0"/>
-              <a:t>7/10/25</a:t>
+              <a:t>25/10/25</a:t>
             </a:fld>
             <a:endParaRPr lang="en-ES"/>
           </a:p>
@@ -906,7 +907,7 @@
           <a:p>
             <a:fld id="{BA48513D-C823-C342-87AA-C2EB607FA67A}" type="datetimeFigureOut">
               <a:rPr lang="en-ES" smtClean="0"/>
-              <a:t>7/10/25</a:t>
+              <a:t>25/10/25</a:t>
             </a:fld>
             <a:endParaRPr lang="en-ES"/>
           </a:p>
@@ -1182,7 +1183,7 @@
           <a:p>
             <a:fld id="{BA48513D-C823-C342-87AA-C2EB607FA67A}" type="datetimeFigureOut">
               <a:rPr lang="en-ES" smtClean="0"/>
-              <a:t>7/10/25</a:t>
+              <a:t>25/10/25</a:t>
             </a:fld>
             <a:endParaRPr lang="en-ES"/>
           </a:p>
@@ -1450,7 +1451,7 @@
           <a:p>
             <a:fld id="{BA48513D-C823-C342-87AA-C2EB607FA67A}" type="datetimeFigureOut">
               <a:rPr lang="en-ES" smtClean="0"/>
-              <a:t>7/10/25</a:t>
+              <a:t>25/10/25</a:t>
             </a:fld>
             <a:endParaRPr lang="en-ES"/>
           </a:p>
@@ -1865,7 +1866,7 @@
           <a:p>
             <a:fld id="{BA48513D-C823-C342-87AA-C2EB607FA67A}" type="datetimeFigureOut">
               <a:rPr lang="en-ES" smtClean="0"/>
-              <a:t>7/10/25</a:t>
+              <a:t>25/10/25</a:t>
             </a:fld>
             <a:endParaRPr lang="en-ES"/>
           </a:p>
@@ -2007,7 +2008,7 @@
           <a:p>
             <a:fld id="{BA48513D-C823-C342-87AA-C2EB607FA67A}" type="datetimeFigureOut">
               <a:rPr lang="en-ES" smtClean="0"/>
-              <a:t>7/10/25</a:t>
+              <a:t>25/10/25</a:t>
             </a:fld>
             <a:endParaRPr lang="en-ES"/>
           </a:p>
@@ -2120,7 +2121,7 @@
           <a:p>
             <a:fld id="{BA48513D-C823-C342-87AA-C2EB607FA67A}" type="datetimeFigureOut">
               <a:rPr lang="en-ES" smtClean="0"/>
-              <a:t>7/10/25</a:t>
+              <a:t>25/10/25</a:t>
             </a:fld>
             <a:endParaRPr lang="en-ES"/>
           </a:p>
@@ -2433,7 +2434,7 @@
           <a:p>
             <a:fld id="{BA48513D-C823-C342-87AA-C2EB607FA67A}" type="datetimeFigureOut">
               <a:rPr lang="en-ES" smtClean="0"/>
-              <a:t>7/10/25</a:t>
+              <a:t>25/10/25</a:t>
             </a:fld>
             <a:endParaRPr lang="en-ES"/>
           </a:p>
@@ -2722,7 +2723,7 @@
           <a:p>
             <a:fld id="{BA48513D-C823-C342-87AA-C2EB607FA67A}" type="datetimeFigureOut">
               <a:rPr lang="en-ES" smtClean="0"/>
-              <a:t>7/10/25</a:t>
+              <a:t>25/10/25</a:t>
             </a:fld>
             <a:endParaRPr lang="en-ES"/>
           </a:p>
@@ -2965,7 +2966,7 @@
           <a:p>
             <a:fld id="{BA48513D-C823-C342-87AA-C2EB607FA67A}" type="datetimeFigureOut">
               <a:rPr lang="en-ES" smtClean="0"/>
-              <a:t>7/10/25</a:t>
+              <a:t>25/10/25</a:t>
             </a:fld>
             <a:endParaRPr lang="en-ES"/>
           </a:p>
@@ -11070,6 +11071,694 @@
       </p:grpSpPr>
       <p:sp>
         <p:nvSpPr>
+          <p:cNvPr id="2" name="Title 1">
+            <a:extLst>
+              <a:ext uri="{FF2B5EF4-FFF2-40B4-BE49-F238E27FC236}">
+                <a16:creationId xmlns:a16="http://schemas.microsoft.com/office/drawing/2014/main" id="{F4BFFCCF-52AF-54AB-4451-61FC1DF0734B}"/>
+              </a:ext>
+            </a:extLst>
+          </p:cNvPr>
+          <p:cNvSpPr>
+            <a:spLocks noGrp="1"/>
+          </p:cNvSpPr>
+          <p:nvPr>
+            <p:ph type="title"/>
+          </p:nvPr>
+        </p:nvSpPr>
+        <p:spPr/>
+        <p:txBody>
+          <a:bodyPr/>
+          <a:lstStyle/>
+          <a:p>
+            <a:r>
+              <a:rPr lang="en-ES" dirty="0"/>
+              <a:t>B3.S6.1</a:t>
+            </a:r>
+          </a:p>
+        </p:txBody>
+      </p:sp>
+      <p:sp>
+        <p:nvSpPr>
+          <p:cNvPr id="3" name="Oval 2">
+            <a:extLst>
+              <a:ext uri="{FF2B5EF4-FFF2-40B4-BE49-F238E27FC236}">
+                <a16:creationId xmlns:a16="http://schemas.microsoft.com/office/drawing/2014/main" id="{319C08B9-75D1-FBC0-91FE-C40313739C78}"/>
+              </a:ext>
+            </a:extLst>
+          </p:cNvPr>
+          <p:cNvSpPr/>
+          <p:nvPr/>
+        </p:nvSpPr>
+        <p:spPr>
+          <a:xfrm>
+            <a:off x="2303811" y="2006930"/>
+            <a:ext cx="2743200" cy="2743200"/>
+          </a:xfrm>
+          <a:prstGeom prst="ellipse">
+            <a:avLst/>
+          </a:prstGeom>
+          <a:noFill/>
+          <a:ln w="38100" cap="flat" cmpd="sng" algn="ctr">
+            <a:solidFill>
+              <a:schemeClr val="tx1"/>
+            </a:solidFill>
+            <a:prstDash val="solid"/>
+            <a:round/>
+            <a:headEnd type="none" w="med" len="med"/>
+            <a:tailEnd type="none" w="med" len="med"/>
+          </a:ln>
+        </p:spPr>
+        <p:style>
+          <a:lnRef idx="0">
+            <a:scrgbClr r="0" g="0" b="0"/>
+          </a:lnRef>
+          <a:fillRef idx="0">
+            <a:scrgbClr r="0" g="0" b="0"/>
+          </a:fillRef>
+          <a:effectRef idx="0">
+            <a:scrgbClr r="0" g="0" b="0"/>
+          </a:effectRef>
+          <a:fontRef idx="minor">
+            <a:schemeClr val="dk1"/>
+          </a:fontRef>
+        </p:style>
+        <p:txBody>
+          <a:bodyPr rtlCol="0" anchor="ctr"/>
+          <a:lstStyle/>
+          <a:p>
+            <a:pPr algn="ctr"/>
+            <a:endParaRPr lang="en-ES"/>
+          </a:p>
+        </p:txBody>
+      </p:sp>
+      <p:grpSp>
+        <p:nvGrpSpPr>
+          <p:cNvPr id="4" name="Group 3">
+            <a:extLst>
+              <a:ext uri="{FF2B5EF4-FFF2-40B4-BE49-F238E27FC236}">
+                <a16:creationId xmlns:a16="http://schemas.microsoft.com/office/drawing/2014/main" id="{ACDFB34D-C207-A20A-D1D1-8D8CF0B032B6}"/>
+              </a:ext>
+            </a:extLst>
+          </p:cNvPr>
+          <p:cNvGrpSpPr/>
+          <p:nvPr/>
+        </p:nvGrpSpPr>
+        <p:grpSpPr>
+          <a:xfrm>
+            <a:off x="2396837" y="5011387"/>
+            <a:ext cx="476989" cy="164275"/>
+            <a:chOff x="2325585" y="5248894"/>
+            <a:chExt cx="476989" cy="164275"/>
+          </a:xfrm>
+        </p:grpSpPr>
+        <p:cxnSp>
+          <p:nvCxnSpPr>
+            <p:cNvPr id="5" name="Straight Connector 4">
+              <a:extLst>
+                <a:ext uri="{FF2B5EF4-FFF2-40B4-BE49-F238E27FC236}">
+                  <a16:creationId xmlns:a16="http://schemas.microsoft.com/office/drawing/2014/main" id="{0D0A340F-9944-0CA8-2A18-975A3F6AA909}"/>
+                </a:ext>
+              </a:extLst>
+            </p:cNvPr>
+            <p:cNvCxnSpPr/>
+            <p:nvPr/>
+          </p:nvCxnSpPr>
+          <p:spPr>
+            <a:xfrm>
+              <a:off x="2327561" y="5248894"/>
+              <a:ext cx="475013" cy="0"/>
+            </a:xfrm>
+            <a:prstGeom prst="line">
+              <a:avLst/>
+            </a:prstGeom>
+            <a:ln w="38100">
+              <a:solidFill>
+                <a:schemeClr val="tx1"/>
+              </a:solidFill>
+            </a:ln>
+          </p:spPr>
+          <p:style>
+            <a:lnRef idx="2">
+              <a:schemeClr val="accent1"/>
+            </a:lnRef>
+            <a:fillRef idx="0">
+              <a:schemeClr val="accent1"/>
+            </a:fillRef>
+            <a:effectRef idx="1">
+              <a:schemeClr val="accent1"/>
+            </a:effectRef>
+            <a:fontRef idx="minor">
+              <a:schemeClr val="tx1"/>
+            </a:fontRef>
+          </p:style>
+        </p:cxnSp>
+        <p:cxnSp>
+          <p:nvCxnSpPr>
+            <p:cNvPr id="6" name="Straight Connector 5">
+              <a:extLst>
+                <a:ext uri="{FF2B5EF4-FFF2-40B4-BE49-F238E27FC236}">
+                  <a16:creationId xmlns:a16="http://schemas.microsoft.com/office/drawing/2014/main" id="{D3F3BB6E-C708-47B1-4883-205990BB5AD7}"/>
+                </a:ext>
+              </a:extLst>
+            </p:cNvPr>
+            <p:cNvCxnSpPr>
+              <a:cxnSpLocks/>
+            </p:cNvCxnSpPr>
+            <p:nvPr/>
+          </p:nvCxnSpPr>
+          <p:spPr>
+            <a:xfrm flipV="1">
+              <a:off x="2325585" y="5248894"/>
+              <a:ext cx="120732" cy="164275"/>
+            </a:xfrm>
+            <a:prstGeom prst="line">
+              <a:avLst/>
+            </a:prstGeom>
+            <a:ln w="38100">
+              <a:solidFill>
+                <a:schemeClr val="tx1"/>
+              </a:solidFill>
+            </a:ln>
+          </p:spPr>
+          <p:style>
+            <a:lnRef idx="2">
+              <a:schemeClr val="accent1"/>
+            </a:lnRef>
+            <a:fillRef idx="0">
+              <a:schemeClr val="accent1"/>
+            </a:fillRef>
+            <a:effectRef idx="1">
+              <a:schemeClr val="accent1"/>
+            </a:effectRef>
+            <a:fontRef idx="minor">
+              <a:schemeClr val="tx1"/>
+            </a:fontRef>
+          </p:style>
+        </p:cxnSp>
+        <p:cxnSp>
+          <p:nvCxnSpPr>
+            <p:cNvPr id="7" name="Straight Connector 6">
+              <a:extLst>
+                <a:ext uri="{FF2B5EF4-FFF2-40B4-BE49-F238E27FC236}">
+                  <a16:creationId xmlns:a16="http://schemas.microsoft.com/office/drawing/2014/main" id="{77DC2397-DCAC-4E6E-ED92-C60300730152}"/>
+                </a:ext>
+              </a:extLst>
+            </p:cNvPr>
+            <p:cNvCxnSpPr>
+              <a:cxnSpLocks/>
+            </p:cNvCxnSpPr>
+            <p:nvPr/>
+          </p:nvCxnSpPr>
+          <p:spPr>
+            <a:xfrm flipV="1">
+              <a:off x="2477985" y="5248894"/>
+              <a:ext cx="120732" cy="164275"/>
+            </a:xfrm>
+            <a:prstGeom prst="line">
+              <a:avLst/>
+            </a:prstGeom>
+            <a:ln w="38100">
+              <a:solidFill>
+                <a:schemeClr val="tx1"/>
+              </a:solidFill>
+            </a:ln>
+          </p:spPr>
+          <p:style>
+            <a:lnRef idx="2">
+              <a:schemeClr val="accent1"/>
+            </a:lnRef>
+            <a:fillRef idx="0">
+              <a:schemeClr val="accent1"/>
+            </a:fillRef>
+            <a:effectRef idx="1">
+              <a:schemeClr val="accent1"/>
+            </a:effectRef>
+            <a:fontRef idx="minor">
+              <a:schemeClr val="tx1"/>
+            </a:fontRef>
+          </p:style>
+        </p:cxnSp>
+        <p:cxnSp>
+          <p:nvCxnSpPr>
+            <p:cNvPr id="8" name="Straight Connector 7">
+              <a:extLst>
+                <a:ext uri="{FF2B5EF4-FFF2-40B4-BE49-F238E27FC236}">
+                  <a16:creationId xmlns:a16="http://schemas.microsoft.com/office/drawing/2014/main" id="{5C0A1D78-A0E3-36BB-026B-CCAD20C5DBB0}"/>
+                </a:ext>
+              </a:extLst>
+            </p:cNvPr>
+            <p:cNvCxnSpPr>
+              <a:cxnSpLocks/>
+            </p:cNvCxnSpPr>
+            <p:nvPr/>
+          </p:nvCxnSpPr>
+          <p:spPr>
+            <a:xfrm flipV="1">
+              <a:off x="2630385" y="5248894"/>
+              <a:ext cx="120732" cy="164275"/>
+            </a:xfrm>
+            <a:prstGeom prst="line">
+              <a:avLst/>
+            </a:prstGeom>
+            <a:ln w="38100">
+              <a:solidFill>
+                <a:schemeClr val="tx1"/>
+              </a:solidFill>
+            </a:ln>
+          </p:spPr>
+          <p:style>
+            <a:lnRef idx="2">
+              <a:schemeClr val="accent1"/>
+            </a:lnRef>
+            <a:fillRef idx="0">
+              <a:schemeClr val="accent1"/>
+            </a:fillRef>
+            <a:effectRef idx="1">
+              <a:schemeClr val="accent1"/>
+            </a:effectRef>
+            <a:fontRef idx="minor">
+              <a:schemeClr val="tx1"/>
+            </a:fontRef>
+          </p:style>
+        </p:cxnSp>
+      </p:grpSp>
+      <p:sp>
+        <p:nvSpPr>
+          <p:cNvPr id="9" name="Arc 8">
+            <a:extLst>
+              <a:ext uri="{FF2B5EF4-FFF2-40B4-BE49-F238E27FC236}">
+                <a16:creationId xmlns:a16="http://schemas.microsoft.com/office/drawing/2014/main" id="{ACBD0EF1-1846-9659-A5DE-A15E10C7E273}"/>
+              </a:ext>
+            </a:extLst>
+          </p:cNvPr>
+          <p:cNvSpPr/>
+          <p:nvPr/>
+        </p:nvSpPr>
+        <p:spPr>
+          <a:xfrm>
+            <a:off x="2612570" y="4180114"/>
+            <a:ext cx="1721923" cy="1626919"/>
+          </a:xfrm>
+          <a:prstGeom prst="arc">
+            <a:avLst>
+              <a:gd name="adj1" fmla="val 10736342"/>
+              <a:gd name="adj2" fmla="val 13215760"/>
+            </a:avLst>
+          </a:prstGeom>
+          <a:ln w="38100">
+            <a:solidFill>
+              <a:schemeClr val="tx1"/>
+            </a:solidFill>
+          </a:ln>
+        </p:spPr>
+        <p:style>
+          <a:lnRef idx="2">
+            <a:schemeClr val="accent1"/>
+          </a:lnRef>
+          <a:fillRef idx="0">
+            <a:schemeClr val="accent1"/>
+          </a:fillRef>
+          <a:effectRef idx="1">
+            <a:schemeClr val="accent1"/>
+          </a:effectRef>
+          <a:fontRef idx="minor">
+            <a:schemeClr val="tx1"/>
+          </a:fontRef>
+        </p:style>
+        <p:txBody>
+          <a:bodyPr rtlCol="0" anchor="ctr"/>
+          <a:lstStyle/>
+          <a:p>
+            <a:pPr algn="ctr"/>
+            <a:endParaRPr lang="en-ES"/>
+          </a:p>
+        </p:txBody>
+      </p:sp>
+      <p:sp>
+        <p:nvSpPr>
+          <p:cNvPr id="10" name="Oval 9">
+            <a:extLst>
+              <a:ext uri="{FF2B5EF4-FFF2-40B4-BE49-F238E27FC236}">
+                <a16:creationId xmlns:a16="http://schemas.microsoft.com/office/drawing/2014/main" id="{012D7575-465A-F4D2-A3DA-243D40786C4A}"/>
+              </a:ext>
+            </a:extLst>
+          </p:cNvPr>
+          <p:cNvSpPr/>
+          <p:nvPr/>
+        </p:nvSpPr>
+        <p:spPr>
+          <a:xfrm>
+            <a:off x="3147205" y="2899063"/>
+            <a:ext cx="1056412" cy="1059873"/>
+          </a:xfrm>
+          <a:prstGeom prst="ellipse">
+            <a:avLst/>
+          </a:prstGeom>
+          <a:noFill/>
+          <a:ln w="38100" cap="flat" cmpd="sng" algn="ctr">
+            <a:solidFill>
+              <a:schemeClr val="tx1"/>
+            </a:solidFill>
+            <a:prstDash val="solid"/>
+            <a:round/>
+            <a:headEnd type="none" w="med" len="med"/>
+            <a:tailEnd type="none" w="med" len="med"/>
+          </a:ln>
+        </p:spPr>
+        <p:style>
+          <a:lnRef idx="0">
+            <a:scrgbClr r="0" g="0" b="0"/>
+          </a:lnRef>
+          <a:fillRef idx="0">
+            <a:scrgbClr r="0" g="0" b="0"/>
+          </a:fillRef>
+          <a:effectRef idx="0">
+            <a:scrgbClr r="0" g="0" b="0"/>
+          </a:effectRef>
+          <a:fontRef idx="minor">
+            <a:schemeClr val="dk1"/>
+          </a:fontRef>
+        </p:style>
+        <p:txBody>
+          <a:bodyPr rtlCol="0" anchor="ctr"/>
+          <a:lstStyle/>
+          <a:p>
+            <a:pPr algn="ctr"/>
+            <a:endParaRPr lang="en-ES"/>
+          </a:p>
+        </p:txBody>
+      </p:sp>
+      <p:sp>
+        <p:nvSpPr>
+          <p:cNvPr id="11" name="Left Bracket 10">
+            <a:extLst>
+              <a:ext uri="{FF2B5EF4-FFF2-40B4-BE49-F238E27FC236}">
+                <a16:creationId xmlns:a16="http://schemas.microsoft.com/office/drawing/2014/main" id="{56C9A14F-22F0-60A0-4A37-87C6F058605D}"/>
+              </a:ext>
+            </a:extLst>
+          </p:cNvPr>
+          <p:cNvSpPr/>
+          <p:nvPr/>
+        </p:nvSpPr>
+        <p:spPr>
+          <a:xfrm rot="16200000">
+            <a:off x="3833608" y="4636864"/>
+            <a:ext cx="228049" cy="511977"/>
+          </a:xfrm>
+          <a:prstGeom prst="leftBracket">
+            <a:avLst/>
+          </a:prstGeom>
+          <a:ln w="38100"/>
+        </p:spPr>
+        <p:style>
+          <a:lnRef idx="2">
+            <a:schemeClr val="accent1"/>
+          </a:lnRef>
+          <a:fillRef idx="0">
+            <a:schemeClr val="accent1"/>
+          </a:fillRef>
+          <a:effectRef idx="1">
+            <a:schemeClr val="accent1"/>
+          </a:effectRef>
+          <a:fontRef idx="minor">
+            <a:schemeClr val="tx1"/>
+          </a:fontRef>
+        </p:style>
+        <p:txBody>
+          <a:bodyPr rtlCol="0" anchor="ctr"/>
+          <a:lstStyle/>
+          <a:p>
+            <a:pPr algn="ctr"/>
+            <a:endParaRPr lang="en-ES" dirty="0"/>
+          </a:p>
+        </p:txBody>
+      </p:sp>
+      <p:sp>
+        <p:nvSpPr>
+          <p:cNvPr id="12" name="Left Bracket 11">
+            <a:extLst>
+              <a:ext uri="{FF2B5EF4-FFF2-40B4-BE49-F238E27FC236}">
+                <a16:creationId xmlns:a16="http://schemas.microsoft.com/office/drawing/2014/main" id="{50EEEFD8-10E3-DA16-BF5B-A02A114E5D72}"/>
+              </a:ext>
+            </a:extLst>
+          </p:cNvPr>
+          <p:cNvSpPr/>
+          <p:nvPr/>
+        </p:nvSpPr>
+        <p:spPr>
+          <a:xfrm rot="16200000">
+            <a:off x="4253433" y="4661051"/>
+            <a:ext cx="229748" cy="1353325"/>
+          </a:xfrm>
+          <a:prstGeom prst="leftBracket">
+            <a:avLst/>
+          </a:prstGeom>
+          <a:ln w="38100"/>
+        </p:spPr>
+        <p:style>
+          <a:lnRef idx="2">
+            <a:schemeClr val="accent1"/>
+          </a:lnRef>
+          <a:fillRef idx="0">
+            <a:schemeClr val="accent1"/>
+          </a:fillRef>
+          <a:effectRef idx="1">
+            <a:schemeClr val="accent1"/>
+          </a:effectRef>
+          <a:fontRef idx="minor">
+            <a:schemeClr val="tx1"/>
+          </a:fontRef>
+        </p:style>
+        <p:txBody>
+          <a:bodyPr rtlCol="0" anchor="ctr"/>
+          <a:lstStyle/>
+          <a:p>
+            <a:pPr algn="ctr"/>
+            <a:endParaRPr lang="en-ES" dirty="0"/>
+          </a:p>
+        </p:txBody>
+      </p:sp>
+      <p:sp>
+        <p:nvSpPr>
+          <p:cNvPr id="13" name="TextBox 12">
+            <a:extLst>
+              <a:ext uri="{FF2B5EF4-FFF2-40B4-BE49-F238E27FC236}">
+                <a16:creationId xmlns:a16="http://schemas.microsoft.com/office/drawing/2014/main" id="{AAB2EAF5-9816-24B8-5E9B-E3F4B78D9362}"/>
+              </a:ext>
+            </a:extLst>
+          </p:cNvPr>
+          <p:cNvSpPr txBox="1"/>
+          <p:nvPr/>
+        </p:nvSpPr>
+        <p:spPr>
+          <a:xfrm>
+            <a:off x="3747898" y="4874518"/>
+            <a:ext cx="402674" cy="584775"/>
+          </a:xfrm>
+          <a:prstGeom prst="rect">
+            <a:avLst/>
+          </a:prstGeom>
+          <a:noFill/>
+        </p:spPr>
+        <p:txBody>
+          <a:bodyPr wrap="none" rtlCol="0">
+            <a:spAutoFit/>
+          </a:bodyPr>
+          <a:lstStyle/>
+          <a:p>
+            <a:r>
+              <a:rPr lang="en-ES" sz="3200" dirty="0"/>
+              <a:t>a</a:t>
+            </a:r>
+            <a:endParaRPr lang="en-ES" dirty="0"/>
+          </a:p>
+        </p:txBody>
+      </p:sp>
+      <p:sp>
+        <p:nvSpPr>
+          <p:cNvPr id="14" name="TextBox 13">
+            <a:extLst>
+              <a:ext uri="{FF2B5EF4-FFF2-40B4-BE49-F238E27FC236}">
+                <a16:creationId xmlns:a16="http://schemas.microsoft.com/office/drawing/2014/main" id="{B3AEA582-6BCA-1222-015C-C3932E4E0E39}"/>
+              </a:ext>
+            </a:extLst>
+          </p:cNvPr>
+          <p:cNvSpPr txBox="1"/>
+          <p:nvPr/>
+        </p:nvSpPr>
+        <p:spPr>
+          <a:xfrm>
+            <a:off x="4176556" y="5294245"/>
+            <a:ext cx="399468" cy="584775"/>
+          </a:xfrm>
+          <a:prstGeom prst="rect">
+            <a:avLst/>
+          </a:prstGeom>
+          <a:noFill/>
+        </p:spPr>
+        <p:txBody>
+          <a:bodyPr wrap="none" rtlCol="0">
+            <a:spAutoFit/>
+          </a:bodyPr>
+          <a:lstStyle/>
+          <a:p>
+            <a:r>
+              <a:rPr lang="en-ES" sz="3200" dirty="0"/>
+              <a:t>c</a:t>
+            </a:r>
+            <a:endParaRPr lang="en-ES" dirty="0"/>
+          </a:p>
+        </p:txBody>
+      </p:sp>
+      <p:sp>
+        <p:nvSpPr>
+          <p:cNvPr id="15" name="TextBox 14">
+            <a:extLst>
+              <a:ext uri="{FF2B5EF4-FFF2-40B4-BE49-F238E27FC236}">
+                <a16:creationId xmlns:a16="http://schemas.microsoft.com/office/drawing/2014/main" id="{03056FC6-9AB9-A612-8A86-AB97A0BE99E5}"/>
+              </a:ext>
+            </a:extLst>
+          </p:cNvPr>
+          <p:cNvSpPr txBox="1"/>
+          <p:nvPr/>
+        </p:nvSpPr>
+        <p:spPr>
+          <a:xfrm>
+            <a:off x="2873826" y="2345418"/>
+            <a:ext cx="534121" cy="584775"/>
+          </a:xfrm>
+          <a:prstGeom prst="rect">
+            <a:avLst/>
+          </a:prstGeom>
+          <a:noFill/>
+        </p:spPr>
+        <p:txBody>
+          <a:bodyPr wrap="none" rtlCol="0">
+            <a:spAutoFit/>
+          </a:bodyPr>
+          <a:lstStyle/>
+          <a:p>
+            <a:r>
+              <a:rPr lang="en-ES" sz="3200" dirty="0"/>
+              <a:t>ε</a:t>
+            </a:r>
+            <a:r>
+              <a:rPr lang="en-ES" sz="3200" baseline="-25000" dirty="0"/>
+              <a:t>1</a:t>
+            </a:r>
+            <a:endParaRPr lang="en-ES" baseline="-25000" dirty="0"/>
+          </a:p>
+        </p:txBody>
+      </p:sp>
+      <p:sp>
+        <p:nvSpPr>
+          <p:cNvPr id="17" name="TextBox 16">
+            <a:extLst>
+              <a:ext uri="{FF2B5EF4-FFF2-40B4-BE49-F238E27FC236}">
+                <a16:creationId xmlns:a16="http://schemas.microsoft.com/office/drawing/2014/main" id="{96A39D66-5BC2-83C3-553D-EFDC9D901FD9}"/>
+              </a:ext>
+            </a:extLst>
+          </p:cNvPr>
+          <p:cNvSpPr txBox="1"/>
+          <p:nvPr/>
+        </p:nvSpPr>
+        <p:spPr>
+          <a:xfrm>
+            <a:off x="5110524" y="1879605"/>
+            <a:ext cx="425116" cy="584775"/>
+          </a:xfrm>
+          <a:prstGeom prst="rect">
+            <a:avLst/>
+          </a:prstGeom>
+          <a:noFill/>
+        </p:spPr>
+        <p:txBody>
+          <a:bodyPr wrap="square" rtlCol="0">
+            <a:spAutoFit/>
+          </a:bodyPr>
+          <a:lstStyle/>
+          <a:p>
+            <a:r>
+              <a:rPr lang="en-ES" sz="3200" dirty="0"/>
+              <a:t>V</a:t>
+            </a:r>
+            <a:endParaRPr lang="en-ES" dirty="0"/>
+          </a:p>
+        </p:txBody>
+      </p:sp>
+      <p:cxnSp>
+        <p:nvCxnSpPr>
+          <p:cNvPr id="19" name="Straight Arrow Connector 18">
+            <a:extLst>
+              <a:ext uri="{FF2B5EF4-FFF2-40B4-BE49-F238E27FC236}">
+                <a16:creationId xmlns:a16="http://schemas.microsoft.com/office/drawing/2014/main" id="{AB62BD04-3D14-5C2F-168D-3319A3576DF0}"/>
+              </a:ext>
+            </a:extLst>
+          </p:cNvPr>
+          <p:cNvCxnSpPr>
+            <a:cxnSpLocks/>
+          </p:cNvCxnSpPr>
+          <p:nvPr/>
+        </p:nvCxnSpPr>
+        <p:spPr>
+          <a:xfrm flipH="1">
+            <a:off x="4118681" y="2264593"/>
+            <a:ext cx="1061293" cy="837421"/>
+          </a:xfrm>
+          <a:prstGeom prst="straightConnector1">
+            <a:avLst/>
+          </a:prstGeom>
+          <a:ln w="38100">
+            <a:tailEnd type="triangle"/>
+          </a:ln>
+        </p:spPr>
+        <p:style>
+          <a:lnRef idx="2">
+            <a:schemeClr val="dk1"/>
+          </a:lnRef>
+          <a:fillRef idx="0">
+            <a:schemeClr val="dk1"/>
+          </a:fillRef>
+          <a:effectRef idx="1">
+            <a:schemeClr val="dk1"/>
+          </a:effectRef>
+          <a:fontRef idx="minor">
+            <a:schemeClr val="tx1"/>
+          </a:fontRef>
+        </p:style>
+      </p:cxnSp>
+    </p:spTree>
+    <p:extLst>
+      <p:ext uri="{BB962C8B-B14F-4D97-AF65-F5344CB8AC3E}">
+        <p14:creationId xmlns:p14="http://schemas.microsoft.com/office/powerpoint/2010/main" val="3811981928"/>
+      </p:ext>
+    </p:extLst>
+  </p:cSld>
+  <p:clrMapOvr>
+    <a:masterClrMapping/>
+  </p:clrMapOvr>
+</p:sld>
+</file>
+
+<file path=ppt/slides/slide18.xml><?xml version="1.0" encoding="utf-8"?>
+<p:sld xmlns:a="http://schemas.openxmlformats.org/drawingml/2006/main" xmlns:r="http://schemas.openxmlformats.org/officeDocument/2006/relationships" xmlns:p="http://schemas.openxmlformats.org/presentationml/2006/main">
+  <p:cSld>
+    <p:spTree>
+      <p:nvGrpSpPr>
+        <p:cNvPr id="1" name=""/>
+        <p:cNvGrpSpPr/>
+        <p:nvPr/>
+      </p:nvGrpSpPr>
+      <p:grpSpPr>
+        <a:xfrm>
+          <a:off x="0" y="0"/>
+          <a:ext cx="0" cy="0"/>
+          <a:chOff x="0" y="0"/>
+          <a:chExt cx="0" cy="0"/>
+        </a:xfrm>
+      </p:grpSpPr>
+      <p:sp>
+        <p:nvSpPr>
           <p:cNvPr id="2" name="Doughnut 1">
             <a:extLst>
               <a:ext uri="{FF2B5EF4-FFF2-40B4-BE49-F238E27FC236}">
@@ -12164,7 +12853,7 @@
 </p:sld>
 </file>
 
-<file path=ppt/slides/slide18.xml><?xml version="1.0" encoding="utf-8"?>
+<file path=ppt/slides/slide19.xml><?xml version="1.0" encoding="utf-8"?>
 <p:sld xmlns:a="http://schemas.openxmlformats.org/drawingml/2006/main" xmlns:r="http://schemas.openxmlformats.org/officeDocument/2006/relationships" xmlns:p="http://schemas.openxmlformats.org/presentationml/2006/main">
   <p:cSld>
     <p:spTree>
@@ -12521,689 +13210,6 @@
     <p:extLst>
       <p:ext uri="{BB962C8B-B14F-4D97-AF65-F5344CB8AC3E}">
         <p14:creationId xmlns:p14="http://schemas.microsoft.com/office/powerpoint/2010/main" val="2727744404"/>
-      </p:ext>
-    </p:extLst>
-  </p:cSld>
-  <p:clrMapOvr>
-    <a:masterClrMapping/>
-  </p:clrMapOvr>
-</p:sld>
-</file>
-
-<file path=ppt/slides/slide19.xml><?xml version="1.0" encoding="utf-8"?>
-<p:sld xmlns:a="http://schemas.openxmlformats.org/drawingml/2006/main" xmlns:r="http://schemas.openxmlformats.org/officeDocument/2006/relationships" xmlns:p="http://schemas.openxmlformats.org/presentationml/2006/main">
-  <p:cSld>
-    <p:spTree>
-      <p:nvGrpSpPr>
-        <p:cNvPr id="1" name="">
-          <a:extLst>
-            <a:ext uri="{FF2B5EF4-FFF2-40B4-BE49-F238E27FC236}">
-              <a16:creationId xmlns:a16="http://schemas.microsoft.com/office/drawing/2014/main" id="{626F113F-E0F4-DB94-6594-2C99C6E6B025}"/>
-            </a:ext>
-          </a:extLst>
-        </p:cNvPr>
-        <p:cNvGrpSpPr/>
-        <p:nvPr/>
-      </p:nvGrpSpPr>
-      <p:grpSpPr>
-        <a:xfrm>
-          <a:off x="0" y="0"/>
-          <a:ext cx="0" cy="0"/>
-          <a:chOff x="0" y="0"/>
-          <a:chExt cx="0" cy="0"/>
-        </a:xfrm>
-      </p:grpSpPr>
-      <p:sp>
-        <p:nvSpPr>
-          <p:cNvPr id="28" name="TextBox 27">
-            <a:extLst>
-              <a:ext uri="{FF2B5EF4-FFF2-40B4-BE49-F238E27FC236}">
-                <a16:creationId xmlns:a16="http://schemas.microsoft.com/office/drawing/2014/main" id="{F91D499D-EB81-2FAB-8F86-2A401CDF1FFC}"/>
-              </a:ext>
-            </a:extLst>
-          </p:cNvPr>
-          <p:cNvSpPr txBox="1"/>
-          <p:nvPr/>
-        </p:nvSpPr>
-        <p:spPr>
-          <a:xfrm>
-            <a:off x="2166198" y="1886667"/>
-            <a:ext cx="481222" cy="584775"/>
-          </a:xfrm>
-          <a:prstGeom prst="rect">
-            <a:avLst/>
-          </a:prstGeom>
-          <a:noFill/>
-        </p:spPr>
-        <p:txBody>
-          <a:bodyPr wrap="square" rtlCol="0">
-            <a:spAutoFit/>
-          </a:bodyPr>
-          <a:lstStyle/>
-          <a:p>
-            <a:r>
-              <a:rPr lang="en-ES" sz="3200" dirty="0"/>
-              <a:t>w</a:t>
-            </a:r>
-            <a:endParaRPr lang="en-ES" dirty="0"/>
-          </a:p>
-        </p:txBody>
-      </p:sp>
-      <p:sp>
-        <p:nvSpPr>
-          <p:cNvPr id="29" name="TextBox 28">
-            <a:extLst>
-              <a:ext uri="{FF2B5EF4-FFF2-40B4-BE49-F238E27FC236}">
-                <a16:creationId xmlns:a16="http://schemas.microsoft.com/office/drawing/2014/main" id="{28C2C59F-1A06-CD71-F728-631EF8B739D9}"/>
-              </a:ext>
-            </a:extLst>
-          </p:cNvPr>
-          <p:cNvSpPr txBox="1"/>
-          <p:nvPr/>
-        </p:nvSpPr>
-        <p:spPr>
-          <a:xfrm>
-            <a:off x="2161121" y="1793648"/>
-            <a:ext cx="492443" cy="461665"/>
-          </a:xfrm>
-          <a:prstGeom prst="rect">
-            <a:avLst/>
-          </a:prstGeom>
-          <a:noFill/>
-        </p:spPr>
-        <p:txBody>
-          <a:bodyPr wrap="square" rtlCol="0">
-            <a:spAutoFit/>
-          </a:bodyPr>
-          <a:lstStyle/>
-          <a:p>
-            <a:r>
-              <a:rPr lang="en-ES" sz="2400" dirty="0"/>
-              <a:t>➝</a:t>
-            </a:r>
-          </a:p>
-        </p:txBody>
-      </p:sp>
-      <p:sp>
-        <p:nvSpPr>
-          <p:cNvPr id="8" name="Oval 7">
-            <a:extLst>
-              <a:ext uri="{FF2B5EF4-FFF2-40B4-BE49-F238E27FC236}">
-                <a16:creationId xmlns:a16="http://schemas.microsoft.com/office/drawing/2014/main" id="{E297E46B-E2E5-41E3-2571-FC97CFC97E79}"/>
-              </a:ext>
-            </a:extLst>
-          </p:cNvPr>
-          <p:cNvSpPr/>
-          <p:nvPr/>
-        </p:nvSpPr>
-        <p:spPr>
-          <a:xfrm rot="19898773">
-            <a:off x="2487835" y="2638674"/>
-            <a:ext cx="2068164" cy="2064080"/>
-          </a:xfrm>
-          <a:prstGeom prst="ellipse">
-            <a:avLst/>
-          </a:prstGeom>
-          <a:gradFill flip="none" rotWithShape="1">
-            <a:gsLst>
-              <a:gs pos="100000">
-                <a:schemeClr val="accent1">
-                  <a:lumMod val="75000"/>
-                </a:schemeClr>
-              </a:gs>
-              <a:gs pos="14000">
-                <a:schemeClr val="accent1">
-                  <a:lumMod val="20000"/>
-                  <a:lumOff val="80000"/>
-                </a:schemeClr>
-              </a:gs>
-            </a:gsLst>
-            <a:path path="circle">
-              <a:fillToRect l="100000" b="100000"/>
-            </a:path>
-            <a:tileRect t="-100000" r="-100000"/>
-          </a:gradFill>
-          <a:ln w="38100" cap="flat" cmpd="sng" algn="ctr">
-            <a:solidFill>
-              <a:schemeClr val="tx1"/>
-            </a:solidFill>
-            <a:prstDash val="solid"/>
-            <a:round/>
-            <a:headEnd type="none" w="med" len="med"/>
-            <a:tailEnd type="none" w="med" len="med"/>
-          </a:ln>
-        </p:spPr>
-        <p:style>
-          <a:lnRef idx="0">
-            <a:scrgbClr r="0" g="0" b="0"/>
-          </a:lnRef>
-          <a:fillRef idx="0">
-            <a:scrgbClr r="0" g="0" b="0"/>
-          </a:fillRef>
-          <a:effectRef idx="0">
-            <a:scrgbClr r="0" g="0" b="0"/>
-          </a:effectRef>
-          <a:fontRef idx="minor">
-            <a:schemeClr val="dk1"/>
-          </a:fontRef>
-        </p:style>
-        <p:txBody>
-          <a:bodyPr rtlCol="0" anchor="ctr"/>
-          <a:lstStyle/>
-          <a:p>
-            <a:pPr algn="ctr"/>
-            <a:endParaRPr lang="en-ES" dirty="0"/>
-          </a:p>
-        </p:txBody>
-      </p:sp>
-      <p:cxnSp>
-        <p:nvCxnSpPr>
-          <p:cNvPr id="19" name="Straight Arrow Connector 18">
-            <a:extLst>
-              <a:ext uri="{FF2B5EF4-FFF2-40B4-BE49-F238E27FC236}">
-                <a16:creationId xmlns:a16="http://schemas.microsoft.com/office/drawing/2014/main" id="{47E48170-B536-9466-A524-35FB7E94CE69}"/>
-              </a:ext>
-            </a:extLst>
-          </p:cNvPr>
-          <p:cNvCxnSpPr>
-            <a:cxnSpLocks/>
-          </p:cNvCxnSpPr>
-          <p:nvPr/>
-        </p:nvCxnSpPr>
-        <p:spPr>
-          <a:xfrm rot="19898773" flipV="1">
-            <a:off x="2889563" y="2021609"/>
-            <a:ext cx="0" cy="939033"/>
-          </a:xfrm>
-          <a:prstGeom prst="straightConnector1">
-            <a:avLst/>
-          </a:prstGeom>
-          <a:ln w="38100">
-            <a:tailEnd type="triangle"/>
-          </a:ln>
-        </p:spPr>
-        <p:style>
-          <a:lnRef idx="2">
-            <a:schemeClr val="accent1"/>
-          </a:lnRef>
-          <a:fillRef idx="0">
-            <a:schemeClr val="accent1"/>
-          </a:fillRef>
-          <a:effectRef idx="1">
-            <a:schemeClr val="accent1"/>
-          </a:effectRef>
-          <a:fontRef idx="minor">
-            <a:schemeClr val="tx1"/>
-          </a:fontRef>
-        </p:style>
-      </p:cxnSp>
-      <p:sp>
-        <p:nvSpPr>
-          <p:cNvPr id="33" name="Arc 32">
-            <a:extLst>
-              <a:ext uri="{FF2B5EF4-FFF2-40B4-BE49-F238E27FC236}">
-                <a16:creationId xmlns:a16="http://schemas.microsoft.com/office/drawing/2014/main" id="{D5937DA5-B7EF-C550-8EE1-B553264B90BD}"/>
-              </a:ext>
-            </a:extLst>
-          </p:cNvPr>
-          <p:cNvSpPr/>
-          <p:nvPr/>
-        </p:nvSpPr>
-        <p:spPr>
-          <a:xfrm rot="19898773">
-            <a:off x="2411608" y="2902458"/>
-            <a:ext cx="2128837" cy="1348743"/>
-          </a:xfrm>
-          <a:prstGeom prst="arc">
-            <a:avLst>
-              <a:gd name="adj1" fmla="val 1278982"/>
-              <a:gd name="adj2" fmla="val 10400285"/>
-            </a:avLst>
-          </a:prstGeom>
-          <a:ln w="38100">
-            <a:solidFill>
-              <a:schemeClr val="tx1"/>
-            </a:solidFill>
-            <a:prstDash val="dash"/>
-            <a:headEnd type="arrow" w="med" len="med"/>
-            <a:tailEnd type="none" w="med" len="med"/>
-          </a:ln>
-        </p:spPr>
-        <p:style>
-          <a:lnRef idx="2">
-            <a:schemeClr val="accent1"/>
-          </a:lnRef>
-          <a:fillRef idx="0">
-            <a:schemeClr val="accent1"/>
-          </a:fillRef>
-          <a:effectRef idx="1">
-            <a:schemeClr val="accent1"/>
-          </a:effectRef>
-          <a:fontRef idx="minor">
-            <a:schemeClr val="tx1"/>
-          </a:fontRef>
-        </p:style>
-        <p:txBody>
-          <a:bodyPr rtlCol="0" anchor="ctr"/>
-          <a:lstStyle/>
-          <a:p>
-            <a:pPr algn="ctr"/>
-            <a:endParaRPr lang="en-ES"/>
-          </a:p>
-        </p:txBody>
-      </p:sp>
-      <p:sp>
-        <p:nvSpPr>
-          <p:cNvPr id="34" name="Arc 33">
-            <a:extLst>
-              <a:ext uri="{FF2B5EF4-FFF2-40B4-BE49-F238E27FC236}">
-                <a16:creationId xmlns:a16="http://schemas.microsoft.com/office/drawing/2014/main" id="{7E952548-FC50-BB72-6807-DA2AC650D8A8}"/>
-              </a:ext>
-            </a:extLst>
-          </p:cNvPr>
-          <p:cNvSpPr/>
-          <p:nvPr/>
-        </p:nvSpPr>
-        <p:spPr>
-          <a:xfrm rot="19898773">
-            <a:off x="2624166" y="2287720"/>
-            <a:ext cx="549966" cy="407799"/>
-          </a:xfrm>
-          <a:prstGeom prst="arc">
-            <a:avLst>
-              <a:gd name="adj1" fmla="val 1490579"/>
-              <a:gd name="adj2" fmla="val 20964950"/>
-            </a:avLst>
-          </a:prstGeom>
-          <a:ln w="38100">
-            <a:solidFill>
-              <a:schemeClr val="tx1"/>
-            </a:solidFill>
-            <a:prstDash val="solid"/>
-            <a:headEnd type="arrow" w="med" len="med"/>
-            <a:tailEnd type="none" w="med" len="med"/>
-          </a:ln>
-        </p:spPr>
-        <p:style>
-          <a:lnRef idx="2">
-            <a:schemeClr val="accent1"/>
-          </a:lnRef>
-          <a:fillRef idx="0">
-            <a:schemeClr val="accent1"/>
-          </a:fillRef>
-          <a:effectRef idx="1">
-            <a:schemeClr val="accent1"/>
-          </a:effectRef>
-          <a:fontRef idx="minor">
-            <a:schemeClr val="tx1"/>
-          </a:fontRef>
-        </p:style>
-        <p:txBody>
-          <a:bodyPr rtlCol="0" anchor="ctr"/>
-          <a:lstStyle/>
-          <a:p>
-            <a:pPr algn="ctr"/>
-            <a:endParaRPr lang="en-ES"/>
-          </a:p>
-        </p:txBody>
-      </p:sp>
-      <p:cxnSp>
-        <p:nvCxnSpPr>
-          <p:cNvPr id="3" name="Straight Arrow Connector 2">
-            <a:extLst>
-              <a:ext uri="{FF2B5EF4-FFF2-40B4-BE49-F238E27FC236}">
-                <a16:creationId xmlns:a16="http://schemas.microsoft.com/office/drawing/2014/main" id="{913159A8-EFB5-1CC5-D869-9191CE959BEA}"/>
-              </a:ext>
-            </a:extLst>
-          </p:cNvPr>
-          <p:cNvCxnSpPr>
-            <a:cxnSpLocks/>
-          </p:cNvCxnSpPr>
-          <p:nvPr/>
-        </p:nvCxnSpPr>
-        <p:spPr>
-          <a:xfrm flipV="1">
-            <a:off x="3531502" y="629391"/>
-            <a:ext cx="0" cy="3040084"/>
-          </a:xfrm>
-          <a:prstGeom prst="straightConnector1">
-            <a:avLst/>
-          </a:prstGeom>
-          <a:ln w="38100">
-            <a:tailEnd type="triangle"/>
-          </a:ln>
-        </p:spPr>
-        <p:style>
-          <a:lnRef idx="2">
-            <a:schemeClr val="accent1"/>
-          </a:lnRef>
-          <a:fillRef idx="0">
-            <a:schemeClr val="accent1"/>
-          </a:fillRef>
-          <a:effectRef idx="1">
-            <a:schemeClr val="accent1"/>
-          </a:effectRef>
-          <a:fontRef idx="minor">
-            <a:schemeClr val="tx1"/>
-          </a:fontRef>
-        </p:style>
-      </p:cxnSp>
-      <p:cxnSp>
-        <p:nvCxnSpPr>
-          <p:cNvPr id="7" name="Straight Arrow Connector 6">
-            <a:extLst>
-              <a:ext uri="{FF2B5EF4-FFF2-40B4-BE49-F238E27FC236}">
-                <a16:creationId xmlns:a16="http://schemas.microsoft.com/office/drawing/2014/main" id="{1380C8A2-3BC5-6AEF-1DD3-6F1827C3CDF0}"/>
-              </a:ext>
-            </a:extLst>
-          </p:cNvPr>
-          <p:cNvCxnSpPr>
-            <a:cxnSpLocks/>
-          </p:cNvCxnSpPr>
-          <p:nvPr/>
-        </p:nvCxnSpPr>
-        <p:spPr>
-          <a:xfrm flipH="1">
-            <a:off x="1935679" y="3655621"/>
-            <a:ext cx="1605720" cy="1260762"/>
-          </a:xfrm>
-          <a:prstGeom prst="straightConnector1">
-            <a:avLst/>
-          </a:prstGeom>
-          <a:ln w="38100">
-            <a:tailEnd type="triangle"/>
-          </a:ln>
-        </p:spPr>
-        <p:style>
-          <a:lnRef idx="2">
-            <a:schemeClr val="accent1"/>
-          </a:lnRef>
-          <a:fillRef idx="0">
-            <a:schemeClr val="accent1"/>
-          </a:fillRef>
-          <a:effectRef idx="1">
-            <a:schemeClr val="accent1"/>
-          </a:effectRef>
-          <a:fontRef idx="minor">
-            <a:schemeClr val="tx1"/>
-          </a:fontRef>
-        </p:style>
-      </p:cxnSp>
-      <p:cxnSp>
-        <p:nvCxnSpPr>
-          <p:cNvPr id="10" name="Straight Arrow Connector 9">
-            <a:extLst>
-              <a:ext uri="{FF2B5EF4-FFF2-40B4-BE49-F238E27FC236}">
-                <a16:creationId xmlns:a16="http://schemas.microsoft.com/office/drawing/2014/main" id="{0655789D-AF63-864B-898A-CEE279DB157E}"/>
-              </a:ext>
-            </a:extLst>
-          </p:cNvPr>
-          <p:cNvCxnSpPr>
-            <a:cxnSpLocks/>
-          </p:cNvCxnSpPr>
-          <p:nvPr/>
-        </p:nvCxnSpPr>
-        <p:spPr>
-          <a:xfrm>
-            <a:off x="3513120" y="3677394"/>
-            <a:ext cx="1783276" cy="0"/>
-          </a:xfrm>
-          <a:prstGeom prst="straightConnector1">
-            <a:avLst/>
-          </a:prstGeom>
-          <a:ln w="38100">
-            <a:tailEnd type="triangle"/>
-          </a:ln>
-        </p:spPr>
-        <p:style>
-          <a:lnRef idx="2">
-            <a:schemeClr val="accent1"/>
-          </a:lnRef>
-          <a:fillRef idx="0">
-            <a:schemeClr val="accent1"/>
-          </a:fillRef>
-          <a:effectRef idx="1">
-            <a:schemeClr val="accent1"/>
-          </a:effectRef>
-          <a:fontRef idx="minor">
-            <a:schemeClr val="tx1"/>
-          </a:fontRef>
-        </p:style>
-      </p:cxnSp>
-      <p:cxnSp>
-        <p:nvCxnSpPr>
-          <p:cNvPr id="14" name="Straight Arrow Connector 13">
-            <a:extLst>
-              <a:ext uri="{FF2B5EF4-FFF2-40B4-BE49-F238E27FC236}">
-                <a16:creationId xmlns:a16="http://schemas.microsoft.com/office/drawing/2014/main" id="{B28E979E-52E1-C7E4-1C4F-30E958AD4417}"/>
-              </a:ext>
-            </a:extLst>
-          </p:cNvPr>
-          <p:cNvCxnSpPr>
-            <a:cxnSpLocks/>
-          </p:cNvCxnSpPr>
-          <p:nvPr/>
-        </p:nvCxnSpPr>
-        <p:spPr>
-          <a:xfrm flipH="1">
-            <a:off x="2636322" y="1413164"/>
-            <a:ext cx="890649" cy="688769"/>
-          </a:xfrm>
-          <a:prstGeom prst="straightConnector1">
-            <a:avLst/>
-          </a:prstGeom>
-          <a:ln w="38100">
-            <a:prstDash val="sysDot"/>
-            <a:headEnd type="none" w="med" len="med"/>
-            <a:tailEnd type="none" w="med" len="med"/>
-          </a:ln>
-        </p:spPr>
-        <p:style>
-          <a:lnRef idx="2">
-            <a:schemeClr val="accent1"/>
-          </a:lnRef>
-          <a:fillRef idx="0">
-            <a:schemeClr val="accent1"/>
-          </a:fillRef>
-          <a:effectRef idx="1">
-            <a:schemeClr val="accent1"/>
-          </a:effectRef>
-          <a:fontRef idx="minor">
-            <a:schemeClr val="tx1"/>
-          </a:fontRef>
-        </p:style>
-      </p:cxnSp>
-      <p:cxnSp>
-        <p:nvCxnSpPr>
-          <p:cNvPr id="16" name="Straight Arrow Connector 15">
-            <a:extLst>
-              <a:ext uri="{FF2B5EF4-FFF2-40B4-BE49-F238E27FC236}">
-                <a16:creationId xmlns:a16="http://schemas.microsoft.com/office/drawing/2014/main" id="{0796D4F4-4BE7-0F5D-0F7E-344FC2405605}"/>
-              </a:ext>
-            </a:extLst>
-          </p:cNvPr>
-          <p:cNvCxnSpPr>
-            <a:cxnSpLocks/>
-          </p:cNvCxnSpPr>
-          <p:nvPr/>
-        </p:nvCxnSpPr>
-        <p:spPr>
-          <a:xfrm>
-            <a:off x="2648770" y="2072243"/>
-            <a:ext cx="0" cy="2262250"/>
-          </a:xfrm>
-          <a:prstGeom prst="straightConnector1">
-            <a:avLst/>
-          </a:prstGeom>
-          <a:ln w="38100">
-            <a:prstDash val="sysDot"/>
-            <a:headEnd type="none" w="med" len="med"/>
-            <a:tailEnd type="none" w="med" len="med"/>
-          </a:ln>
-        </p:spPr>
-        <p:style>
-          <a:lnRef idx="2">
-            <a:schemeClr val="accent1"/>
-          </a:lnRef>
-          <a:fillRef idx="0">
-            <a:schemeClr val="accent1"/>
-          </a:fillRef>
-          <a:effectRef idx="1">
-            <a:schemeClr val="accent1"/>
-          </a:effectRef>
-          <a:fontRef idx="minor">
-            <a:schemeClr val="tx1"/>
-          </a:fontRef>
-        </p:style>
-      </p:cxnSp>
-      <p:sp>
-        <p:nvSpPr>
-          <p:cNvPr id="18" name="TextBox 17">
-            <a:extLst>
-              <a:ext uri="{FF2B5EF4-FFF2-40B4-BE49-F238E27FC236}">
-                <a16:creationId xmlns:a16="http://schemas.microsoft.com/office/drawing/2014/main" id="{A8C541FA-990D-5E6E-CB42-49381EDD4293}"/>
-              </a:ext>
-            </a:extLst>
-          </p:cNvPr>
-          <p:cNvSpPr txBox="1"/>
-          <p:nvPr/>
-        </p:nvSpPr>
-        <p:spPr>
-          <a:xfrm>
-            <a:off x="1812336" y="4233110"/>
-            <a:ext cx="365806" cy="584775"/>
-          </a:xfrm>
-          <a:prstGeom prst="rect">
-            <a:avLst/>
-          </a:prstGeom>
-          <a:noFill/>
-        </p:spPr>
-        <p:txBody>
-          <a:bodyPr wrap="none" rtlCol="0">
-            <a:spAutoFit/>
-          </a:bodyPr>
-          <a:lstStyle/>
-          <a:p>
-            <a:r>
-              <a:rPr lang="en-ES" sz="3200" dirty="0"/>
-              <a:t>x</a:t>
-            </a:r>
-            <a:endParaRPr lang="en-ES" dirty="0"/>
-          </a:p>
-        </p:txBody>
-      </p:sp>
-      <p:sp>
-        <p:nvSpPr>
-          <p:cNvPr id="20" name="TextBox 19">
-            <a:extLst>
-              <a:ext uri="{FF2B5EF4-FFF2-40B4-BE49-F238E27FC236}">
-                <a16:creationId xmlns:a16="http://schemas.microsoft.com/office/drawing/2014/main" id="{14A68ABB-374E-B843-9644-823F05F7EC21}"/>
-              </a:ext>
-            </a:extLst>
-          </p:cNvPr>
-          <p:cNvSpPr txBox="1"/>
-          <p:nvPr/>
-        </p:nvSpPr>
-        <p:spPr>
-          <a:xfrm>
-            <a:off x="4921692" y="3043598"/>
-            <a:ext cx="370614" cy="584775"/>
-          </a:xfrm>
-          <a:prstGeom prst="rect">
-            <a:avLst/>
-          </a:prstGeom>
-          <a:noFill/>
-        </p:spPr>
-        <p:txBody>
-          <a:bodyPr wrap="none" rtlCol="0">
-            <a:spAutoFit/>
-          </a:bodyPr>
-          <a:lstStyle/>
-          <a:p>
-            <a:r>
-              <a:rPr lang="en-ES" sz="3200" dirty="0"/>
-              <a:t>y</a:t>
-            </a:r>
-            <a:endParaRPr lang="en-ES" dirty="0"/>
-          </a:p>
-        </p:txBody>
-      </p:sp>
-      <p:sp>
-        <p:nvSpPr>
-          <p:cNvPr id="21" name="TextBox 20">
-            <a:extLst>
-              <a:ext uri="{FF2B5EF4-FFF2-40B4-BE49-F238E27FC236}">
-                <a16:creationId xmlns:a16="http://schemas.microsoft.com/office/drawing/2014/main" id="{765E0D64-B109-0734-4510-0F606EBC0E8F}"/>
-              </a:ext>
-            </a:extLst>
-          </p:cNvPr>
-          <p:cNvSpPr txBox="1"/>
-          <p:nvPr/>
-        </p:nvSpPr>
-        <p:spPr>
-          <a:xfrm>
-            <a:off x="3625303" y="524050"/>
-            <a:ext cx="364202" cy="584775"/>
-          </a:xfrm>
-          <a:prstGeom prst="rect">
-            <a:avLst/>
-          </a:prstGeom>
-          <a:noFill/>
-        </p:spPr>
-        <p:txBody>
-          <a:bodyPr wrap="none" rtlCol="0">
-            <a:spAutoFit/>
-          </a:bodyPr>
-          <a:lstStyle/>
-          <a:p>
-            <a:r>
-              <a:rPr lang="en-ES" sz="3200" dirty="0"/>
-              <a:t>z</a:t>
-            </a:r>
-            <a:endParaRPr lang="en-ES" dirty="0"/>
-          </a:p>
-        </p:txBody>
-      </p:sp>
-      <p:sp>
-        <p:nvSpPr>
-          <p:cNvPr id="30" name="TextBox 29">
-            <a:extLst>
-              <a:ext uri="{FF2B5EF4-FFF2-40B4-BE49-F238E27FC236}">
-                <a16:creationId xmlns:a16="http://schemas.microsoft.com/office/drawing/2014/main" id="{AA1D099A-4CBC-1BDC-7E29-B3E7B409C7FF}"/>
-              </a:ext>
-            </a:extLst>
-          </p:cNvPr>
-          <p:cNvSpPr txBox="1"/>
-          <p:nvPr/>
-        </p:nvSpPr>
-        <p:spPr>
-          <a:xfrm>
-            <a:off x="3643114" y="2726924"/>
-            <a:ext cx="421910" cy="584775"/>
-          </a:xfrm>
-          <a:prstGeom prst="rect">
-            <a:avLst/>
-          </a:prstGeom>
-          <a:noFill/>
-        </p:spPr>
-        <p:txBody>
-          <a:bodyPr wrap="none" rtlCol="0">
-            <a:spAutoFit/>
-          </a:bodyPr>
-          <a:lstStyle/>
-          <a:p>
-            <a:r>
-              <a:rPr lang="en-ES" sz="3200" dirty="0"/>
-              <a:t>σ</a:t>
-            </a:r>
-            <a:endParaRPr lang="en-ES" dirty="0"/>
-          </a:p>
-        </p:txBody>
-      </p:sp>
-    </p:spTree>
-    <p:extLst>
-      <p:ext uri="{BB962C8B-B14F-4D97-AF65-F5344CB8AC3E}">
-        <p14:creationId xmlns:p14="http://schemas.microsoft.com/office/powerpoint/2010/main" val="264424654"/>
       </p:ext>
     </p:extLst>
   </p:cSld>
@@ -14663,6 +14669,689 @@
 </file>
 
 <file path=ppt/slides/slide20.xml><?xml version="1.0" encoding="utf-8"?>
+<p:sld xmlns:a="http://schemas.openxmlformats.org/drawingml/2006/main" xmlns:r="http://schemas.openxmlformats.org/officeDocument/2006/relationships" xmlns:p="http://schemas.openxmlformats.org/presentationml/2006/main">
+  <p:cSld>
+    <p:spTree>
+      <p:nvGrpSpPr>
+        <p:cNvPr id="1" name="">
+          <a:extLst>
+            <a:ext uri="{FF2B5EF4-FFF2-40B4-BE49-F238E27FC236}">
+              <a16:creationId xmlns:a16="http://schemas.microsoft.com/office/drawing/2014/main" id="{626F113F-E0F4-DB94-6594-2C99C6E6B025}"/>
+            </a:ext>
+          </a:extLst>
+        </p:cNvPr>
+        <p:cNvGrpSpPr/>
+        <p:nvPr/>
+      </p:nvGrpSpPr>
+      <p:grpSpPr>
+        <a:xfrm>
+          <a:off x="0" y="0"/>
+          <a:ext cx="0" cy="0"/>
+          <a:chOff x="0" y="0"/>
+          <a:chExt cx="0" cy="0"/>
+        </a:xfrm>
+      </p:grpSpPr>
+      <p:sp>
+        <p:nvSpPr>
+          <p:cNvPr id="28" name="TextBox 27">
+            <a:extLst>
+              <a:ext uri="{FF2B5EF4-FFF2-40B4-BE49-F238E27FC236}">
+                <a16:creationId xmlns:a16="http://schemas.microsoft.com/office/drawing/2014/main" id="{F91D499D-EB81-2FAB-8F86-2A401CDF1FFC}"/>
+              </a:ext>
+            </a:extLst>
+          </p:cNvPr>
+          <p:cNvSpPr txBox="1"/>
+          <p:nvPr/>
+        </p:nvSpPr>
+        <p:spPr>
+          <a:xfrm>
+            <a:off x="2166198" y="1886667"/>
+            <a:ext cx="481222" cy="584775"/>
+          </a:xfrm>
+          <a:prstGeom prst="rect">
+            <a:avLst/>
+          </a:prstGeom>
+          <a:noFill/>
+        </p:spPr>
+        <p:txBody>
+          <a:bodyPr wrap="square" rtlCol="0">
+            <a:spAutoFit/>
+          </a:bodyPr>
+          <a:lstStyle/>
+          <a:p>
+            <a:r>
+              <a:rPr lang="en-ES" sz="3200" dirty="0"/>
+              <a:t>w</a:t>
+            </a:r>
+            <a:endParaRPr lang="en-ES" dirty="0"/>
+          </a:p>
+        </p:txBody>
+      </p:sp>
+      <p:sp>
+        <p:nvSpPr>
+          <p:cNvPr id="29" name="TextBox 28">
+            <a:extLst>
+              <a:ext uri="{FF2B5EF4-FFF2-40B4-BE49-F238E27FC236}">
+                <a16:creationId xmlns:a16="http://schemas.microsoft.com/office/drawing/2014/main" id="{28C2C59F-1A06-CD71-F728-631EF8B739D9}"/>
+              </a:ext>
+            </a:extLst>
+          </p:cNvPr>
+          <p:cNvSpPr txBox="1"/>
+          <p:nvPr/>
+        </p:nvSpPr>
+        <p:spPr>
+          <a:xfrm>
+            <a:off x="2161121" y="1793648"/>
+            <a:ext cx="492443" cy="461665"/>
+          </a:xfrm>
+          <a:prstGeom prst="rect">
+            <a:avLst/>
+          </a:prstGeom>
+          <a:noFill/>
+        </p:spPr>
+        <p:txBody>
+          <a:bodyPr wrap="square" rtlCol="0">
+            <a:spAutoFit/>
+          </a:bodyPr>
+          <a:lstStyle/>
+          <a:p>
+            <a:r>
+              <a:rPr lang="en-ES" sz="2400" dirty="0"/>
+              <a:t>➝</a:t>
+            </a:r>
+          </a:p>
+        </p:txBody>
+      </p:sp>
+      <p:sp>
+        <p:nvSpPr>
+          <p:cNvPr id="8" name="Oval 7">
+            <a:extLst>
+              <a:ext uri="{FF2B5EF4-FFF2-40B4-BE49-F238E27FC236}">
+                <a16:creationId xmlns:a16="http://schemas.microsoft.com/office/drawing/2014/main" id="{E297E46B-E2E5-41E3-2571-FC97CFC97E79}"/>
+              </a:ext>
+            </a:extLst>
+          </p:cNvPr>
+          <p:cNvSpPr/>
+          <p:nvPr/>
+        </p:nvSpPr>
+        <p:spPr>
+          <a:xfrm rot="19898773">
+            <a:off x="2487835" y="2638674"/>
+            <a:ext cx="2068164" cy="2064080"/>
+          </a:xfrm>
+          <a:prstGeom prst="ellipse">
+            <a:avLst/>
+          </a:prstGeom>
+          <a:gradFill flip="none" rotWithShape="1">
+            <a:gsLst>
+              <a:gs pos="100000">
+                <a:schemeClr val="accent1">
+                  <a:lumMod val="75000"/>
+                </a:schemeClr>
+              </a:gs>
+              <a:gs pos="14000">
+                <a:schemeClr val="accent1">
+                  <a:lumMod val="20000"/>
+                  <a:lumOff val="80000"/>
+                </a:schemeClr>
+              </a:gs>
+            </a:gsLst>
+            <a:path path="circle">
+              <a:fillToRect l="100000" b="100000"/>
+            </a:path>
+            <a:tileRect t="-100000" r="-100000"/>
+          </a:gradFill>
+          <a:ln w="38100" cap="flat" cmpd="sng" algn="ctr">
+            <a:solidFill>
+              <a:schemeClr val="tx1"/>
+            </a:solidFill>
+            <a:prstDash val="solid"/>
+            <a:round/>
+            <a:headEnd type="none" w="med" len="med"/>
+            <a:tailEnd type="none" w="med" len="med"/>
+          </a:ln>
+        </p:spPr>
+        <p:style>
+          <a:lnRef idx="0">
+            <a:scrgbClr r="0" g="0" b="0"/>
+          </a:lnRef>
+          <a:fillRef idx="0">
+            <a:scrgbClr r="0" g="0" b="0"/>
+          </a:fillRef>
+          <a:effectRef idx="0">
+            <a:scrgbClr r="0" g="0" b="0"/>
+          </a:effectRef>
+          <a:fontRef idx="minor">
+            <a:schemeClr val="dk1"/>
+          </a:fontRef>
+        </p:style>
+        <p:txBody>
+          <a:bodyPr rtlCol="0" anchor="ctr"/>
+          <a:lstStyle/>
+          <a:p>
+            <a:pPr algn="ctr"/>
+            <a:endParaRPr lang="en-ES" dirty="0"/>
+          </a:p>
+        </p:txBody>
+      </p:sp>
+      <p:cxnSp>
+        <p:nvCxnSpPr>
+          <p:cNvPr id="19" name="Straight Arrow Connector 18">
+            <a:extLst>
+              <a:ext uri="{FF2B5EF4-FFF2-40B4-BE49-F238E27FC236}">
+                <a16:creationId xmlns:a16="http://schemas.microsoft.com/office/drawing/2014/main" id="{47E48170-B536-9466-A524-35FB7E94CE69}"/>
+              </a:ext>
+            </a:extLst>
+          </p:cNvPr>
+          <p:cNvCxnSpPr>
+            <a:cxnSpLocks/>
+          </p:cNvCxnSpPr>
+          <p:nvPr/>
+        </p:nvCxnSpPr>
+        <p:spPr>
+          <a:xfrm rot="19898773" flipV="1">
+            <a:off x="2889563" y="2021609"/>
+            <a:ext cx="0" cy="939033"/>
+          </a:xfrm>
+          <a:prstGeom prst="straightConnector1">
+            <a:avLst/>
+          </a:prstGeom>
+          <a:ln w="38100">
+            <a:tailEnd type="triangle"/>
+          </a:ln>
+        </p:spPr>
+        <p:style>
+          <a:lnRef idx="2">
+            <a:schemeClr val="accent1"/>
+          </a:lnRef>
+          <a:fillRef idx="0">
+            <a:schemeClr val="accent1"/>
+          </a:fillRef>
+          <a:effectRef idx="1">
+            <a:schemeClr val="accent1"/>
+          </a:effectRef>
+          <a:fontRef idx="minor">
+            <a:schemeClr val="tx1"/>
+          </a:fontRef>
+        </p:style>
+      </p:cxnSp>
+      <p:sp>
+        <p:nvSpPr>
+          <p:cNvPr id="33" name="Arc 32">
+            <a:extLst>
+              <a:ext uri="{FF2B5EF4-FFF2-40B4-BE49-F238E27FC236}">
+                <a16:creationId xmlns:a16="http://schemas.microsoft.com/office/drawing/2014/main" id="{D5937DA5-B7EF-C550-8EE1-B553264B90BD}"/>
+              </a:ext>
+            </a:extLst>
+          </p:cNvPr>
+          <p:cNvSpPr/>
+          <p:nvPr/>
+        </p:nvSpPr>
+        <p:spPr>
+          <a:xfrm rot="19898773">
+            <a:off x="2411608" y="2902458"/>
+            <a:ext cx="2128837" cy="1348743"/>
+          </a:xfrm>
+          <a:prstGeom prst="arc">
+            <a:avLst>
+              <a:gd name="adj1" fmla="val 1278982"/>
+              <a:gd name="adj2" fmla="val 10400285"/>
+            </a:avLst>
+          </a:prstGeom>
+          <a:ln w="38100">
+            <a:solidFill>
+              <a:schemeClr val="tx1"/>
+            </a:solidFill>
+            <a:prstDash val="dash"/>
+            <a:headEnd type="arrow" w="med" len="med"/>
+            <a:tailEnd type="none" w="med" len="med"/>
+          </a:ln>
+        </p:spPr>
+        <p:style>
+          <a:lnRef idx="2">
+            <a:schemeClr val="accent1"/>
+          </a:lnRef>
+          <a:fillRef idx="0">
+            <a:schemeClr val="accent1"/>
+          </a:fillRef>
+          <a:effectRef idx="1">
+            <a:schemeClr val="accent1"/>
+          </a:effectRef>
+          <a:fontRef idx="minor">
+            <a:schemeClr val="tx1"/>
+          </a:fontRef>
+        </p:style>
+        <p:txBody>
+          <a:bodyPr rtlCol="0" anchor="ctr"/>
+          <a:lstStyle/>
+          <a:p>
+            <a:pPr algn="ctr"/>
+            <a:endParaRPr lang="en-ES"/>
+          </a:p>
+        </p:txBody>
+      </p:sp>
+      <p:sp>
+        <p:nvSpPr>
+          <p:cNvPr id="34" name="Arc 33">
+            <a:extLst>
+              <a:ext uri="{FF2B5EF4-FFF2-40B4-BE49-F238E27FC236}">
+                <a16:creationId xmlns:a16="http://schemas.microsoft.com/office/drawing/2014/main" id="{7E952548-FC50-BB72-6807-DA2AC650D8A8}"/>
+              </a:ext>
+            </a:extLst>
+          </p:cNvPr>
+          <p:cNvSpPr/>
+          <p:nvPr/>
+        </p:nvSpPr>
+        <p:spPr>
+          <a:xfrm rot="19898773">
+            <a:off x="2624166" y="2287720"/>
+            <a:ext cx="549966" cy="407799"/>
+          </a:xfrm>
+          <a:prstGeom prst="arc">
+            <a:avLst>
+              <a:gd name="adj1" fmla="val 1490579"/>
+              <a:gd name="adj2" fmla="val 20964950"/>
+            </a:avLst>
+          </a:prstGeom>
+          <a:ln w="38100">
+            <a:solidFill>
+              <a:schemeClr val="tx1"/>
+            </a:solidFill>
+            <a:prstDash val="solid"/>
+            <a:headEnd type="arrow" w="med" len="med"/>
+            <a:tailEnd type="none" w="med" len="med"/>
+          </a:ln>
+        </p:spPr>
+        <p:style>
+          <a:lnRef idx="2">
+            <a:schemeClr val="accent1"/>
+          </a:lnRef>
+          <a:fillRef idx="0">
+            <a:schemeClr val="accent1"/>
+          </a:fillRef>
+          <a:effectRef idx="1">
+            <a:schemeClr val="accent1"/>
+          </a:effectRef>
+          <a:fontRef idx="minor">
+            <a:schemeClr val="tx1"/>
+          </a:fontRef>
+        </p:style>
+        <p:txBody>
+          <a:bodyPr rtlCol="0" anchor="ctr"/>
+          <a:lstStyle/>
+          <a:p>
+            <a:pPr algn="ctr"/>
+            <a:endParaRPr lang="en-ES"/>
+          </a:p>
+        </p:txBody>
+      </p:sp>
+      <p:cxnSp>
+        <p:nvCxnSpPr>
+          <p:cNvPr id="3" name="Straight Arrow Connector 2">
+            <a:extLst>
+              <a:ext uri="{FF2B5EF4-FFF2-40B4-BE49-F238E27FC236}">
+                <a16:creationId xmlns:a16="http://schemas.microsoft.com/office/drawing/2014/main" id="{913159A8-EFB5-1CC5-D869-9191CE959BEA}"/>
+              </a:ext>
+            </a:extLst>
+          </p:cNvPr>
+          <p:cNvCxnSpPr>
+            <a:cxnSpLocks/>
+          </p:cNvCxnSpPr>
+          <p:nvPr/>
+        </p:nvCxnSpPr>
+        <p:spPr>
+          <a:xfrm flipV="1">
+            <a:off x="3531502" y="629391"/>
+            <a:ext cx="0" cy="3040084"/>
+          </a:xfrm>
+          <a:prstGeom prst="straightConnector1">
+            <a:avLst/>
+          </a:prstGeom>
+          <a:ln w="38100">
+            <a:tailEnd type="triangle"/>
+          </a:ln>
+        </p:spPr>
+        <p:style>
+          <a:lnRef idx="2">
+            <a:schemeClr val="accent1"/>
+          </a:lnRef>
+          <a:fillRef idx="0">
+            <a:schemeClr val="accent1"/>
+          </a:fillRef>
+          <a:effectRef idx="1">
+            <a:schemeClr val="accent1"/>
+          </a:effectRef>
+          <a:fontRef idx="minor">
+            <a:schemeClr val="tx1"/>
+          </a:fontRef>
+        </p:style>
+      </p:cxnSp>
+      <p:cxnSp>
+        <p:nvCxnSpPr>
+          <p:cNvPr id="7" name="Straight Arrow Connector 6">
+            <a:extLst>
+              <a:ext uri="{FF2B5EF4-FFF2-40B4-BE49-F238E27FC236}">
+                <a16:creationId xmlns:a16="http://schemas.microsoft.com/office/drawing/2014/main" id="{1380C8A2-3BC5-6AEF-1DD3-6F1827C3CDF0}"/>
+              </a:ext>
+            </a:extLst>
+          </p:cNvPr>
+          <p:cNvCxnSpPr>
+            <a:cxnSpLocks/>
+          </p:cNvCxnSpPr>
+          <p:nvPr/>
+        </p:nvCxnSpPr>
+        <p:spPr>
+          <a:xfrm flipH="1">
+            <a:off x="1935679" y="3655621"/>
+            <a:ext cx="1605720" cy="1260762"/>
+          </a:xfrm>
+          <a:prstGeom prst="straightConnector1">
+            <a:avLst/>
+          </a:prstGeom>
+          <a:ln w="38100">
+            <a:tailEnd type="triangle"/>
+          </a:ln>
+        </p:spPr>
+        <p:style>
+          <a:lnRef idx="2">
+            <a:schemeClr val="accent1"/>
+          </a:lnRef>
+          <a:fillRef idx="0">
+            <a:schemeClr val="accent1"/>
+          </a:fillRef>
+          <a:effectRef idx="1">
+            <a:schemeClr val="accent1"/>
+          </a:effectRef>
+          <a:fontRef idx="minor">
+            <a:schemeClr val="tx1"/>
+          </a:fontRef>
+        </p:style>
+      </p:cxnSp>
+      <p:cxnSp>
+        <p:nvCxnSpPr>
+          <p:cNvPr id="10" name="Straight Arrow Connector 9">
+            <a:extLst>
+              <a:ext uri="{FF2B5EF4-FFF2-40B4-BE49-F238E27FC236}">
+                <a16:creationId xmlns:a16="http://schemas.microsoft.com/office/drawing/2014/main" id="{0655789D-AF63-864B-898A-CEE279DB157E}"/>
+              </a:ext>
+            </a:extLst>
+          </p:cNvPr>
+          <p:cNvCxnSpPr>
+            <a:cxnSpLocks/>
+          </p:cNvCxnSpPr>
+          <p:nvPr/>
+        </p:nvCxnSpPr>
+        <p:spPr>
+          <a:xfrm>
+            <a:off x="3513120" y="3677394"/>
+            <a:ext cx="1783276" cy="0"/>
+          </a:xfrm>
+          <a:prstGeom prst="straightConnector1">
+            <a:avLst/>
+          </a:prstGeom>
+          <a:ln w="38100">
+            <a:tailEnd type="triangle"/>
+          </a:ln>
+        </p:spPr>
+        <p:style>
+          <a:lnRef idx="2">
+            <a:schemeClr val="accent1"/>
+          </a:lnRef>
+          <a:fillRef idx="0">
+            <a:schemeClr val="accent1"/>
+          </a:fillRef>
+          <a:effectRef idx="1">
+            <a:schemeClr val="accent1"/>
+          </a:effectRef>
+          <a:fontRef idx="minor">
+            <a:schemeClr val="tx1"/>
+          </a:fontRef>
+        </p:style>
+      </p:cxnSp>
+      <p:cxnSp>
+        <p:nvCxnSpPr>
+          <p:cNvPr id="14" name="Straight Arrow Connector 13">
+            <a:extLst>
+              <a:ext uri="{FF2B5EF4-FFF2-40B4-BE49-F238E27FC236}">
+                <a16:creationId xmlns:a16="http://schemas.microsoft.com/office/drawing/2014/main" id="{B28E979E-52E1-C7E4-1C4F-30E958AD4417}"/>
+              </a:ext>
+            </a:extLst>
+          </p:cNvPr>
+          <p:cNvCxnSpPr>
+            <a:cxnSpLocks/>
+          </p:cNvCxnSpPr>
+          <p:nvPr/>
+        </p:nvCxnSpPr>
+        <p:spPr>
+          <a:xfrm flipH="1">
+            <a:off x="2636322" y="1413164"/>
+            <a:ext cx="890649" cy="688769"/>
+          </a:xfrm>
+          <a:prstGeom prst="straightConnector1">
+            <a:avLst/>
+          </a:prstGeom>
+          <a:ln w="38100">
+            <a:prstDash val="sysDot"/>
+            <a:headEnd type="none" w="med" len="med"/>
+            <a:tailEnd type="none" w="med" len="med"/>
+          </a:ln>
+        </p:spPr>
+        <p:style>
+          <a:lnRef idx="2">
+            <a:schemeClr val="accent1"/>
+          </a:lnRef>
+          <a:fillRef idx="0">
+            <a:schemeClr val="accent1"/>
+          </a:fillRef>
+          <a:effectRef idx="1">
+            <a:schemeClr val="accent1"/>
+          </a:effectRef>
+          <a:fontRef idx="minor">
+            <a:schemeClr val="tx1"/>
+          </a:fontRef>
+        </p:style>
+      </p:cxnSp>
+      <p:cxnSp>
+        <p:nvCxnSpPr>
+          <p:cNvPr id="16" name="Straight Arrow Connector 15">
+            <a:extLst>
+              <a:ext uri="{FF2B5EF4-FFF2-40B4-BE49-F238E27FC236}">
+                <a16:creationId xmlns:a16="http://schemas.microsoft.com/office/drawing/2014/main" id="{0796D4F4-4BE7-0F5D-0F7E-344FC2405605}"/>
+              </a:ext>
+            </a:extLst>
+          </p:cNvPr>
+          <p:cNvCxnSpPr>
+            <a:cxnSpLocks/>
+          </p:cNvCxnSpPr>
+          <p:nvPr/>
+        </p:nvCxnSpPr>
+        <p:spPr>
+          <a:xfrm>
+            <a:off x="2648770" y="2072243"/>
+            <a:ext cx="0" cy="2262250"/>
+          </a:xfrm>
+          <a:prstGeom prst="straightConnector1">
+            <a:avLst/>
+          </a:prstGeom>
+          <a:ln w="38100">
+            <a:prstDash val="sysDot"/>
+            <a:headEnd type="none" w="med" len="med"/>
+            <a:tailEnd type="none" w="med" len="med"/>
+          </a:ln>
+        </p:spPr>
+        <p:style>
+          <a:lnRef idx="2">
+            <a:schemeClr val="accent1"/>
+          </a:lnRef>
+          <a:fillRef idx="0">
+            <a:schemeClr val="accent1"/>
+          </a:fillRef>
+          <a:effectRef idx="1">
+            <a:schemeClr val="accent1"/>
+          </a:effectRef>
+          <a:fontRef idx="minor">
+            <a:schemeClr val="tx1"/>
+          </a:fontRef>
+        </p:style>
+      </p:cxnSp>
+      <p:sp>
+        <p:nvSpPr>
+          <p:cNvPr id="18" name="TextBox 17">
+            <a:extLst>
+              <a:ext uri="{FF2B5EF4-FFF2-40B4-BE49-F238E27FC236}">
+                <a16:creationId xmlns:a16="http://schemas.microsoft.com/office/drawing/2014/main" id="{A8C541FA-990D-5E6E-CB42-49381EDD4293}"/>
+              </a:ext>
+            </a:extLst>
+          </p:cNvPr>
+          <p:cNvSpPr txBox="1"/>
+          <p:nvPr/>
+        </p:nvSpPr>
+        <p:spPr>
+          <a:xfrm>
+            <a:off x="1812336" y="4233110"/>
+            <a:ext cx="365806" cy="584775"/>
+          </a:xfrm>
+          <a:prstGeom prst="rect">
+            <a:avLst/>
+          </a:prstGeom>
+          <a:noFill/>
+        </p:spPr>
+        <p:txBody>
+          <a:bodyPr wrap="none" rtlCol="0">
+            <a:spAutoFit/>
+          </a:bodyPr>
+          <a:lstStyle/>
+          <a:p>
+            <a:r>
+              <a:rPr lang="en-ES" sz="3200" dirty="0"/>
+              <a:t>x</a:t>
+            </a:r>
+            <a:endParaRPr lang="en-ES" dirty="0"/>
+          </a:p>
+        </p:txBody>
+      </p:sp>
+      <p:sp>
+        <p:nvSpPr>
+          <p:cNvPr id="20" name="TextBox 19">
+            <a:extLst>
+              <a:ext uri="{FF2B5EF4-FFF2-40B4-BE49-F238E27FC236}">
+                <a16:creationId xmlns:a16="http://schemas.microsoft.com/office/drawing/2014/main" id="{14A68ABB-374E-B843-9644-823F05F7EC21}"/>
+              </a:ext>
+            </a:extLst>
+          </p:cNvPr>
+          <p:cNvSpPr txBox="1"/>
+          <p:nvPr/>
+        </p:nvSpPr>
+        <p:spPr>
+          <a:xfrm>
+            <a:off x="4921692" y="3043598"/>
+            <a:ext cx="370614" cy="584775"/>
+          </a:xfrm>
+          <a:prstGeom prst="rect">
+            <a:avLst/>
+          </a:prstGeom>
+          <a:noFill/>
+        </p:spPr>
+        <p:txBody>
+          <a:bodyPr wrap="none" rtlCol="0">
+            <a:spAutoFit/>
+          </a:bodyPr>
+          <a:lstStyle/>
+          <a:p>
+            <a:r>
+              <a:rPr lang="en-ES" sz="3200" dirty="0"/>
+              <a:t>y</a:t>
+            </a:r>
+            <a:endParaRPr lang="en-ES" dirty="0"/>
+          </a:p>
+        </p:txBody>
+      </p:sp>
+      <p:sp>
+        <p:nvSpPr>
+          <p:cNvPr id="21" name="TextBox 20">
+            <a:extLst>
+              <a:ext uri="{FF2B5EF4-FFF2-40B4-BE49-F238E27FC236}">
+                <a16:creationId xmlns:a16="http://schemas.microsoft.com/office/drawing/2014/main" id="{765E0D64-B109-0734-4510-0F606EBC0E8F}"/>
+              </a:ext>
+            </a:extLst>
+          </p:cNvPr>
+          <p:cNvSpPr txBox="1"/>
+          <p:nvPr/>
+        </p:nvSpPr>
+        <p:spPr>
+          <a:xfrm>
+            <a:off x="3625303" y="524050"/>
+            <a:ext cx="364202" cy="584775"/>
+          </a:xfrm>
+          <a:prstGeom prst="rect">
+            <a:avLst/>
+          </a:prstGeom>
+          <a:noFill/>
+        </p:spPr>
+        <p:txBody>
+          <a:bodyPr wrap="none" rtlCol="0">
+            <a:spAutoFit/>
+          </a:bodyPr>
+          <a:lstStyle/>
+          <a:p>
+            <a:r>
+              <a:rPr lang="en-ES" sz="3200" dirty="0"/>
+              <a:t>z</a:t>
+            </a:r>
+            <a:endParaRPr lang="en-ES" dirty="0"/>
+          </a:p>
+        </p:txBody>
+      </p:sp>
+      <p:sp>
+        <p:nvSpPr>
+          <p:cNvPr id="30" name="TextBox 29">
+            <a:extLst>
+              <a:ext uri="{FF2B5EF4-FFF2-40B4-BE49-F238E27FC236}">
+                <a16:creationId xmlns:a16="http://schemas.microsoft.com/office/drawing/2014/main" id="{AA1D099A-4CBC-1BDC-7E29-B3E7B409C7FF}"/>
+              </a:ext>
+            </a:extLst>
+          </p:cNvPr>
+          <p:cNvSpPr txBox="1"/>
+          <p:nvPr/>
+        </p:nvSpPr>
+        <p:spPr>
+          <a:xfrm>
+            <a:off x="3643114" y="2726924"/>
+            <a:ext cx="421910" cy="584775"/>
+          </a:xfrm>
+          <a:prstGeom prst="rect">
+            <a:avLst/>
+          </a:prstGeom>
+          <a:noFill/>
+        </p:spPr>
+        <p:txBody>
+          <a:bodyPr wrap="none" rtlCol="0">
+            <a:spAutoFit/>
+          </a:bodyPr>
+          <a:lstStyle/>
+          <a:p>
+            <a:r>
+              <a:rPr lang="en-ES" sz="3200" dirty="0"/>
+              <a:t>σ</a:t>
+            </a:r>
+            <a:endParaRPr lang="en-ES" dirty="0"/>
+          </a:p>
+        </p:txBody>
+      </p:sp>
+    </p:spTree>
+    <p:extLst>
+      <p:ext uri="{BB962C8B-B14F-4D97-AF65-F5344CB8AC3E}">
+        <p14:creationId xmlns:p14="http://schemas.microsoft.com/office/powerpoint/2010/main" val="264424654"/>
+      </p:ext>
+    </p:extLst>
+  </p:cSld>
+  <p:clrMapOvr>
+    <a:masterClrMapping/>
+  </p:clrMapOvr>
+</p:sld>
+</file>
+
+<file path=ppt/slides/slide21.xml><?xml version="1.0" encoding="utf-8"?>
 <p:sld xmlns:a="http://schemas.openxmlformats.org/drawingml/2006/main" xmlns:r="http://schemas.openxmlformats.org/officeDocument/2006/relationships" xmlns:p="http://schemas.openxmlformats.org/presentationml/2006/main">
   <p:cSld>
     <p:spTree>
@@ -15713,7 +16402,7 @@
 </p:sld>
 </file>
 
-<file path=ppt/slides/slide21.xml><?xml version="1.0" encoding="utf-8"?>
+<file path=ppt/slides/slide22.xml><?xml version="1.0" encoding="utf-8"?>
 <p:sld xmlns:a="http://schemas.openxmlformats.org/drawingml/2006/main" xmlns:r="http://schemas.openxmlformats.org/officeDocument/2006/relationships" xmlns:p="http://schemas.openxmlformats.org/presentationml/2006/main">
   <p:cSld>
     <p:spTree>
@@ -16726,7 +17415,7 @@
 </p:sld>
 </file>
 
-<file path=ppt/slides/slide22.xml><?xml version="1.0" encoding="utf-8"?>
+<file path=ppt/slides/slide23.xml><?xml version="1.0" encoding="utf-8"?>
 <p:sld xmlns:a="http://schemas.openxmlformats.org/drawingml/2006/main" xmlns:r="http://schemas.openxmlformats.org/officeDocument/2006/relationships" xmlns:p="http://schemas.openxmlformats.org/presentationml/2006/main">
   <p:cSld>
     <p:spTree>
@@ -17489,7 +18178,7 @@
 </p:sld>
 </file>
 
-<file path=ppt/slides/slide23.xml><?xml version="1.0" encoding="utf-8"?>
+<file path=ppt/slides/slide24.xml><?xml version="1.0" encoding="utf-8"?>
 <p:sld xmlns:a="http://schemas.openxmlformats.org/drawingml/2006/main" xmlns:r="http://schemas.openxmlformats.org/officeDocument/2006/relationships" xmlns:p="http://schemas.openxmlformats.org/presentationml/2006/main">
   <p:cSld>
     <p:spTree>
@@ -18258,7 +18947,7 @@
 </p:sld>
 </file>
 
-<file path=ppt/slides/slide24.xml><?xml version="1.0" encoding="utf-8"?>
+<file path=ppt/slides/slide25.xml><?xml version="1.0" encoding="utf-8"?>
 <p:sld xmlns:a="http://schemas.openxmlformats.org/drawingml/2006/main" xmlns:r="http://schemas.openxmlformats.org/officeDocument/2006/relationships" xmlns:p="http://schemas.openxmlformats.org/presentationml/2006/main">
   <p:cSld>
     <p:spTree>
@@ -19027,7 +19716,7 @@
 </p:sld>
 </file>
 
-<file path=ppt/slides/slide25.xml><?xml version="1.0" encoding="utf-8"?>
+<file path=ppt/slides/slide26.xml><?xml version="1.0" encoding="utf-8"?>
 <p:sld xmlns:a="http://schemas.openxmlformats.org/drawingml/2006/main" xmlns:r="http://schemas.openxmlformats.org/officeDocument/2006/relationships" xmlns:p="http://schemas.openxmlformats.org/presentationml/2006/main">
   <p:cSld>
     <p:spTree>
@@ -19600,7 +20289,7 @@
 </p:sld>
 </file>
 
-<file path=ppt/slides/slide26.xml><?xml version="1.0" encoding="utf-8"?>
+<file path=ppt/slides/slide27.xml><?xml version="1.0" encoding="utf-8"?>
 <p:sld xmlns:a="http://schemas.openxmlformats.org/drawingml/2006/main" xmlns:r="http://schemas.openxmlformats.org/officeDocument/2006/relationships" xmlns:p="http://schemas.openxmlformats.org/presentationml/2006/main">
   <p:cSld>
     <p:spTree>
@@ -20183,7 +20872,7 @@
 </p:sld>
 </file>
 
-<file path=ppt/slides/slide27.xml><?xml version="1.0" encoding="utf-8"?>
+<file path=ppt/slides/slide28.xml><?xml version="1.0" encoding="utf-8"?>
 <p:sld xmlns:a="http://schemas.openxmlformats.org/drawingml/2006/main" xmlns:r="http://schemas.openxmlformats.org/officeDocument/2006/relationships" xmlns:p="http://schemas.openxmlformats.org/presentationml/2006/main">
   <p:cSld>
     <p:spTree>
@@ -20900,7 +21589,7 @@
 </p:sld>
 </file>
 
-<file path=ppt/slides/slide28.xml><?xml version="1.0" encoding="utf-8"?>
+<file path=ppt/slides/slide29.xml><?xml version="1.0" encoding="utf-8"?>
 <p:sld xmlns:a="http://schemas.openxmlformats.org/drawingml/2006/main" xmlns:r="http://schemas.openxmlformats.org/officeDocument/2006/relationships" xmlns:p="http://schemas.openxmlformats.org/presentationml/2006/main">
   <p:cSld>
     <p:spTree>
@@ -21514,7 +22203,1160 @@
 </p:sld>
 </file>
 
-<file path=ppt/slides/slide29.xml><?xml version="1.0" encoding="utf-8"?>
+<file path=ppt/slides/slide3.xml><?xml version="1.0" encoding="utf-8"?>
+<p:sld xmlns:a="http://schemas.openxmlformats.org/drawingml/2006/main" xmlns:r="http://schemas.openxmlformats.org/officeDocument/2006/relationships" xmlns:p="http://schemas.openxmlformats.org/presentationml/2006/main">
+  <p:cSld>
+    <p:spTree>
+      <p:nvGrpSpPr>
+        <p:cNvPr id="1" name=""/>
+        <p:cNvGrpSpPr/>
+        <p:nvPr/>
+      </p:nvGrpSpPr>
+      <p:grpSpPr>
+        <a:xfrm>
+          <a:off x="0" y="0"/>
+          <a:ext cx="0" cy="0"/>
+          <a:chOff x="0" y="0"/>
+          <a:chExt cx="0" cy="0"/>
+        </a:xfrm>
+      </p:grpSpPr>
+      <p:sp>
+        <p:nvSpPr>
+          <p:cNvPr id="2" name="Title 1">
+            <a:extLst>
+              <a:ext uri="{FF2B5EF4-FFF2-40B4-BE49-F238E27FC236}">
+                <a16:creationId xmlns:a16="http://schemas.microsoft.com/office/drawing/2014/main" id="{D39B841F-54C7-3AE1-E545-FD824C8DAF7F}"/>
+              </a:ext>
+            </a:extLst>
+          </p:cNvPr>
+          <p:cNvSpPr>
+            <a:spLocks noGrp="1"/>
+          </p:cNvSpPr>
+          <p:nvPr>
+            <p:ph type="title"/>
+          </p:nvPr>
+        </p:nvSpPr>
+        <p:spPr/>
+        <p:txBody>
+          <a:bodyPr/>
+          <a:lstStyle/>
+          <a:p>
+            <a:r>
+              <a:rPr lang="en-ES" dirty="0"/>
+              <a:t>B1.S2.1</a:t>
+            </a:r>
+          </a:p>
+        </p:txBody>
+      </p:sp>
+      <p:sp>
+        <p:nvSpPr>
+          <p:cNvPr id="5" name="Arc 4">
+            <a:extLst>
+              <a:ext uri="{FF2B5EF4-FFF2-40B4-BE49-F238E27FC236}">
+                <a16:creationId xmlns:a16="http://schemas.microsoft.com/office/drawing/2014/main" id="{C62C6161-AC50-592A-79A8-62650346F24E}"/>
+              </a:ext>
+            </a:extLst>
+          </p:cNvPr>
+          <p:cNvSpPr/>
+          <p:nvPr/>
+        </p:nvSpPr>
+        <p:spPr>
+          <a:xfrm rot="16200000">
+            <a:off x="492552" y="2918012"/>
+            <a:ext cx="4155141" cy="4222377"/>
+          </a:xfrm>
+          <a:prstGeom prst="arc">
+            <a:avLst>
+              <a:gd name="adj1" fmla="val 16259988"/>
+              <a:gd name="adj2" fmla="val 5404610"/>
+            </a:avLst>
+          </a:prstGeom>
+          <a:ln w="38100">
+            <a:gradFill>
+              <a:gsLst>
+                <a:gs pos="51000">
+                  <a:schemeClr val="accent1">
+                    <a:lumMod val="5000"/>
+                    <a:lumOff val="95000"/>
+                  </a:schemeClr>
+                </a:gs>
+                <a:gs pos="100000">
+                  <a:schemeClr val="accent1">
+                    <a:lumMod val="45000"/>
+                    <a:lumOff val="55000"/>
+                  </a:schemeClr>
+                </a:gs>
+                <a:gs pos="0">
+                  <a:srgbClr val="FF0000"/>
+                </a:gs>
+              </a:gsLst>
+              <a:lin ang="5400000" scaled="1"/>
+            </a:gradFill>
+          </a:ln>
+        </p:spPr>
+        <p:style>
+          <a:lnRef idx="2">
+            <a:schemeClr val="accent1"/>
+          </a:lnRef>
+          <a:fillRef idx="0">
+            <a:schemeClr val="accent1"/>
+          </a:fillRef>
+          <a:effectRef idx="1">
+            <a:schemeClr val="accent1"/>
+          </a:effectRef>
+          <a:fontRef idx="minor">
+            <a:schemeClr val="tx1"/>
+          </a:fontRef>
+        </p:style>
+        <p:txBody>
+          <a:bodyPr rtlCol="0" anchor="ctr"/>
+          <a:lstStyle/>
+          <a:p>
+            <a:pPr algn="ctr"/>
+            <a:endParaRPr lang="en-ES"/>
+          </a:p>
+        </p:txBody>
+      </p:sp>
+      <p:cxnSp>
+        <p:nvCxnSpPr>
+          <p:cNvPr id="10" name="Straight Arrow Connector 9">
+            <a:extLst>
+              <a:ext uri="{FF2B5EF4-FFF2-40B4-BE49-F238E27FC236}">
+                <a16:creationId xmlns:a16="http://schemas.microsoft.com/office/drawing/2014/main" id="{8E1BDB21-2D8F-C9C2-3B07-F77D99022865}"/>
+              </a:ext>
+            </a:extLst>
+          </p:cNvPr>
+          <p:cNvCxnSpPr>
+            <a:cxnSpLocks/>
+          </p:cNvCxnSpPr>
+          <p:nvPr/>
+        </p:nvCxnSpPr>
+        <p:spPr>
+          <a:xfrm flipV="1">
+            <a:off x="2589628" y="1817132"/>
+            <a:ext cx="0" cy="3223735"/>
+          </a:xfrm>
+          <a:prstGeom prst="straightConnector1">
+            <a:avLst/>
+          </a:prstGeom>
+          <a:ln w="38100">
+            <a:solidFill>
+              <a:schemeClr val="tx1"/>
+            </a:solidFill>
+            <a:tailEnd type="triangle"/>
+          </a:ln>
+        </p:spPr>
+        <p:style>
+          <a:lnRef idx="2">
+            <a:schemeClr val="accent1"/>
+          </a:lnRef>
+          <a:fillRef idx="0">
+            <a:schemeClr val="accent1"/>
+          </a:fillRef>
+          <a:effectRef idx="1">
+            <a:schemeClr val="accent1"/>
+          </a:effectRef>
+          <a:fontRef idx="minor">
+            <a:schemeClr val="tx1"/>
+          </a:fontRef>
+        </p:style>
+      </p:cxnSp>
+      <p:sp>
+        <p:nvSpPr>
+          <p:cNvPr id="15" name="TextBox 14">
+            <a:extLst>
+              <a:ext uri="{FF2B5EF4-FFF2-40B4-BE49-F238E27FC236}">
+                <a16:creationId xmlns:a16="http://schemas.microsoft.com/office/drawing/2014/main" id="{724436C1-324F-AAF1-C132-967FFB014398}"/>
+              </a:ext>
+            </a:extLst>
+          </p:cNvPr>
+          <p:cNvSpPr txBox="1"/>
+          <p:nvPr/>
+        </p:nvSpPr>
+        <p:spPr>
+          <a:xfrm>
+            <a:off x="2054698" y="1817132"/>
+            <a:ext cx="393056" cy="646331"/>
+          </a:xfrm>
+          <a:prstGeom prst="rect">
+            <a:avLst/>
+          </a:prstGeom>
+          <a:noFill/>
+        </p:spPr>
+        <p:txBody>
+          <a:bodyPr wrap="none" rtlCol="0">
+            <a:spAutoFit/>
+          </a:bodyPr>
+          <a:lstStyle/>
+          <a:p>
+            <a:r>
+              <a:rPr lang="en-ES" sz="3600" dirty="0"/>
+              <a:t>y</a:t>
+            </a:r>
+          </a:p>
+        </p:txBody>
+      </p:sp>
+      <p:cxnSp>
+        <p:nvCxnSpPr>
+          <p:cNvPr id="17" name="Straight Arrow Connector 16">
+            <a:extLst>
+              <a:ext uri="{FF2B5EF4-FFF2-40B4-BE49-F238E27FC236}">
+                <a16:creationId xmlns:a16="http://schemas.microsoft.com/office/drawing/2014/main" id="{5B01AE06-DAE3-451D-0620-065E77F3FD38}"/>
+              </a:ext>
+            </a:extLst>
+          </p:cNvPr>
+          <p:cNvCxnSpPr>
+            <a:cxnSpLocks/>
+          </p:cNvCxnSpPr>
+          <p:nvPr/>
+        </p:nvCxnSpPr>
+        <p:spPr>
+          <a:xfrm>
+            <a:off x="2589628" y="5040867"/>
+            <a:ext cx="3225269" cy="0"/>
+          </a:xfrm>
+          <a:prstGeom prst="straightConnector1">
+            <a:avLst/>
+          </a:prstGeom>
+          <a:ln w="38100">
+            <a:solidFill>
+              <a:schemeClr val="tx1"/>
+            </a:solidFill>
+            <a:tailEnd type="triangle"/>
+          </a:ln>
+        </p:spPr>
+        <p:style>
+          <a:lnRef idx="2">
+            <a:schemeClr val="accent1"/>
+          </a:lnRef>
+          <a:fillRef idx="0">
+            <a:schemeClr val="accent1"/>
+          </a:fillRef>
+          <a:effectRef idx="1">
+            <a:schemeClr val="accent1"/>
+          </a:effectRef>
+          <a:fontRef idx="minor">
+            <a:schemeClr val="tx1"/>
+          </a:fontRef>
+        </p:style>
+      </p:cxnSp>
+      <p:sp>
+        <p:nvSpPr>
+          <p:cNvPr id="18" name="TextBox 17">
+            <a:extLst>
+              <a:ext uri="{FF2B5EF4-FFF2-40B4-BE49-F238E27FC236}">
+                <a16:creationId xmlns:a16="http://schemas.microsoft.com/office/drawing/2014/main" id="{10908EA1-8301-F8A5-2AA4-12299B055323}"/>
+              </a:ext>
+            </a:extLst>
+          </p:cNvPr>
+          <p:cNvSpPr txBox="1"/>
+          <p:nvPr/>
+        </p:nvSpPr>
+        <p:spPr>
+          <a:xfrm>
+            <a:off x="5392791" y="5040867"/>
+            <a:ext cx="567868" cy="646331"/>
+          </a:xfrm>
+          <a:prstGeom prst="rect">
+            <a:avLst/>
+          </a:prstGeom>
+          <a:noFill/>
+        </p:spPr>
+        <p:txBody>
+          <a:bodyPr wrap="square" rtlCol="0">
+            <a:spAutoFit/>
+          </a:bodyPr>
+          <a:lstStyle/>
+          <a:p>
+            <a:r>
+              <a:rPr lang="en-ES" sz="3600" dirty="0"/>
+              <a:t>x</a:t>
+            </a:r>
+          </a:p>
+        </p:txBody>
+      </p:sp>
+      <p:sp>
+        <p:nvSpPr>
+          <p:cNvPr id="24" name="TextBox 23">
+            <a:extLst>
+              <a:ext uri="{FF2B5EF4-FFF2-40B4-BE49-F238E27FC236}">
+                <a16:creationId xmlns:a16="http://schemas.microsoft.com/office/drawing/2014/main" id="{619EBB20-CB39-E643-A01C-4EDC9B94301E}"/>
+              </a:ext>
+            </a:extLst>
+          </p:cNvPr>
+          <p:cNvSpPr txBox="1"/>
+          <p:nvPr/>
+        </p:nvSpPr>
+        <p:spPr>
+          <a:xfrm>
+            <a:off x="3338760" y="2417283"/>
+            <a:ext cx="2207656" cy="646331"/>
+          </a:xfrm>
+          <a:prstGeom prst="rect">
+            <a:avLst/>
+          </a:prstGeom>
+          <a:noFill/>
+        </p:spPr>
+        <p:txBody>
+          <a:bodyPr wrap="none" rtlCol="0">
+            <a:spAutoFit/>
+          </a:bodyPr>
+          <a:lstStyle/>
+          <a:p>
+            <a:r>
+              <a:rPr lang="en-ES" sz="3600" dirty="0"/>
+              <a:t>λ= λ</a:t>
+            </a:r>
+            <a:r>
+              <a:rPr lang="en-ES" sz="3600" baseline="-25000" dirty="0"/>
+              <a:t>0</a:t>
+            </a:r>
+            <a:r>
+              <a:rPr lang="en-ES" sz="3600" dirty="0"/>
+              <a:t>cosɸ’</a:t>
+            </a:r>
+          </a:p>
+        </p:txBody>
+      </p:sp>
+      <p:sp>
+        <p:nvSpPr>
+          <p:cNvPr id="30" name="Arc 29">
+            <a:extLst>
+              <a:ext uri="{FF2B5EF4-FFF2-40B4-BE49-F238E27FC236}">
+                <a16:creationId xmlns:a16="http://schemas.microsoft.com/office/drawing/2014/main" id="{471F2308-244C-599C-E8D1-D81CA02C565C}"/>
+              </a:ext>
+            </a:extLst>
+          </p:cNvPr>
+          <p:cNvSpPr/>
+          <p:nvPr/>
+        </p:nvSpPr>
+        <p:spPr>
+          <a:xfrm>
+            <a:off x="2027258" y="4415634"/>
+            <a:ext cx="1085728" cy="1125962"/>
+          </a:xfrm>
+          <a:prstGeom prst="arc">
+            <a:avLst>
+              <a:gd name="adj1" fmla="val 19745494"/>
+              <a:gd name="adj2" fmla="val 414981"/>
+            </a:avLst>
+          </a:prstGeom>
+          <a:ln w="38100">
+            <a:solidFill>
+              <a:schemeClr val="tx1"/>
+            </a:solidFill>
+          </a:ln>
+        </p:spPr>
+        <p:style>
+          <a:lnRef idx="2">
+            <a:schemeClr val="accent1"/>
+          </a:lnRef>
+          <a:fillRef idx="0">
+            <a:schemeClr val="accent1"/>
+          </a:fillRef>
+          <a:effectRef idx="1">
+            <a:schemeClr val="accent1"/>
+          </a:effectRef>
+          <a:fontRef idx="minor">
+            <a:schemeClr val="tx1"/>
+          </a:fontRef>
+        </p:style>
+        <p:txBody>
+          <a:bodyPr rtlCol="0" anchor="ctr"/>
+          <a:lstStyle/>
+          <a:p>
+            <a:pPr algn="ctr"/>
+            <a:endParaRPr lang="en-ES"/>
+          </a:p>
+        </p:txBody>
+      </p:sp>
+      <p:cxnSp>
+        <p:nvCxnSpPr>
+          <p:cNvPr id="31" name="Straight Arrow Connector 30">
+            <a:extLst>
+              <a:ext uri="{FF2B5EF4-FFF2-40B4-BE49-F238E27FC236}">
+                <a16:creationId xmlns:a16="http://schemas.microsoft.com/office/drawing/2014/main" id="{DAB80AE4-2DA9-5C87-2446-D9AD483D5F7C}"/>
+              </a:ext>
+            </a:extLst>
+          </p:cNvPr>
+          <p:cNvCxnSpPr>
+            <a:cxnSpLocks/>
+          </p:cNvCxnSpPr>
+          <p:nvPr/>
+        </p:nvCxnSpPr>
+        <p:spPr>
+          <a:xfrm flipV="1">
+            <a:off x="2589628" y="3834198"/>
+            <a:ext cx="1708441" cy="1195002"/>
+          </a:xfrm>
+          <a:prstGeom prst="straightConnector1">
+            <a:avLst/>
+          </a:prstGeom>
+          <a:ln w="38100">
+            <a:solidFill>
+              <a:schemeClr val="tx1"/>
+            </a:solidFill>
+            <a:tailEnd type="none"/>
+          </a:ln>
+        </p:spPr>
+        <p:style>
+          <a:lnRef idx="2">
+            <a:schemeClr val="accent1"/>
+          </a:lnRef>
+          <a:fillRef idx="0">
+            <a:schemeClr val="accent1"/>
+          </a:fillRef>
+          <a:effectRef idx="1">
+            <a:schemeClr val="accent1"/>
+          </a:effectRef>
+          <a:fontRef idx="minor">
+            <a:schemeClr val="tx1"/>
+          </a:fontRef>
+        </p:style>
+      </p:cxnSp>
+      <p:sp>
+        <p:nvSpPr>
+          <p:cNvPr id="36" name="TextBox 35">
+            <a:extLst>
+              <a:ext uri="{FF2B5EF4-FFF2-40B4-BE49-F238E27FC236}">
+                <a16:creationId xmlns:a16="http://schemas.microsoft.com/office/drawing/2014/main" id="{361442C0-CDFC-75EA-BF49-A961B88188D3}"/>
+              </a:ext>
+            </a:extLst>
+          </p:cNvPr>
+          <p:cNvSpPr txBox="1"/>
+          <p:nvPr/>
+        </p:nvSpPr>
+        <p:spPr>
+          <a:xfrm>
+            <a:off x="3254860" y="4431699"/>
+            <a:ext cx="562975" cy="646331"/>
+          </a:xfrm>
+          <a:prstGeom prst="rect">
+            <a:avLst/>
+          </a:prstGeom>
+          <a:noFill/>
+        </p:spPr>
+        <p:txBody>
+          <a:bodyPr wrap="none" rtlCol="0">
+            <a:spAutoFit/>
+          </a:bodyPr>
+          <a:lstStyle/>
+          <a:p>
+            <a:r>
+              <a:rPr lang="en-ES" sz="3600" dirty="0"/>
+              <a:t>ɸ’</a:t>
+            </a:r>
+          </a:p>
+        </p:txBody>
+      </p:sp>
+      <p:sp>
+        <p:nvSpPr>
+          <p:cNvPr id="41" name="TextBox 40">
+            <a:extLst>
+              <a:ext uri="{FF2B5EF4-FFF2-40B4-BE49-F238E27FC236}">
+                <a16:creationId xmlns:a16="http://schemas.microsoft.com/office/drawing/2014/main" id="{21DF65AF-0014-9838-1F9C-FA788DF430E2}"/>
+              </a:ext>
+            </a:extLst>
+          </p:cNvPr>
+          <p:cNvSpPr txBox="1"/>
+          <p:nvPr/>
+        </p:nvSpPr>
+        <p:spPr>
+          <a:xfrm>
+            <a:off x="8895270" y="2869329"/>
+            <a:ext cx="393056" cy="646331"/>
+          </a:xfrm>
+          <a:prstGeom prst="rect">
+            <a:avLst/>
+          </a:prstGeom>
+          <a:noFill/>
+        </p:spPr>
+        <p:txBody>
+          <a:bodyPr wrap="none" rtlCol="0">
+            <a:spAutoFit/>
+          </a:bodyPr>
+          <a:lstStyle/>
+          <a:p>
+            <a:r>
+              <a:rPr lang="en-ES" sz="3600" dirty="0"/>
+              <a:t>y</a:t>
+            </a:r>
+          </a:p>
+        </p:txBody>
+      </p:sp>
+      <p:sp>
+        <p:nvSpPr>
+          <p:cNvPr id="37" name="Arc 36">
+            <a:extLst>
+              <a:ext uri="{FF2B5EF4-FFF2-40B4-BE49-F238E27FC236}">
+                <a16:creationId xmlns:a16="http://schemas.microsoft.com/office/drawing/2014/main" id="{E8940850-8C44-3553-B1C6-4AC24BCEB1E8}"/>
+              </a:ext>
+            </a:extLst>
+          </p:cNvPr>
+          <p:cNvSpPr/>
+          <p:nvPr/>
+        </p:nvSpPr>
+        <p:spPr>
+          <a:xfrm rot="15416767">
+            <a:off x="7308147" y="2797188"/>
+            <a:ext cx="1884148" cy="4222377"/>
+          </a:xfrm>
+          <a:prstGeom prst="arc">
+            <a:avLst>
+              <a:gd name="adj1" fmla="val 16931934"/>
+              <a:gd name="adj2" fmla="val 6161777"/>
+            </a:avLst>
+          </a:prstGeom>
+          <a:ln w="38100">
+            <a:gradFill>
+              <a:gsLst>
+                <a:gs pos="72000">
+                  <a:schemeClr val="accent1">
+                    <a:lumMod val="5000"/>
+                    <a:lumOff val="95000"/>
+                  </a:schemeClr>
+                </a:gs>
+                <a:gs pos="100000">
+                  <a:schemeClr val="accent1">
+                    <a:lumMod val="45000"/>
+                    <a:lumOff val="55000"/>
+                  </a:schemeClr>
+                </a:gs>
+                <a:gs pos="0">
+                  <a:srgbClr val="FF0000"/>
+                </a:gs>
+              </a:gsLst>
+              <a:lin ang="5400000" scaled="1"/>
+            </a:gradFill>
+          </a:ln>
+        </p:spPr>
+        <p:style>
+          <a:lnRef idx="2">
+            <a:schemeClr val="accent1"/>
+          </a:lnRef>
+          <a:fillRef idx="0">
+            <a:schemeClr val="accent1"/>
+          </a:fillRef>
+          <a:effectRef idx="1">
+            <a:schemeClr val="accent1"/>
+          </a:effectRef>
+          <a:fontRef idx="minor">
+            <a:schemeClr val="tx1"/>
+          </a:fontRef>
+        </p:style>
+        <p:txBody>
+          <a:bodyPr rtlCol="0" anchor="ctr"/>
+          <a:lstStyle/>
+          <a:p>
+            <a:pPr algn="ctr"/>
+            <a:endParaRPr lang="en-ES"/>
+          </a:p>
+        </p:txBody>
+      </p:sp>
+      <p:cxnSp>
+        <p:nvCxnSpPr>
+          <p:cNvPr id="38" name="Straight Arrow Connector 37">
+            <a:extLst>
+              <a:ext uri="{FF2B5EF4-FFF2-40B4-BE49-F238E27FC236}">
+                <a16:creationId xmlns:a16="http://schemas.microsoft.com/office/drawing/2014/main" id="{7F40F7C0-8F9F-5467-0AA1-54322A1B012E}"/>
+              </a:ext>
+            </a:extLst>
+          </p:cNvPr>
+          <p:cNvCxnSpPr>
+            <a:cxnSpLocks/>
+          </p:cNvCxnSpPr>
+          <p:nvPr/>
+        </p:nvCxnSpPr>
+        <p:spPr>
+          <a:xfrm flipV="1">
+            <a:off x="8226694" y="2417283"/>
+            <a:ext cx="23527" cy="2491093"/>
+          </a:xfrm>
+          <a:prstGeom prst="straightConnector1">
+            <a:avLst/>
+          </a:prstGeom>
+          <a:ln w="38100">
+            <a:solidFill>
+              <a:schemeClr val="tx1"/>
+            </a:solidFill>
+            <a:tailEnd type="triangle"/>
+          </a:ln>
+        </p:spPr>
+        <p:style>
+          <a:lnRef idx="2">
+            <a:schemeClr val="accent1"/>
+          </a:lnRef>
+          <a:fillRef idx="0">
+            <a:schemeClr val="accent1"/>
+          </a:fillRef>
+          <a:effectRef idx="1">
+            <a:schemeClr val="accent1"/>
+          </a:effectRef>
+          <a:fontRef idx="minor">
+            <a:schemeClr val="tx1"/>
+          </a:fontRef>
+        </p:style>
+      </p:cxnSp>
+      <p:cxnSp>
+        <p:nvCxnSpPr>
+          <p:cNvPr id="42" name="Straight Arrow Connector 41">
+            <a:extLst>
+              <a:ext uri="{FF2B5EF4-FFF2-40B4-BE49-F238E27FC236}">
+                <a16:creationId xmlns:a16="http://schemas.microsoft.com/office/drawing/2014/main" id="{3FF65B0D-2128-48A2-C6BF-EEFBDF5032C2}"/>
+              </a:ext>
+            </a:extLst>
+          </p:cNvPr>
+          <p:cNvCxnSpPr>
+            <a:cxnSpLocks/>
+          </p:cNvCxnSpPr>
+          <p:nvPr/>
+        </p:nvCxnSpPr>
+        <p:spPr>
+          <a:xfrm>
+            <a:off x="8226694" y="4908376"/>
+            <a:ext cx="3225269" cy="0"/>
+          </a:xfrm>
+          <a:prstGeom prst="straightConnector1">
+            <a:avLst/>
+          </a:prstGeom>
+          <a:ln w="38100">
+            <a:solidFill>
+              <a:schemeClr val="tx1"/>
+            </a:solidFill>
+            <a:tailEnd type="triangle"/>
+          </a:ln>
+        </p:spPr>
+        <p:style>
+          <a:lnRef idx="2">
+            <a:schemeClr val="accent1"/>
+          </a:lnRef>
+          <a:fillRef idx="0">
+            <a:schemeClr val="accent1"/>
+          </a:fillRef>
+          <a:effectRef idx="1">
+            <a:schemeClr val="accent1"/>
+          </a:effectRef>
+          <a:fontRef idx="minor">
+            <a:schemeClr val="tx1"/>
+          </a:fontRef>
+        </p:style>
+      </p:cxnSp>
+      <p:sp>
+        <p:nvSpPr>
+          <p:cNvPr id="43" name="TextBox 42">
+            <a:extLst>
+              <a:ext uri="{FF2B5EF4-FFF2-40B4-BE49-F238E27FC236}">
+                <a16:creationId xmlns:a16="http://schemas.microsoft.com/office/drawing/2014/main" id="{62972613-7A40-EEAD-36D6-D99B33FD04D6}"/>
+              </a:ext>
+            </a:extLst>
+          </p:cNvPr>
+          <p:cNvSpPr txBox="1"/>
+          <p:nvPr/>
+        </p:nvSpPr>
+        <p:spPr>
+          <a:xfrm>
+            <a:off x="11069866" y="4895265"/>
+            <a:ext cx="567868" cy="646331"/>
+          </a:xfrm>
+          <a:prstGeom prst="rect">
+            <a:avLst/>
+          </a:prstGeom>
+          <a:noFill/>
+        </p:spPr>
+        <p:txBody>
+          <a:bodyPr wrap="square" rtlCol="0">
+            <a:spAutoFit/>
+          </a:bodyPr>
+          <a:lstStyle/>
+          <a:p>
+            <a:r>
+              <a:rPr lang="en-ES" sz="3600" dirty="0"/>
+              <a:t>x</a:t>
+            </a:r>
+          </a:p>
+        </p:txBody>
+      </p:sp>
+      <p:cxnSp>
+        <p:nvCxnSpPr>
+          <p:cNvPr id="58" name="Straight Arrow Connector 57">
+            <a:extLst>
+              <a:ext uri="{FF2B5EF4-FFF2-40B4-BE49-F238E27FC236}">
+                <a16:creationId xmlns:a16="http://schemas.microsoft.com/office/drawing/2014/main" id="{CCA5B95B-998E-A1C6-47D1-5E353C95FAF5}"/>
+              </a:ext>
+            </a:extLst>
+          </p:cNvPr>
+          <p:cNvCxnSpPr>
+            <a:cxnSpLocks/>
+          </p:cNvCxnSpPr>
+          <p:nvPr/>
+        </p:nvCxnSpPr>
+        <p:spPr>
+          <a:xfrm flipV="1">
+            <a:off x="8231487" y="3513799"/>
+            <a:ext cx="951382" cy="1419145"/>
+          </a:xfrm>
+          <a:prstGeom prst="straightConnector1">
+            <a:avLst/>
+          </a:prstGeom>
+          <a:ln w="38100">
+            <a:solidFill>
+              <a:schemeClr val="tx1"/>
+            </a:solidFill>
+            <a:tailEnd type="triangle"/>
+          </a:ln>
+        </p:spPr>
+        <p:style>
+          <a:lnRef idx="2">
+            <a:schemeClr val="accent1"/>
+          </a:lnRef>
+          <a:fillRef idx="0">
+            <a:schemeClr val="accent1"/>
+          </a:fillRef>
+          <a:effectRef idx="1">
+            <a:schemeClr val="accent1"/>
+          </a:effectRef>
+          <a:fontRef idx="minor">
+            <a:schemeClr val="tx1"/>
+          </a:fontRef>
+        </p:style>
+      </p:cxnSp>
+      <p:sp>
+        <p:nvSpPr>
+          <p:cNvPr id="61" name="TextBox 60">
+            <a:extLst>
+              <a:ext uri="{FF2B5EF4-FFF2-40B4-BE49-F238E27FC236}">
+                <a16:creationId xmlns:a16="http://schemas.microsoft.com/office/drawing/2014/main" id="{7C0742B9-49F1-60CA-F189-435AEC7AC1F2}"/>
+              </a:ext>
+            </a:extLst>
+          </p:cNvPr>
+          <p:cNvSpPr txBox="1"/>
+          <p:nvPr/>
+        </p:nvSpPr>
+        <p:spPr>
+          <a:xfrm>
+            <a:off x="8375794" y="2033395"/>
+            <a:ext cx="386644" cy="646331"/>
+          </a:xfrm>
+          <a:prstGeom prst="rect">
+            <a:avLst/>
+          </a:prstGeom>
+          <a:noFill/>
+        </p:spPr>
+        <p:txBody>
+          <a:bodyPr wrap="none" rtlCol="0">
+            <a:spAutoFit/>
+          </a:bodyPr>
+          <a:lstStyle/>
+          <a:p>
+            <a:r>
+              <a:rPr lang="en-ES" sz="3600" dirty="0"/>
+              <a:t>z</a:t>
+            </a:r>
+          </a:p>
+        </p:txBody>
+      </p:sp>
+      <p:sp>
+        <p:nvSpPr>
+          <p:cNvPr id="63" name="Oval 62">
+            <a:extLst>
+              <a:ext uri="{FF2B5EF4-FFF2-40B4-BE49-F238E27FC236}">
+                <a16:creationId xmlns:a16="http://schemas.microsoft.com/office/drawing/2014/main" id="{4C5C545A-0A5E-81E3-07A4-D107F0ADC87A}"/>
+              </a:ext>
+            </a:extLst>
+          </p:cNvPr>
+          <p:cNvSpPr/>
+          <p:nvPr/>
+        </p:nvSpPr>
+        <p:spPr>
+          <a:xfrm>
+            <a:off x="8196111" y="3083404"/>
+            <a:ext cx="95519" cy="87688"/>
+          </a:xfrm>
+          <a:prstGeom prst="ellipse">
+            <a:avLst/>
+          </a:prstGeom>
+        </p:spPr>
+        <p:style>
+          <a:lnRef idx="2">
+            <a:schemeClr val="accent1">
+              <a:shade val="15000"/>
+            </a:schemeClr>
+          </a:lnRef>
+          <a:fillRef idx="1">
+            <a:schemeClr val="accent1"/>
+          </a:fillRef>
+          <a:effectRef idx="0">
+            <a:schemeClr val="accent1"/>
+          </a:effectRef>
+          <a:fontRef idx="minor">
+            <a:schemeClr val="lt1"/>
+          </a:fontRef>
+        </p:style>
+        <p:txBody>
+          <a:bodyPr rtlCol="0" anchor="ctr"/>
+          <a:lstStyle/>
+          <a:p>
+            <a:pPr algn="ctr"/>
+            <a:endParaRPr lang="en-ES"/>
+          </a:p>
+        </p:txBody>
+      </p:sp>
+      <p:sp>
+        <p:nvSpPr>
+          <p:cNvPr id="64" name="Oval 63">
+            <a:extLst>
+              <a:ext uri="{FF2B5EF4-FFF2-40B4-BE49-F238E27FC236}">
+                <a16:creationId xmlns:a16="http://schemas.microsoft.com/office/drawing/2014/main" id="{B9DECD15-6A90-8F2A-42EE-A001068C177B}"/>
+              </a:ext>
+            </a:extLst>
+          </p:cNvPr>
+          <p:cNvSpPr/>
+          <p:nvPr/>
+        </p:nvSpPr>
+        <p:spPr>
+          <a:xfrm>
+            <a:off x="10236623" y="4342107"/>
+            <a:ext cx="95519" cy="87688"/>
+          </a:xfrm>
+          <a:prstGeom prst="ellipse">
+            <a:avLst/>
+          </a:prstGeom>
+        </p:spPr>
+        <p:style>
+          <a:lnRef idx="2">
+            <a:schemeClr val="accent1">
+              <a:shade val="15000"/>
+            </a:schemeClr>
+          </a:lnRef>
+          <a:fillRef idx="1">
+            <a:schemeClr val="accent1"/>
+          </a:fillRef>
+          <a:effectRef idx="0">
+            <a:schemeClr val="accent1"/>
+          </a:effectRef>
+          <a:fontRef idx="minor">
+            <a:schemeClr val="lt1"/>
+          </a:fontRef>
+        </p:style>
+        <p:txBody>
+          <a:bodyPr rtlCol="0" anchor="ctr"/>
+          <a:lstStyle/>
+          <a:p>
+            <a:pPr algn="ctr"/>
+            <a:endParaRPr lang="en-ES"/>
+          </a:p>
+        </p:txBody>
+      </p:sp>
+      <p:sp>
+        <p:nvSpPr>
+          <p:cNvPr id="65" name="Oval 64">
+            <a:extLst>
+              <a:ext uri="{FF2B5EF4-FFF2-40B4-BE49-F238E27FC236}">
+                <a16:creationId xmlns:a16="http://schemas.microsoft.com/office/drawing/2014/main" id="{CBEA7EF2-4DF1-77C2-309F-A3BFC3B20BE1}"/>
+              </a:ext>
+            </a:extLst>
+          </p:cNvPr>
+          <p:cNvSpPr/>
+          <p:nvPr/>
+        </p:nvSpPr>
+        <p:spPr>
+          <a:xfrm>
+            <a:off x="6940473" y="4342107"/>
+            <a:ext cx="95519" cy="87688"/>
+          </a:xfrm>
+          <a:prstGeom prst="ellipse">
+            <a:avLst/>
+          </a:prstGeom>
+        </p:spPr>
+        <p:style>
+          <a:lnRef idx="2">
+            <a:schemeClr val="accent1">
+              <a:shade val="15000"/>
+            </a:schemeClr>
+          </a:lnRef>
+          <a:fillRef idx="1">
+            <a:schemeClr val="accent1"/>
+          </a:fillRef>
+          <a:effectRef idx="0">
+            <a:schemeClr val="accent1"/>
+          </a:effectRef>
+          <a:fontRef idx="minor">
+            <a:schemeClr val="lt1"/>
+          </a:fontRef>
+        </p:style>
+        <p:txBody>
+          <a:bodyPr rtlCol="0" anchor="ctr"/>
+          <a:lstStyle/>
+          <a:p>
+            <a:pPr algn="ctr"/>
+            <a:endParaRPr lang="en-ES"/>
+          </a:p>
+        </p:txBody>
+      </p:sp>
+      <p:cxnSp>
+        <p:nvCxnSpPr>
+          <p:cNvPr id="66" name="Straight Arrow Connector 65">
+            <a:extLst>
+              <a:ext uri="{FF2B5EF4-FFF2-40B4-BE49-F238E27FC236}">
+                <a16:creationId xmlns:a16="http://schemas.microsoft.com/office/drawing/2014/main" id="{4E6E89EA-DB65-0D6F-D0E7-B4A7A3669132}"/>
+              </a:ext>
+            </a:extLst>
+          </p:cNvPr>
+          <p:cNvCxnSpPr>
+            <a:cxnSpLocks/>
+          </p:cNvCxnSpPr>
+          <p:nvPr/>
+        </p:nvCxnSpPr>
+        <p:spPr>
+          <a:xfrm flipH="1" flipV="1">
+            <a:off x="7510690" y="2665527"/>
+            <a:ext cx="699409" cy="438811"/>
+          </a:xfrm>
+          <a:prstGeom prst="straightConnector1">
+            <a:avLst/>
+          </a:prstGeom>
+          <a:ln w="38100">
+            <a:solidFill>
+              <a:schemeClr val="tx1"/>
+            </a:solidFill>
+            <a:tailEnd type="triangle"/>
+          </a:ln>
+        </p:spPr>
+        <p:style>
+          <a:lnRef idx="2">
+            <a:schemeClr val="accent1"/>
+          </a:lnRef>
+          <a:fillRef idx="0">
+            <a:schemeClr val="accent1"/>
+          </a:fillRef>
+          <a:effectRef idx="1">
+            <a:schemeClr val="accent1"/>
+          </a:effectRef>
+          <a:fontRef idx="minor">
+            <a:schemeClr val="tx1"/>
+          </a:fontRef>
+        </p:style>
+      </p:cxnSp>
+      <p:cxnSp>
+        <p:nvCxnSpPr>
+          <p:cNvPr id="70" name="Straight Arrow Connector 69">
+            <a:extLst>
+              <a:ext uri="{FF2B5EF4-FFF2-40B4-BE49-F238E27FC236}">
+                <a16:creationId xmlns:a16="http://schemas.microsoft.com/office/drawing/2014/main" id="{057A2C09-DEA6-0010-6F4A-38BA466EE131}"/>
+              </a:ext>
+            </a:extLst>
+          </p:cNvPr>
+          <p:cNvCxnSpPr>
+            <a:cxnSpLocks/>
+            <a:endCxn id="63" idx="5"/>
+          </p:cNvCxnSpPr>
+          <p:nvPr/>
+        </p:nvCxnSpPr>
+        <p:spPr>
+          <a:xfrm flipH="1" flipV="1">
+            <a:off x="8277642" y="3158250"/>
+            <a:ext cx="1987588" cy="1217979"/>
+          </a:xfrm>
+          <a:prstGeom prst="straightConnector1">
+            <a:avLst/>
+          </a:prstGeom>
+          <a:ln w="38100">
+            <a:solidFill>
+              <a:schemeClr val="tx1"/>
+            </a:solidFill>
+            <a:prstDash val="dash"/>
+            <a:tailEnd type="none"/>
+          </a:ln>
+        </p:spPr>
+        <p:style>
+          <a:lnRef idx="2">
+            <a:schemeClr val="accent1"/>
+          </a:lnRef>
+          <a:fillRef idx="0">
+            <a:schemeClr val="accent1"/>
+          </a:fillRef>
+          <a:effectRef idx="1">
+            <a:schemeClr val="accent1"/>
+          </a:effectRef>
+          <a:fontRef idx="minor">
+            <a:schemeClr val="tx1"/>
+          </a:fontRef>
+        </p:style>
+      </p:cxnSp>
+      <p:cxnSp>
+        <p:nvCxnSpPr>
+          <p:cNvPr id="73" name="Straight Arrow Connector 72">
+            <a:extLst>
+              <a:ext uri="{FF2B5EF4-FFF2-40B4-BE49-F238E27FC236}">
+                <a16:creationId xmlns:a16="http://schemas.microsoft.com/office/drawing/2014/main" id="{574AE1CD-877A-3333-9F4B-5AB770D75161}"/>
+              </a:ext>
+            </a:extLst>
+          </p:cNvPr>
+          <p:cNvCxnSpPr>
+            <a:cxnSpLocks/>
+          </p:cNvCxnSpPr>
+          <p:nvPr/>
+        </p:nvCxnSpPr>
+        <p:spPr>
+          <a:xfrm flipH="1">
+            <a:off x="7632706" y="3151452"/>
+            <a:ext cx="585558" cy="600339"/>
+          </a:xfrm>
+          <a:prstGeom prst="straightConnector1">
+            <a:avLst/>
+          </a:prstGeom>
+          <a:ln w="38100">
+            <a:solidFill>
+              <a:schemeClr val="tx1"/>
+            </a:solidFill>
+            <a:tailEnd type="triangle"/>
+          </a:ln>
+        </p:spPr>
+        <p:style>
+          <a:lnRef idx="2">
+            <a:schemeClr val="accent1"/>
+          </a:lnRef>
+          <a:fillRef idx="0">
+            <a:schemeClr val="accent1"/>
+          </a:fillRef>
+          <a:effectRef idx="1">
+            <a:schemeClr val="accent1"/>
+          </a:effectRef>
+          <a:fontRef idx="minor">
+            <a:schemeClr val="tx1"/>
+          </a:fontRef>
+        </p:style>
+      </p:cxnSp>
+      <p:cxnSp>
+        <p:nvCxnSpPr>
+          <p:cNvPr id="76" name="Straight Arrow Connector 75">
+            <a:extLst>
+              <a:ext uri="{FF2B5EF4-FFF2-40B4-BE49-F238E27FC236}">
+                <a16:creationId xmlns:a16="http://schemas.microsoft.com/office/drawing/2014/main" id="{5EA5187D-0BEF-3AE5-F182-07B473F575C7}"/>
+              </a:ext>
+            </a:extLst>
+          </p:cNvPr>
+          <p:cNvCxnSpPr>
+            <a:cxnSpLocks/>
+            <a:endCxn id="65" idx="7"/>
+          </p:cNvCxnSpPr>
+          <p:nvPr/>
+        </p:nvCxnSpPr>
+        <p:spPr>
+          <a:xfrm flipH="1">
+            <a:off x="7022004" y="3801830"/>
+            <a:ext cx="551549" cy="553119"/>
+          </a:xfrm>
+          <a:prstGeom prst="straightConnector1">
+            <a:avLst/>
+          </a:prstGeom>
+          <a:ln w="38100">
+            <a:solidFill>
+              <a:schemeClr val="tx1"/>
+            </a:solidFill>
+            <a:prstDash val="dash"/>
+            <a:tailEnd type="none"/>
+          </a:ln>
+        </p:spPr>
+        <p:style>
+          <a:lnRef idx="2">
+            <a:schemeClr val="accent1"/>
+          </a:lnRef>
+          <a:fillRef idx="0">
+            <a:schemeClr val="accent1"/>
+          </a:fillRef>
+          <a:effectRef idx="1">
+            <a:schemeClr val="accent1"/>
+          </a:effectRef>
+          <a:fontRef idx="minor">
+            <a:schemeClr val="tx1"/>
+          </a:fontRef>
+        </p:style>
+      </p:cxnSp>
+      <p:sp>
+        <p:nvSpPr>
+          <p:cNvPr id="88" name="TextBox 87">
+            <a:extLst>
+              <a:ext uri="{FF2B5EF4-FFF2-40B4-BE49-F238E27FC236}">
+                <a16:creationId xmlns:a16="http://schemas.microsoft.com/office/drawing/2014/main" id="{62F315E5-15F5-F32A-79B4-8EB5B351B1F7}"/>
+              </a:ext>
+            </a:extLst>
+          </p:cNvPr>
+          <p:cNvSpPr txBox="1"/>
+          <p:nvPr/>
+        </p:nvSpPr>
+        <p:spPr>
+          <a:xfrm>
+            <a:off x="6086094" y="2322249"/>
+            <a:ext cx="1804276" cy="369332"/>
+          </a:xfrm>
+          <a:prstGeom prst="rect">
+            <a:avLst/>
+          </a:prstGeom>
+          <a:noFill/>
+        </p:spPr>
+        <p:txBody>
+          <a:bodyPr wrap="none" rtlCol="0">
+            <a:spAutoFit/>
+          </a:bodyPr>
+          <a:lstStyle/>
+          <a:p>
+            <a:r>
+              <a:rPr lang="en-ES" dirty="0"/>
+              <a:t>Ez&gt;0  Ey&lt;0  Ex&lt;0</a:t>
+            </a:r>
+          </a:p>
+        </p:txBody>
+      </p:sp>
+      <p:sp>
+        <p:nvSpPr>
+          <p:cNvPr id="89" name="TextBox 88">
+            <a:extLst>
+              <a:ext uri="{FF2B5EF4-FFF2-40B4-BE49-F238E27FC236}">
+                <a16:creationId xmlns:a16="http://schemas.microsoft.com/office/drawing/2014/main" id="{6F7CE4F5-D0BA-E3E3-F65E-E299F8461623}"/>
+              </a:ext>
+            </a:extLst>
+          </p:cNvPr>
+          <p:cNvSpPr txBox="1"/>
+          <p:nvPr/>
+        </p:nvSpPr>
+        <p:spPr>
+          <a:xfrm>
+            <a:off x="6038727" y="3227768"/>
+            <a:ext cx="1804276" cy="369332"/>
+          </a:xfrm>
+          <a:prstGeom prst="rect">
+            <a:avLst/>
+          </a:prstGeom>
+          <a:noFill/>
+        </p:spPr>
+        <p:txBody>
+          <a:bodyPr wrap="none" rtlCol="0">
+            <a:spAutoFit/>
+          </a:bodyPr>
+          <a:lstStyle/>
+          <a:p>
+            <a:r>
+              <a:rPr lang="en-ES" dirty="0"/>
+              <a:t>Ez&lt;0  Ey&gt;0  Ex&lt;0</a:t>
+            </a:r>
+          </a:p>
+        </p:txBody>
+      </p:sp>
+    </p:spTree>
+    <p:extLst>
+      <p:ext uri="{BB962C8B-B14F-4D97-AF65-F5344CB8AC3E}">
+        <p14:creationId xmlns:p14="http://schemas.microsoft.com/office/powerpoint/2010/main" val="650413243"/>
+      </p:ext>
+    </p:extLst>
+  </p:cSld>
+  <p:clrMapOvr>
+    <a:masterClrMapping/>
+  </p:clrMapOvr>
+</p:sld>
+</file>
+
+<file path=ppt/slides/slide30.xml><?xml version="1.0" encoding="utf-8"?>
 <p:sld xmlns:a="http://schemas.openxmlformats.org/drawingml/2006/main" xmlns:r="http://schemas.openxmlformats.org/officeDocument/2006/relationships" xmlns:p="http://schemas.openxmlformats.org/presentationml/2006/main">
   <p:cSld>
     <p:spTree>
@@ -22178,1160 +24020,7 @@
 </p:sld>
 </file>
 
-<file path=ppt/slides/slide3.xml><?xml version="1.0" encoding="utf-8"?>
-<p:sld xmlns:a="http://schemas.openxmlformats.org/drawingml/2006/main" xmlns:r="http://schemas.openxmlformats.org/officeDocument/2006/relationships" xmlns:p="http://schemas.openxmlformats.org/presentationml/2006/main">
-  <p:cSld>
-    <p:spTree>
-      <p:nvGrpSpPr>
-        <p:cNvPr id="1" name=""/>
-        <p:cNvGrpSpPr/>
-        <p:nvPr/>
-      </p:nvGrpSpPr>
-      <p:grpSpPr>
-        <a:xfrm>
-          <a:off x="0" y="0"/>
-          <a:ext cx="0" cy="0"/>
-          <a:chOff x="0" y="0"/>
-          <a:chExt cx="0" cy="0"/>
-        </a:xfrm>
-      </p:grpSpPr>
-      <p:sp>
-        <p:nvSpPr>
-          <p:cNvPr id="2" name="Title 1">
-            <a:extLst>
-              <a:ext uri="{FF2B5EF4-FFF2-40B4-BE49-F238E27FC236}">
-                <a16:creationId xmlns:a16="http://schemas.microsoft.com/office/drawing/2014/main" id="{D39B841F-54C7-3AE1-E545-FD824C8DAF7F}"/>
-              </a:ext>
-            </a:extLst>
-          </p:cNvPr>
-          <p:cNvSpPr>
-            <a:spLocks noGrp="1"/>
-          </p:cNvSpPr>
-          <p:nvPr>
-            <p:ph type="title"/>
-          </p:nvPr>
-        </p:nvSpPr>
-        <p:spPr/>
-        <p:txBody>
-          <a:bodyPr/>
-          <a:lstStyle/>
-          <a:p>
-            <a:r>
-              <a:rPr lang="en-ES" dirty="0"/>
-              <a:t>B1.S2.1</a:t>
-            </a:r>
-          </a:p>
-        </p:txBody>
-      </p:sp>
-      <p:sp>
-        <p:nvSpPr>
-          <p:cNvPr id="5" name="Arc 4">
-            <a:extLst>
-              <a:ext uri="{FF2B5EF4-FFF2-40B4-BE49-F238E27FC236}">
-                <a16:creationId xmlns:a16="http://schemas.microsoft.com/office/drawing/2014/main" id="{C62C6161-AC50-592A-79A8-62650346F24E}"/>
-              </a:ext>
-            </a:extLst>
-          </p:cNvPr>
-          <p:cNvSpPr/>
-          <p:nvPr/>
-        </p:nvSpPr>
-        <p:spPr>
-          <a:xfrm rot="16200000">
-            <a:off x="492552" y="2918012"/>
-            <a:ext cx="4155141" cy="4222377"/>
-          </a:xfrm>
-          <a:prstGeom prst="arc">
-            <a:avLst>
-              <a:gd name="adj1" fmla="val 16259988"/>
-              <a:gd name="adj2" fmla="val 5404610"/>
-            </a:avLst>
-          </a:prstGeom>
-          <a:ln w="38100">
-            <a:gradFill>
-              <a:gsLst>
-                <a:gs pos="51000">
-                  <a:schemeClr val="accent1">
-                    <a:lumMod val="5000"/>
-                    <a:lumOff val="95000"/>
-                  </a:schemeClr>
-                </a:gs>
-                <a:gs pos="100000">
-                  <a:schemeClr val="accent1">
-                    <a:lumMod val="45000"/>
-                    <a:lumOff val="55000"/>
-                  </a:schemeClr>
-                </a:gs>
-                <a:gs pos="0">
-                  <a:srgbClr val="FF0000"/>
-                </a:gs>
-              </a:gsLst>
-              <a:lin ang="5400000" scaled="1"/>
-            </a:gradFill>
-          </a:ln>
-        </p:spPr>
-        <p:style>
-          <a:lnRef idx="2">
-            <a:schemeClr val="accent1"/>
-          </a:lnRef>
-          <a:fillRef idx="0">
-            <a:schemeClr val="accent1"/>
-          </a:fillRef>
-          <a:effectRef idx="1">
-            <a:schemeClr val="accent1"/>
-          </a:effectRef>
-          <a:fontRef idx="minor">
-            <a:schemeClr val="tx1"/>
-          </a:fontRef>
-        </p:style>
-        <p:txBody>
-          <a:bodyPr rtlCol="0" anchor="ctr"/>
-          <a:lstStyle/>
-          <a:p>
-            <a:pPr algn="ctr"/>
-            <a:endParaRPr lang="en-ES"/>
-          </a:p>
-        </p:txBody>
-      </p:sp>
-      <p:cxnSp>
-        <p:nvCxnSpPr>
-          <p:cNvPr id="10" name="Straight Arrow Connector 9">
-            <a:extLst>
-              <a:ext uri="{FF2B5EF4-FFF2-40B4-BE49-F238E27FC236}">
-                <a16:creationId xmlns:a16="http://schemas.microsoft.com/office/drawing/2014/main" id="{8E1BDB21-2D8F-C9C2-3B07-F77D99022865}"/>
-              </a:ext>
-            </a:extLst>
-          </p:cNvPr>
-          <p:cNvCxnSpPr>
-            <a:cxnSpLocks/>
-          </p:cNvCxnSpPr>
-          <p:nvPr/>
-        </p:nvCxnSpPr>
-        <p:spPr>
-          <a:xfrm flipV="1">
-            <a:off x="2589628" y="1817132"/>
-            <a:ext cx="0" cy="3223735"/>
-          </a:xfrm>
-          <a:prstGeom prst="straightConnector1">
-            <a:avLst/>
-          </a:prstGeom>
-          <a:ln w="38100">
-            <a:solidFill>
-              <a:schemeClr val="tx1"/>
-            </a:solidFill>
-            <a:tailEnd type="triangle"/>
-          </a:ln>
-        </p:spPr>
-        <p:style>
-          <a:lnRef idx="2">
-            <a:schemeClr val="accent1"/>
-          </a:lnRef>
-          <a:fillRef idx="0">
-            <a:schemeClr val="accent1"/>
-          </a:fillRef>
-          <a:effectRef idx="1">
-            <a:schemeClr val="accent1"/>
-          </a:effectRef>
-          <a:fontRef idx="minor">
-            <a:schemeClr val="tx1"/>
-          </a:fontRef>
-        </p:style>
-      </p:cxnSp>
-      <p:sp>
-        <p:nvSpPr>
-          <p:cNvPr id="15" name="TextBox 14">
-            <a:extLst>
-              <a:ext uri="{FF2B5EF4-FFF2-40B4-BE49-F238E27FC236}">
-                <a16:creationId xmlns:a16="http://schemas.microsoft.com/office/drawing/2014/main" id="{724436C1-324F-AAF1-C132-967FFB014398}"/>
-              </a:ext>
-            </a:extLst>
-          </p:cNvPr>
-          <p:cNvSpPr txBox="1"/>
-          <p:nvPr/>
-        </p:nvSpPr>
-        <p:spPr>
-          <a:xfrm>
-            <a:off x="2054698" y="1817132"/>
-            <a:ext cx="393056" cy="646331"/>
-          </a:xfrm>
-          <a:prstGeom prst="rect">
-            <a:avLst/>
-          </a:prstGeom>
-          <a:noFill/>
-        </p:spPr>
-        <p:txBody>
-          <a:bodyPr wrap="none" rtlCol="0">
-            <a:spAutoFit/>
-          </a:bodyPr>
-          <a:lstStyle/>
-          <a:p>
-            <a:r>
-              <a:rPr lang="en-ES" sz="3600" dirty="0"/>
-              <a:t>y</a:t>
-            </a:r>
-          </a:p>
-        </p:txBody>
-      </p:sp>
-      <p:cxnSp>
-        <p:nvCxnSpPr>
-          <p:cNvPr id="17" name="Straight Arrow Connector 16">
-            <a:extLst>
-              <a:ext uri="{FF2B5EF4-FFF2-40B4-BE49-F238E27FC236}">
-                <a16:creationId xmlns:a16="http://schemas.microsoft.com/office/drawing/2014/main" id="{5B01AE06-DAE3-451D-0620-065E77F3FD38}"/>
-              </a:ext>
-            </a:extLst>
-          </p:cNvPr>
-          <p:cNvCxnSpPr>
-            <a:cxnSpLocks/>
-          </p:cNvCxnSpPr>
-          <p:nvPr/>
-        </p:nvCxnSpPr>
-        <p:spPr>
-          <a:xfrm>
-            <a:off x="2589628" y="5040867"/>
-            <a:ext cx="3225269" cy="0"/>
-          </a:xfrm>
-          <a:prstGeom prst="straightConnector1">
-            <a:avLst/>
-          </a:prstGeom>
-          <a:ln w="38100">
-            <a:solidFill>
-              <a:schemeClr val="tx1"/>
-            </a:solidFill>
-            <a:tailEnd type="triangle"/>
-          </a:ln>
-        </p:spPr>
-        <p:style>
-          <a:lnRef idx="2">
-            <a:schemeClr val="accent1"/>
-          </a:lnRef>
-          <a:fillRef idx="0">
-            <a:schemeClr val="accent1"/>
-          </a:fillRef>
-          <a:effectRef idx="1">
-            <a:schemeClr val="accent1"/>
-          </a:effectRef>
-          <a:fontRef idx="minor">
-            <a:schemeClr val="tx1"/>
-          </a:fontRef>
-        </p:style>
-      </p:cxnSp>
-      <p:sp>
-        <p:nvSpPr>
-          <p:cNvPr id="18" name="TextBox 17">
-            <a:extLst>
-              <a:ext uri="{FF2B5EF4-FFF2-40B4-BE49-F238E27FC236}">
-                <a16:creationId xmlns:a16="http://schemas.microsoft.com/office/drawing/2014/main" id="{10908EA1-8301-F8A5-2AA4-12299B055323}"/>
-              </a:ext>
-            </a:extLst>
-          </p:cNvPr>
-          <p:cNvSpPr txBox="1"/>
-          <p:nvPr/>
-        </p:nvSpPr>
-        <p:spPr>
-          <a:xfrm>
-            <a:off x="5392791" y="5040867"/>
-            <a:ext cx="567868" cy="646331"/>
-          </a:xfrm>
-          <a:prstGeom prst="rect">
-            <a:avLst/>
-          </a:prstGeom>
-          <a:noFill/>
-        </p:spPr>
-        <p:txBody>
-          <a:bodyPr wrap="square" rtlCol="0">
-            <a:spAutoFit/>
-          </a:bodyPr>
-          <a:lstStyle/>
-          <a:p>
-            <a:r>
-              <a:rPr lang="en-ES" sz="3600" dirty="0"/>
-              <a:t>x</a:t>
-            </a:r>
-          </a:p>
-        </p:txBody>
-      </p:sp>
-      <p:sp>
-        <p:nvSpPr>
-          <p:cNvPr id="24" name="TextBox 23">
-            <a:extLst>
-              <a:ext uri="{FF2B5EF4-FFF2-40B4-BE49-F238E27FC236}">
-                <a16:creationId xmlns:a16="http://schemas.microsoft.com/office/drawing/2014/main" id="{619EBB20-CB39-E643-A01C-4EDC9B94301E}"/>
-              </a:ext>
-            </a:extLst>
-          </p:cNvPr>
-          <p:cNvSpPr txBox="1"/>
-          <p:nvPr/>
-        </p:nvSpPr>
-        <p:spPr>
-          <a:xfrm>
-            <a:off x="3338760" y="2417283"/>
-            <a:ext cx="2207656" cy="646331"/>
-          </a:xfrm>
-          <a:prstGeom prst="rect">
-            <a:avLst/>
-          </a:prstGeom>
-          <a:noFill/>
-        </p:spPr>
-        <p:txBody>
-          <a:bodyPr wrap="none" rtlCol="0">
-            <a:spAutoFit/>
-          </a:bodyPr>
-          <a:lstStyle/>
-          <a:p>
-            <a:r>
-              <a:rPr lang="en-ES" sz="3600" dirty="0"/>
-              <a:t>λ= λ</a:t>
-            </a:r>
-            <a:r>
-              <a:rPr lang="en-ES" sz="3600" baseline="-25000" dirty="0"/>
-              <a:t>0</a:t>
-            </a:r>
-            <a:r>
-              <a:rPr lang="en-ES" sz="3600" dirty="0"/>
-              <a:t>cosɸ’</a:t>
-            </a:r>
-          </a:p>
-        </p:txBody>
-      </p:sp>
-      <p:sp>
-        <p:nvSpPr>
-          <p:cNvPr id="30" name="Arc 29">
-            <a:extLst>
-              <a:ext uri="{FF2B5EF4-FFF2-40B4-BE49-F238E27FC236}">
-                <a16:creationId xmlns:a16="http://schemas.microsoft.com/office/drawing/2014/main" id="{471F2308-244C-599C-E8D1-D81CA02C565C}"/>
-              </a:ext>
-            </a:extLst>
-          </p:cNvPr>
-          <p:cNvSpPr/>
-          <p:nvPr/>
-        </p:nvSpPr>
-        <p:spPr>
-          <a:xfrm>
-            <a:off x="2027258" y="4415634"/>
-            <a:ext cx="1085728" cy="1125962"/>
-          </a:xfrm>
-          <a:prstGeom prst="arc">
-            <a:avLst>
-              <a:gd name="adj1" fmla="val 19745494"/>
-              <a:gd name="adj2" fmla="val 414981"/>
-            </a:avLst>
-          </a:prstGeom>
-          <a:ln w="38100">
-            <a:solidFill>
-              <a:schemeClr val="tx1"/>
-            </a:solidFill>
-          </a:ln>
-        </p:spPr>
-        <p:style>
-          <a:lnRef idx="2">
-            <a:schemeClr val="accent1"/>
-          </a:lnRef>
-          <a:fillRef idx="0">
-            <a:schemeClr val="accent1"/>
-          </a:fillRef>
-          <a:effectRef idx="1">
-            <a:schemeClr val="accent1"/>
-          </a:effectRef>
-          <a:fontRef idx="minor">
-            <a:schemeClr val="tx1"/>
-          </a:fontRef>
-        </p:style>
-        <p:txBody>
-          <a:bodyPr rtlCol="0" anchor="ctr"/>
-          <a:lstStyle/>
-          <a:p>
-            <a:pPr algn="ctr"/>
-            <a:endParaRPr lang="en-ES"/>
-          </a:p>
-        </p:txBody>
-      </p:sp>
-      <p:cxnSp>
-        <p:nvCxnSpPr>
-          <p:cNvPr id="31" name="Straight Arrow Connector 30">
-            <a:extLst>
-              <a:ext uri="{FF2B5EF4-FFF2-40B4-BE49-F238E27FC236}">
-                <a16:creationId xmlns:a16="http://schemas.microsoft.com/office/drawing/2014/main" id="{DAB80AE4-2DA9-5C87-2446-D9AD483D5F7C}"/>
-              </a:ext>
-            </a:extLst>
-          </p:cNvPr>
-          <p:cNvCxnSpPr>
-            <a:cxnSpLocks/>
-          </p:cNvCxnSpPr>
-          <p:nvPr/>
-        </p:nvCxnSpPr>
-        <p:spPr>
-          <a:xfrm flipV="1">
-            <a:off x="2589628" y="3834198"/>
-            <a:ext cx="1708441" cy="1195002"/>
-          </a:xfrm>
-          <a:prstGeom prst="straightConnector1">
-            <a:avLst/>
-          </a:prstGeom>
-          <a:ln w="38100">
-            <a:solidFill>
-              <a:schemeClr val="tx1"/>
-            </a:solidFill>
-            <a:tailEnd type="none"/>
-          </a:ln>
-        </p:spPr>
-        <p:style>
-          <a:lnRef idx="2">
-            <a:schemeClr val="accent1"/>
-          </a:lnRef>
-          <a:fillRef idx="0">
-            <a:schemeClr val="accent1"/>
-          </a:fillRef>
-          <a:effectRef idx="1">
-            <a:schemeClr val="accent1"/>
-          </a:effectRef>
-          <a:fontRef idx="minor">
-            <a:schemeClr val="tx1"/>
-          </a:fontRef>
-        </p:style>
-      </p:cxnSp>
-      <p:sp>
-        <p:nvSpPr>
-          <p:cNvPr id="36" name="TextBox 35">
-            <a:extLst>
-              <a:ext uri="{FF2B5EF4-FFF2-40B4-BE49-F238E27FC236}">
-                <a16:creationId xmlns:a16="http://schemas.microsoft.com/office/drawing/2014/main" id="{361442C0-CDFC-75EA-BF49-A961B88188D3}"/>
-              </a:ext>
-            </a:extLst>
-          </p:cNvPr>
-          <p:cNvSpPr txBox="1"/>
-          <p:nvPr/>
-        </p:nvSpPr>
-        <p:spPr>
-          <a:xfrm>
-            <a:off x="3254860" y="4431699"/>
-            <a:ext cx="562975" cy="646331"/>
-          </a:xfrm>
-          <a:prstGeom prst="rect">
-            <a:avLst/>
-          </a:prstGeom>
-          <a:noFill/>
-        </p:spPr>
-        <p:txBody>
-          <a:bodyPr wrap="none" rtlCol="0">
-            <a:spAutoFit/>
-          </a:bodyPr>
-          <a:lstStyle/>
-          <a:p>
-            <a:r>
-              <a:rPr lang="en-ES" sz="3600" dirty="0"/>
-              <a:t>ɸ’</a:t>
-            </a:r>
-          </a:p>
-        </p:txBody>
-      </p:sp>
-      <p:sp>
-        <p:nvSpPr>
-          <p:cNvPr id="41" name="TextBox 40">
-            <a:extLst>
-              <a:ext uri="{FF2B5EF4-FFF2-40B4-BE49-F238E27FC236}">
-                <a16:creationId xmlns:a16="http://schemas.microsoft.com/office/drawing/2014/main" id="{21DF65AF-0014-9838-1F9C-FA788DF430E2}"/>
-              </a:ext>
-            </a:extLst>
-          </p:cNvPr>
-          <p:cNvSpPr txBox="1"/>
-          <p:nvPr/>
-        </p:nvSpPr>
-        <p:spPr>
-          <a:xfrm>
-            <a:off x="8895270" y="2869329"/>
-            <a:ext cx="393056" cy="646331"/>
-          </a:xfrm>
-          <a:prstGeom prst="rect">
-            <a:avLst/>
-          </a:prstGeom>
-          <a:noFill/>
-        </p:spPr>
-        <p:txBody>
-          <a:bodyPr wrap="none" rtlCol="0">
-            <a:spAutoFit/>
-          </a:bodyPr>
-          <a:lstStyle/>
-          <a:p>
-            <a:r>
-              <a:rPr lang="en-ES" sz="3600" dirty="0"/>
-              <a:t>y</a:t>
-            </a:r>
-          </a:p>
-        </p:txBody>
-      </p:sp>
-      <p:sp>
-        <p:nvSpPr>
-          <p:cNvPr id="37" name="Arc 36">
-            <a:extLst>
-              <a:ext uri="{FF2B5EF4-FFF2-40B4-BE49-F238E27FC236}">
-                <a16:creationId xmlns:a16="http://schemas.microsoft.com/office/drawing/2014/main" id="{E8940850-8C44-3553-B1C6-4AC24BCEB1E8}"/>
-              </a:ext>
-            </a:extLst>
-          </p:cNvPr>
-          <p:cNvSpPr/>
-          <p:nvPr/>
-        </p:nvSpPr>
-        <p:spPr>
-          <a:xfrm rot="15416767">
-            <a:off x="7308147" y="2797188"/>
-            <a:ext cx="1884148" cy="4222377"/>
-          </a:xfrm>
-          <a:prstGeom prst="arc">
-            <a:avLst>
-              <a:gd name="adj1" fmla="val 16931934"/>
-              <a:gd name="adj2" fmla="val 6161777"/>
-            </a:avLst>
-          </a:prstGeom>
-          <a:ln w="38100">
-            <a:gradFill>
-              <a:gsLst>
-                <a:gs pos="72000">
-                  <a:schemeClr val="accent1">
-                    <a:lumMod val="5000"/>
-                    <a:lumOff val="95000"/>
-                  </a:schemeClr>
-                </a:gs>
-                <a:gs pos="100000">
-                  <a:schemeClr val="accent1">
-                    <a:lumMod val="45000"/>
-                    <a:lumOff val="55000"/>
-                  </a:schemeClr>
-                </a:gs>
-                <a:gs pos="0">
-                  <a:srgbClr val="FF0000"/>
-                </a:gs>
-              </a:gsLst>
-              <a:lin ang="5400000" scaled="1"/>
-            </a:gradFill>
-          </a:ln>
-        </p:spPr>
-        <p:style>
-          <a:lnRef idx="2">
-            <a:schemeClr val="accent1"/>
-          </a:lnRef>
-          <a:fillRef idx="0">
-            <a:schemeClr val="accent1"/>
-          </a:fillRef>
-          <a:effectRef idx="1">
-            <a:schemeClr val="accent1"/>
-          </a:effectRef>
-          <a:fontRef idx="minor">
-            <a:schemeClr val="tx1"/>
-          </a:fontRef>
-        </p:style>
-        <p:txBody>
-          <a:bodyPr rtlCol="0" anchor="ctr"/>
-          <a:lstStyle/>
-          <a:p>
-            <a:pPr algn="ctr"/>
-            <a:endParaRPr lang="en-ES"/>
-          </a:p>
-        </p:txBody>
-      </p:sp>
-      <p:cxnSp>
-        <p:nvCxnSpPr>
-          <p:cNvPr id="38" name="Straight Arrow Connector 37">
-            <a:extLst>
-              <a:ext uri="{FF2B5EF4-FFF2-40B4-BE49-F238E27FC236}">
-                <a16:creationId xmlns:a16="http://schemas.microsoft.com/office/drawing/2014/main" id="{7F40F7C0-8F9F-5467-0AA1-54322A1B012E}"/>
-              </a:ext>
-            </a:extLst>
-          </p:cNvPr>
-          <p:cNvCxnSpPr>
-            <a:cxnSpLocks/>
-          </p:cNvCxnSpPr>
-          <p:nvPr/>
-        </p:nvCxnSpPr>
-        <p:spPr>
-          <a:xfrm flipV="1">
-            <a:off x="8226694" y="2417283"/>
-            <a:ext cx="23527" cy="2491093"/>
-          </a:xfrm>
-          <a:prstGeom prst="straightConnector1">
-            <a:avLst/>
-          </a:prstGeom>
-          <a:ln w="38100">
-            <a:solidFill>
-              <a:schemeClr val="tx1"/>
-            </a:solidFill>
-            <a:tailEnd type="triangle"/>
-          </a:ln>
-        </p:spPr>
-        <p:style>
-          <a:lnRef idx="2">
-            <a:schemeClr val="accent1"/>
-          </a:lnRef>
-          <a:fillRef idx="0">
-            <a:schemeClr val="accent1"/>
-          </a:fillRef>
-          <a:effectRef idx="1">
-            <a:schemeClr val="accent1"/>
-          </a:effectRef>
-          <a:fontRef idx="minor">
-            <a:schemeClr val="tx1"/>
-          </a:fontRef>
-        </p:style>
-      </p:cxnSp>
-      <p:cxnSp>
-        <p:nvCxnSpPr>
-          <p:cNvPr id="42" name="Straight Arrow Connector 41">
-            <a:extLst>
-              <a:ext uri="{FF2B5EF4-FFF2-40B4-BE49-F238E27FC236}">
-                <a16:creationId xmlns:a16="http://schemas.microsoft.com/office/drawing/2014/main" id="{3FF65B0D-2128-48A2-C6BF-EEFBDF5032C2}"/>
-              </a:ext>
-            </a:extLst>
-          </p:cNvPr>
-          <p:cNvCxnSpPr>
-            <a:cxnSpLocks/>
-          </p:cNvCxnSpPr>
-          <p:nvPr/>
-        </p:nvCxnSpPr>
-        <p:spPr>
-          <a:xfrm>
-            <a:off x="8226694" y="4908376"/>
-            <a:ext cx="3225269" cy="0"/>
-          </a:xfrm>
-          <a:prstGeom prst="straightConnector1">
-            <a:avLst/>
-          </a:prstGeom>
-          <a:ln w="38100">
-            <a:solidFill>
-              <a:schemeClr val="tx1"/>
-            </a:solidFill>
-            <a:tailEnd type="triangle"/>
-          </a:ln>
-        </p:spPr>
-        <p:style>
-          <a:lnRef idx="2">
-            <a:schemeClr val="accent1"/>
-          </a:lnRef>
-          <a:fillRef idx="0">
-            <a:schemeClr val="accent1"/>
-          </a:fillRef>
-          <a:effectRef idx="1">
-            <a:schemeClr val="accent1"/>
-          </a:effectRef>
-          <a:fontRef idx="minor">
-            <a:schemeClr val="tx1"/>
-          </a:fontRef>
-        </p:style>
-      </p:cxnSp>
-      <p:sp>
-        <p:nvSpPr>
-          <p:cNvPr id="43" name="TextBox 42">
-            <a:extLst>
-              <a:ext uri="{FF2B5EF4-FFF2-40B4-BE49-F238E27FC236}">
-                <a16:creationId xmlns:a16="http://schemas.microsoft.com/office/drawing/2014/main" id="{62972613-7A40-EEAD-36D6-D99B33FD04D6}"/>
-              </a:ext>
-            </a:extLst>
-          </p:cNvPr>
-          <p:cNvSpPr txBox="1"/>
-          <p:nvPr/>
-        </p:nvSpPr>
-        <p:spPr>
-          <a:xfrm>
-            <a:off x="11069866" y="4895265"/>
-            <a:ext cx="567868" cy="646331"/>
-          </a:xfrm>
-          <a:prstGeom prst="rect">
-            <a:avLst/>
-          </a:prstGeom>
-          <a:noFill/>
-        </p:spPr>
-        <p:txBody>
-          <a:bodyPr wrap="square" rtlCol="0">
-            <a:spAutoFit/>
-          </a:bodyPr>
-          <a:lstStyle/>
-          <a:p>
-            <a:r>
-              <a:rPr lang="en-ES" sz="3600" dirty="0"/>
-              <a:t>x</a:t>
-            </a:r>
-          </a:p>
-        </p:txBody>
-      </p:sp>
-      <p:cxnSp>
-        <p:nvCxnSpPr>
-          <p:cNvPr id="58" name="Straight Arrow Connector 57">
-            <a:extLst>
-              <a:ext uri="{FF2B5EF4-FFF2-40B4-BE49-F238E27FC236}">
-                <a16:creationId xmlns:a16="http://schemas.microsoft.com/office/drawing/2014/main" id="{CCA5B95B-998E-A1C6-47D1-5E353C95FAF5}"/>
-              </a:ext>
-            </a:extLst>
-          </p:cNvPr>
-          <p:cNvCxnSpPr>
-            <a:cxnSpLocks/>
-          </p:cNvCxnSpPr>
-          <p:nvPr/>
-        </p:nvCxnSpPr>
-        <p:spPr>
-          <a:xfrm flipV="1">
-            <a:off x="8231487" y="3513799"/>
-            <a:ext cx="951382" cy="1419145"/>
-          </a:xfrm>
-          <a:prstGeom prst="straightConnector1">
-            <a:avLst/>
-          </a:prstGeom>
-          <a:ln w="38100">
-            <a:solidFill>
-              <a:schemeClr val="tx1"/>
-            </a:solidFill>
-            <a:tailEnd type="triangle"/>
-          </a:ln>
-        </p:spPr>
-        <p:style>
-          <a:lnRef idx="2">
-            <a:schemeClr val="accent1"/>
-          </a:lnRef>
-          <a:fillRef idx="0">
-            <a:schemeClr val="accent1"/>
-          </a:fillRef>
-          <a:effectRef idx="1">
-            <a:schemeClr val="accent1"/>
-          </a:effectRef>
-          <a:fontRef idx="minor">
-            <a:schemeClr val="tx1"/>
-          </a:fontRef>
-        </p:style>
-      </p:cxnSp>
-      <p:sp>
-        <p:nvSpPr>
-          <p:cNvPr id="61" name="TextBox 60">
-            <a:extLst>
-              <a:ext uri="{FF2B5EF4-FFF2-40B4-BE49-F238E27FC236}">
-                <a16:creationId xmlns:a16="http://schemas.microsoft.com/office/drawing/2014/main" id="{7C0742B9-49F1-60CA-F189-435AEC7AC1F2}"/>
-              </a:ext>
-            </a:extLst>
-          </p:cNvPr>
-          <p:cNvSpPr txBox="1"/>
-          <p:nvPr/>
-        </p:nvSpPr>
-        <p:spPr>
-          <a:xfrm>
-            <a:off x="8375794" y="2033395"/>
-            <a:ext cx="386644" cy="646331"/>
-          </a:xfrm>
-          <a:prstGeom prst="rect">
-            <a:avLst/>
-          </a:prstGeom>
-          <a:noFill/>
-        </p:spPr>
-        <p:txBody>
-          <a:bodyPr wrap="none" rtlCol="0">
-            <a:spAutoFit/>
-          </a:bodyPr>
-          <a:lstStyle/>
-          <a:p>
-            <a:r>
-              <a:rPr lang="en-ES" sz="3600" dirty="0"/>
-              <a:t>z</a:t>
-            </a:r>
-          </a:p>
-        </p:txBody>
-      </p:sp>
-      <p:sp>
-        <p:nvSpPr>
-          <p:cNvPr id="63" name="Oval 62">
-            <a:extLst>
-              <a:ext uri="{FF2B5EF4-FFF2-40B4-BE49-F238E27FC236}">
-                <a16:creationId xmlns:a16="http://schemas.microsoft.com/office/drawing/2014/main" id="{4C5C545A-0A5E-81E3-07A4-D107F0ADC87A}"/>
-              </a:ext>
-            </a:extLst>
-          </p:cNvPr>
-          <p:cNvSpPr/>
-          <p:nvPr/>
-        </p:nvSpPr>
-        <p:spPr>
-          <a:xfrm>
-            <a:off x="8196111" y="3083404"/>
-            <a:ext cx="95519" cy="87688"/>
-          </a:xfrm>
-          <a:prstGeom prst="ellipse">
-            <a:avLst/>
-          </a:prstGeom>
-        </p:spPr>
-        <p:style>
-          <a:lnRef idx="2">
-            <a:schemeClr val="accent1">
-              <a:shade val="15000"/>
-            </a:schemeClr>
-          </a:lnRef>
-          <a:fillRef idx="1">
-            <a:schemeClr val="accent1"/>
-          </a:fillRef>
-          <a:effectRef idx="0">
-            <a:schemeClr val="accent1"/>
-          </a:effectRef>
-          <a:fontRef idx="minor">
-            <a:schemeClr val="lt1"/>
-          </a:fontRef>
-        </p:style>
-        <p:txBody>
-          <a:bodyPr rtlCol="0" anchor="ctr"/>
-          <a:lstStyle/>
-          <a:p>
-            <a:pPr algn="ctr"/>
-            <a:endParaRPr lang="en-ES"/>
-          </a:p>
-        </p:txBody>
-      </p:sp>
-      <p:sp>
-        <p:nvSpPr>
-          <p:cNvPr id="64" name="Oval 63">
-            <a:extLst>
-              <a:ext uri="{FF2B5EF4-FFF2-40B4-BE49-F238E27FC236}">
-                <a16:creationId xmlns:a16="http://schemas.microsoft.com/office/drawing/2014/main" id="{B9DECD15-6A90-8F2A-42EE-A001068C177B}"/>
-              </a:ext>
-            </a:extLst>
-          </p:cNvPr>
-          <p:cNvSpPr/>
-          <p:nvPr/>
-        </p:nvSpPr>
-        <p:spPr>
-          <a:xfrm>
-            <a:off x="10236623" y="4342107"/>
-            <a:ext cx="95519" cy="87688"/>
-          </a:xfrm>
-          <a:prstGeom prst="ellipse">
-            <a:avLst/>
-          </a:prstGeom>
-        </p:spPr>
-        <p:style>
-          <a:lnRef idx="2">
-            <a:schemeClr val="accent1">
-              <a:shade val="15000"/>
-            </a:schemeClr>
-          </a:lnRef>
-          <a:fillRef idx="1">
-            <a:schemeClr val="accent1"/>
-          </a:fillRef>
-          <a:effectRef idx="0">
-            <a:schemeClr val="accent1"/>
-          </a:effectRef>
-          <a:fontRef idx="minor">
-            <a:schemeClr val="lt1"/>
-          </a:fontRef>
-        </p:style>
-        <p:txBody>
-          <a:bodyPr rtlCol="0" anchor="ctr"/>
-          <a:lstStyle/>
-          <a:p>
-            <a:pPr algn="ctr"/>
-            <a:endParaRPr lang="en-ES"/>
-          </a:p>
-        </p:txBody>
-      </p:sp>
-      <p:sp>
-        <p:nvSpPr>
-          <p:cNvPr id="65" name="Oval 64">
-            <a:extLst>
-              <a:ext uri="{FF2B5EF4-FFF2-40B4-BE49-F238E27FC236}">
-                <a16:creationId xmlns:a16="http://schemas.microsoft.com/office/drawing/2014/main" id="{CBEA7EF2-4DF1-77C2-309F-A3BFC3B20BE1}"/>
-              </a:ext>
-            </a:extLst>
-          </p:cNvPr>
-          <p:cNvSpPr/>
-          <p:nvPr/>
-        </p:nvSpPr>
-        <p:spPr>
-          <a:xfrm>
-            <a:off x="6940473" y="4342107"/>
-            <a:ext cx="95519" cy="87688"/>
-          </a:xfrm>
-          <a:prstGeom prst="ellipse">
-            <a:avLst/>
-          </a:prstGeom>
-        </p:spPr>
-        <p:style>
-          <a:lnRef idx="2">
-            <a:schemeClr val="accent1">
-              <a:shade val="15000"/>
-            </a:schemeClr>
-          </a:lnRef>
-          <a:fillRef idx="1">
-            <a:schemeClr val="accent1"/>
-          </a:fillRef>
-          <a:effectRef idx="0">
-            <a:schemeClr val="accent1"/>
-          </a:effectRef>
-          <a:fontRef idx="minor">
-            <a:schemeClr val="lt1"/>
-          </a:fontRef>
-        </p:style>
-        <p:txBody>
-          <a:bodyPr rtlCol="0" anchor="ctr"/>
-          <a:lstStyle/>
-          <a:p>
-            <a:pPr algn="ctr"/>
-            <a:endParaRPr lang="en-ES"/>
-          </a:p>
-        </p:txBody>
-      </p:sp>
-      <p:cxnSp>
-        <p:nvCxnSpPr>
-          <p:cNvPr id="66" name="Straight Arrow Connector 65">
-            <a:extLst>
-              <a:ext uri="{FF2B5EF4-FFF2-40B4-BE49-F238E27FC236}">
-                <a16:creationId xmlns:a16="http://schemas.microsoft.com/office/drawing/2014/main" id="{4E6E89EA-DB65-0D6F-D0E7-B4A7A3669132}"/>
-              </a:ext>
-            </a:extLst>
-          </p:cNvPr>
-          <p:cNvCxnSpPr>
-            <a:cxnSpLocks/>
-          </p:cNvCxnSpPr>
-          <p:nvPr/>
-        </p:nvCxnSpPr>
-        <p:spPr>
-          <a:xfrm flipH="1" flipV="1">
-            <a:off x="7510690" y="2665527"/>
-            <a:ext cx="699409" cy="438811"/>
-          </a:xfrm>
-          <a:prstGeom prst="straightConnector1">
-            <a:avLst/>
-          </a:prstGeom>
-          <a:ln w="38100">
-            <a:solidFill>
-              <a:schemeClr val="tx1"/>
-            </a:solidFill>
-            <a:tailEnd type="triangle"/>
-          </a:ln>
-        </p:spPr>
-        <p:style>
-          <a:lnRef idx="2">
-            <a:schemeClr val="accent1"/>
-          </a:lnRef>
-          <a:fillRef idx="0">
-            <a:schemeClr val="accent1"/>
-          </a:fillRef>
-          <a:effectRef idx="1">
-            <a:schemeClr val="accent1"/>
-          </a:effectRef>
-          <a:fontRef idx="minor">
-            <a:schemeClr val="tx1"/>
-          </a:fontRef>
-        </p:style>
-      </p:cxnSp>
-      <p:cxnSp>
-        <p:nvCxnSpPr>
-          <p:cNvPr id="70" name="Straight Arrow Connector 69">
-            <a:extLst>
-              <a:ext uri="{FF2B5EF4-FFF2-40B4-BE49-F238E27FC236}">
-                <a16:creationId xmlns:a16="http://schemas.microsoft.com/office/drawing/2014/main" id="{057A2C09-DEA6-0010-6F4A-38BA466EE131}"/>
-              </a:ext>
-            </a:extLst>
-          </p:cNvPr>
-          <p:cNvCxnSpPr>
-            <a:cxnSpLocks/>
-            <a:endCxn id="63" idx="5"/>
-          </p:cNvCxnSpPr>
-          <p:nvPr/>
-        </p:nvCxnSpPr>
-        <p:spPr>
-          <a:xfrm flipH="1" flipV="1">
-            <a:off x="8277642" y="3158250"/>
-            <a:ext cx="1987588" cy="1217979"/>
-          </a:xfrm>
-          <a:prstGeom prst="straightConnector1">
-            <a:avLst/>
-          </a:prstGeom>
-          <a:ln w="38100">
-            <a:solidFill>
-              <a:schemeClr val="tx1"/>
-            </a:solidFill>
-            <a:prstDash val="dash"/>
-            <a:tailEnd type="none"/>
-          </a:ln>
-        </p:spPr>
-        <p:style>
-          <a:lnRef idx="2">
-            <a:schemeClr val="accent1"/>
-          </a:lnRef>
-          <a:fillRef idx="0">
-            <a:schemeClr val="accent1"/>
-          </a:fillRef>
-          <a:effectRef idx="1">
-            <a:schemeClr val="accent1"/>
-          </a:effectRef>
-          <a:fontRef idx="minor">
-            <a:schemeClr val="tx1"/>
-          </a:fontRef>
-        </p:style>
-      </p:cxnSp>
-      <p:cxnSp>
-        <p:nvCxnSpPr>
-          <p:cNvPr id="73" name="Straight Arrow Connector 72">
-            <a:extLst>
-              <a:ext uri="{FF2B5EF4-FFF2-40B4-BE49-F238E27FC236}">
-                <a16:creationId xmlns:a16="http://schemas.microsoft.com/office/drawing/2014/main" id="{574AE1CD-877A-3333-9F4B-5AB770D75161}"/>
-              </a:ext>
-            </a:extLst>
-          </p:cNvPr>
-          <p:cNvCxnSpPr>
-            <a:cxnSpLocks/>
-          </p:cNvCxnSpPr>
-          <p:nvPr/>
-        </p:nvCxnSpPr>
-        <p:spPr>
-          <a:xfrm flipH="1">
-            <a:off x="7632706" y="3151452"/>
-            <a:ext cx="585558" cy="600339"/>
-          </a:xfrm>
-          <a:prstGeom prst="straightConnector1">
-            <a:avLst/>
-          </a:prstGeom>
-          <a:ln w="38100">
-            <a:solidFill>
-              <a:schemeClr val="tx1"/>
-            </a:solidFill>
-            <a:tailEnd type="triangle"/>
-          </a:ln>
-        </p:spPr>
-        <p:style>
-          <a:lnRef idx="2">
-            <a:schemeClr val="accent1"/>
-          </a:lnRef>
-          <a:fillRef idx="0">
-            <a:schemeClr val="accent1"/>
-          </a:fillRef>
-          <a:effectRef idx="1">
-            <a:schemeClr val="accent1"/>
-          </a:effectRef>
-          <a:fontRef idx="minor">
-            <a:schemeClr val="tx1"/>
-          </a:fontRef>
-        </p:style>
-      </p:cxnSp>
-      <p:cxnSp>
-        <p:nvCxnSpPr>
-          <p:cNvPr id="76" name="Straight Arrow Connector 75">
-            <a:extLst>
-              <a:ext uri="{FF2B5EF4-FFF2-40B4-BE49-F238E27FC236}">
-                <a16:creationId xmlns:a16="http://schemas.microsoft.com/office/drawing/2014/main" id="{5EA5187D-0BEF-3AE5-F182-07B473F575C7}"/>
-              </a:ext>
-            </a:extLst>
-          </p:cNvPr>
-          <p:cNvCxnSpPr>
-            <a:cxnSpLocks/>
-            <a:endCxn id="65" idx="7"/>
-          </p:cNvCxnSpPr>
-          <p:nvPr/>
-        </p:nvCxnSpPr>
-        <p:spPr>
-          <a:xfrm flipH="1">
-            <a:off x="7022004" y="3801830"/>
-            <a:ext cx="551549" cy="553119"/>
-          </a:xfrm>
-          <a:prstGeom prst="straightConnector1">
-            <a:avLst/>
-          </a:prstGeom>
-          <a:ln w="38100">
-            <a:solidFill>
-              <a:schemeClr val="tx1"/>
-            </a:solidFill>
-            <a:prstDash val="dash"/>
-            <a:tailEnd type="none"/>
-          </a:ln>
-        </p:spPr>
-        <p:style>
-          <a:lnRef idx="2">
-            <a:schemeClr val="accent1"/>
-          </a:lnRef>
-          <a:fillRef idx="0">
-            <a:schemeClr val="accent1"/>
-          </a:fillRef>
-          <a:effectRef idx="1">
-            <a:schemeClr val="accent1"/>
-          </a:effectRef>
-          <a:fontRef idx="minor">
-            <a:schemeClr val="tx1"/>
-          </a:fontRef>
-        </p:style>
-      </p:cxnSp>
-      <p:sp>
-        <p:nvSpPr>
-          <p:cNvPr id="88" name="TextBox 87">
-            <a:extLst>
-              <a:ext uri="{FF2B5EF4-FFF2-40B4-BE49-F238E27FC236}">
-                <a16:creationId xmlns:a16="http://schemas.microsoft.com/office/drawing/2014/main" id="{62F315E5-15F5-F32A-79B4-8EB5B351B1F7}"/>
-              </a:ext>
-            </a:extLst>
-          </p:cNvPr>
-          <p:cNvSpPr txBox="1"/>
-          <p:nvPr/>
-        </p:nvSpPr>
-        <p:spPr>
-          <a:xfrm>
-            <a:off x="6086094" y="2322249"/>
-            <a:ext cx="1804276" cy="369332"/>
-          </a:xfrm>
-          <a:prstGeom prst="rect">
-            <a:avLst/>
-          </a:prstGeom>
-          <a:noFill/>
-        </p:spPr>
-        <p:txBody>
-          <a:bodyPr wrap="none" rtlCol="0">
-            <a:spAutoFit/>
-          </a:bodyPr>
-          <a:lstStyle/>
-          <a:p>
-            <a:r>
-              <a:rPr lang="en-ES" dirty="0"/>
-              <a:t>Ez&gt;0  Ey&lt;0  Ex&lt;0</a:t>
-            </a:r>
-          </a:p>
-        </p:txBody>
-      </p:sp>
-      <p:sp>
-        <p:nvSpPr>
-          <p:cNvPr id="89" name="TextBox 88">
-            <a:extLst>
-              <a:ext uri="{FF2B5EF4-FFF2-40B4-BE49-F238E27FC236}">
-                <a16:creationId xmlns:a16="http://schemas.microsoft.com/office/drawing/2014/main" id="{6F7CE4F5-D0BA-E3E3-F65E-E299F8461623}"/>
-              </a:ext>
-            </a:extLst>
-          </p:cNvPr>
-          <p:cNvSpPr txBox="1"/>
-          <p:nvPr/>
-        </p:nvSpPr>
-        <p:spPr>
-          <a:xfrm>
-            <a:off x="6038727" y="3227768"/>
-            <a:ext cx="1804276" cy="369332"/>
-          </a:xfrm>
-          <a:prstGeom prst="rect">
-            <a:avLst/>
-          </a:prstGeom>
-          <a:noFill/>
-        </p:spPr>
-        <p:txBody>
-          <a:bodyPr wrap="none" rtlCol="0">
-            <a:spAutoFit/>
-          </a:bodyPr>
-          <a:lstStyle/>
-          <a:p>
-            <a:r>
-              <a:rPr lang="en-ES" dirty="0"/>
-              <a:t>Ez&lt;0  Ey&gt;0  Ex&lt;0</a:t>
-            </a:r>
-          </a:p>
-        </p:txBody>
-      </p:sp>
-    </p:spTree>
-    <p:extLst>
-      <p:ext uri="{BB962C8B-B14F-4D97-AF65-F5344CB8AC3E}">
-        <p14:creationId xmlns:p14="http://schemas.microsoft.com/office/powerpoint/2010/main" val="650413243"/>
-      </p:ext>
-    </p:extLst>
-  </p:cSld>
-  <p:clrMapOvr>
-    <a:masterClrMapping/>
-  </p:clrMapOvr>
-</p:sld>
-</file>
-
-<file path=ppt/slides/slide30.xml><?xml version="1.0" encoding="utf-8"?>
+<file path=ppt/slides/slide31.xml><?xml version="1.0" encoding="utf-8"?>
 <p:sld xmlns:a="http://schemas.openxmlformats.org/drawingml/2006/main" xmlns:r="http://schemas.openxmlformats.org/officeDocument/2006/relationships" xmlns:p="http://schemas.openxmlformats.org/presentationml/2006/main">
   <p:cSld>
     <p:spTree>
@@ -24664,7 +25353,7 @@
 </p:sld>
 </file>
 
-<file path=ppt/slides/slide31.xml><?xml version="1.0" encoding="utf-8"?>
+<file path=ppt/slides/slide32.xml><?xml version="1.0" encoding="utf-8"?>
 <p:sld xmlns:a="http://schemas.openxmlformats.org/drawingml/2006/main" xmlns:r="http://schemas.openxmlformats.org/officeDocument/2006/relationships" xmlns:p="http://schemas.openxmlformats.org/presentationml/2006/main">
   <p:cSld>
     <p:spTree>
@@ -25749,7 +26438,7 @@
 </p:sld>
 </file>
 
-<file path=ppt/slides/slide32.xml><?xml version="1.0" encoding="utf-8"?>
+<file path=ppt/slides/slide33.xml><?xml version="1.0" encoding="utf-8"?>
 <p:sld xmlns:a="http://schemas.openxmlformats.org/drawingml/2006/main" xmlns:r="http://schemas.openxmlformats.org/officeDocument/2006/relationships" xmlns:p="http://schemas.openxmlformats.org/presentationml/2006/main">
   <p:cSld>
     <p:spTree>
@@ -27170,7 +27859,7 @@
 </p:sld>
 </file>
 
-<file path=ppt/slides/slide33.xml><?xml version="1.0" encoding="utf-8"?>
+<file path=ppt/slides/slide34.xml><?xml version="1.0" encoding="utf-8"?>
 <p:sld xmlns:a="http://schemas.openxmlformats.org/drawingml/2006/main" xmlns:r="http://schemas.openxmlformats.org/officeDocument/2006/relationships" xmlns:p="http://schemas.openxmlformats.org/presentationml/2006/main">
   <p:cSld>
     <p:spTree>
@@ -27932,7 +28621,7 @@
 </p:sld>
 </file>
 
-<file path=ppt/slides/slide34.xml><?xml version="1.0" encoding="utf-8"?>
+<file path=ppt/slides/slide35.xml><?xml version="1.0" encoding="utf-8"?>
 <p:sld xmlns:a="http://schemas.openxmlformats.org/drawingml/2006/main" xmlns:r="http://schemas.openxmlformats.org/officeDocument/2006/relationships" xmlns:p="http://schemas.openxmlformats.org/presentationml/2006/main">
   <p:cSld>
     <p:spTree>
@@ -29057,7 +29746,7 @@
 </p:sld>
 </file>
 
-<file path=ppt/slides/slide35.xml><?xml version="1.0" encoding="utf-8"?>
+<file path=ppt/slides/slide36.xml><?xml version="1.0" encoding="utf-8"?>
 <p:sld xmlns:a="http://schemas.openxmlformats.org/drawingml/2006/main" xmlns:r="http://schemas.openxmlformats.org/officeDocument/2006/relationships" xmlns:p="http://schemas.openxmlformats.org/presentationml/2006/main">
   <p:cSld>
     <p:spTree>
@@ -31166,7 +31855,7 @@
 </p:sld>
 </file>
 
-<file path=ppt/slides/slide36.xml><?xml version="1.0" encoding="utf-8"?>
+<file path=ppt/slides/slide37.xml><?xml version="1.0" encoding="utf-8"?>
 <p:sld xmlns:a="http://schemas.openxmlformats.org/drawingml/2006/main" xmlns:r="http://schemas.openxmlformats.org/officeDocument/2006/relationships" xmlns:p="http://schemas.openxmlformats.org/presentationml/2006/main">
   <p:cSld>
     <p:spTree>

</xml_diff>